<commit_message>
Remove Arcade Advanced stream for today
</commit_message>
<xml_diff>
--- a/docs/static/online-learning/Mixer Stream Schedule.pptx
+++ b/docs/static/online-learning/Mixer Stream Schedule.pptx
@@ -11,8 +11,8 @@
     <p:sldId id="256" r:id="rId5"/>
     <p:sldId id="257" r:id="rId6"/>
     <p:sldId id="258" r:id="rId7"/>
-    <p:sldId id="262" r:id="rId8"/>
-    <p:sldId id="259" r:id="rId9"/>
+    <p:sldId id="259" r:id="rId8"/>
+    <p:sldId id="262" r:id="rId9"/>
     <p:sldId id="260" r:id="rId10"/>
     <p:sldId id="261" r:id="rId11"/>
   </p:sldIdLst>
@@ -804,7 +804,7 @@
     </p:spTree>
     <p:extLst>
       <p:ext uri="{BB962C8B-B14F-4D97-AF65-F5344CB8AC3E}">
-        <p14:creationId xmlns:p14="http://schemas.microsoft.com/office/powerpoint/2010/main" val="388717020"/>
+        <p14:creationId xmlns:p14="http://schemas.microsoft.com/office/powerpoint/2010/main" val="2525836932"/>
       </p:ext>
     </p:extLst>
   </p:cSld>
@@ -888,7 +888,7 @@
     </p:spTree>
     <p:extLst>
       <p:ext uri="{BB962C8B-B14F-4D97-AF65-F5344CB8AC3E}">
-        <p14:creationId xmlns:p14="http://schemas.microsoft.com/office/powerpoint/2010/main" val="2525836932"/>
+        <p14:creationId xmlns:p14="http://schemas.microsoft.com/office/powerpoint/2010/main" val="3414736694"/>
       </p:ext>
     </p:extLst>
   </p:cSld>
@@ -7126,1000 +7126,6 @@
 <file path=ppt/slides/slide4.xml><?xml version="1.0" encoding="utf-8"?>
 <p:sld xmlns:a="http://schemas.openxmlformats.org/drawingml/2006/main" xmlns:r="http://schemas.openxmlformats.org/officeDocument/2006/relationships" xmlns:p="http://schemas.openxmlformats.org/presentationml/2006/main">
   <p:cSld>
-    <p:spTree>
-      <p:nvGrpSpPr>
-        <p:cNvPr id="1" name=""/>
-        <p:cNvGrpSpPr/>
-        <p:nvPr/>
-      </p:nvGrpSpPr>
-      <p:grpSpPr>
-        <a:xfrm>
-          <a:off x="0" y="0"/>
-          <a:ext cx="0" cy="0"/>
-          <a:chOff x="0" y="0"/>
-          <a:chExt cx="0" cy="0"/>
-        </a:xfrm>
-      </p:grpSpPr>
-      <p:graphicFrame>
-        <p:nvGraphicFramePr>
-          <p:cNvPr id="4" name="Table 4">
-            <a:extLst>
-              <a:ext uri="{FF2B5EF4-FFF2-40B4-BE49-F238E27FC236}">
-                <a16:creationId xmlns:a16="http://schemas.microsoft.com/office/drawing/2014/main" id="{1E17FCE3-C1AC-415D-AD4D-9D9BBBF374CC}"/>
-              </a:ext>
-            </a:extLst>
-          </p:cNvPr>
-          <p:cNvGraphicFramePr>
-            <a:graphicFrameLocks noGrp="1"/>
-          </p:cNvGraphicFramePr>
-          <p:nvPr/>
-        </p:nvGraphicFramePr>
-        <p:xfrm>
-          <a:off x="272956" y="270379"/>
-          <a:ext cx="10181230" cy="6317242"/>
-        </p:xfrm>
-        <a:graphic>
-          <a:graphicData uri="http://schemas.openxmlformats.org/drawingml/2006/table">
-            <a:tbl>
-              <a:tblPr firstRow="1" bandRow="1">
-                <a:tableStyleId>{69012ECD-51FC-41F1-AA8D-1B2483CD663E}</a:tableStyleId>
-              </a:tblPr>
-              <a:tblGrid>
-                <a:gridCol w="2255241">
-                  <a:extLst>
-                    <a:ext uri="{9D8B030D-6E8A-4147-A177-3AD203B41FA5}">
-                      <a16:colId xmlns:a16="http://schemas.microsoft.com/office/drawing/2014/main" val="1510224491"/>
-                    </a:ext>
-                  </a:extLst>
-                </a:gridCol>
-                <a:gridCol w="7925989">
-                  <a:extLst>
-                    <a:ext uri="{9D8B030D-6E8A-4147-A177-3AD203B41FA5}">
-                      <a16:colId xmlns:a16="http://schemas.microsoft.com/office/drawing/2014/main" val="21893690"/>
-                    </a:ext>
-                  </a:extLst>
-                </a:gridCol>
-              </a:tblGrid>
-              <a:tr h="1148097">
-                <a:tc>
-                  <a:txBody>
-                    <a:bodyPr/>
-                    <a:lstStyle/>
-                    <a:p>
-                      <a:pPr algn="ctr"/>
-                      <a:r>
-                        <a:rPr lang="en-US" sz="3600" dirty="0">
-                          <a:latin typeface="Agency FB" panose="020B0503020202020204" pitchFamily="34" charset="0"/>
-                        </a:rPr>
-                        <a:t>TIME</a:t>
-                      </a:r>
-                    </a:p>
-                  </a:txBody>
-                  <a:tcPr marL="107715" marR="107715" marT="53858" marB="53858" anchor="ctr">
-                    <a:lnL w="6350" cap="flat" cmpd="sng" algn="ctr">
-                      <a:noFill/>
-                      <a:prstDash val="solid"/>
-                      <a:miter lim="800000"/>
-                    </a:lnL>
-                    <a:lnR>
-                      <a:noFill/>
-                    </a:lnR>
-                    <a:lnT w="6350" cap="flat" cmpd="sng" algn="ctr">
-                      <a:noFill/>
-                      <a:prstDash val="solid"/>
-                      <a:miter lim="800000"/>
-                    </a:lnT>
-                    <a:lnB w="6350" cap="flat" cmpd="sng" algn="ctr">
-                      <a:noFill/>
-                      <a:prstDash val="solid"/>
-                      <a:miter lim="800000"/>
-                    </a:lnB>
-                    <a:lnTlToBr w="12700" cmpd="sng">
-                      <a:noFill/>
-                      <a:prstDash val="solid"/>
-                    </a:lnTlToBr>
-                    <a:lnBlToTr w="12700" cmpd="sng">
-                      <a:noFill/>
-                      <a:prstDash val="solid"/>
-                    </a:lnBlToTr>
-                    <a:solidFill>
-                      <a:srgbClr val="5D406C"/>
-                    </a:solidFill>
-                  </a:tcPr>
-                </a:tc>
-                <a:tc>
-                  <a:txBody>
-                    <a:bodyPr/>
-                    <a:lstStyle/>
-                    <a:p>
-                      <a:pPr algn="ctr"/>
-                      <a:r>
-                        <a:rPr lang="en-US" sz="3600" dirty="0">
-                          <a:latin typeface="Agency FB" panose="020B0503020202020204" pitchFamily="34" charset="0"/>
-                        </a:rPr>
-                        <a:t>STREAM</a:t>
-                      </a:r>
-                    </a:p>
-                  </a:txBody>
-                  <a:tcPr marL="107715" marR="107715" marT="53858" marB="53858" anchor="ctr">
-                    <a:lnL>
-                      <a:noFill/>
-                    </a:lnL>
-                    <a:lnR w="6350" cap="flat" cmpd="sng" algn="ctr">
-                      <a:noFill/>
-                      <a:prstDash val="solid"/>
-                      <a:miter lim="800000"/>
-                    </a:lnR>
-                    <a:lnT w="6350" cap="flat" cmpd="sng" algn="ctr">
-                      <a:noFill/>
-                      <a:prstDash val="solid"/>
-                      <a:miter lim="800000"/>
-                    </a:lnT>
-                    <a:lnB w="6350" cap="flat" cmpd="sng" algn="ctr">
-                      <a:noFill/>
-                      <a:prstDash val="solid"/>
-                      <a:miter lim="800000"/>
-                    </a:lnB>
-                    <a:lnTlToBr w="12700" cmpd="sng">
-                      <a:noFill/>
-                      <a:prstDash val="solid"/>
-                    </a:lnTlToBr>
-                    <a:lnBlToTr w="12700" cmpd="sng">
-                      <a:noFill/>
-                      <a:prstDash val="solid"/>
-                    </a:lnBlToTr>
-                    <a:solidFill>
-                      <a:srgbClr val="5D406C"/>
-                    </a:solidFill>
-                  </a:tcPr>
-                </a:tc>
-                <a:extLst>
-                  <a:ext uri="{0D108BD9-81ED-4DB2-BD59-A6C34878D82A}">
-                    <a16:rowId xmlns:a16="http://schemas.microsoft.com/office/drawing/2014/main" val="888274358"/>
-                  </a:ext>
-                </a:extLst>
-              </a:tr>
-              <a:tr h="1033829">
-                <a:tc>
-                  <a:txBody>
-                    <a:bodyPr/>
-                    <a:lstStyle/>
-                    <a:p>
-                      <a:pPr algn="ctr"/>
-                      <a:r>
-                        <a:rPr lang="en-US" sz="2400" b="1" dirty="0">
-                          <a:solidFill>
-                            <a:schemeClr val="bg1">
-                              <a:lumMod val="85000"/>
-                            </a:schemeClr>
-                          </a:solidFill>
-                          <a:latin typeface="Agency FB" panose="020B0503020202020204" pitchFamily="34" charset="0"/>
-                        </a:rPr>
-                        <a:t>9 AM PST</a:t>
-                      </a:r>
-                    </a:p>
-                    <a:p>
-                      <a:pPr algn="ctr"/>
-                      <a:r>
-                        <a:rPr lang="en-US" sz="2400" dirty="0">
-                          <a:solidFill>
-                            <a:schemeClr val="bg1">
-                              <a:lumMod val="85000"/>
-                            </a:schemeClr>
-                          </a:solidFill>
-                          <a:latin typeface="Agency FB" panose="020B0503020202020204" pitchFamily="34" charset="0"/>
-                        </a:rPr>
-                        <a:t>12 PM EST</a:t>
-                      </a:r>
-                    </a:p>
-                  </a:txBody>
-                  <a:tcPr marL="107715" marR="107715" marT="53858" marB="53858" anchor="ctr">
-                    <a:lnL w="6350" cap="flat" cmpd="sng" algn="ctr">
-                      <a:noFill/>
-                      <a:prstDash val="solid"/>
-                      <a:miter lim="800000"/>
-                    </a:lnL>
-                    <a:lnR>
-                      <a:noFill/>
-                    </a:lnR>
-                    <a:lnT w="6350" cap="flat" cmpd="sng" algn="ctr">
-                      <a:noFill/>
-                      <a:prstDash val="solid"/>
-                      <a:miter lim="800000"/>
-                    </a:lnT>
-                    <a:lnB w="6350" cap="flat" cmpd="sng" algn="ctr">
-                      <a:noFill/>
-                      <a:prstDash val="solid"/>
-                      <a:miter lim="800000"/>
-                    </a:lnB>
-                    <a:lnTlToBr w="12700" cmpd="sng">
-                      <a:noFill/>
-                      <a:prstDash val="solid"/>
-                    </a:lnTlToBr>
-                    <a:lnBlToTr w="12700" cmpd="sng">
-                      <a:noFill/>
-                      <a:prstDash val="solid"/>
-                    </a:lnBlToTr>
-                    <a:solidFill>
-                      <a:schemeClr val="bg1"/>
-                    </a:solidFill>
-                  </a:tcPr>
-                </a:tc>
-                <a:tc>
-                  <a:txBody>
-                    <a:bodyPr/>
-                    <a:lstStyle/>
-                    <a:p>
-                      <a:pPr algn="ctr"/>
-                      <a:r>
-                        <a:rPr lang="en-US" sz="3600" dirty="0">
-                          <a:solidFill>
-                            <a:schemeClr val="bg1">
-                              <a:lumMod val="85000"/>
-                            </a:schemeClr>
-                          </a:solidFill>
-                          <a:latin typeface="Agency FB" panose="020B0503020202020204" pitchFamily="34" charset="0"/>
-                        </a:rPr>
-                        <a:t>MakeCode for the </a:t>
-                      </a:r>
-                      <a:r>
-                        <a:rPr lang="en-US" sz="3600" dirty="0" err="1">
-                          <a:solidFill>
-                            <a:schemeClr val="bg1">
-                              <a:lumMod val="85000"/>
-                            </a:schemeClr>
-                          </a:solidFill>
-                          <a:latin typeface="Agency FB" panose="020B0503020202020204" pitchFamily="34" charset="0"/>
-                        </a:rPr>
-                        <a:t>micro:bit</a:t>
-                      </a:r>
-                      <a:r>
-                        <a:rPr lang="en-US" sz="3600" dirty="0">
-                          <a:solidFill>
-                            <a:schemeClr val="bg1">
-                              <a:lumMod val="85000"/>
-                            </a:schemeClr>
-                          </a:solidFill>
-                          <a:latin typeface="Agency FB" panose="020B0503020202020204" pitchFamily="34" charset="0"/>
-                        </a:rPr>
-                        <a:t> (on break)</a:t>
-                      </a:r>
-                    </a:p>
-                  </a:txBody>
-                  <a:tcPr marL="107715" marR="107715" marT="53858" marB="53858" anchor="ctr">
-                    <a:lnL>
-                      <a:noFill/>
-                    </a:lnL>
-                    <a:lnR w="6350" cap="flat" cmpd="sng" algn="ctr">
-                      <a:noFill/>
-                      <a:prstDash val="solid"/>
-                      <a:miter lim="800000"/>
-                    </a:lnR>
-                    <a:lnT w="6350" cap="flat" cmpd="sng" algn="ctr">
-                      <a:noFill/>
-                      <a:prstDash val="solid"/>
-                      <a:miter lim="800000"/>
-                    </a:lnT>
-                    <a:lnB w="6350" cap="flat" cmpd="sng" algn="ctr">
-                      <a:noFill/>
-                      <a:prstDash val="solid"/>
-                      <a:miter lim="800000"/>
-                    </a:lnB>
-                    <a:lnTlToBr w="12700" cmpd="sng">
-                      <a:noFill/>
-                      <a:prstDash val="solid"/>
-                    </a:lnTlToBr>
-                    <a:lnBlToTr w="12700" cmpd="sng">
-                      <a:noFill/>
-                      <a:prstDash val="solid"/>
-                    </a:lnBlToTr>
-                    <a:solidFill>
-                      <a:schemeClr val="bg1"/>
-                    </a:solidFill>
-                  </a:tcPr>
-                </a:tc>
-                <a:extLst>
-                  <a:ext uri="{0D108BD9-81ED-4DB2-BD59-A6C34878D82A}">
-                    <a16:rowId xmlns:a16="http://schemas.microsoft.com/office/drawing/2014/main" val="55475757"/>
-                  </a:ext>
-                </a:extLst>
-              </a:tr>
-              <a:tr h="1033829">
-                <a:tc>
-                  <a:txBody>
-                    <a:bodyPr/>
-                    <a:lstStyle/>
-                    <a:p>
-                      <a:pPr algn="ctr"/>
-                      <a:r>
-                        <a:rPr lang="en-US" sz="2400" b="1" dirty="0">
-                          <a:solidFill>
-                            <a:srgbClr val="CDBBCB"/>
-                          </a:solidFill>
-                          <a:latin typeface="Agency FB" panose="020B0503020202020204" pitchFamily="34" charset="0"/>
-                        </a:rPr>
-                        <a:t>10 AM PST</a:t>
-                      </a:r>
-                    </a:p>
-                    <a:p>
-                      <a:pPr algn="ctr"/>
-                      <a:r>
-                        <a:rPr lang="en-US" sz="2400" dirty="0">
-                          <a:solidFill>
-                            <a:srgbClr val="CDBBCB"/>
-                          </a:solidFill>
-                          <a:latin typeface="Agency FB" panose="020B0503020202020204" pitchFamily="34" charset="0"/>
-                        </a:rPr>
-                        <a:t>1 PM EST</a:t>
-                      </a:r>
-                    </a:p>
-                  </a:txBody>
-                  <a:tcPr marL="107715" marR="107715" marT="53858" marB="53858" anchor="ctr">
-                    <a:lnL w="6350" cap="flat" cmpd="sng" algn="ctr">
-                      <a:noFill/>
-                      <a:prstDash val="solid"/>
-                      <a:miter lim="800000"/>
-                    </a:lnL>
-                    <a:lnR>
-                      <a:noFill/>
-                    </a:lnR>
-                    <a:lnT w="6350" cap="flat" cmpd="sng" algn="ctr">
-                      <a:noFill/>
-                      <a:prstDash val="solid"/>
-                      <a:miter lim="800000"/>
-                    </a:lnT>
-                    <a:lnB w="6350" cap="flat" cmpd="sng" algn="ctr">
-                      <a:noFill/>
-                      <a:prstDash val="solid"/>
-                      <a:miter lim="800000"/>
-                    </a:lnB>
-                    <a:lnTlToBr w="12700" cmpd="sng">
-                      <a:noFill/>
-                      <a:prstDash val="solid"/>
-                    </a:lnTlToBr>
-                    <a:lnBlToTr w="12700" cmpd="sng">
-                      <a:noFill/>
-                      <a:prstDash val="solid"/>
-                    </a:lnBlToTr>
-                    <a:solidFill>
-                      <a:srgbClr val="ECE4EB"/>
-                    </a:solidFill>
-                  </a:tcPr>
-                </a:tc>
-                <a:tc>
-                  <a:txBody>
-                    <a:bodyPr/>
-                    <a:lstStyle/>
-                    <a:p>
-                      <a:pPr algn="ctr"/>
-                      <a:r>
-                        <a:rPr lang="en-US" sz="3600" dirty="0">
-                          <a:solidFill>
-                            <a:srgbClr val="CDBBCB"/>
-                          </a:solidFill>
-                          <a:latin typeface="Agency FB" panose="020B0503020202020204" pitchFamily="34" charset="0"/>
-                        </a:rPr>
-                        <a:t>MakeCode with Minecraft (on break)</a:t>
-                      </a:r>
-                    </a:p>
-                  </a:txBody>
-                  <a:tcPr marL="107715" marR="107715" marT="53858" marB="53858" anchor="ctr">
-                    <a:lnL>
-                      <a:noFill/>
-                    </a:lnL>
-                    <a:lnR w="6350" cap="flat" cmpd="sng" algn="ctr">
-                      <a:noFill/>
-                      <a:prstDash val="solid"/>
-                      <a:miter lim="800000"/>
-                    </a:lnR>
-                    <a:lnT w="6350" cap="flat" cmpd="sng" algn="ctr">
-                      <a:noFill/>
-                      <a:prstDash val="solid"/>
-                      <a:miter lim="800000"/>
-                    </a:lnT>
-                    <a:lnB w="6350" cap="flat" cmpd="sng" algn="ctr">
-                      <a:noFill/>
-                      <a:prstDash val="solid"/>
-                      <a:miter lim="800000"/>
-                    </a:lnB>
-                    <a:lnTlToBr w="12700" cmpd="sng">
-                      <a:noFill/>
-                      <a:prstDash val="solid"/>
-                    </a:lnTlToBr>
-                    <a:lnBlToTr w="12700" cmpd="sng">
-                      <a:noFill/>
-                      <a:prstDash val="solid"/>
-                    </a:lnBlToTr>
-                    <a:solidFill>
-                      <a:srgbClr val="ECE4EB"/>
-                    </a:solidFill>
-                  </a:tcPr>
-                </a:tc>
-                <a:extLst>
-                  <a:ext uri="{0D108BD9-81ED-4DB2-BD59-A6C34878D82A}">
-                    <a16:rowId xmlns:a16="http://schemas.microsoft.com/office/drawing/2014/main" val="1272730967"/>
-                  </a:ext>
-                </a:extLst>
-              </a:tr>
-              <a:tr h="1033829">
-                <a:tc>
-                  <a:txBody>
-                    <a:bodyPr/>
-                    <a:lstStyle/>
-                    <a:p>
-                      <a:pPr algn="ctr"/>
-                      <a:r>
-                        <a:rPr lang="en-US" sz="2400" b="1" dirty="0">
-                          <a:solidFill>
-                            <a:schemeClr val="bg1">
-                              <a:lumMod val="85000"/>
-                            </a:schemeClr>
-                          </a:solidFill>
-                          <a:latin typeface="Agency FB" panose="020B0503020202020204" pitchFamily="34" charset="0"/>
-                        </a:rPr>
-                        <a:t>11 AM PST</a:t>
-                      </a:r>
-                    </a:p>
-                    <a:p>
-                      <a:pPr algn="ctr"/>
-                      <a:r>
-                        <a:rPr lang="en-US" sz="2400" dirty="0">
-                          <a:solidFill>
-                            <a:schemeClr val="bg1">
-                              <a:lumMod val="85000"/>
-                            </a:schemeClr>
-                          </a:solidFill>
-                          <a:latin typeface="Agency FB" panose="020B0503020202020204" pitchFamily="34" charset="0"/>
-                        </a:rPr>
-                        <a:t>2 PM EST</a:t>
-                      </a:r>
-                    </a:p>
-                  </a:txBody>
-                  <a:tcPr marL="107715" marR="107715" marT="53858" marB="53858" anchor="ctr">
-                    <a:lnL w="6350" cap="flat" cmpd="sng" algn="ctr">
-                      <a:noFill/>
-                      <a:prstDash val="solid"/>
-                      <a:miter lim="800000"/>
-                    </a:lnL>
-                    <a:lnR>
-                      <a:noFill/>
-                    </a:lnR>
-                    <a:lnT w="6350" cap="flat" cmpd="sng" algn="ctr">
-                      <a:noFill/>
-                      <a:prstDash val="solid"/>
-                      <a:miter lim="800000"/>
-                    </a:lnT>
-                    <a:lnB w="6350" cap="flat" cmpd="sng" algn="ctr">
-                      <a:noFill/>
-                      <a:prstDash val="solid"/>
-                      <a:miter lim="800000"/>
-                    </a:lnB>
-                    <a:lnTlToBr w="12700" cmpd="sng">
-                      <a:noFill/>
-                      <a:prstDash val="solid"/>
-                    </a:lnTlToBr>
-                    <a:lnBlToTr w="12700" cmpd="sng">
-                      <a:noFill/>
-                      <a:prstDash val="solid"/>
-                    </a:lnBlToTr>
-                    <a:solidFill>
-                      <a:schemeClr val="bg1"/>
-                    </a:solidFill>
-                  </a:tcPr>
-                </a:tc>
-                <a:tc>
-                  <a:txBody>
-                    <a:bodyPr/>
-                    <a:lstStyle/>
-                    <a:p>
-                      <a:pPr algn="ctr"/>
-                      <a:r>
-                        <a:rPr lang="en-US" sz="3600" dirty="0">
-                          <a:solidFill>
-                            <a:schemeClr val="bg1">
-                              <a:lumMod val="85000"/>
-                            </a:schemeClr>
-                          </a:solidFill>
-                          <a:latin typeface="Agency FB" panose="020B0503020202020204" pitchFamily="34" charset="0"/>
-                        </a:rPr>
-                        <a:t>MakeCode Arcade  (on break)</a:t>
-                      </a:r>
-                    </a:p>
-                  </a:txBody>
-                  <a:tcPr marL="107715" marR="107715" marT="53858" marB="53858" anchor="ctr">
-                    <a:lnL>
-                      <a:noFill/>
-                    </a:lnL>
-                    <a:lnR w="6350" cap="flat" cmpd="sng" algn="ctr">
-                      <a:noFill/>
-                      <a:prstDash val="solid"/>
-                      <a:miter lim="800000"/>
-                    </a:lnR>
-                    <a:lnT w="6350" cap="flat" cmpd="sng" algn="ctr">
-                      <a:noFill/>
-                      <a:prstDash val="solid"/>
-                      <a:miter lim="800000"/>
-                    </a:lnT>
-                    <a:lnB w="6350" cap="flat" cmpd="sng" algn="ctr">
-                      <a:noFill/>
-                      <a:prstDash val="solid"/>
-                      <a:miter lim="800000"/>
-                    </a:lnB>
-                    <a:lnTlToBr w="12700" cmpd="sng">
-                      <a:noFill/>
-                      <a:prstDash val="solid"/>
-                    </a:lnTlToBr>
-                    <a:lnBlToTr w="12700" cmpd="sng">
-                      <a:noFill/>
-                      <a:prstDash val="solid"/>
-                    </a:lnBlToTr>
-                    <a:solidFill>
-                      <a:schemeClr val="bg1"/>
-                    </a:solidFill>
-                  </a:tcPr>
-                </a:tc>
-                <a:extLst>
-                  <a:ext uri="{0D108BD9-81ED-4DB2-BD59-A6C34878D82A}">
-                    <a16:rowId xmlns:a16="http://schemas.microsoft.com/office/drawing/2014/main" val="2202148809"/>
-                  </a:ext>
-                </a:extLst>
-              </a:tr>
-              <a:tr h="1033829">
-                <a:tc>
-                  <a:txBody>
-                    <a:bodyPr/>
-                    <a:lstStyle/>
-                    <a:p>
-                      <a:pPr algn="ctr"/>
-                      <a:r>
-                        <a:rPr lang="en-US" sz="2400" b="1" dirty="0">
-                          <a:solidFill>
-                            <a:schemeClr val="tx1"/>
-                          </a:solidFill>
-                          <a:latin typeface="Agency FB" panose="020B0503020202020204" pitchFamily="34" charset="0"/>
-                        </a:rPr>
-                        <a:t>1 PM PST</a:t>
-                      </a:r>
-                    </a:p>
-                    <a:p>
-                      <a:pPr algn="ctr"/>
-                      <a:r>
-                        <a:rPr lang="en-US" sz="2400" dirty="0">
-                          <a:solidFill>
-                            <a:schemeClr val="tx1"/>
-                          </a:solidFill>
-                          <a:latin typeface="Agency FB" panose="020B0503020202020204" pitchFamily="34" charset="0"/>
-                        </a:rPr>
-                        <a:t>4 PM EST</a:t>
-                      </a:r>
-                    </a:p>
-                  </a:txBody>
-                  <a:tcPr marL="107715" marR="107715" marT="53858" marB="53858" anchor="ctr">
-                    <a:lnL w="6350" cap="flat" cmpd="sng" algn="ctr">
-                      <a:noFill/>
-                      <a:prstDash val="solid"/>
-                      <a:miter lim="800000"/>
-                    </a:lnL>
-                    <a:lnR>
-                      <a:noFill/>
-                    </a:lnR>
-                    <a:lnT w="6350" cap="flat" cmpd="sng" algn="ctr">
-                      <a:noFill/>
-                      <a:prstDash val="solid"/>
-                      <a:miter lim="800000"/>
-                    </a:lnT>
-                    <a:lnB w="6350" cap="flat" cmpd="sng" algn="ctr">
-                      <a:noFill/>
-                      <a:prstDash val="solid"/>
-                      <a:miter lim="800000"/>
-                    </a:lnB>
-                    <a:lnTlToBr w="12700" cmpd="sng">
-                      <a:noFill/>
-                      <a:prstDash val="solid"/>
-                    </a:lnTlToBr>
-                    <a:lnBlToTr w="12700" cmpd="sng">
-                      <a:noFill/>
-                      <a:prstDash val="solid"/>
-                    </a:lnBlToTr>
-                    <a:solidFill>
-                      <a:srgbClr val="ECE4EB"/>
-                    </a:solidFill>
-                  </a:tcPr>
-                </a:tc>
-                <a:tc>
-                  <a:txBody>
-                    <a:bodyPr/>
-                    <a:lstStyle/>
-                    <a:p>
-                      <a:pPr algn="ctr"/>
-                      <a:r>
-                        <a:rPr lang="en-US" sz="3600" dirty="0">
-                          <a:solidFill>
-                            <a:schemeClr val="tx1"/>
-                          </a:solidFill>
-                          <a:latin typeface="Agency FB" panose="020B0503020202020204" pitchFamily="34" charset="0"/>
-                        </a:rPr>
-                        <a:t>MakeCode Arcade (Advanced)</a:t>
-                      </a:r>
-                    </a:p>
-                  </a:txBody>
-                  <a:tcPr marL="107715" marR="107715" marT="53858" marB="53858" anchor="ctr">
-                    <a:lnL>
-                      <a:noFill/>
-                    </a:lnL>
-                    <a:lnR w="6350" cap="flat" cmpd="sng" algn="ctr">
-                      <a:noFill/>
-                      <a:prstDash val="solid"/>
-                      <a:miter lim="800000"/>
-                    </a:lnR>
-                    <a:lnT w="6350" cap="flat" cmpd="sng" algn="ctr">
-                      <a:noFill/>
-                      <a:prstDash val="solid"/>
-                      <a:miter lim="800000"/>
-                    </a:lnT>
-                    <a:lnB w="6350" cap="flat" cmpd="sng" algn="ctr">
-                      <a:noFill/>
-                      <a:prstDash val="solid"/>
-                      <a:miter lim="800000"/>
-                    </a:lnB>
-                    <a:lnTlToBr w="12700" cmpd="sng">
-                      <a:noFill/>
-                      <a:prstDash val="solid"/>
-                    </a:lnTlToBr>
-                    <a:lnBlToTr w="12700" cmpd="sng">
-                      <a:noFill/>
-                      <a:prstDash val="solid"/>
-                    </a:lnBlToTr>
-                    <a:solidFill>
-                      <a:srgbClr val="ECE4EB"/>
-                    </a:solidFill>
-                  </a:tcPr>
-                </a:tc>
-                <a:extLst>
-                  <a:ext uri="{0D108BD9-81ED-4DB2-BD59-A6C34878D82A}">
-                    <a16:rowId xmlns:a16="http://schemas.microsoft.com/office/drawing/2014/main" val="2354609438"/>
-                  </a:ext>
-                </a:extLst>
-              </a:tr>
-              <a:tr h="1033829">
-                <a:tc>
-                  <a:txBody>
-                    <a:bodyPr/>
-                    <a:lstStyle/>
-                    <a:p>
-                      <a:pPr algn="ctr"/>
-                      <a:r>
-                        <a:rPr lang="en-US" sz="2400" b="1" dirty="0">
-                          <a:latin typeface="Agency FB" panose="020B0503020202020204" pitchFamily="34" charset="0"/>
-                        </a:rPr>
-                        <a:t>2 PM PST</a:t>
-                      </a:r>
-                    </a:p>
-                    <a:p>
-                      <a:pPr algn="ctr"/>
-                      <a:r>
-                        <a:rPr lang="en-US" sz="2400" dirty="0">
-                          <a:latin typeface="Agency FB" panose="020B0503020202020204" pitchFamily="34" charset="0"/>
-                        </a:rPr>
-                        <a:t>5PM EST</a:t>
-                      </a:r>
-                    </a:p>
-                  </a:txBody>
-                  <a:tcPr marL="107715" marR="107715" marT="53858" marB="53858" anchor="ctr">
-                    <a:lnL w="6350" cap="flat" cmpd="sng" algn="ctr">
-                      <a:noFill/>
-                      <a:prstDash val="solid"/>
-                      <a:miter lim="800000"/>
-                    </a:lnL>
-                    <a:lnR>
-                      <a:noFill/>
-                    </a:lnR>
-                    <a:lnT w="6350" cap="flat" cmpd="sng" algn="ctr">
-                      <a:noFill/>
-                      <a:prstDash val="solid"/>
-                      <a:miter lim="800000"/>
-                    </a:lnT>
-                    <a:lnB w="6350" cap="flat" cmpd="sng" algn="ctr">
-                      <a:noFill/>
-                      <a:prstDash val="solid"/>
-                      <a:miter lim="800000"/>
-                    </a:lnB>
-                    <a:lnTlToBr w="12700" cmpd="sng">
-                      <a:noFill/>
-                      <a:prstDash val="solid"/>
-                    </a:lnTlToBr>
-                    <a:lnBlToTr w="12700" cmpd="sng">
-                      <a:noFill/>
-                      <a:prstDash val="solid"/>
-                    </a:lnBlToTr>
-                    <a:solidFill>
-                      <a:schemeClr val="bg1"/>
-                    </a:solidFill>
-                  </a:tcPr>
-                </a:tc>
-                <a:tc>
-                  <a:txBody>
-                    <a:bodyPr/>
-                    <a:lstStyle/>
-                    <a:p>
-                      <a:pPr algn="ctr"/>
-                      <a:r>
-                        <a:rPr lang="en-US" sz="3600" dirty="0">
-                          <a:latin typeface="Agency FB" panose="020B0503020202020204" pitchFamily="34" charset="0"/>
-                        </a:rPr>
-                        <a:t>MakeCode in the Kitchen (Friday only)</a:t>
-                      </a:r>
-                    </a:p>
-                  </a:txBody>
-                  <a:tcPr marL="107715" marR="107715" marT="53858" marB="53858" anchor="ctr">
-                    <a:lnL>
-                      <a:noFill/>
-                    </a:lnL>
-                    <a:lnR w="6350" cap="flat" cmpd="sng" algn="ctr">
-                      <a:noFill/>
-                      <a:prstDash val="solid"/>
-                      <a:miter lim="800000"/>
-                    </a:lnR>
-                    <a:lnT w="6350" cap="flat" cmpd="sng" algn="ctr">
-                      <a:noFill/>
-                      <a:prstDash val="solid"/>
-                      <a:miter lim="800000"/>
-                    </a:lnT>
-                    <a:lnB w="6350" cap="flat" cmpd="sng" algn="ctr">
-                      <a:noFill/>
-                      <a:prstDash val="solid"/>
-                      <a:miter lim="800000"/>
-                    </a:lnB>
-                    <a:lnTlToBr w="12700" cmpd="sng">
-                      <a:noFill/>
-                      <a:prstDash val="solid"/>
-                    </a:lnTlToBr>
-                    <a:lnBlToTr w="12700" cmpd="sng">
-                      <a:noFill/>
-                      <a:prstDash val="solid"/>
-                    </a:lnBlToTr>
-                    <a:solidFill>
-                      <a:schemeClr val="bg1"/>
-                    </a:solidFill>
-                  </a:tcPr>
-                </a:tc>
-                <a:extLst>
-                  <a:ext uri="{0D108BD9-81ED-4DB2-BD59-A6C34878D82A}">
-                    <a16:rowId xmlns:a16="http://schemas.microsoft.com/office/drawing/2014/main" val="1095520334"/>
-                  </a:ext>
-                </a:extLst>
-              </a:tr>
-            </a:tbl>
-          </a:graphicData>
-        </a:graphic>
-      </p:graphicFrame>
-      <p:pic>
-        <p:nvPicPr>
-          <p:cNvPr id="6" name="Picture 5">
-            <a:extLst>
-              <a:ext uri="{FF2B5EF4-FFF2-40B4-BE49-F238E27FC236}">
-                <a16:creationId xmlns:a16="http://schemas.microsoft.com/office/drawing/2014/main" id="{DFA03610-80FC-4DFE-A985-E935A407F2D5}"/>
-              </a:ext>
-            </a:extLst>
-          </p:cNvPr>
-          <p:cNvPicPr>
-            <a:picLocks noChangeAspect="1"/>
-          </p:cNvPicPr>
-          <p:nvPr/>
-        </p:nvPicPr>
-        <p:blipFill>
-          <a:blip r:embed="rId3">
-            <a:clrChange>
-              <a:clrFrom>
-                <a:srgbClr val="FFFFFF"/>
-              </a:clrFrom>
-              <a:clrTo>
-                <a:srgbClr val="FFFFFF">
-                  <a:alpha val="0"/>
-                </a:srgbClr>
-              </a:clrTo>
-            </a:clrChange>
-          </a:blip>
-          <a:stretch>
-            <a:fillRect/>
-          </a:stretch>
-        </p:blipFill>
-        <p:spPr>
-          <a:xfrm rot="20891684">
-            <a:off x="9661190" y="7499776"/>
-            <a:ext cx="1585991" cy="1288260"/>
-          </a:xfrm>
-          <a:prstGeom prst="rect">
-            <a:avLst/>
-          </a:prstGeom>
-        </p:spPr>
-      </p:pic>
-      <p:pic>
-        <p:nvPicPr>
-          <p:cNvPr id="1026" name="Picture 2" descr="Image result for minecraft agent">
-            <a:extLst>
-              <a:ext uri="{FF2B5EF4-FFF2-40B4-BE49-F238E27FC236}">
-                <a16:creationId xmlns:a16="http://schemas.microsoft.com/office/drawing/2014/main" id="{88852689-71CA-442A-A4C5-81C1A8DFB04A}"/>
-              </a:ext>
-            </a:extLst>
-          </p:cNvPr>
-          <p:cNvPicPr>
-            <a:picLocks noChangeAspect="1" noChangeArrowheads="1"/>
-          </p:cNvPicPr>
-          <p:nvPr/>
-        </p:nvPicPr>
-        <p:blipFill>
-          <a:blip r:embed="rId4">
-            <a:extLst>
-              <a:ext uri="{28A0092B-C50C-407E-A947-70E740481C1C}">
-                <a14:useLocalDpi xmlns:a14="http://schemas.microsoft.com/office/drawing/2010/main" val="0"/>
-              </a:ext>
-            </a:extLst>
-          </a:blip>
-          <a:srcRect/>
-          <a:stretch>
-            <a:fillRect/>
-          </a:stretch>
-        </p:blipFill>
-        <p:spPr bwMode="auto">
-          <a:xfrm>
-            <a:off x="7180351" y="7026356"/>
-            <a:ext cx="1485444" cy="1909856"/>
-          </a:xfrm>
-          <a:prstGeom prst="rect">
-            <a:avLst/>
-          </a:prstGeom>
-          <a:noFill/>
-          <a:extLst>
-            <a:ext uri="{909E8E84-426E-40DD-AFC4-6F175D3DCCD1}">
-              <a14:hiddenFill xmlns:a14="http://schemas.microsoft.com/office/drawing/2010/main">
-                <a:solidFill>
-                  <a:srgbClr val="FFFFFF"/>
-                </a:solidFill>
-              </a14:hiddenFill>
-            </a:ext>
-          </a:extLst>
-        </p:spPr>
-      </p:pic>
-      <p:pic>
-        <p:nvPicPr>
-          <p:cNvPr id="20" name="Picture 19">
-            <a:extLst>
-              <a:ext uri="{FF2B5EF4-FFF2-40B4-BE49-F238E27FC236}">
-                <a16:creationId xmlns:a16="http://schemas.microsoft.com/office/drawing/2014/main" id="{48293F08-CD3E-4C65-96CD-5DF121F46256}"/>
-              </a:ext>
-            </a:extLst>
-          </p:cNvPr>
-          <p:cNvPicPr>
-            <a:picLocks noChangeAspect="1"/>
-          </p:cNvPicPr>
-          <p:nvPr/>
-        </p:nvPicPr>
-        <p:blipFill>
-          <a:blip r:embed="rId5">
-            <a:clrChange>
-              <a:clrFrom>
-                <a:srgbClr val="FFFFFF"/>
-              </a:clrFrom>
-              <a:clrTo>
-                <a:srgbClr val="FFFFFF">
-                  <a:alpha val="0"/>
-                </a:srgbClr>
-              </a:clrTo>
-            </a:clrChange>
-          </a:blip>
-          <a:stretch>
-            <a:fillRect/>
-          </a:stretch>
-        </p:blipFill>
-        <p:spPr>
-          <a:xfrm>
-            <a:off x="4909602" y="7150779"/>
-            <a:ext cx="1579177" cy="1986253"/>
-          </a:xfrm>
-          <a:prstGeom prst="rect">
-            <a:avLst/>
-          </a:prstGeom>
-        </p:spPr>
-      </p:pic>
-      <p:pic>
-        <p:nvPicPr>
-          <p:cNvPr id="21" name="Picture 20">
-            <a:extLst>
-              <a:ext uri="{FF2B5EF4-FFF2-40B4-BE49-F238E27FC236}">
-                <a16:creationId xmlns:a16="http://schemas.microsoft.com/office/drawing/2014/main" id="{7B9D8333-3412-4B90-9070-714BFAC66DE1}"/>
-              </a:ext>
-            </a:extLst>
-          </p:cNvPr>
-          <p:cNvPicPr>
-            <a:picLocks noChangeAspect="1"/>
-          </p:cNvPicPr>
-          <p:nvPr/>
-        </p:nvPicPr>
-        <p:blipFill>
-          <a:blip r:embed="rId6">
-            <a:clrChange>
-              <a:clrFrom>
-                <a:srgbClr val="FAFAFA"/>
-              </a:clrFrom>
-              <a:clrTo>
-                <a:srgbClr val="FAFAFA">
-                  <a:alpha val="0"/>
-                </a:srgbClr>
-              </a:clrTo>
-            </a:clrChange>
-          </a:blip>
-          <a:stretch>
-            <a:fillRect/>
-          </a:stretch>
-        </p:blipFill>
-        <p:spPr>
-          <a:xfrm>
-            <a:off x="8665795" y="2618970"/>
-            <a:ext cx="4262886" cy="4225817"/>
-          </a:xfrm>
-          <a:prstGeom prst="rect">
-            <a:avLst/>
-          </a:prstGeom>
-        </p:spPr>
-      </p:pic>
-      <p:pic>
-        <p:nvPicPr>
-          <p:cNvPr id="22" name="Picture 21">
-            <a:extLst>
-              <a:ext uri="{FF2B5EF4-FFF2-40B4-BE49-F238E27FC236}">
-                <a16:creationId xmlns:a16="http://schemas.microsoft.com/office/drawing/2014/main" id="{A98EC812-E79E-4C80-A59D-65E79E1E6801}"/>
-              </a:ext>
-            </a:extLst>
-          </p:cNvPr>
-          <p:cNvPicPr>
-            <a:picLocks noChangeAspect="1"/>
-          </p:cNvPicPr>
-          <p:nvPr/>
-        </p:nvPicPr>
-        <p:blipFill>
-          <a:blip r:embed="rId7">
-            <a:clrChange>
-              <a:clrFrom>
-                <a:srgbClr val="FFFFFF"/>
-              </a:clrFrom>
-              <a:clrTo>
-                <a:srgbClr val="FFFFFF">
-                  <a:alpha val="0"/>
-                </a:srgbClr>
-              </a:clrTo>
-            </a:clrChange>
-          </a:blip>
-          <a:stretch>
-            <a:fillRect/>
-          </a:stretch>
-        </p:blipFill>
-        <p:spPr>
-          <a:xfrm rot="21244650">
-            <a:off x="2288230" y="7073140"/>
-            <a:ext cx="1441710" cy="1454888"/>
-          </a:xfrm>
-          <a:prstGeom prst="rect">
-            <a:avLst/>
-          </a:prstGeom>
-        </p:spPr>
-      </p:pic>
-    </p:spTree>
-    <p:extLst>
-      <p:ext uri="{BB962C8B-B14F-4D97-AF65-F5344CB8AC3E}">
-        <p14:creationId xmlns:p14="http://schemas.microsoft.com/office/powerpoint/2010/main" val="2895878372"/>
-      </p:ext>
-    </p:extLst>
-  </p:cSld>
-  <p:clrMapOvr>
-    <a:masterClrMapping/>
-  </p:clrMapOvr>
-</p:sld>
-</file>
-
-<file path=ppt/slides/slide5.xml><?xml version="1.0" encoding="utf-8"?>
-<p:sld xmlns:a="http://schemas.openxmlformats.org/drawingml/2006/main" xmlns:r="http://schemas.openxmlformats.org/officeDocument/2006/relationships" xmlns:p="http://schemas.openxmlformats.org/presentationml/2006/main">
-  <p:cSld>
     <p:bg>
       <p:bgPr>
         <a:pattFill prst="pct5">
@@ -8162,7 +7168,7 @@
           <p:nvPr>
             <p:extLst>
               <p:ext uri="{D42A27DB-BD31-4B8C-83A1-F6EECF244321}">
-                <p14:modId xmlns:p14="http://schemas.microsoft.com/office/powerpoint/2010/main" val="307885181"/>
+                <p14:modId xmlns:p14="http://schemas.microsoft.com/office/powerpoint/2010/main" val="1526443243"/>
               </p:ext>
             </p:extLst>
           </p:nvPr>
@@ -9227,6 +8233,1008 @@
     <p:extLst>
       <p:ext uri="{BB962C8B-B14F-4D97-AF65-F5344CB8AC3E}">
         <p14:creationId xmlns:p14="http://schemas.microsoft.com/office/powerpoint/2010/main" val="1554094204"/>
+      </p:ext>
+    </p:extLst>
+  </p:cSld>
+  <p:clrMapOvr>
+    <a:masterClrMapping/>
+  </p:clrMapOvr>
+</p:sld>
+</file>
+
+<file path=ppt/slides/slide5.xml><?xml version="1.0" encoding="utf-8"?>
+<p:sld xmlns:a="http://schemas.openxmlformats.org/drawingml/2006/main" xmlns:r="http://schemas.openxmlformats.org/officeDocument/2006/relationships" xmlns:p="http://schemas.openxmlformats.org/presentationml/2006/main">
+  <p:cSld>
+    <p:bg>
+      <p:bgPr>
+        <a:pattFill prst="pct5">
+          <a:fgClr>
+            <a:srgbClr val="5D406C"/>
+          </a:fgClr>
+          <a:bgClr>
+            <a:schemeClr val="bg1"/>
+          </a:bgClr>
+        </a:pattFill>
+        <a:effectLst/>
+      </p:bgPr>
+    </p:bg>
+    <p:spTree>
+      <p:nvGrpSpPr>
+        <p:cNvPr id="1" name=""/>
+        <p:cNvGrpSpPr/>
+        <p:nvPr/>
+      </p:nvGrpSpPr>
+      <p:grpSpPr>
+        <a:xfrm>
+          <a:off x="0" y="0"/>
+          <a:ext cx="0" cy="0"/>
+          <a:chOff x="0" y="0"/>
+          <a:chExt cx="0" cy="0"/>
+        </a:xfrm>
+      </p:grpSpPr>
+      <p:graphicFrame>
+        <p:nvGraphicFramePr>
+          <p:cNvPr id="4" name="Table 4">
+            <a:extLst>
+              <a:ext uri="{FF2B5EF4-FFF2-40B4-BE49-F238E27FC236}">
+                <a16:creationId xmlns:a16="http://schemas.microsoft.com/office/drawing/2014/main" id="{1E17FCE3-C1AC-415D-AD4D-9D9BBBF374CC}"/>
+              </a:ext>
+            </a:extLst>
+          </p:cNvPr>
+          <p:cNvGraphicFramePr>
+            <a:graphicFrameLocks noGrp="1"/>
+          </p:cNvGraphicFramePr>
+          <p:nvPr>
+            <p:extLst>
+              <p:ext uri="{D42A27DB-BD31-4B8C-83A1-F6EECF244321}">
+                <p14:modId xmlns:p14="http://schemas.microsoft.com/office/powerpoint/2010/main" val="1499617002"/>
+              </p:ext>
+            </p:extLst>
+          </p:nvPr>
+        </p:nvGraphicFramePr>
+        <p:xfrm>
+          <a:off x="272956" y="194173"/>
+          <a:ext cx="8989325" cy="6370400"/>
+        </p:xfrm>
+        <a:graphic>
+          <a:graphicData uri="http://schemas.openxmlformats.org/drawingml/2006/table">
+            <a:tbl>
+              <a:tblPr firstRow="1" bandRow="1">
+                <a:tableStyleId>{69012ECD-51FC-41F1-AA8D-1B2483CD663E}</a:tableStyleId>
+              </a:tblPr>
+              <a:tblGrid>
+                <a:gridCol w="2056175">
+                  <a:extLst>
+                    <a:ext uri="{9D8B030D-6E8A-4147-A177-3AD203B41FA5}">
+                      <a16:colId xmlns:a16="http://schemas.microsoft.com/office/drawing/2014/main" val="1510224491"/>
+                    </a:ext>
+                  </a:extLst>
+                </a:gridCol>
+                <a:gridCol w="6933150">
+                  <a:extLst>
+                    <a:ext uri="{9D8B030D-6E8A-4147-A177-3AD203B41FA5}">
+                      <a16:colId xmlns:a16="http://schemas.microsoft.com/office/drawing/2014/main" val="21893690"/>
+                    </a:ext>
+                  </a:extLst>
+                </a:gridCol>
+              </a:tblGrid>
+              <a:tr h="801267">
+                <a:tc>
+                  <a:txBody>
+                    <a:bodyPr/>
+                    <a:lstStyle/>
+                    <a:p>
+                      <a:pPr algn="ctr"/>
+                      <a:r>
+                        <a:rPr lang="en-US" sz="3600" dirty="0">
+                          <a:latin typeface="Agency FB" panose="020B0503020202020204" pitchFamily="34" charset="0"/>
+                        </a:rPr>
+                        <a:t>TIME</a:t>
+                      </a:r>
+                    </a:p>
+                  </a:txBody>
+                  <a:tcPr marL="107715" marR="107715" marT="53858" marB="53858" anchor="ctr">
+                    <a:lnL w="6350" cap="flat" cmpd="sng" algn="ctr">
+                      <a:noFill/>
+                      <a:prstDash val="solid"/>
+                      <a:miter lim="800000"/>
+                    </a:lnL>
+                    <a:lnR>
+                      <a:noFill/>
+                    </a:lnR>
+                    <a:lnT w="6350" cap="flat" cmpd="sng" algn="ctr">
+                      <a:noFill/>
+                      <a:prstDash val="solid"/>
+                      <a:miter lim="800000"/>
+                    </a:lnT>
+                    <a:lnB w="6350" cap="flat" cmpd="sng" algn="ctr">
+                      <a:noFill/>
+                      <a:prstDash val="solid"/>
+                      <a:miter lim="800000"/>
+                    </a:lnB>
+                    <a:lnTlToBr w="12700" cmpd="sng">
+                      <a:noFill/>
+                      <a:prstDash val="solid"/>
+                    </a:lnTlToBr>
+                    <a:lnBlToTr w="12700" cmpd="sng">
+                      <a:noFill/>
+                      <a:prstDash val="solid"/>
+                    </a:lnBlToTr>
+                    <a:solidFill>
+                      <a:srgbClr val="5D406C"/>
+                    </a:solidFill>
+                  </a:tcPr>
+                </a:tc>
+                <a:tc>
+                  <a:txBody>
+                    <a:bodyPr/>
+                    <a:lstStyle/>
+                    <a:p>
+                      <a:pPr algn="ctr"/>
+                      <a:r>
+                        <a:rPr lang="en-US" sz="3600" dirty="0">
+                          <a:latin typeface="Agency FB" panose="020B0503020202020204" pitchFamily="34" charset="0"/>
+                        </a:rPr>
+                        <a:t>STREAM</a:t>
+                      </a:r>
+                    </a:p>
+                  </a:txBody>
+                  <a:tcPr marL="107715" marR="107715" marT="53858" marB="53858" anchor="ctr">
+                    <a:lnL>
+                      <a:noFill/>
+                    </a:lnL>
+                    <a:lnR w="6350" cap="flat" cmpd="sng" algn="ctr">
+                      <a:noFill/>
+                      <a:prstDash val="solid"/>
+                      <a:miter lim="800000"/>
+                    </a:lnR>
+                    <a:lnT w="6350" cap="flat" cmpd="sng" algn="ctr">
+                      <a:noFill/>
+                      <a:prstDash val="solid"/>
+                      <a:miter lim="800000"/>
+                    </a:lnT>
+                    <a:lnB w="6350" cap="flat" cmpd="sng" algn="ctr">
+                      <a:noFill/>
+                      <a:prstDash val="solid"/>
+                      <a:miter lim="800000"/>
+                    </a:lnB>
+                    <a:lnTlToBr w="12700" cmpd="sng">
+                      <a:noFill/>
+                      <a:prstDash val="solid"/>
+                    </a:lnTlToBr>
+                    <a:lnBlToTr w="12700" cmpd="sng">
+                      <a:noFill/>
+                      <a:prstDash val="solid"/>
+                    </a:lnBlToTr>
+                    <a:solidFill>
+                      <a:srgbClr val="5D406C"/>
+                    </a:solidFill>
+                  </a:tcPr>
+                </a:tc>
+                <a:extLst>
+                  <a:ext uri="{0D108BD9-81ED-4DB2-BD59-A6C34878D82A}">
+                    <a16:rowId xmlns:a16="http://schemas.microsoft.com/office/drawing/2014/main" val="888274358"/>
+                  </a:ext>
+                </a:extLst>
+              </a:tr>
+              <a:tr h="1024524">
+                <a:tc>
+                  <a:txBody>
+                    <a:bodyPr/>
+                    <a:lstStyle/>
+                    <a:p>
+                      <a:pPr algn="ctr"/>
+                      <a:r>
+                        <a:rPr lang="en-US" sz="2400" b="1" dirty="0">
+                          <a:latin typeface="Agency FB" panose="020B0503020202020204" pitchFamily="34" charset="0"/>
+                        </a:rPr>
+                        <a:t>9 AM PT</a:t>
+                      </a:r>
+                    </a:p>
+                    <a:p>
+                      <a:pPr algn="ctr"/>
+                      <a:r>
+                        <a:rPr lang="en-US" sz="2400" dirty="0">
+                          <a:latin typeface="Agency FB" panose="020B0503020202020204" pitchFamily="34" charset="0"/>
+                        </a:rPr>
+                        <a:t>12 PM ET</a:t>
+                      </a:r>
+                    </a:p>
+                  </a:txBody>
+                  <a:tcPr marL="107715" marR="107715" marT="53858" marB="53858" anchor="ctr">
+                    <a:lnL w="6350" cap="flat" cmpd="sng" algn="ctr">
+                      <a:noFill/>
+                      <a:prstDash val="solid"/>
+                      <a:miter lim="800000"/>
+                    </a:lnL>
+                    <a:lnR>
+                      <a:noFill/>
+                    </a:lnR>
+                    <a:lnT w="6350" cap="flat" cmpd="sng" algn="ctr">
+                      <a:noFill/>
+                      <a:prstDash val="solid"/>
+                      <a:miter lim="800000"/>
+                    </a:lnT>
+                    <a:lnB w="6350" cap="flat" cmpd="sng" algn="ctr">
+                      <a:noFill/>
+                      <a:prstDash val="solid"/>
+                      <a:miter lim="800000"/>
+                    </a:lnB>
+                    <a:lnTlToBr w="12700" cmpd="sng">
+                      <a:noFill/>
+                      <a:prstDash val="solid"/>
+                    </a:lnTlToBr>
+                    <a:lnBlToTr w="12700" cmpd="sng">
+                      <a:noFill/>
+                      <a:prstDash val="solid"/>
+                    </a:lnBlToTr>
+                    <a:solidFill>
+                      <a:schemeClr val="bg1"/>
+                    </a:solidFill>
+                  </a:tcPr>
+                </a:tc>
+                <a:tc>
+                  <a:txBody>
+                    <a:bodyPr/>
+                    <a:lstStyle/>
+                    <a:p>
+                      <a:pPr algn="ctr"/>
+                      <a:r>
+                        <a:rPr lang="en-US" sz="3600" dirty="0">
+                          <a:latin typeface="Agency FB" panose="020B0503020202020204" pitchFamily="34" charset="0"/>
+                        </a:rPr>
+                        <a:t>MakeCode for the micro:bit</a:t>
+                      </a:r>
+                    </a:p>
+                  </a:txBody>
+                  <a:tcPr marL="107715" marR="107715" marT="53858" marB="53858" anchor="ctr">
+                    <a:lnL>
+                      <a:noFill/>
+                    </a:lnL>
+                    <a:lnR w="6350" cap="flat" cmpd="sng" algn="ctr">
+                      <a:noFill/>
+                      <a:prstDash val="solid"/>
+                      <a:miter lim="800000"/>
+                    </a:lnR>
+                    <a:lnT w="6350" cap="flat" cmpd="sng" algn="ctr">
+                      <a:noFill/>
+                      <a:prstDash val="solid"/>
+                      <a:miter lim="800000"/>
+                    </a:lnT>
+                    <a:lnB w="6350" cap="flat" cmpd="sng" algn="ctr">
+                      <a:noFill/>
+                      <a:prstDash val="solid"/>
+                      <a:miter lim="800000"/>
+                    </a:lnB>
+                    <a:lnTlToBr w="12700" cmpd="sng">
+                      <a:noFill/>
+                      <a:prstDash val="solid"/>
+                    </a:lnTlToBr>
+                    <a:lnBlToTr w="12700" cmpd="sng">
+                      <a:noFill/>
+                      <a:prstDash val="solid"/>
+                    </a:lnBlToTr>
+                    <a:solidFill>
+                      <a:schemeClr val="bg1"/>
+                    </a:solidFill>
+                  </a:tcPr>
+                </a:tc>
+                <a:extLst>
+                  <a:ext uri="{0D108BD9-81ED-4DB2-BD59-A6C34878D82A}">
+                    <a16:rowId xmlns:a16="http://schemas.microsoft.com/office/drawing/2014/main" val="55475757"/>
+                  </a:ext>
+                </a:extLst>
+              </a:tr>
+              <a:tr h="1024524">
+                <a:tc>
+                  <a:txBody>
+                    <a:bodyPr/>
+                    <a:lstStyle/>
+                    <a:p>
+                      <a:pPr algn="ctr"/>
+                      <a:r>
+                        <a:rPr lang="en-US" sz="2400" b="1" dirty="0">
+                          <a:latin typeface="Agency FB" panose="020B0503020202020204" pitchFamily="34" charset="0"/>
+                        </a:rPr>
+                        <a:t>10 AM PT</a:t>
+                      </a:r>
+                    </a:p>
+                    <a:p>
+                      <a:pPr algn="ctr"/>
+                      <a:r>
+                        <a:rPr lang="en-US" sz="2400" dirty="0">
+                          <a:latin typeface="Agency FB" panose="020B0503020202020204" pitchFamily="34" charset="0"/>
+                        </a:rPr>
+                        <a:t>1 PM ET</a:t>
+                      </a:r>
+                    </a:p>
+                  </a:txBody>
+                  <a:tcPr marL="107715" marR="107715" marT="53858" marB="53858" anchor="ctr">
+                    <a:lnL w="6350" cap="flat" cmpd="sng" algn="ctr">
+                      <a:noFill/>
+                      <a:prstDash val="solid"/>
+                      <a:miter lim="800000"/>
+                    </a:lnL>
+                    <a:lnR>
+                      <a:noFill/>
+                    </a:lnR>
+                    <a:lnT w="6350" cap="flat" cmpd="sng" algn="ctr">
+                      <a:noFill/>
+                      <a:prstDash val="solid"/>
+                      <a:miter lim="800000"/>
+                    </a:lnT>
+                    <a:lnB w="6350" cap="flat" cmpd="sng" algn="ctr">
+                      <a:noFill/>
+                      <a:prstDash val="solid"/>
+                      <a:miter lim="800000"/>
+                    </a:lnB>
+                    <a:lnTlToBr w="12700" cmpd="sng">
+                      <a:noFill/>
+                      <a:prstDash val="solid"/>
+                    </a:lnTlToBr>
+                    <a:lnBlToTr w="12700" cmpd="sng">
+                      <a:noFill/>
+                      <a:prstDash val="solid"/>
+                    </a:lnBlToTr>
+                    <a:solidFill>
+                      <a:srgbClr val="ECE4EB"/>
+                    </a:solidFill>
+                  </a:tcPr>
+                </a:tc>
+                <a:tc>
+                  <a:txBody>
+                    <a:bodyPr/>
+                    <a:lstStyle/>
+                    <a:p>
+                      <a:pPr algn="ctr"/>
+                      <a:r>
+                        <a:rPr lang="en-US" sz="3600" dirty="0">
+                          <a:latin typeface="Agency FB" panose="020B0503020202020204" pitchFamily="34" charset="0"/>
+                        </a:rPr>
+                        <a:t>MakeCode with Minecraft: Education Edition</a:t>
+                      </a:r>
+                    </a:p>
+                  </a:txBody>
+                  <a:tcPr marL="107715" marR="107715" marT="53858" marB="53858" anchor="ctr">
+                    <a:lnL>
+                      <a:noFill/>
+                    </a:lnL>
+                    <a:lnR w="6350" cap="flat" cmpd="sng" algn="ctr">
+                      <a:noFill/>
+                      <a:prstDash val="solid"/>
+                      <a:miter lim="800000"/>
+                    </a:lnR>
+                    <a:lnT w="6350" cap="flat" cmpd="sng" algn="ctr">
+                      <a:noFill/>
+                      <a:prstDash val="solid"/>
+                      <a:miter lim="800000"/>
+                    </a:lnT>
+                    <a:lnB w="6350" cap="flat" cmpd="sng" algn="ctr">
+                      <a:noFill/>
+                      <a:prstDash val="solid"/>
+                      <a:miter lim="800000"/>
+                    </a:lnB>
+                    <a:lnTlToBr w="12700" cmpd="sng">
+                      <a:noFill/>
+                      <a:prstDash val="solid"/>
+                    </a:lnTlToBr>
+                    <a:lnBlToTr w="12700" cmpd="sng">
+                      <a:noFill/>
+                      <a:prstDash val="solid"/>
+                    </a:lnBlToTr>
+                    <a:solidFill>
+                      <a:srgbClr val="ECE4EB"/>
+                    </a:solidFill>
+                  </a:tcPr>
+                </a:tc>
+                <a:extLst>
+                  <a:ext uri="{0D108BD9-81ED-4DB2-BD59-A6C34878D82A}">
+                    <a16:rowId xmlns:a16="http://schemas.microsoft.com/office/drawing/2014/main" val="1272730967"/>
+                  </a:ext>
+                </a:extLst>
+              </a:tr>
+              <a:tr h="1024524">
+                <a:tc>
+                  <a:txBody>
+                    <a:bodyPr/>
+                    <a:lstStyle/>
+                    <a:p>
+                      <a:pPr algn="ctr"/>
+                      <a:r>
+                        <a:rPr lang="en-US" sz="2400" b="1" dirty="0">
+                          <a:latin typeface="Agency FB" panose="020B0503020202020204" pitchFamily="34" charset="0"/>
+                        </a:rPr>
+                        <a:t>11 AM PT</a:t>
+                      </a:r>
+                    </a:p>
+                    <a:p>
+                      <a:pPr algn="ctr"/>
+                      <a:r>
+                        <a:rPr lang="en-US" sz="2400" dirty="0">
+                          <a:latin typeface="Agency FB" panose="020B0503020202020204" pitchFamily="34" charset="0"/>
+                        </a:rPr>
+                        <a:t>2 PM ET</a:t>
+                      </a:r>
+                    </a:p>
+                  </a:txBody>
+                  <a:tcPr marL="107715" marR="107715" marT="53858" marB="53858" anchor="ctr">
+                    <a:lnL w="6350" cap="flat" cmpd="sng" algn="ctr">
+                      <a:noFill/>
+                      <a:prstDash val="solid"/>
+                      <a:miter lim="800000"/>
+                    </a:lnL>
+                    <a:lnR>
+                      <a:noFill/>
+                    </a:lnR>
+                    <a:lnT w="6350" cap="flat" cmpd="sng" algn="ctr">
+                      <a:noFill/>
+                      <a:prstDash val="solid"/>
+                      <a:miter lim="800000"/>
+                    </a:lnT>
+                    <a:lnB w="6350" cap="flat" cmpd="sng" algn="ctr">
+                      <a:noFill/>
+                      <a:prstDash val="solid"/>
+                      <a:miter lim="800000"/>
+                    </a:lnB>
+                    <a:lnTlToBr w="12700" cmpd="sng">
+                      <a:noFill/>
+                      <a:prstDash val="solid"/>
+                    </a:lnTlToBr>
+                    <a:lnBlToTr w="12700" cmpd="sng">
+                      <a:noFill/>
+                      <a:prstDash val="solid"/>
+                    </a:lnBlToTr>
+                    <a:solidFill>
+                      <a:schemeClr val="bg1"/>
+                    </a:solidFill>
+                  </a:tcPr>
+                </a:tc>
+                <a:tc>
+                  <a:txBody>
+                    <a:bodyPr/>
+                    <a:lstStyle/>
+                    <a:p>
+                      <a:pPr algn="ctr"/>
+                      <a:r>
+                        <a:rPr lang="en-US" sz="3600" dirty="0">
+                          <a:latin typeface="Agency FB" panose="020B0503020202020204" pitchFamily="34" charset="0"/>
+                        </a:rPr>
+                        <a:t>MakeCode Arcade (Beginner)</a:t>
+                      </a:r>
+                    </a:p>
+                  </a:txBody>
+                  <a:tcPr marL="107715" marR="107715" marT="53858" marB="53858" anchor="ctr">
+                    <a:lnL>
+                      <a:noFill/>
+                    </a:lnL>
+                    <a:lnR w="6350" cap="flat" cmpd="sng" algn="ctr">
+                      <a:noFill/>
+                      <a:prstDash val="solid"/>
+                      <a:miter lim="800000"/>
+                    </a:lnR>
+                    <a:lnT w="6350" cap="flat" cmpd="sng" algn="ctr">
+                      <a:noFill/>
+                      <a:prstDash val="solid"/>
+                      <a:miter lim="800000"/>
+                    </a:lnT>
+                    <a:lnB w="6350" cap="flat" cmpd="sng" algn="ctr">
+                      <a:noFill/>
+                      <a:prstDash val="solid"/>
+                      <a:miter lim="800000"/>
+                    </a:lnB>
+                    <a:lnTlToBr w="12700" cmpd="sng">
+                      <a:noFill/>
+                      <a:prstDash val="solid"/>
+                    </a:lnTlToBr>
+                    <a:lnBlToTr w="12700" cmpd="sng">
+                      <a:noFill/>
+                      <a:prstDash val="solid"/>
+                    </a:lnBlToTr>
+                    <a:solidFill>
+                      <a:schemeClr val="bg1"/>
+                    </a:solidFill>
+                  </a:tcPr>
+                </a:tc>
+                <a:extLst>
+                  <a:ext uri="{0D108BD9-81ED-4DB2-BD59-A6C34878D82A}">
+                    <a16:rowId xmlns:a16="http://schemas.microsoft.com/office/drawing/2014/main" val="2202148809"/>
+                  </a:ext>
+                </a:extLst>
+              </a:tr>
+              <a:tr h="1471037">
+                <a:tc>
+                  <a:txBody>
+                    <a:bodyPr/>
+                    <a:lstStyle/>
+                    <a:p>
+                      <a:pPr algn="ctr"/>
+                      <a:r>
+                        <a:rPr lang="en-US" sz="2400" b="1" dirty="0">
+                          <a:latin typeface="Agency FB" panose="020B0503020202020204" pitchFamily="34" charset="0"/>
+                        </a:rPr>
+                        <a:t>12 PM PT</a:t>
+                      </a:r>
+                    </a:p>
+                    <a:p>
+                      <a:pPr algn="ctr"/>
+                      <a:r>
+                        <a:rPr lang="en-US" sz="2400" b="1" dirty="0">
+                          <a:latin typeface="Agency FB" panose="020B0503020202020204" pitchFamily="34" charset="0"/>
+                        </a:rPr>
+                        <a:t>1 PM MT</a:t>
+                      </a:r>
+                    </a:p>
+                    <a:p>
+                      <a:pPr algn="ctr"/>
+                      <a:r>
+                        <a:rPr lang="en-US" sz="2400" dirty="0">
+                          <a:latin typeface="Agency FB" panose="020B0503020202020204" pitchFamily="34" charset="0"/>
+                        </a:rPr>
+                        <a:t>3 PM ET</a:t>
+                      </a:r>
+                    </a:p>
+                  </a:txBody>
+                  <a:tcPr marL="107715" marR="107715" marT="53858" marB="53858" anchor="ctr">
+                    <a:lnL w="6350" cap="flat" cmpd="sng" algn="ctr">
+                      <a:noFill/>
+                      <a:prstDash val="solid"/>
+                      <a:miter lim="800000"/>
+                    </a:lnL>
+                    <a:lnR>
+                      <a:noFill/>
+                    </a:lnR>
+                    <a:lnT w="6350" cap="flat" cmpd="sng" algn="ctr">
+                      <a:noFill/>
+                      <a:prstDash val="solid"/>
+                      <a:miter lim="800000"/>
+                    </a:lnT>
+                    <a:lnB w="6350" cap="flat" cmpd="sng" algn="ctr">
+                      <a:noFill/>
+                      <a:prstDash val="solid"/>
+                      <a:miter lim="800000"/>
+                    </a:lnB>
+                    <a:lnTlToBr w="12700" cmpd="sng">
+                      <a:noFill/>
+                      <a:prstDash val="solid"/>
+                    </a:lnTlToBr>
+                    <a:lnBlToTr w="12700" cmpd="sng">
+                      <a:noFill/>
+                      <a:prstDash val="solid"/>
+                    </a:lnBlToTr>
+                    <a:solidFill>
+                      <a:srgbClr val="ECE4EB"/>
+                    </a:solidFill>
+                  </a:tcPr>
+                </a:tc>
+                <a:tc>
+                  <a:txBody>
+                    <a:bodyPr/>
+                    <a:lstStyle/>
+                    <a:p>
+                      <a:pPr algn="ctr"/>
+                      <a:r>
+                        <a:rPr lang="en-US" sz="3600" dirty="0">
+                          <a:solidFill>
+                            <a:sysClr val="windowText" lastClr="000000"/>
+                          </a:solidFill>
+                          <a:latin typeface="Agency FB" panose="020B0503020202020204" pitchFamily="34" charset="0"/>
+                        </a:rPr>
+                        <a:t>Digital All-Stars (Thursday only)</a:t>
+                      </a:r>
+                    </a:p>
+                    <a:p>
+                      <a:pPr algn="ctr"/>
+                      <a:r>
+                        <a:rPr lang="en-US" sz="3600" dirty="0">
+                          <a:solidFill>
+                            <a:sysClr val="windowText" lastClr="000000"/>
+                          </a:solidFill>
+                          <a:latin typeface="Agency FB" panose="020B0503020202020204" pitchFamily="34" charset="0"/>
+                        </a:rPr>
+                        <a:t>Brandan Wright, NBA Player</a:t>
+                      </a:r>
+                    </a:p>
+                  </a:txBody>
+                  <a:tcPr marL="107715" marR="107715" marT="53858" marB="53858" anchor="ctr">
+                    <a:lnL>
+                      <a:noFill/>
+                    </a:lnL>
+                    <a:lnR w="6350" cap="flat" cmpd="sng" algn="ctr">
+                      <a:noFill/>
+                      <a:prstDash val="solid"/>
+                      <a:miter lim="800000"/>
+                    </a:lnR>
+                    <a:lnT w="6350" cap="flat" cmpd="sng" algn="ctr">
+                      <a:noFill/>
+                      <a:prstDash val="solid"/>
+                      <a:miter lim="800000"/>
+                    </a:lnT>
+                    <a:lnB w="6350" cap="flat" cmpd="sng" algn="ctr">
+                      <a:noFill/>
+                      <a:prstDash val="solid"/>
+                      <a:miter lim="800000"/>
+                    </a:lnB>
+                    <a:lnTlToBr w="12700" cmpd="sng">
+                      <a:noFill/>
+                      <a:prstDash val="solid"/>
+                    </a:lnTlToBr>
+                    <a:lnBlToTr w="12700" cmpd="sng">
+                      <a:noFill/>
+                      <a:prstDash val="solid"/>
+                    </a:lnBlToTr>
+                    <a:solidFill>
+                      <a:srgbClr val="ECE4EB"/>
+                    </a:solidFill>
+                  </a:tcPr>
+                </a:tc>
+                <a:extLst>
+                  <a:ext uri="{0D108BD9-81ED-4DB2-BD59-A6C34878D82A}">
+                    <a16:rowId xmlns:a16="http://schemas.microsoft.com/office/drawing/2014/main" val="2879450763"/>
+                  </a:ext>
+                </a:extLst>
+              </a:tr>
+              <a:tr h="1024524">
+                <a:tc>
+                  <a:txBody>
+                    <a:bodyPr/>
+                    <a:lstStyle/>
+                    <a:p>
+                      <a:pPr algn="ctr"/>
+                      <a:r>
+                        <a:rPr lang="en-US" sz="2400" b="1" dirty="0">
+                          <a:latin typeface="Agency FB" panose="020B0503020202020204" pitchFamily="34" charset="0"/>
+                        </a:rPr>
+                        <a:t>2 PM PT</a:t>
+                      </a:r>
+                    </a:p>
+                    <a:p>
+                      <a:pPr algn="ctr"/>
+                      <a:r>
+                        <a:rPr lang="en-US" sz="2400" dirty="0">
+                          <a:latin typeface="Agency FB" panose="020B0503020202020204" pitchFamily="34" charset="0"/>
+                        </a:rPr>
+                        <a:t>5PM ET</a:t>
+                      </a:r>
+                    </a:p>
+                  </a:txBody>
+                  <a:tcPr marL="107715" marR="107715" marT="53858" marB="53858" anchor="ctr">
+                    <a:lnL w="6350" cap="flat" cmpd="sng" algn="ctr">
+                      <a:noFill/>
+                      <a:prstDash val="solid"/>
+                      <a:miter lim="800000"/>
+                    </a:lnL>
+                    <a:lnR>
+                      <a:noFill/>
+                    </a:lnR>
+                    <a:lnT w="6350" cap="flat" cmpd="sng" algn="ctr">
+                      <a:noFill/>
+                      <a:prstDash val="solid"/>
+                      <a:miter lim="800000"/>
+                    </a:lnT>
+                    <a:lnB w="6350" cap="flat" cmpd="sng" algn="ctr">
+                      <a:noFill/>
+                      <a:prstDash val="solid"/>
+                      <a:miter lim="800000"/>
+                    </a:lnB>
+                    <a:lnTlToBr w="12700" cmpd="sng">
+                      <a:noFill/>
+                      <a:prstDash val="solid"/>
+                    </a:lnTlToBr>
+                    <a:lnBlToTr w="12700" cmpd="sng">
+                      <a:noFill/>
+                      <a:prstDash val="solid"/>
+                    </a:lnBlToTr>
+                    <a:solidFill>
+                      <a:schemeClr val="bg1"/>
+                    </a:solidFill>
+                  </a:tcPr>
+                </a:tc>
+                <a:tc>
+                  <a:txBody>
+                    <a:bodyPr/>
+                    <a:lstStyle/>
+                    <a:p>
+                      <a:pPr algn="ctr"/>
+                      <a:r>
+                        <a:rPr lang="en-US" sz="3600" dirty="0">
+                          <a:latin typeface="Agency FB" panose="020B0503020202020204" pitchFamily="34" charset="0"/>
+                        </a:rPr>
+                        <a:t>MakeCode in the Kitchen (Friday only)</a:t>
+                      </a:r>
+                    </a:p>
+                  </a:txBody>
+                  <a:tcPr marL="107715" marR="107715" marT="53858" marB="53858" anchor="ctr">
+                    <a:lnL>
+                      <a:noFill/>
+                    </a:lnL>
+                    <a:lnR w="6350" cap="flat" cmpd="sng" algn="ctr">
+                      <a:noFill/>
+                      <a:prstDash val="solid"/>
+                      <a:miter lim="800000"/>
+                    </a:lnR>
+                    <a:lnT w="6350" cap="flat" cmpd="sng" algn="ctr">
+                      <a:noFill/>
+                      <a:prstDash val="solid"/>
+                      <a:miter lim="800000"/>
+                    </a:lnT>
+                    <a:lnB w="6350" cap="flat" cmpd="sng" algn="ctr">
+                      <a:noFill/>
+                      <a:prstDash val="solid"/>
+                      <a:miter lim="800000"/>
+                    </a:lnB>
+                    <a:lnTlToBr w="12700" cmpd="sng">
+                      <a:noFill/>
+                      <a:prstDash val="solid"/>
+                    </a:lnTlToBr>
+                    <a:lnBlToTr w="12700" cmpd="sng">
+                      <a:noFill/>
+                      <a:prstDash val="solid"/>
+                    </a:lnBlToTr>
+                    <a:solidFill>
+                      <a:schemeClr val="bg1"/>
+                    </a:solidFill>
+                  </a:tcPr>
+                </a:tc>
+                <a:extLst>
+                  <a:ext uri="{0D108BD9-81ED-4DB2-BD59-A6C34878D82A}">
+                    <a16:rowId xmlns:a16="http://schemas.microsoft.com/office/drawing/2014/main" val="2354609438"/>
+                  </a:ext>
+                </a:extLst>
+              </a:tr>
+            </a:tbl>
+          </a:graphicData>
+        </a:graphic>
+      </p:graphicFrame>
+      <p:pic>
+        <p:nvPicPr>
+          <p:cNvPr id="6" name="Picture 5">
+            <a:extLst>
+              <a:ext uri="{FF2B5EF4-FFF2-40B4-BE49-F238E27FC236}">
+                <a16:creationId xmlns:a16="http://schemas.microsoft.com/office/drawing/2014/main" id="{DFA03610-80FC-4DFE-A985-E935A407F2D5}"/>
+              </a:ext>
+            </a:extLst>
+          </p:cNvPr>
+          <p:cNvPicPr>
+            <a:picLocks noChangeAspect="1"/>
+          </p:cNvPicPr>
+          <p:nvPr/>
+        </p:nvPicPr>
+        <p:blipFill>
+          <a:blip r:embed="rId3">
+            <a:clrChange>
+              <a:clrFrom>
+                <a:srgbClr val="FFFFFF"/>
+              </a:clrFrom>
+              <a:clrTo>
+                <a:srgbClr val="FFFFFF">
+                  <a:alpha val="0"/>
+                </a:srgbClr>
+              </a:clrTo>
+            </a:clrChange>
+          </a:blip>
+          <a:stretch>
+            <a:fillRect/>
+          </a:stretch>
+        </p:blipFill>
+        <p:spPr>
+          <a:xfrm rot="20891684">
+            <a:off x="9661190" y="7499776"/>
+            <a:ext cx="1585991" cy="1288260"/>
+          </a:xfrm>
+          <a:prstGeom prst="rect">
+            <a:avLst/>
+          </a:prstGeom>
+        </p:spPr>
+      </p:pic>
+      <p:pic>
+        <p:nvPicPr>
+          <p:cNvPr id="1026" name="Picture 2" descr="Image result for minecraft agent">
+            <a:extLst>
+              <a:ext uri="{FF2B5EF4-FFF2-40B4-BE49-F238E27FC236}">
+                <a16:creationId xmlns:a16="http://schemas.microsoft.com/office/drawing/2014/main" id="{88852689-71CA-442A-A4C5-81C1A8DFB04A}"/>
+              </a:ext>
+            </a:extLst>
+          </p:cNvPr>
+          <p:cNvPicPr>
+            <a:picLocks noChangeAspect="1" noChangeArrowheads="1"/>
+          </p:cNvPicPr>
+          <p:nvPr/>
+        </p:nvPicPr>
+        <p:blipFill>
+          <a:blip r:embed="rId4">
+            <a:extLst>
+              <a:ext uri="{28A0092B-C50C-407E-A947-70E740481C1C}">
+                <a14:useLocalDpi xmlns:a14="http://schemas.microsoft.com/office/drawing/2010/main" val="0"/>
+              </a:ext>
+            </a:extLst>
+          </a:blip>
+          <a:srcRect/>
+          <a:stretch>
+            <a:fillRect/>
+          </a:stretch>
+        </p:blipFill>
+        <p:spPr bwMode="auto">
+          <a:xfrm>
+            <a:off x="7180351" y="7026356"/>
+            <a:ext cx="1485444" cy="1909856"/>
+          </a:xfrm>
+          <a:prstGeom prst="rect">
+            <a:avLst/>
+          </a:prstGeom>
+          <a:noFill/>
+          <a:extLst>
+            <a:ext uri="{909E8E84-426E-40DD-AFC4-6F175D3DCCD1}">
+              <a14:hiddenFill xmlns:a14="http://schemas.microsoft.com/office/drawing/2010/main">
+                <a:solidFill>
+                  <a:srgbClr val="FFFFFF"/>
+                </a:solidFill>
+              </a14:hiddenFill>
+            </a:ext>
+          </a:extLst>
+        </p:spPr>
+      </p:pic>
+      <p:pic>
+        <p:nvPicPr>
+          <p:cNvPr id="20" name="Picture 19">
+            <a:extLst>
+              <a:ext uri="{FF2B5EF4-FFF2-40B4-BE49-F238E27FC236}">
+                <a16:creationId xmlns:a16="http://schemas.microsoft.com/office/drawing/2014/main" id="{48293F08-CD3E-4C65-96CD-5DF121F46256}"/>
+              </a:ext>
+            </a:extLst>
+          </p:cNvPr>
+          <p:cNvPicPr>
+            <a:picLocks noChangeAspect="1"/>
+          </p:cNvPicPr>
+          <p:nvPr/>
+        </p:nvPicPr>
+        <p:blipFill>
+          <a:blip r:embed="rId5">
+            <a:clrChange>
+              <a:clrFrom>
+                <a:srgbClr val="FFFFFF"/>
+              </a:clrFrom>
+              <a:clrTo>
+                <a:srgbClr val="FFFFFF">
+                  <a:alpha val="0"/>
+                </a:srgbClr>
+              </a:clrTo>
+            </a:clrChange>
+          </a:blip>
+          <a:stretch>
+            <a:fillRect/>
+          </a:stretch>
+        </p:blipFill>
+        <p:spPr>
+          <a:xfrm>
+            <a:off x="4909602" y="7150779"/>
+            <a:ext cx="1579177" cy="1986253"/>
+          </a:xfrm>
+          <a:prstGeom prst="rect">
+            <a:avLst/>
+          </a:prstGeom>
+        </p:spPr>
+      </p:pic>
+      <p:pic>
+        <p:nvPicPr>
+          <p:cNvPr id="21" name="Picture 20">
+            <a:extLst>
+              <a:ext uri="{FF2B5EF4-FFF2-40B4-BE49-F238E27FC236}">
+                <a16:creationId xmlns:a16="http://schemas.microsoft.com/office/drawing/2014/main" id="{7B9D8333-3412-4B90-9070-714BFAC66DE1}"/>
+              </a:ext>
+            </a:extLst>
+          </p:cNvPr>
+          <p:cNvPicPr>
+            <a:picLocks noChangeAspect="1"/>
+          </p:cNvPicPr>
+          <p:nvPr/>
+        </p:nvPicPr>
+        <p:blipFill>
+          <a:blip r:embed="rId6">
+            <a:clrChange>
+              <a:clrFrom>
+                <a:srgbClr val="FAFAFA"/>
+              </a:clrFrom>
+              <a:clrTo>
+                <a:srgbClr val="FAFAFA">
+                  <a:alpha val="0"/>
+                </a:srgbClr>
+              </a:clrTo>
+            </a:clrChange>
+          </a:blip>
+          <a:stretch>
+            <a:fillRect/>
+          </a:stretch>
+        </p:blipFill>
+        <p:spPr>
+          <a:xfrm>
+            <a:off x="7881105" y="2475425"/>
+            <a:ext cx="4225143" cy="4188402"/>
+          </a:xfrm>
+          <a:prstGeom prst="rect">
+            <a:avLst/>
+          </a:prstGeom>
+        </p:spPr>
+      </p:pic>
+      <p:pic>
+        <p:nvPicPr>
+          <p:cNvPr id="22" name="Picture 21">
+            <a:extLst>
+              <a:ext uri="{FF2B5EF4-FFF2-40B4-BE49-F238E27FC236}">
+                <a16:creationId xmlns:a16="http://schemas.microsoft.com/office/drawing/2014/main" id="{A98EC812-E79E-4C80-A59D-65E79E1E6801}"/>
+              </a:ext>
+            </a:extLst>
+          </p:cNvPr>
+          <p:cNvPicPr>
+            <a:picLocks noChangeAspect="1"/>
+          </p:cNvPicPr>
+          <p:nvPr/>
+        </p:nvPicPr>
+        <p:blipFill>
+          <a:blip r:embed="rId7">
+            <a:clrChange>
+              <a:clrFrom>
+                <a:srgbClr val="FFFFFF"/>
+              </a:clrFrom>
+              <a:clrTo>
+                <a:srgbClr val="FFFFFF">
+                  <a:alpha val="0"/>
+                </a:srgbClr>
+              </a:clrTo>
+            </a:clrChange>
+          </a:blip>
+          <a:stretch>
+            <a:fillRect/>
+          </a:stretch>
+        </p:blipFill>
+        <p:spPr>
+          <a:xfrm rot="21244650">
+            <a:off x="2288230" y="7073140"/>
+            <a:ext cx="1441710" cy="1454888"/>
+          </a:xfrm>
+          <a:prstGeom prst="rect">
+            <a:avLst/>
+          </a:prstGeom>
+        </p:spPr>
+      </p:pic>
+      <p:pic>
+        <p:nvPicPr>
+          <p:cNvPr id="3" name="Picture 2" descr="A picture containing shirt&#10;&#10;Description automatically generated">
+            <a:extLst>
+              <a:ext uri="{FF2B5EF4-FFF2-40B4-BE49-F238E27FC236}">
+                <a16:creationId xmlns:a16="http://schemas.microsoft.com/office/drawing/2014/main" id="{F0DCA003-393A-41D2-8AE3-C0653694807A}"/>
+              </a:ext>
+            </a:extLst>
+          </p:cNvPr>
+          <p:cNvPicPr>
+            <a:picLocks noChangeAspect="1"/>
+          </p:cNvPicPr>
+          <p:nvPr/>
+        </p:nvPicPr>
+        <p:blipFill rotWithShape="1">
+          <a:blip r:embed="rId8">
+            <a:extLst>
+              <a:ext uri="{28A0092B-C50C-407E-A947-70E740481C1C}">
+                <a14:useLocalDpi xmlns:a14="http://schemas.microsoft.com/office/drawing/2010/main" val="0"/>
+              </a:ext>
+            </a:extLst>
+          </a:blip>
+          <a:srcRect l="33838" t="34344" r="34847" b="18249"/>
+          <a:stretch/>
+        </p:blipFill>
+        <p:spPr>
+          <a:xfrm>
+            <a:off x="2198323" y="3210745"/>
+            <a:ext cx="810762" cy="1534346"/>
+          </a:xfrm>
+          <a:prstGeom prst="rect">
+            <a:avLst/>
+          </a:prstGeom>
+        </p:spPr>
+      </p:pic>
+    </p:spTree>
+    <p:extLst>
+      <p:ext uri="{BB962C8B-B14F-4D97-AF65-F5344CB8AC3E}">
+        <p14:creationId xmlns:p14="http://schemas.microsoft.com/office/powerpoint/2010/main" val="2873932509"/>
       </p:ext>
     </p:extLst>
   </p:cSld>
@@ -12065,21 +12073,6 @@
 </file>
 
 <file path=customXml/item1.xml><?xml version="1.0" encoding="utf-8"?>
-<p:properties xmlns:p="http://schemas.microsoft.com/office/2006/metadata/properties" xmlns:xsi="http://www.w3.org/2001/XMLSchema-instance" xmlns:pc="http://schemas.microsoft.com/office/infopath/2007/PartnerControls">
-  <documentManagement/>
-</p:properties>
-</file>
-
-<file path=customXml/item2.xml><?xml version="1.0" encoding="utf-8"?>
-<?mso-contentType ?>
-<FormTemplates xmlns="http://schemas.microsoft.com/sharepoint/v3/contenttype/forms">
-  <Display>DocumentLibraryForm</Display>
-  <Edit>DocumentLibraryForm</Edit>
-  <New>DocumentLibraryForm</New>
-</FormTemplates>
-</file>
-
-<file path=customXml/item3.xml><?xml version="1.0" encoding="utf-8"?>
 <ct:contentTypeSchema xmlns:ct="http://schemas.microsoft.com/office/2006/metadata/contentType" xmlns:ma="http://schemas.microsoft.com/office/2006/metadata/properties/metaAttributes" ct:_="" ma:_="" ma:contentTypeName="Document" ma:contentTypeID="0x010100860CD5D9B0436D4CAD5600AE7CA2E713" ma:contentTypeVersion="5" ma:contentTypeDescription="Create a new document." ma:contentTypeScope="" ma:versionID="82efc5ef0cc70a930dc0dd44bc7a59e5">
   <xsd:schema xmlns:xsd="http://www.w3.org/2001/XMLSchema" xmlns:xs="http://www.w3.org/2001/XMLSchema" xmlns:p="http://schemas.microsoft.com/office/2006/metadata/properties" xmlns:ns3="88ced256-c029-4233-a058-f3ec71fefdbe" xmlns:ns4="999ce889-1043-45e4-86ca-a56cfe2271af" targetNamespace="http://schemas.microsoft.com/office/2006/metadata/properties" ma:root="true" ma:fieldsID="df5615878e1656ee4e772df057bbfd02" ns3:_="" ns4:_="">
     <xsd:import namespace="88ced256-c029-4233-a058-f3ec71fefdbe"/>
@@ -12250,32 +12243,22 @@
 </ct:contentTypeSchema>
 </file>
 
-<file path=customXml/itemProps1.xml><?xml version="1.0" encoding="utf-8"?>
-<ds:datastoreItem xmlns:ds="http://schemas.openxmlformats.org/officeDocument/2006/customXml" ds:itemID="{60259DF6-DA4D-4E1C-9935-A04345E6A0FE}">
-  <ds:schemaRefs>
-    <ds:schemaRef ds:uri="http://schemas.microsoft.com/office/2006/metadata/properties"/>
-    <ds:schemaRef ds:uri="88ced256-c029-4233-a058-f3ec71fefdbe"/>
-    <ds:schemaRef ds:uri="http://schemas.microsoft.com/office/infopath/2007/PartnerControls"/>
-    <ds:schemaRef ds:uri="999ce889-1043-45e4-86ca-a56cfe2271af"/>
-    <ds:schemaRef ds:uri="http://purl.org/dc/dcmitype/"/>
-    <ds:schemaRef ds:uri="http://purl.org/dc/terms/"/>
-    <ds:schemaRef ds:uri="http://schemas.microsoft.com/office/2006/documentManagement/types"/>
-    <ds:schemaRef ds:uri="http://purl.org/dc/elements/1.1/"/>
-    <ds:schemaRef ds:uri="http://schemas.openxmlformats.org/package/2006/metadata/core-properties"/>
-    <ds:schemaRef ds:uri="http://www.w3.org/XML/1998/namespace"/>
-  </ds:schemaRefs>
-</ds:datastoreItem>
+<file path=customXml/item2.xml><?xml version="1.0" encoding="utf-8"?>
+<?mso-contentType ?>
+<FormTemplates xmlns="http://schemas.microsoft.com/sharepoint/v3/contenttype/forms">
+  <Display>DocumentLibraryForm</Display>
+  <Edit>DocumentLibraryForm</Edit>
+  <New>DocumentLibraryForm</New>
+</FormTemplates>
 </file>
 
-<file path=customXml/itemProps2.xml><?xml version="1.0" encoding="utf-8"?>
-<ds:datastoreItem xmlns:ds="http://schemas.openxmlformats.org/officeDocument/2006/customXml" ds:itemID="{4080D5DD-FD7F-4E53-9DDB-1149624B0AF8}">
-  <ds:schemaRefs>
-    <ds:schemaRef ds:uri="http://schemas.microsoft.com/sharepoint/v3/contenttype/forms"/>
-  </ds:schemaRefs>
-</ds:datastoreItem>
+<file path=customXml/item3.xml><?xml version="1.0" encoding="utf-8"?>
+<p:properties xmlns:p="http://schemas.microsoft.com/office/2006/metadata/properties" xmlns:xsi="http://www.w3.org/2001/XMLSchema-instance" xmlns:pc="http://schemas.microsoft.com/office/infopath/2007/PartnerControls">
+  <documentManagement/>
+</p:properties>
 </file>
 
-<file path=customXml/itemProps3.xml><?xml version="1.0" encoding="utf-8"?>
+<file path=customXml/itemProps1.xml><?xml version="1.0" encoding="utf-8"?>
 <ds:datastoreItem xmlns:ds="http://schemas.openxmlformats.org/officeDocument/2006/customXml" ds:itemID="{48DDB3CD-7A26-4427-A010-5E4AD2CBA3CF}">
   <ds:schemaRefs>
     <ds:schemaRef ds:uri="http://schemas.microsoft.com/office/2006/metadata/contentType"/>
@@ -12292,4 +12275,29 @@
     <ds:schemaRef ds:uri="http://schemas.microsoft.com/internal/obd"/>
   </ds:schemaRefs>
 </ds:datastoreItem>
+</file>
+
+<file path=customXml/itemProps2.xml><?xml version="1.0" encoding="utf-8"?>
+<ds:datastoreItem xmlns:ds="http://schemas.openxmlformats.org/officeDocument/2006/customXml" ds:itemID="{4080D5DD-FD7F-4E53-9DDB-1149624B0AF8}">
+  <ds:schemaRefs>
+    <ds:schemaRef ds:uri="http://schemas.microsoft.com/sharepoint/v3/contenttype/forms"/>
+  </ds:schemaRefs>
+</ds:datastoreItem>
+</file>
+
+<file path=customXml/itemProps3.xml><?xml version="1.0" encoding="utf-8"?>
+<ds:datastoreItem xmlns:ds="http://schemas.openxmlformats.org/officeDocument/2006/customXml" ds:itemID="{60259DF6-DA4D-4E1C-9935-A04345E6A0FE}">
+  <ds:schemaRefs>
+    <ds:schemaRef ds:uri="http://schemas.microsoft.com/office/2006/metadata/properties"/>
+    <ds:schemaRef ds:uri="88ced256-c029-4233-a058-f3ec71fefdbe"/>
+    <ds:schemaRef ds:uri="http://schemas.microsoft.com/office/infopath/2007/PartnerControls"/>
+    <ds:schemaRef ds:uri="999ce889-1043-45e4-86ca-a56cfe2271af"/>
+    <ds:schemaRef ds:uri="http://purl.org/dc/dcmitype/"/>
+    <ds:schemaRef ds:uri="http://purl.org/dc/terms/"/>
+    <ds:schemaRef ds:uri="http://schemas.microsoft.com/office/2006/documentManagement/types"/>
+    <ds:schemaRef ds:uri="http://purl.org/dc/elements/1.1/"/>
+    <ds:schemaRef ds:uri="http://schemas.openxmlformats.org/package/2006/metadata/core-properties"/>
+    <ds:schemaRef ds:uri="http://www.w3.org/XML/1998/namespace"/>
+  </ds:schemaRefs>
+</ds:datastoreItem>
 </file>
</xml_diff>

<commit_message>
Tweak jpg for better aspect ratio on Mixer
</commit_message>
<xml_diff>
--- a/docs/static/online-learning/Mixer Stream Schedule.pptx
+++ b/docs/static/online-learning/Mixer Stream Schedule.pptx
@@ -9147,7 +9147,7 @@
         </p:blipFill>
         <p:spPr>
           <a:xfrm>
-            <a:off x="7881105" y="2475425"/>
+            <a:off x="7881105" y="2680146"/>
             <a:ext cx="4225143" cy="4188402"/>
           </a:xfrm>
           <a:prstGeom prst="rect">
@@ -9223,8 +9223,8 @@
         </p:blipFill>
         <p:spPr>
           <a:xfrm>
-            <a:off x="2198323" y="3210745"/>
-            <a:ext cx="810762" cy="1534346"/>
+            <a:off x="2118957" y="3952274"/>
+            <a:ext cx="919944" cy="1740970"/>
           </a:xfrm>
           <a:prstGeom prst="rect">
             <a:avLst/>
@@ -12073,6 +12073,21 @@
 </file>
 
 <file path=customXml/item1.xml><?xml version="1.0" encoding="utf-8"?>
+<p:properties xmlns:p="http://schemas.microsoft.com/office/2006/metadata/properties" xmlns:xsi="http://www.w3.org/2001/XMLSchema-instance" xmlns:pc="http://schemas.microsoft.com/office/infopath/2007/PartnerControls">
+  <documentManagement/>
+</p:properties>
+</file>
+
+<file path=customXml/item2.xml><?xml version="1.0" encoding="utf-8"?>
+<?mso-contentType ?>
+<FormTemplates xmlns="http://schemas.microsoft.com/sharepoint/v3/contenttype/forms">
+  <Display>DocumentLibraryForm</Display>
+  <Edit>DocumentLibraryForm</Edit>
+  <New>DocumentLibraryForm</New>
+</FormTemplates>
+</file>
+
+<file path=customXml/item3.xml><?xml version="1.0" encoding="utf-8"?>
 <ct:contentTypeSchema xmlns:ct="http://schemas.microsoft.com/office/2006/metadata/contentType" xmlns:ma="http://schemas.microsoft.com/office/2006/metadata/properties/metaAttributes" ct:_="" ma:_="" ma:contentTypeName="Document" ma:contentTypeID="0x010100860CD5D9B0436D4CAD5600AE7CA2E713" ma:contentTypeVersion="5" ma:contentTypeDescription="Create a new document." ma:contentTypeScope="" ma:versionID="82efc5ef0cc70a930dc0dd44bc7a59e5">
   <xsd:schema xmlns:xsd="http://www.w3.org/2001/XMLSchema" xmlns:xs="http://www.w3.org/2001/XMLSchema" xmlns:p="http://schemas.microsoft.com/office/2006/metadata/properties" xmlns:ns3="88ced256-c029-4233-a058-f3ec71fefdbe" xmlns:ns4="999ce889-1043-45e4-86ca-a56cfe2271af" targetNamespace="http://schemas.microsoft.com/office/2006/metadata/properties" ma:root="true" ma:fieldsID="df5615878e1656ee4e772df057bbfd02" ns3:_="" ns4:_="">
     <xsd:import namespace="88ced256-c029-4233-a058-f3ec71fefdbe"/>
@@ -12243,22 +12258,32 @@
 </ct:contentTypeSchema>
 </file>
 
-<file path=customXml/item2.xml><?xml version="1.0" encoding="utf-8"?>
-<?mso-contentType ?>
-<FormTemplates xmlns="http://schemas.microsoft.com/sharepoint/v3/contenttype/forms">
-  <Display>DocumentLibraryForm</Display>
-  <Edit>DocumentLibraryForm</Edit>
-  <New>DocumentLibraryForm</New>
-</FormTemplates>
+<file path=customXml/itemProps1.xml><?xml version="1.0" encoding="utf-8"?>
+<ds:datastoreItem xmlns:ds="http://schemas.openxmlformats.org/officeDocument/2006/customXml" ds:itemID="{60259DF6-DA4D-4E1C-9935-A04345E6A0FE}">
+  <ds:schemaRefs>
+    <ds:schemaRef ds:uri="http://schemas.microsoft.com/office/2006/metadata/properties"/>
+    <ds:schemaRef ds:uri="88ced256-c029-4233-a058-f3ec71fefdbe"/>
+    <ds:schemaRef ds:uri="http://schemas.microsoft.com/office/infopath/2007/PartnerControls"/>
+    <ds:schemaRef ds:uri="999ce889-1043-45e4-86ca-a56cfe2271af"/>
+    <ds:schemaRef ds:uri="http://purl.org/dc/dcmitype/"/>
+    <ds:schemaRef ds:uri="http://purl.org/dc/terms/"/>
+    <ds:schemaRef ds:uri="http://schemas.microsoft.com/office/2006/documentManagement/types"/>
+    <ds:schemaRef ds:uri="http://purl.org/dc/elements/1.1/"/>
+    <ds:schemaRef ds:uri="http://schemas.openxmlformats.org/package/2006/metadata/core-properties"/>
+    <ds:schemaRef ds:uri="http://www.w3.org/XML/1998/namespace"/>
+  </ds:schemaRefs>
+</ds:datastoreItem>
 </file>
 
-<file path=customXml/item3.xml><?xml version="1.0" encoding="utf-8"?>
-<p:properties xmlns:p="http://schemas.microsoft.com/office/2006/metadata/properties" xmlns:xsi="http://www.w3.org/2001/XMLSchema-instance" xmlns:pc="http://schemas.microsoft.com/office/infopath/2007/PartnerControls">
-  <documentManagement/>
-</p:properties>
+<file path=customXml/itemProps2.xml><?xml version="1.0" encoding="utf-8"?>
+<ds:datastoreItem xmlns:ds="http://schemas.openxmlformats.org/officeDocument/2006/customXml" ds:itemID="{4080D5DD-FD7F-4E53-9DDB-1149624B0AF8}">
+  <ds:schemaRefs>
+    <ds:schemaRef ds:uri="http://schemas.microsoft.com/sharepoint/v3/contenttype/forms"/>
+  </ds:schemaRefs>
+</ds:datastoreItem>
 </file>
 
-<file path=customXml/itemProps1.xml><?xml version="1.0" encoding="utf-8"?>
+<file path=customXml/itemProps3.xml><?xml version="1.0" encoding="utf-8"?>
 <ds:datastoreItem xmlns:ds="http://schemas.openxmlformats.org/officeDocument/2006/customXml" ds:itemID="{48DDB3CD-7A26-4427-A010-5E4AD2CBA3CF}">
   <ds:schemaRefs>
     <ds:schemaRef ds:uri="http://schemas.microsoft.com/office/2006/metadata/contentType"/>
@@ -12275,29 +12300,4 @@
     <ds:schemaRef ds:uri="http://schemas.microsoft.com/internal/obd"/>
   </ds:schemaRefs>
 </ds:datastoreItem>
-</file>
-
-<file path=customXml/itemProps2.xml><?xml version="1.0" encoding="utf-8"?>
-<ds:datastoreItem xmlns:ds="http://schemas.openxmlformats.org/officeDocument/2006/customXml" ds:itemID="{4080D5DD-FD7F-4E53-9DDB-1149624B0AF8}">
-  <ds:schemaRefs>
-    <ds:schemaRef ds:uri="http://schemas.microsoft.com/sharepoint/v3/contenttype/forms"/>
-  </ds:schemaRefs>
-</ds:datastoreItem>
-</file>
-
-<file path=customXml/itemProps3.xml><?xml version="1.0" encoding="utf-8"?>
-<ds:datastoreItem xmlns:ds="http://schemas.openxmlformats.org/officeDocument/2006/customXml" ds:itemID="{60259DF6-DA4D-4E1C-9935-A04345E6A0FE}">
-  <ds:schemaRefs>
-    <ds:schemaRef ds:uri="http://schemas.microsoft.com/office/2006/metadata/properties"/>
-    <ds:schemaRef ds:uri="88ced256-c029-4233-a058-f3ec71fefdbe"/>
-    <ds:schemaRef ds:uri="http://schemas.microsoft.com/office/infopath/2007/PartnerControls"/>
-    <ds:schemaRef ds:uri="999ce889-1043-45e4-86ca-a56cfe2271af"/>
-    <ds:schemaRef ds:uri="http://purl.org/dc/dcmitype/"/>
-    <ds:schemaRef ds:uri="http://purl.org/dc/terms/"/>
-    <ds:schemaRef ds:uri="http://schemas.microsoft.com/office/2006/documentManagement/types"/>
-    <ds:schemaRef ds:uri="http://purl.org/dc/elements/1.1/"/>
-    <ds:schemaRef ds:uri="http://schemas.openxmlformats.org/package/2006/metadata/core-properties"/>
-    <ds:schemaRef ds:uri="http://www.w3.org/XML/1998/namespace"/>
-  </ds:schemaRefs>
-</ds:datastoreItem>
 </file>
</xml_diff>

<commit_message>
Remove Arcade Advanced stream for today (#6878)
* Remove Arcade Advanced stream for today

* Tweak jpg for better aspect ratio on Mixer
</commit_message>
<xml_diff>
--- a/docs/static/online-learning/Mixer Stream Schedule.pptx
+++ b/docs/static/online-learning/Mixer Stream Schedule.pptx
@@ -11,8 +11,8 @@
     <p:sldId id="256" r:id="rId5"/>
     <p:sldId id="257" r:id="rId6"/>
     <p:sldId id="258" r:id="rId7"/>
-    <p:sldId id="262" r:id="rId8"/>
-    <p:sldId id="259" r:id="rId9"/>
+    <p:sldId id="259" r:id="rId8"/>
+    <p:sldId id="262" r:id="rId9"/>
     <p:sldId id="260" r:id="rId10"/>
     <p:sldId id="261" r:id="rId11"/>
   </p:sldIdLst>
@@ -804,7 +804,7 @@
     </p:spTree>
     <p:extLst>
       <p:ext uri="{BB962C8B-B14F-4D97-AF65-F5344CB8AC3E}">
-        <p14:creationId xmlns:p14="http://schemas.microsoft.com/office/powerpoint/2010/main" val="388717020"/>
+        <p14:creationId xmlns:p14="http://schemas.microsoft.com/office/powerpoint/2010/main" val="2525836932"/>
       </p:ext>
     </p:extLst>
   </p:cSld>
@@ -888,7 +888,7 @@
     </p:spTree>
     <p:extLst>
       <p:ext uri="{BB962C8B-B14F-4D97-AF65-F5344CB8AC3E}">
-        <p14:creationId xmlns:p14="http://schemas.microsoft.com/office/powerpoint/2010/main" val="2525836932"/>
+        <p14:creationId xmlns:p14="http://schemas.microsoft.com/office/powerpoint/2010/main" val="3414736694"/>
       </p:ext>
     </p:extLst>
   </p:cSld>
@@ -7126,1000 +7126,6 @@
 <file path=ppt/slides/slide4.xml><?xml version="1.0" encoding="utf-8"?>
 <p:sld xmlns:a="http://schemas.openxmlformats.org/drawingml/2006/main" xmlns:r="http://schemas.openxmlformats.org/officeDocument/2006/relationships" xmlns:p="http://schemas.openxmlformats.org/presentationml/2006/main">
   <p:cSld>
-    <p:spTree>
-      <p:nvGrpSpPr>
-        <p:cNvPr id="1" name=""/>
-        <p:cNvGrpSpPr/>
-        <p:nvPr/>
-      </p:nvGrpSpPr>
-      <p:grpSpPr>
-        <a:xfrm>
-          <a:off x="0" y="0"/>
-          <a:ext cx="0" cy="0"/>
-          <a:chOff x="0" y="0"/>
-          <a:chExt cx="0" cy="0"/>
-        </a:xfrm>
-      </p:grpSpPr>
-      <p:graphicFrame>
-        <p:nvGraphicFramePr>
-          <p:cNvPr id="4" name="Table 4">
-            <a:extLst>
-              <a:ext uri="{FF2B5EF4-FFF2-40B4-BE49-F238E27FC236}">
-                <a16:creationId xmlns:a16="http://schemas.microsoft.com/office/drawing/2014/main" id="{1E17FCE3-C1AC-415D-AD4D-9D9BBBF374CC}"/>
-              </a:ext>
-            </a:extLst>
-          </p:cNvPr>
-          <p:cNvGraphicFramePr>
-            <a:graphicFrameLocks noGrp="1"/>
-          </p:cNvGraphicFramePr>
-          <p:nvPr/>
-        </p:nvGraphicFramePr>
-        <p:xfrm>
-          <a:off x="272956" y="270379"/>
-          <a:ext cx="10181230" cy="6317242"/>
-        </p:xfrm>
-        <a:graphic>
-          <a:graphicData uri="http://schemas.openxmlformats.org/drawingml/2006/table">
-            <a:tbl>
-              <a:tblPr firstRow="1" bandRow="1">
-                <a:tableStyleId>{69012ECD-51FC-41F1-AA8D-1B2483CD663E}</a:tableStyleId>
-              </a:tblPr>
-              <a:tblGrid>
-                <a:gridCol w="2255241">
-                  <a:extLst>
-                    <a:ext uri="{9D8B030D-6E8A-4147-A177-3AD203B41FA5}">
-                      <a16:colId xmlns:a16="http://schemas.microsoft.com/office/drawing/2014/main" val="1510224491"/>
-                    </a:ext>
-                  </a:extLst>
-                </a:gridCol>
-                <a:gridCol w="7925989">
-                  <a:extLst>
-                    <a:ext uri="{9D8B030D-6E8A-4147-A177-3AD203B41FA5}">
-                      <a16:colId xmlns:a16="http://schemas.microsoft.com/office/drawing/2014/main" val="21893690"/>
-                    </a:ext>
-                  </a:extLst>
-                </a:gridCol>
-              </a:tblGrid>
-              <a:tr h="1148097">
-                <a:tc>
-                  <a:txBody>
-                    <a:bodyPr/>
-                    <a:lstStyle/>
-                    <a:p>
-                      <a:pPr algn="ctr"/>
-                      <a:r>
-                        <a:rPr lang="en-US" sz="3600" dirty="0">
-                          <a:latin typeface="Agency FB" panose="020B0503020202020204" pitchFamily="34" charset="0"/>
-                        </a:rPr>
-                        <a:t>TIME</a:t>
-                      </a:r>
-                    </a:p>
-                  </a:txBody>
-                  <a:tcPr marL="107715" marR="107715" marT="53858" marB="53858" anchor="ctr">
-                    <a:lnL w="6350" cap="flat" cmpd="sng" algn="ctr">
-                      <a:noFill/>
-                      <a:prstDash val="solid"/>
-                      <a:miter lim="800000"/>
-                    </a:lnL>
-                    <a:lnR>
-                      <a:noFill/>
-                    </a:lnR>
-                    <a:lnT w="6350" cap="flat" cmpd="sng" algn="ctr">
-                      <a:noFill/>
-                      <a:prstDash val="solid"/>
-                      <a:miter lim="800000"/>
-                    </a:lnT>
-                    <a:lnB w="6350" cap="flat" cmpd="sng" algn="ctr">
-                      <a:noFill/>
-                      <a:prstDash val="solid"/>
-                      <a:miter lim="800000"/>
-                    </a:lnB>
-                    <a:lnTlToBr w="12700" cmpd="sng">
-                      <a:noFill/>
-                      <a:prstDash val="solid"/>
-                    </a:lnTlToBr>
-                    <a:lnBlToTr w="12700" cmpd="sng">
-                      <a:noFill/>
-                      <a:prstDash val="solid"/>
-                    </a:lnBlToTr>
-                    <a:solidFill>
-                      <a:srgbClr val="5D406C"/>
-                    </a:solidFill>
-                  </a:tcPr>
-                </a:tc>
-                <a:tc>
-                  <a:txBody>
-                    <a:bodyPr/>
-                    <a:lstStyle/>
-                    <a:p>
-                      <a:pPr algn="ctr"/>
-                      <a:r>
-                        <a:rPr lang="en-US" sz="3600" dirty="0">
-                          <a:latin typeface="Agency FB" panose="020B0503020202020204" pitchFamily="34" charset="0"/>
-                        </a:rPr>
-                        <a:t>STREAM</a:t>
-                      </a:r>
-                    </a:p>
-                  </a:txBody>
-                  <a:tcPr marL="107715" marR="107715" marT="53858" marB="53858" anchor="ctr">
-                    <a:lnL>
-                      <a:noFill/>
-                    </a:lnL>
-                    <a:lnR w="6350" cap="flat" cmpd="sng" algn="ctr">
-                      <a:noFill/>
-                      <a:prstDash val="solid"/>
-                      <a:miter lim="800000"/>
-                    </a:lnR>
-                    <a:lnT w="6350" cap="flat" cmpd="sng" algn="ctr">
-                      <a:noFill/>
-                      <a:prstDash val="solid"/>
-                      <a:miter lim="800000"/>
-                    </a:lnT>
-                    <a:lnB w="6350" cap="flat" cmpd="sng" algn="ctr">
-                      <a:noFill/>
-                      <a:prstDash val="solid"/>
-                      <a:miter lim="800000"/>
-                    </a:lnB>
-                    <a:lnTlToBr w="12700" cmpd="sng">
-                      <a:noFill/>
-                      <a:prstDash val="solid"/>
-                    </a:lnTlToBr>
-                    <a:lnBlToTr w="12700" cmpd="sng">
-                      <a:noFill/>
-                      <a:prstDash val="solid"/>
-                    </a:lnBlToTr>
-                    <a:solidFill>
-                      <a:srgbClr val="5D406C"/>
-                    </a:solidFill>
-                  </a:tcPr>
-                </a:tc>
-                <a:extLst>
-                  <a:ext uri="{0D108BD9-81ED-4DB2-BD59-A6C34878D82A}">
-                    <a16:rowId xmlns:a16="http://schemas.microsoft.com/office/drawing/2014/main" val="888274358"/>
-                  </a:ext>
-                </a:extLst>
-              </a:tr>
-              <a:tr h="1033829">
-                <a:tc>
-                  <a:txBody>
-                    <a:bodyPr/>
-                    <a:lstStyle/>
-                    <a:p>
-                      <a:pPr algn="ctr"/>
-                      <a:r>
-                        <a:rPr lang="en-US" sz="2400" b="1" dirty="0">
-                          <a:solidFill>
-                            <a:schemeClr val="bg1">
-                              <a:lumMod val="85000"/>
-                            </a:schemeClr>
-                          </a:solidFill>
-                          <a:latin typeface="Agency FB" panose="020B0503020202020204" pitchFamily="34" charset="0"/>
-                        </a:rPr>
-                        <a:t>9 AM PST</a:t>
-                      </a:r>
-                    </a:p>
-                    <a:p>
-                      <a:pPr algn="ctr"/>
-                      <a:r>
-                        <a:rPr lang="en-US" sz="2400" dirty="0">
-                          <a:solidFill>
-                            <a:schemeClr val="bg1">
-                              <a:lumMod val="85000"/>
-                            </a:schemeClr>
-                          </a:solidFill>
-                          <a:latin typeface="Agency FB" panose="020B0503020202020204" pitchFamily="34" charset="0"/>
-                        </a:rPr>
-                        <a:t>12 PM EST</a:t>
-                      </a:r>
-                    </a:p>
-                  </a:txBody>
-                  <a:tcPr marL="107715" marR="107715" marT="53858" marB="53858" anchor="ctr">
-                    <a:lnL w="6350" cap="flat" cmpd="sng" algn="ctr">
-                      <a:noFill/>
-                      <a:prstDash val="solid"/>
-                      <a:miter lim="800000"/>
-                    </a:lnL>
-                    <a:lnR>
-                      <a:noFill/>
-                    </a:lnR>
-                    <a:lnT w="6350" cap="flat" cmpd="sng" algn="ctr">
-                      <a:noFill/>
-                      <a:prstDash val="solid"/>
-                      <a:miter lim="800000"/>
-                    </a:lnT>
-                    <a:lnB w="6350" cap="flat" cmpd="sng" algn="ctr">
-                      <a:noFill/>
-                      <a:prstDash val="solid"/>
-                      <a:miter lim="800000"/>
-                    </a:lnB>
-                    <a:lnTlToBr w="12700" cmpd="sng">
-                      <a:noFill/>
-                      <a:prstDash val="solid"/>
-                    </a:lnTlToBr>
-                    <a:lnBlToTr w="12700" cmpd="sng">
-                      <a:noFill/>
-                      <a:prstDash val="solid"/>
-                    </a:lnBlToTr>
-                    <a:solidFill>
-                      <a:schemeClr val="bg1"/>
-                    </a:solidFill>
-                  </a:tcPr>
-                </a:tc>
-                <a:tc>
-                  <a:txBody>
-                    <a:bodyPr/>
-                    <a:lstStyle/>
-                    <a:p>
-                      <a:pPr algn="ctr"/>
-                      <a:r>
-                        <a:rPr lang="en-US" sz="3600" dirty="0">
-                          <a:solidFill>
-                            <a:schemeClr val="bg1">
-                              <a:lumMod val="85000"/>
-                            </a:schemeClr>
-                          </a:solidFill>
-                          <a:latin typeface="Agency FB" panose="020B0503020202020204" pitchFamily="34" charset="0"/>
-                        </a:rPr>
-                        <a:t>MakeCode for the </a:t>
-                      </a:r>
-                      <a:r>
-                        <a:rPr lang="en-US" sz="3600" dirty="0" err="1">
-                          <a:solidFill>
-                            <a:schemeClr val="bg1">
-                              <a:lumMod val="85000"/>
-                            </a:schemeClr>
-                          </a:solidFill>
-                          <a:latin typeface="Agency FB" panose="020B0503020202020204" pitchFamily="34" charset="0"/>
-                        </a:rPr>
-                        <a:t>micro:bit</a:t>
-                      </a:r>
-                      <a:r>
-                        <a:rPr lang="en-US" sz="3600" dirty="0">
-                          <a:solidFill>
-                            <a:schemeClr val="bg1">
-                              <a:lumMod val="85000"/>
-                            </a:schemeClr>
-                          </a:solidFill>
-                          <a:latin typeface="Agency FB" panose="020B0503020202020204" pitchFamily="34" charset="0"/>
-                        </a:rPr>
-                        <a:t> (on break)</a:t>
-                      </a:r>
-                    </a:p>
-                  </a:txBody>
-                  <a:tcPr marL="107715" marR="107715" marT="53858" marB="53858" anchor="ctr">
-                    <a:lnL>
-                      <a:noFill/>
-                    </a:lnL>
-                    <a:lnR w="6350" cap="flat" cmpd="sng" algn="ctr">
-                      <a:noFill/>
-                      <a:prstDash val="solid"/>
-                      <a:miter lim="800000"/>
-                    </a:lnR>
-                    <a:lnT w="6350" cap="flat" cmpd="sng" algn="ctr">
-                      <a:noFill/>
-                      <a:prstDash val="solid"/>
-                      <a:miter lim="800000"/>
-                    </a:lnT>
-                    <a:lnB w="6350" cap="flat" cmpd="sng" algn="ctr">
-                      <a:noFill/>
-                      <a:prstDash val="solid"/>
-                      <a:miter lim="800000"/>
-                    </a:lnB>
-                    <a:lnTlToBr w="12700" cmpd="sng">
-                      <a:noFill/>
-                      <a:prstDash val="solid"/>
-                    </a:lnTlToBr>
-                    <a:lnBlToTr w="12700" cmpd="sng">
-                      <a:noFill/>
-                      <a:prstDash val="solid"/>
-                    </a:lnBlToTr>
-                    <a:solidFill>
-                      <a:schemeClr val="bg1"/>
-                    </a:solidFill>
-                  </a:tcPr>
-                </a:tc>
-                <a:extLst>
-                  <a:ext uri="{0D108BD9-81ED-4DB2-BD59-A6C34878D82A}">
-                    <a16:rowId xmlns:a16="http://schemas.microsoft.com/office/drawing/2014/main" val="55475757"/>
-                  </a:ext>
-                </a:extLst>
-              </a:tr>
-              <a:tr h="1033829">
-                <a:tc>
-                  <a:txBody>
-                    <a:bodyPr/>
-                    <a:lstStyle/>
-                    <a:p>
-                      <a:pPr algn="ctr"/>
-                      <a:r>
-                        <a:rPr lang="en-US" sz="2400" b="1" dirty="0">
-                          <a:solidFill>
-                            <a:srgbClr val="CDBBCB"/>
-                          </a:solidFill>
-                          <a:latin typeface="Agency FB" panose="020B0503020202020204" pitchFamily="34" charset="0"/>
-                        </a:rPr>
-                        <a:t>10 AM PST</a:t>
-                      </a:r>
-                    </a:p>
-                    <a:p>
-                      <a:pPr algn="ctr"/>
-                      <a:r>
-                        <a:rPr lang="en-US" sz="2400" dirty="0">
-                          <a:solidFill>
-                            <a:srgbClr val="CDBBCB"/>
-                          </a:solidFill>
-                          <a:latin typeface="Agency FB" panose="020B0503020202020204" pitchFamily="34" charset="0"/>
-                        </a:rPr>
-                        <a:t>1 PM EST</a:t>
-                      </a:r>
-                    </a:p>
-                  </a:txBody>
-                  <a:tcPr marL="107715" marR="107715" marT="53858" marB="53858" anchor="ctr">
-                    <a:lnL w="6350" cap="flat" cmpd="sng" algn="ctr">
-                      <a:noFill/>
-                      <a:prstDash val="solid"/>
-                      <a:miter lim="800000"/>
-                    </a:lnL>
-                    <a:lnR>
-                      <a:noFill/>
-                    </a:lnR>
-                    <a:lnT w="6350" cap="flat" cmpd="sng" algn="ctr">
-                      <a:noFill/>
-                      <a:prstDash val="solid"/>
-                      <a:miter lim="800000"/>
-                    </a:lnT>
-                    <a:lnB w="6350" cap="flat" cmpd="sng" algn="ctr">
-                      <a:noFill/>
-                      <a:prstDash val="solid"/>
-                      <a:miter lim="800000"/>
-                    </a:lnB>
-                    <a:lnTlToBr w="12700" cmpd="sng">
-                      <a:noFill/>
-                      <a:prstDash val="solid"/>
-                    </a:lnTlToBr>
-                    <a:lnBlToTr w="12700" cmpd="sng">
-                      <a:noFill/>
-                      <a:prstDash val="solid"/>
-                    </a:lnBlToTr>
-                    <a:solidFill>
-                      <a:srgbClr val="ECE4EB"/>
-                    </a:solidFill>
-                  </a:tcPr>
-                </a:tc>
-                <a:tc>
-                  <a:txBody>
-                    <a:bodyPr/>
-                    <a:lstStyle/>
-                    <a:p>
-                      <a:pPr algn="ctr"/>
-                      <a:r>
-                        <a:rPr lang="en-US" sz="3600" dirty="0">
-                          <a:solidFill>
-                            <a:srgbClr val="CDBBCB"/>
-                          </a:solidFill>
-                          <a:latin typeface="Agency FB" panose="020B0503020202020204" pitchFamily="34" charset="0"/>
-                        </a:rPr>
-                        <a:t>MakeCode with Minecraft (on break)</a:t>
-                      </a:r>
-                    </a:p>
-                  </a:txBody>
-                  <a:tcPr marL="107715" marR="107715" marT="53858" marB="53858" anchor="ctr">
-                    <a:lnL>
-                      <a:noFill/>
-                    </a:lnL>
-                    <a:lnR w="6350" cap="flat" cmpd="sng" algn="ctr">
-                      <a:noFill/>
-                      <a:prstDash val="solid"/>
-                      <a:miter lim="800000"/>
-                    </a:lnR>
-                    <a:lnT w="6350" cap="flat" cmpd="sng" algn="ctr">
-                      <a:noFill/>
-                      <a:prstDash val="solid"/>
-                      <a:miter lim="800000"/>
-                    </a:lnT>
-                    <a:lnB w="6350" cap="flat" cmpd="sng" algn="ctr">
-                      <a:noFill/>
-                      <a:prstDash val="solid"/>
-                      <a:miter lim="800000"/>
-                    </a:lnB>
-                    <a:lnTlToBr w="12700" cmpd="sng">
-                      <a:noFill/>
-                      <a:prstDash val="solid"/>
-                    </a:lnTlToBr>
-                    <a:lnBlToTr w="12700" cmpd="sng">
-                      <a:noFill/>
-                      <a:prstDash val="solid"/>
-                    </a:lnBlToTr>
-                    <a:solidFill>
-                      <a:srgbClr val="ECE4EB"/>
-                    </a:solidFill>
-                  </a:tcPr>
-                </a:tc>
-                <a:extLst>
-                  <a:ext uri="{0D108BD9-81ED-4DB2-BD59-A6C34878D82A}">
-                    <a16:rowId xmlns:a16="http://schemas.microsoft.com/office/drawing/2014/main" val="1272730967"/>
-                  </a:ext>
-                </a:extLst>
-              </a:tr>
-              <a:tr h="1033829">
-                <a:tc>
-                  <a:txBody>
-                    <a:bodyPr/>
-                    <a:lstStyle/>
-                    <a:p>
-                      <a:pPr algn="ctr"/>
-                      <a:r>
-                        <a:rPr lang="en-US" sz="2400" b="1" dirty="0">
-                          <a:solidFill>
-                            <a:schemeClr val="bg1">
-                              <a:lumMod val="85000"/>
-                            </a:schemeClr>
-                          </a:solidFill>
-                          <a:latin typeface="Agency FB" panose="020B0503020202020204" pitchFamily="34" charset="0"/>
-                        </a:rPr>
-                        <a:t>11 AM PST</a:t>
-                      </a:r>
-                    </a:p>
-                    <a:p>
-                      <a:pPr algn="ctr"/>
-                      <a:r>
-                        <a:rPr lang="en-US" sz="2400" dirty="0">
-                          <a:solidFill>
-                            <a:schemeClr val="bg1">
-                              <a:lumMod val="85000"/>
-                            </a:schemeClr>
-                          </a:solidFill>
-                          <a:latin typeface="Agency FB" panose="020B0503020202020204" pitchFamily="34" charset="0"/>
-                        </a:rPr>
-                        <a:t>2 PM EST</a:t>
-                      </a:r>
-                    </a:p>
-                  </a:txBody>
-                  <a:tcPr marL="107715" marR="107715" marT="53858" marB="53858" anchor="ctr">
-                    <a:lnL w="6350" cap="flat" cmpd="sng" algn="ctr">
-                      <a:noFill/>
-                      <a:prstDash val="solid"/>
-                      <a:miter lim="800000"/>
-                    </a:lnL>
-                    <a:lnR>
-                      <a:noFill/>
-                    </a:lnR>
-                    <a:lnT w="6350" cap="flat" cmpd="sng" algn="ctr">
-                      <a:noFill/>
-                      <a:prstDash val="solid"/>
-                      <a:miter lim="800000"/>
-                    </a:lnT>
-                    <a:lnB w="6350" cap="flat" cmpd="sng" algn="ctr">
-                      <a:noFill/>
-                      <a:prstDash val="solid"/>
-                      <a:miter lim="800000"/>
-                    </a:lnB>
-                    <a:lnTlToBr w="12700" cmpd="sng">
-                      <a:noFill/>
-                      <a:prstDash val="solid"/>
-                    </a:lnTlToBr>
-                    <a:lnBlToTr w="12700" cmpd="sng">
-                      <a:noFill/>
-                      <a:prstDash val="solid"/>
-                    </a:lnBlToTr>
-                    <a:solidFill>
-                      <a:schemeClr val="bg1"/>
-                    </a:solidFill>
-                  </a:tcPr>
-                </a:tc>
-                <a:tc>
-                  <a:txBody>
-                    <a:bodyPr/>
-                    <a:lstStyle/>
-                    <a:p>
-                      <a:pPr algn="ctr"/>
-                      <a:r>
-                        <a:rPr lang="en-US" sz="3600" dirty="0">
-                          <a:solidFill>
-                            <a:schemeClr val="bg1">
-                              <a:lumMod val="85000"/>
-                            </a:schemeClr>
-                          </a:solidFill>
-                          <a:latin typeface="Agency FB" panose="020B0503020202020204" pitchFamily="34" charset="0"/>
-                        </a:rPr>
-                        <a:t>MakeCode Arcade  (on break)</a:t>
-                      </a:r>
-                    </a:p>
-                  </a:txBody>
-                  <a:tcPr marL="107715" marR="107715" marT="53858" marB="53858" anchor="ctr">
-                    <a:lnL>
-                      <a:noFill/>
-                    </a:lnL>
-                    <a:lnR w="6350" cap="flat" cmpd="sng" algn="ctr">
-                      <a:noFill/>
-                      <a:prstDash val="solid"/>
-                      <a:miter lim="800000"/>
-                    </a:lnR>
-                    <a:lnT w="6350" cap="flat" cmpd="sng" algn="ctr">
-                      <a:noFill/>
-                      <a:prstDash val="solid"/>
-                      <a:miter lim="800000"/>
-                    </a:lnT>
-                    <a:lnB w="6350" cap="flat" cmpd="sng" algn="ctr">
-                      <a:noFill/>
-                      <a:prstDash val="solid"/>
-                      <a:miter lim="800000"/>
-                    </a:lnB>
-                    <a:lnTlToBr w="12700" cmpd="sng">
-                      <a:noFill/>
-                      <a:prstDash val="solid"/>
-                    </a:lnTlToBr>
-                    <a:lnBlToTr w="12700" cmpd="sng">
-                      <a:noFill/>
-                      <a:prstDash val="solid"/>
-                    </a:lnBlToTr>
-                    <a:solidFill>
-                      <a:schemeClr val="bg1"/>
-                    </a:solidFill>
-                  </a:tcPr>
-                </a:tc>
-                <a:extLst>
-                  <a:ext uri="{0D108BD9-81ED-4DB2-BD59-A6C34878D82A}">
-                    <a16:rowId xmlns:a16="http://schemas.microsoft.com/office/drawing/2014/main" val="2202148809"/>
-                  </a:ext>
-                </a:extLst>
-              </a:tr>
-              <a:tr h="1033829">
-                <a:tc>
-                  <a:txBody>
-                    <a:bodyPr/>
-                    <a:lstStyle/>
-                    <a:p>
-                      <a:pPr algn="ctr"/>
-                      <a:r>
-                        <a:rPr lang="en-US" sz="2400" b="1" dirty="0">
-                          <a:solidFill>
-                            <a:schemeClr val="tx1"/>
-                          </a:solidFill>
-                          <a:latin typeface="Agency FB" panose="020B0503020202020204" pitchFamily="34" charset="0"/>
-                        </a:rPr>
-                        <a:t>1 PM PST</a:t>
-                      </a:r>
-                    </a:p>
-                    <a:p>
-                      <a:pPr algn="ctr"/>
-                      <a:r>
-                        <a:rPr lang="en-US" sz="2400" dirty="0">
-                          <a:solidFill>
-                            <a:schemeClr val="tx1"/>
-                          </a:solidFill>
-                          <a:latin typeface="Agency FB" panose="020B0503020202020204" pitchFamily="34" charset="0"/>
-                        </a:rPr>
-                        <a:t>4 PM EST</a:t>
-                      </a:r>
-                    </a:p>
-                  </a:txBody>
-                  <a:tcPr marL="107715" marR="107715" marT="53858" marB="53858" anchor="ctr">
-                    <a:lnL w="6350" cap="flat" cmpd="sng" algn="ctr">
-                      <a:noFill/>
-                      <a:prstDash val="solid"/>
-                      <a:miter lim="800000"/>
-                    </a:lnL>
-                    <a:lnR>
-                      <a:noFill/>
-                    </a:lnR>
-                    <a:lnT w="6350" cap="flat" cmpd="sng" algn="ctr">
-                      <a:noFill/>
-                      <a:prstDash val="solid"/>
-                      <a:miter lim="800000"/>
-                    </a:lnT>
-                    <a:lnB w="6350" cap="flat" cmpd="sng" algn="ctr">
-                      <a:noFill/>
-                      <a:prstDash val="solid"/>
-                      <a:miter lim="800000"/>
-                    </a:lnB>
-                    <a:lnTlToBr w="12700" cmpd="sng">
-                      <a:noFill/>
-                      <a:prstDash val="solid"/>
-                    </a:lnTlToBr>
-                    <a:lnBlToTr w="12700" cmpd="sng">
-                      <a:noFill/>
-                      <a:prstDash val="solid"/>
-                    </a:lnBlToTr>
-                    <a:solidFill>
-                      <a:srgbClr val="ECE4EB"/>
-                    </a:solidFill>
-                  </a:tcPr>
-                </a:tc>
-                <a:tc>
-                  <a:txBody>
-                    <a:bodyPr/>
-                    <a:lstStyle/>
-                    <a:p>
-                      <a:pPr algn="ctr"/>
-                      <a:r>
-                        <a:rPr lang="en-US" sz="3600" dirty="0">
-                          <a:solidFill>
-                            <a:schemeClr val="tx1"/>
-                          </a:solidFill>
-                          <a:latin typeface="Agency FB" panose="020B0503020202020204" pitchFamily="34" charset="0"/>
-                        </a:rPr>
-                        <a:t>MakeCode Arcade (Advanced)</a:t>
-                      </a:r>
-                    </a:p>
-                  </a:txBody>
-                  <a:tcPr marL="107715" marR="107715" marT="53858" marB="53858" anchor="ctr">
-                    <a:lnL>
-                      <a:noFill/>
-                    </a:lnL>
-                    <a:lnR w="6350" cap="flat" cmpd="sng" algn="ctr">
-                      <a:noFill/>
-                      <a:prstDash val="solid"/>
-                      <a:miter lim="800000"/>
-                    </a:lnR>
-                    <a:lnT w="6350" cap="flat" cmpd="sng" algn="ctr">
-                      <a:noFill/>
-                      <a:prstDash val="solid"/>
-                      <a:miter lim="800000"/>
-                    </a:lnT>
-                    <a:lnB w="6350" cap="flat" cmpd="sng" algn="ctr">
-                      <a:noFill/>
-                      <a:prstDash val="solid"/>
-                      <a:miter lim="800000"/>
-                    </a:lnB>
-                    <a:lnTlToBr w="12700" cmpd="sng">
-                      <a:noFill/>
-                      <a:prstDash val="solid"/>
-                    </a:lnTlToBr>
-                    <a:lnBlToTr w="12700" cmpd="sng">
-                      <a:noFill/>
-                      <a:prstDash val="solid"/>
-                    </a:lnBlToTr>
-                    <a:solidFill>
-                      <a:srgbClr val="ECE4EB"/>
-                    </a:solidFill>
-                  </a:tcPr>
-                </a:tc>
-                <a:extLst>
-                  <a:ext uri="{0D108BD9-81ED-4DB2-BD59-A6C34878D82A}">
-                    <a16:rowId xmlns:a16="http://schemas.microsoft.com/office/drawing/2014/main" val="2354609438"/>
-                  </a:ext>
-                </a:extLst>
-              </a:tr>
-              <a:tr h="1033829">
-                <a:tc>
-                  <a:txBody>
-                    <a:bodyPr/>
-                    <a:lstStyle/>
-                    <a:p>
-                      <a:pPr algn="ctr"/>
-                      <a:r>
-                        <a:rPr lang="en-US" sz="2400" b="1" dirty="0">
-                          <a:latin typeface="Agency FB" panose="020B0503020202020204" pitchFamily="34" charset="0"/>
-                        </a:rPr>
-                        <a:t>2 PM PST</a:t>
-                      </a:r>
-                    </a:p>
-                    <a:p>
-                      <a:pPr algn="ctr"/>
-                      <a:r>
-                        <a:rPr lang="en-US" sz="2400" dirty="0">
-                          <a:latin typeface="Agency FB" panose="020B0503020202020204" pitchFamily="34" charset="0"/>
-                        </a:rPr>
-                        <a:t>5PM EST</a:t>
-                      </a:r>
-                    </a:p>
-                  </a:txBody>
-                  <a:tcPr marL="107715" marR="107715" marT="53858" marB="53858" anchor="ctr">
-                    <a:lnL w="6350" cap="flat" cmpd="sng" algn="ctr">
-                      <a:noFill/>
-                      <a:prstDash val="solid"/>
-                      <a:miter lim="800000"/>
-                    </a:lnL>
-                    <a:lnR>
-                      <a:noFill/>
-                    </a:lnR>
-                    <a:lnT w="6350" cap="flat" cmpd="sng" algn="ctr">
-                      <a:noFill/>
-                      <a:prstDash val="solid"/>
-                      <a:miter lim="800000"/>
-                    </a:lnT>
-                    <a:lnB w="6350" cap="flat" cmpd="sng" algn="ctr">
-                      <a:noFill/>
-                      <a:prstDash val="solid"/>
-                      <a:miter lim="800000"/>
-                    </a:lnB>
-                    <a:lnTlToBr w="12700" cmpd="sng">
-                      <a:noFill/>
-                      <a:prstDash val="solid"/>
-                    </a:lnTlToBr>
-                    <a:lnBlToTr w="12700" cmpd="sng">
-                      <a:noFill/>
-                      <a:prstDash val="solid"/>
-                    </a:lnBlToTr>
-                    <a:solidFill>
-                      <a:schemeClr val="bg1"/>
-                    </a:solidFill>
-                  </a:tcPr>
-                </a:tc>
-                <a:tc>
-                  <a:txBody>
-                    <a:bodyPr/>
-                    <a:lstStyle/>
-                    <a:p>
-                      <a:pPr algn="ctr"/>
-                      <a:r>
-                        <a:rPr lang="en-US" sz="3600" dirty="0">
-                          <a:latin typeface="Agency FB" panose="020B0503020202020204" pitchFamily="34" charset="0"/>
-                        </a:rPr>
-                        <a:t>MakeCode in the Kitchen (Friday only)</a:t>
-                      </a:r>
-                    </a:p>
-                  </a:txBody>
-                  <a:tcPr marL="107715" marR="107715" marT="53858" marB="53858" anchor="ctr">
-                    <a:lnL>
-                      <a:noFill/>
-                    </a:lnL>
-                    <a:lnR w="6350" cap="flat" cmpd="sng" algn="ctr">
-                      <a:noFill/>
-                      <a:prstDash val="solid"/>
-                      <a:miter lim="800000"/>
-                    </a:lnR>
-                    <a:lnT w="6350" cap="flat" cmpd="sng" algn="ctr">
-                      <a:noFill/>
-                      <a:prstDash val="solid"/>
-                      <a:miter lim="800000"/>
-                    </a:lnT>
-                    <a:lnB w="6350" cap="flat" cmpd="sng" algn="ctr">
-                      <a:noFill/>
-                      <a:prstDash val="solid"/>
-                      <a:miter lim="800000"/>
-                    </a:lnB>
-                    <a:lnTlToBr w="12700" cmpd="sng">
-                      <a:noFill/>
-                      <a:prstDash val="solid"/>
-                    </a:lnTlToBr>
-                    <a:lnBlToTr w="12700" cmpd="sng">
-                      <a:noFill/>
-                      <a:prstDash val="solid"/>
-                    </a:lnBlToTr>
-                    <a:solidFill>
-                      <a:schemeClr val="bg1"/>
-                    </a:solidFill>
-                  </a:tcPr>
-                </a:tc>
-                <a:extLst>
-                  <a:ext uri="{0D108BD9-81ED-4DB2-BD59-A6C34878D82A}">
-                    <a16:rowId xmlns:a16="http://schemas.microsoft.com/office/drawing/2014/main" val="1095520334"/>
-                  </a:ext>
-                </a:extLst>
-              </a:tr>
-            </a:tbl>
-          </a:graphicData>
-        </a:graphic>
-      </p:graphicFrame>
-      <p:pic>
-        <p:nvPicPr>
-          <p:cNvPr id="6" name="Picture 5">
-            <a:extLst>
-              <a:ext uri="{FF2B5EF4-FFF2-40B4-BE49-F238E27FC236}">
-                <a16:creationId xmlns:a16="http://schemas.microsoft.com/office/drawing/2014/main" id="{DFA03610-80FC-4DFE-A985-E935A407F2D5}"/>
-              </a:ext>
-            </a:extLst>
-          </p:cNvPr>
-          <p:cNvPicPr>
-            <a:picLocks noChangeAspect="1"/>
-          </p:cNvPicPr>
-          <p:nvPr/>
-        </p:nvPicPr>
-        <p:blipFill>
-          <a:blip r:embed="rId3">
-            <a:clrChange>
-              <a:clrFrom>
-                <a:srgbClr val="FFFFFF"/>
-              </a:clrFrom>
-              <a:clrTo>
-                <a:srgbClr val="FFFFFF">
-                  <a:alpha val="0"/>
-                </a:srgbClr>
-              </a:clrTo>
-            </a:clrChange>
-          </a:blip>
-          <a:stretch>
-            <a:fillRect/>
-          </a:stretch>
-        </p:blipFill>
-        <p:spPr>
-          <a:xfrm rot="20891684">
-            <a:off x="9661190" y="7499776"/>
-            <a:ext cx="1585991" cy="1288260"/>
-          </a:xfrm>
-          <a:prstGeom prst="rect">
-            <a:avLst/>
-          </a:prstGeom>
-        </p:spPr>
-      </p:pic>
-      <p:pic>
-        <p:nvPicPr>
-          <p:cNvPr id="1026" name="Picture 2" descr="Image result for minecraft agent">
-            <a:extLst>
-              <a:ext uri="{FF2B5EF4-FFF2-40B4-BE49-F238E27FC236}">
-                <a16:creationId xmlns:a16="http://schemas.microsoft.com/office/drawing/2014/main" id="{88852689-71CA-442A-A4C5-81C1A8DFB04A}"/>
-              </a:ext>
-            </a:extLst>
-          </p:cNvPr>
-          <p:cNvPicPr>
-            <a:picLocks noChangeAspect="1" noChangeArrowheads="1"/>
-          </p:cNvPicPr>
-          <p:nvPr/>
-        </p:nvPicPr>
-        <p:blipFill>
-          <a:blip r:embed="rId4">
-            <a:extLst>
-              <a:ext uri="{28A0092B-C50C-407E-A947-70E740481C1C}">
-                <a14:useLocalDpi xmlns:a14="http://schemas.microsoft.com/office/drawing/2010/main" val="0"/>
-              </a:ext>
-            </a:extLst>
-          </a:blip>
-          <a:srcRect/>
-          <a:stretch>
-            <a:fillRect/>
-          </a:stretch>
-        </p:blipFill>
-        <p:spPr bwMode="auto">
-          <a:xfrm>
-            <a:off x="7180351" y="7026356"/>
-            <a:ext cx="1485444" cy="1909856"/>
-          </a:xfrm>
-          <a:prstGeom prst="rect">
-            <a:avLst/>
-          </a:prstGeom>
-          <a:noFill/>
-          <a:extLst>
-            <a:ext uri="{909E8E84-426E-40DD-AFC4-6F175D3DCCD1}">
-              <a14:hiddenFill xmlns:a14="http://schemas.microsoft.com/office/drawing/2010/main">
-                <a:solidFill>
-                  <a:srgbClr val="FFFFFF"/>
-                </a:solidFill>
-              </a14:hiddenFill>
-            </a:ext>
-          </a:extLst>
-        </p:spPr>
-      </p:pic>
-      <p:pic>
-        <p:nvPicPr>
-          <p:cNvPr id="20" name="Picture 19">
-            <a:extLst>
-              <a:ext uri="{FF2B5EF4-FFF2-40B4-BE49-F238E27FC236}">
-                <a16:creationId xmlns:a16="http://schemas.microsoft.com/office/drawing/2014/main" id="{48293F08-CD3E-4C65-96CD-5DF121F46256}"/>
-              </a:ext>
-            </a:extLst>
-          </p:cNvPr>
-          <p:cNvPicPr>
-            <a:picLocks noChangeAspect="1"/>
-          </p:cNvPicPr>
-          <p:nvPr/>
-        </p:nvPicPr>
-        <p:blipFill>
-          <a:blip r:embed="rId5">
-            <a:clrChange>
-              <a:clrFrom>
-                <a:srgbClr val="FFFFFF"/>
-              </a:clrFrom>
-              <a:clrTo>
-                <a:srgbClr val="FFFFFF">
-                  <a:alpha val="0"/>
-                </a:srgbClr>
-              </a:clrTo>
-            </a:clrChange>
-          </a:blip>
-          <a:stretch>
-            <a:fillRect/>
-          </a:stretch>
-        </p:blipFill>
-        <p:spPr>
-          <a:xfrm>
-            <a:off x="4909602" y="7150779"/>
-            <a:ext cx="1579177" cy="1986253"/>
-          </a:xfrm>
-          <a:prstGeom prst="rect">
-            <a:avLst/>
-          </a:prstGeom>
-        </p:spPr>
-      </p:pic>
-      <p:pic>
-        <p:nvPicPr>
-          <p:cNvPr id="21" name="Picture 20">
-            <a:extLst>
-              <a:ext uri="{FF2B5EF4-FFF2-40B4-BE49-F238E27FC236}">
-                <a16:creationId xmlns:a16="http://schemas.microsoft.com/office/drawing/2014/main" id="{7B9D8333-3412-4B90-9070-714BFAC66DE1}"/>
-              </a:ext>
-            </a:extLst>
-          </p:cNvPr>
-          <p:cNvPicPr>
-            <a:picLocks noChangeAspect="1"/>
-          </p:cNvPicPr>
-          <p:nvPr/>
-        </p:nvPicPr>
-        <p:blipFill>
-          <a:blip r:embed="rId6">
-            <a:clrChange>
-              <a:clrFrom>
-                <a:srgbClr val="FAFAFA"/>
-              </a:clrFrom>
-              <a:clrTo>
-                <a:srgbClr val="FAFAFA">
-                  <a:alpha val="0"/>
-                </a:srgbClr>
-              </a:clrTo>
-            </a:clrChange>
-          </a:blip>
-          <a:stretch>
-            <a:fillRect/>
-          </a:stretch>
-        </p:blipFill>
-        <p:spPr>
-          <a:xfrm>
-            <a:off x="8665795" y="2618970"/>
-            <a:ext cx="4262886" cy="4225817"/>
-          </a:xfrm>
-          <a:prstGeom prst="rect">
-            <a:avLst/>
-          </a:prstGeom>
-        </p:spPr>
-      </p:pic>
-      <p:pic>
-        <p:nvPicPr>
-          <p:cNvPr id="22" name="Picture 21">
-            <a:extLst>
-              <a:ext uri="{FF2B5EF4-FFF2-40B4-BE49-F238E27FC236}">
-                <a16:creationId xmlns:a16="http://schemas.microsoft.com/office/drawing/2014/main" id="{A98EC812-E79E-4C80-A59D-65E79E1E6801}"/>
-              </a:ext>
-            </a:extLst>
-          </p:cNvPr>
-          <p:cNvPicPr>
-            <a:picLocks noChangeAspect="1"/>
-          </p:cNvPicPr>
-          <p:nvPr/>
-        </p:nvPicPr>
-        <p:blipFill>
-          <a:blip r:embed="rId7">
-            <a:clrChange>
-              <a:clrFrom>
-                <a:srgbClr val="FFFFFF"/>
-              </a:clrFrom>
-              <a:clrTo>
-                <a:srgbClr val="FFFFFF">
-                  <a:alpha val="0"/>
-                </a:srgbClr>
-              </a:clrTo>
-            </a:clrChange>
-          </a:blip>
-          <a:stretch>
-            <a:fillRect/>
-          </a:stretch>
-        </p:blipFill>
-        <p:spPr>
-          <a:xfrm rot="21244650">
-            <a:off x="2288230" y="7073140"/>
-            <a:ext cx="1441710" cy="1454888"/>
-          </a:xfrm>
-          <a:prstGeom prst="rect">
-            <a:avLst/>
-          </a:prstGeom>
-        </p:spPr>
-      </p:pic>
-    </p:spTree>
-    <p:extLst>
-      <p:ext uri="{BB962C8B-B14F-4D97-AF65-F5344CB8AC3E}">
-        <p14:creationId xmlns:p14="http://schemas.microsoft.com/office/powerpoint/2010/main" val="2895878372"/>
-      </p:ext>
-    </p:extLst>
-  </p:cSld>
-  <p:clrMapOvr>
-    <a:masterClrMapping/>
-  </p:clrMapOvr>
-</p:sld>
-</file>
-
-<file path=ppt/slides/slide5.xml><?xml version="1.0" encoding="utf-8"?>
-<p:sld xmlns:a="http://schemas.openxmlformats.org/drawingml/2006/main" xmlns:r="http://schemas.openxmlformats.org/officeDocument/2006/relationships" xmlns:p="http://schemas.openxmlformats.org/presentationml/2006/main">
-  <p:cSld>
     <p:bg>
       <p:bgPr>
         <a:pattFill prst="pct5">
@@ -8162,7 +7168,7 @@
           <p:nvPr>
             <p:extLst>
               <p:ext uri="{D42A27DB-BD31-4B8C-83A1-F6EECF244321}">
-                <p14:modId xmlns:p14="http://schemas.microsoft.com/office/powerpoint/2010/main" val="307885181"/>
+                <p14:modId xmlns:p14="http://schemas.microsoft.com/office/powerpoint/2010/main" val="1526443243"/>
               </p:ext>
             </p:extLst>
           </p:nvPr>
@@ -9227,6 +8233,1008 @@
     <p:extLst>
       <p:ext uri="{BB962C8B-B14F-4D97-AF65-F5344CB8AC3E}">
         <p14:creationId xmlns:p14="http://schemas.microsoft.com/office/powerpoint/2010/main" val="1554094204"/>
+      </p:ext>
+    </p:extLst>
+  </p:cSld>
+  <p:clrMapOvr>
+    <a:masterClrMapping/>
+  </p:clrMapOvr>
+</p:sld>
+</file>
+
+<file path=ppt/slides/slide5.xml><?xml version="1.0" encoding="utf-8"?>
+<p:sld xmlns:a="http://schemas.openxmlformats.org/drawingml/2006/main" xmlns:r="http://schemas.openxmlformats.org/officeDocument/2006/relationships" xmlns:p="http://schemas.openxmlformats.org/presentationml/2006/main">
+  <p:cSld>
+    <p:bg>
+      <p:bgPr>
+        <a:pattFill prst="pct5">
+          <a:fgClr>
+            <a:srgbClr val="5D406C"/>
+          </a:fgClr>
+          <a:bgClr>
+            <a:schemeClr val="bg1"/>
+          </a:bgClr>
+        </a:pattFill>
+        <a:effectLst/>
+      </p:bgPr>
+    </p:bg>
+    <p:spTree>
+      <p:nvGrpSpPr>
+        <p:cNvPr id="1" name=""/>
+        <p:cNvGrpSpPr/>
+        <p:nvPr/>
+      </p:nvGrpSpPr>
+      <p:grpSpPr>
+        <a:xfrm>
+          <a:off x="0" y="0"/>
+          <a:ext cx="0" cy="0"/>
+          <a:chOff x="0" y="0"/>
+          <a:chExt cx="0" cy="0"/>
+        </a:xfrm>
+      </p:grpSpPr>
+      <p:graphicFrame>
+        <p:nvGraphicFramePr>
+          <p:cNvPr id="4" name="Table 4">
+            <a:extLst>
+              <a:ext uri="{FF2B5EF4-FFF2-40B4-BE49-F238E27FC236}">
+                <a16:creationId xmlns:a16="http://schemas.microsoft.com/office/drawing/2014/main" id="{1E17FCE3-C1AC-415D-AD4D-9D9BBBF374CC}"/>
+              </a:ext>
+            </a:extLst>
+          </p:cNvPr>
+          <p:cNvGraphicFramePr>
+            <a:graphicFrameLocks noGrp="1"/>
+          </p:cNvGraphicFramePr>
+          <p:nvPr>
+            <p:extLst>
+              <p:ext uri="{D42A27DB-BD31-4B8C-83A1-F6EECF244321}">
+                <p14:modId xmlns:p14="http://schemas.microsoft.com/office/powerpoint/2010/main" val="1499617002"/>
+              </p:ext>
+            </p:extLst>
+          </p:nvPr>
+        </p:nvGraphicFramePr>
+        <p:xfrm>
+          <a:off x="272956" y="194173"/>
+          <a:ext cx="8989325" cy="6370400"/>
+        </p:xfrm>
+        <a:graphic>
+          <a:graphicData uri="http://schemas.openxmlformats.org/drawingml/2006/table">
+            <a:tbl>
+              <a:tblPr firstRow="1" bandRow="1">
+                <a:tableStyleId>{69012ECD-51FC-41F1-AA8D-1B2483CD663E}</a:tableStyleId>
+              </a:tblPr>
+              <a:tblGrid>
+                <a:gridCol w="2056175">
+                  <a:extLst>
+                    <a:ext uri="{9D8B030D-6E8A-4147-A177-3AD203B41FA5}">
+                      <a16:colId xmlns:a16="http://schemas.microsoft.com/office/drawing/2014/main" val="1510224491"/>
+                    </a:ext>
+                  </a:extLst>
+                </a:gridCol>
+                <a:gridCol w="6933150">
+                  <a:extLst>
+                    <a:ext uri="{9D8B030D-6E8A-4147-A177-3AD203B41FA5}">
+                      <a16:colId xmlns:a16="http://schemas.microsoft.com/office/drawing/2014/main" val="21893690"/>
+                    </a:ext>
+                  </a:extLst>
+                </a:gridCol>
+              </a:tblGrid>
+              <a:tr h="801267">
+                <a:tc>
+                  <a:txBody>
+                    <a:bodyPr/>
+                    <a:lstStyle/>
+                    <a:p>
+                      <a:pPr algn="ctr"/>
+                      <a:r>
+                        <a:rPr lang="en-US" sz="3600" dirty="0">
+                          <a:latin typeface="Agency FB" panose="020B0503020202020204" pitchFamily="34" charset="0"/>
+                        </a:rPr>
+                        <a:t>TIME</a:t>
+                      </a:r>
+                    </a:p>
+                  </a:txBody>
+                  <a:tcPr marL="107715" marR="107715" marT="53858" marB="53858" anchor="ctr">
+                    <a:lnL w="6350" cap="flat" cmpd="sng" algn="ctr">
+                      <a:noFill/>
+                      <a:prstDash val="solid"/>
+                      <a:miter lim="800000"/>
+                    </a:lnL>
+                    <a:lnR>
+                      <a:noFill/>
+                    </a:lnR>
+                    <a:lnT w="6350" cap="flat" cmpd="sng" algn="ctr">
+                      <a:noFill/>
+                      <a:prstDash val="solid"/>
+                      <a:miter lim="800000"/>
+                    </a:lnT>
+                    <a:lnB w="6350" cap="flat" cmpd="sng" algn="ctr">
+                      <a:noFill/>
+                      <a:prstDash val="solid"/>
+                      <a:miter lim="800000"/>
+                    </a:lnB>
+                    <a:lnTlToBr w="12700" cmpd="sng">
+                      <a:noFill/>
+                      <a:prstDash val="solid"/>
+                    </a:lnTlToBr>
+                    <a:lnBlToTr w="12700" cmpd="sng">
+                      <a:noFill/>
+                      <a:prstDash val="solid"/>
+                    </a:lnBlToTr>
+                    <a:solidFill>
+                      <a:srgbClr val="5D406C"/>
+                    </a:solidFill>
+                  </a:tcPr>
+                </a:tc>
+                <a:tc>
+                  <a:txBody>
+                    <a:bodyPr/>
+                    <a:lstStyle/>
+                    <a:p>
+                      <a:pPr algn="ctr"/>
+                      <a:r>
+                        <a:rPr lang="en-US" sz="3600" dirty="0">
+                          <a:latin typeface="Agency FB" panose="020B0503020202020204" pitchFamily="34" charset="0"/>
+                        </a:rPr>
+                        <a:t>STREAM</a:t>
+                      </a:r>
+                    </a:p>
+                  </a:txBody>
+                  <a:tcPr marL="107715" marR="107715" marT="53858" marB="53858" anchor="ctr">
+                    <a:lnL>
+                      <a:noFill/>
+                    </a:lnL>
+                    <a:lnR w="6350" cap="flat" cmpd="sng" algn="ctr">
+                      <a:noFill/>
+                      <a:prstDash val="solid"/>
+                      <a:miter lim="800000"/>
+                    </a:lnR>
+                    <a:lnT w="6350" cap="flat" cmpd="sng" algn="ctr">
+                      <a:noFill/>
+                      <a:prstDash val="solid"/>
+                      <a:miter lim="800000"/>
+                    </a:lnT>
+                    <a:lnB w="6350" cap="flat" cmpd="sng" algn="ctr">
+                      <a:noFill/>
+                      <a:prstDash val="solid"/>
+                      <a:miter lim="800000"/>
+                    </a:lnB>
+                    <a:lnTlToBr w="12700" cmpd="sng">
+                      <a:noFill/>
+                      <a:prstDash val="solid"/>
+                    </a:lnTlToBr>
+                    <a:lnBlToTr w="12700" cmpd="sng">
+                      <a:noFill/>
+                      <a:prstDash val="solid"/>
+                    </a:lnBlToTr>
+                    <a:solidFill>
+                      <a:srgbClr val="5D406C"/>
+                    </a:solidFill>
+                  </a:tcPr>
+                </a:tc>
+                <a:extLst>
+                  <a:ext uri="{0D108BD9-81ED-4DB2-BD59-A6C34878D82A}">
+                    <a16:rowId xmlns:a16="http://schemas.microsoft.com/office/drawing/2014/main" val="888274358"/>
+                  </a:ext>
+                </a:extLst>
+              </a:tr>
+              <a:tr h="1024524">
+                <a:tc>
+                  <a:txBody>
+                    <a:bodyPr/>
+                    <a:lstStyle/>
+                    <a:p>
+                      <a:pPr algn="ctr"/>
+                      <a:r>
+                        <a:rPr lang="en-US" sz="2400" b="1" dirty="0">
+                          <a:latin typeface="Agency FB" panose="020B0503020202020204" pitchFamily="34" charset="0"/>
+                        </a:rPr>
+                        <a:t>9 AM PT</a:t>
+                      </a:r>
+                    </a:p>
+                    <a:p>
+                      <a:pPr algn="ctr"/>
+                      <a:r>
+                        <a:rPr lang="en-US" sz="2400" dirty="0">
+                          <a:latin typeface="Agency FB" panose="020B0503020202020204" pitchFamily="34" charset="0"/>
+                        </a:rPr>
+                        <a:t>12 PM ET</a:t>
+                      </a:r>
+                    </a:p>
+                  </a:txBody>
+                  <a:tcPr marL="107715" marR="107715" marT="53858" marB="53858" anchor="ctr">
+                    <a:lnL w="6350" cap="flat" cmpd="sng" algn="ctr">
+                      <a:noFill/>
+                      <a:prstDash val="solid"/>
+                      <a:miter lim="800000"/>
+                    </a:lnL>
+                    <a:lnR>
+                      <a:noFill/>
+                    </a:lnR>
+                    <a:lnT w="6350" cap="flat" cmpd="sng" algn="ctr">
+                      <a:noFill/>
+                      <a:prstDash val="solid"/>
+                      <a:miter lim="800000"/>
+                    </a:lnT>
+                    <a:lnB w="6350" cap="flat" cmpd="sng" algn="ctr">
+                      <a:noFill/>
+                      <a:prstDash val="solid"/>
+                      <a:miter lim="800000"/>
+                    </a:lnB>
+                    <a:lnTlToBr w="12700" cmpd="sng">
+                      <a:noFill/>
+                      <a:prstDash val="solid"/>
+                    </a:lnTlToBr>
+                    <a:lnBlToTr w="12700" cmpd="sng">
+                      <a:noFill/>
+                      <a:prstDash val="solid"/>
+                    </a:lnBlToTr>
+                    <a:solidFill>
+                      <a:schemeClr val="bg1"/>
+                    </a:solidFill>
+                  </a:tcPr>
+                </a:tc>
+                <a:tc>
+                  <a:txBody>
+                    <a:bodyPr/>
+                    <a:lstStyle/>
+                    <a:p>
+                      <a:pPr algn="ctr"/>
+                      <a:r>
+                        <a:rPr lang="en-US" sz="3600" dirty="0">
+                          <a:latin typeface="Agency FB" panose="020B0503020202020204" pitchFamily="34" charset="0"/>
+                        </a:rPr>
+                        <a:t>MakeCode for the micro:bit</a:t>
+                      </a:r>
+                    </a:p>
+                  </a:txBody>
+                  <a:tcPr marL="107715" marR="107715" marT="53858" marB="53858" anchor="ctr">
+                    <a:lnL>
+                      <a:noFill/>
+                    </a:lnL>
+                    <a:lnR w="6350" cap="flat" cmpd="sng" algn="ctr">
+                      <a:noFill/>
+                      <a:prstDash val="solid"/>
+                      <a:miter lim="800000"/>
+                    </a:lnR>
+                    <a:lnT w="6350" cap="flat" cmpd="sng" algn="ctr">
+                      <a:noFill/>
+                      <a:prstDash val="solid"/>
+                      <a:miter lim="800000"/>
+                    </a:lnT>
+                    <a:lnB w="6350" cap="flat" cmpd="sng" algn="ctr">
+                      <a:noFill/>
+                      <a:prstDash val="solid"/>
+                      <a:miter lim="800000"/>
+                    </a:lnB>
+                    <a:lnTlToBr w="12700" cmpd="sng">
+                      <a:noFill/>
+                      <a:prstDash val="solid"/>
+                    </a:lnTlToBr>
+                    <a:lnBlToTr w="12700" cmpd="sng">
+                      <a:noFill/>
+                      <a:prstDash val="solid"/>
+                    </a:lnBlToTr>
+                    <a:solidFill>
+                      <a:schemeClr val="bg1"/>
+                    </a:solidFill>
+                  </a:tcPr>
+                </a:tc>
+                <a:extLst>
+                  <a:ext uri="{0D108BD9-81ED-4DB2-BD59-A6C34878D82A}">
+                    <a16:rowId xmlns:a16="http://schemas.microsoft.com/office/drawing/2014/main" val="55475757"/>
+                  </a:ext>
+                </a:extLst>
+              </a:tr>
+              <a:tr h="1024524">
+                <a:tc>
+                  <a:txBody>
+                    <a:bodyPr/>
+                    <a:lstStyle/>
+                    <a:p>
+                      <a:pPr algn="ctr"/>
+                      <a:r>
+                        <a:rPr lang="en-US" sz="2400" b="1" dirty="0">
+                          <a:latin typeface="Agency FB" panose="020B0503020202020204" pitchFamily="34" charset="0"/>
+                        </a:rPr>
+                        <a:t>10 AM PT</a:t>
+                      </a:r>
+                    </a:p>
+                    <a:p>
+                      <a:pPr algn="ctr"/>
+                      <a:r>
+                        <a:rPr lang="en-US" sz="2400" dirty="0">
+                          <a:latin typeface="Agency FB" panose="020B0503020202020204" pitchFamily="34" charset="0"/>
+                        </a:rPr>
+                        <a:t>1 PM ET</a:t>
+                      </a:r>
+                    </a:p>
+                  </a:txBody>
+                  <a:tcPr marL="107715" marR="107715" marT="53858" marB="53858" anchor="ctr">
+                    <a:lnL w="6350" cap="flat" cmpd="sng" algn="ctr">
+                      <a:noFill/>
+                      <a:prstDash val="solid"/>
+                      <a:miter lim="800000"/>
+                    </a:lnL>
+                    <a:lnR>
+                      <a:noFill/>
+                    </a:lnR>
+                    <a:lnT w="6350" cap="flat" cmpd="sng" algn="ctr">
+                      <a:noFill/>
+                      <a:prstDash val="solid"/>
+                      <a:miter lim="800000"/>
+                    </a:lnT>
+                    <a:lnB w="6350" cap="flat" cmpd="sng" algn="ctr">
+                      <a:noFill/>
+                      <a:prstDash val="solid"/>
+                      <a:miter lim="800000"/>
+                    </a:lnB>
+                    <a:lnTlToBr w="12700" cmpd="sng">
+                      <a:noFill/>
+                      <a:prstDash val="solid"/>
+                    </a:lnTlToBr>
+                    <a:lnBlToTr w="12700" cmpd="sng">
+                      <a:noFill/>
+                      <a:prstDash val="solid"/>
+                    </a:lnBlToTr>
+                    <a:solidFill>
+                      <a:srgbClr val="ECE4EB"/>
+                    </a:solidFill>
+                  </a:tcPr>
+                </a:tc>
+                <a:tc>
+                  <a:txBody>
+                    <a:bodyPr/>
+                    <a:lstStyle/>
+                    <a:p>
+                      <a:pPr algn="ctr"/>
+                      <a:r>
+                        <a:rPr lang="en-US" sz="3600" dirty="0">
+                          <a:latin typeface="Agency FB" panose="020B0503020202020204" pitchFamily="34" charset="0"/>
+                        </a:rPr>
+                        <a:t>MakeCode with Minecraft: Education Edition</a:t>
+                      </a:r>
+                    </a:p>
+                  </a:txBody>
+                  <a:tcPr marL="107715" marR="107715" marT="53858" marB="53858" anchor="ctr">
+                    <a:lnL>
+                      <a:noFill/>
+                    </a:lnL>
+                    <a:lnR w="6350" cap="flat" cmpd="sng" algn="ctr">
+                      <a:noFill/>
+                      <a:prstDash val="solid"/>
+                      <a:miter lim="800000"/>
+                    </a:lnR>
+                    <a:lnT w="6350" cap="flat" cmpd="sng" algn="ctr">
+                      <a:noFill/>
+                      <a:prstDash val="solid"/>
+                      <a:miter lim="800000"/>
+                    </a:lnT>
+                    <a:lnB w="6350" cap="flat" cmpd="sng" algn="ctr">
+                      <a:noFill/>
+                      <a:prstDash val="solid"/>
+                      <a:miter lim="800000"/>
+                    </a:lnB>
+                    <a:lnTlToBr w="12700" cmpd="sng">
+                      <a:noFill/>
+                      <a:prstDash val="solid"/>
+                    </a:lnTlToBr>
+                    <a:lnBlToTr w="12700" cmpd="sng">
+                      <a:noFill/>
+                      <a:prstDash val="solid"/>
+                    </a:lnBlToTr>
+                    <a:solidFill>
+                      <a:srgbClr val="ECE4EB"/>
+                    </a:solidFill>
+                  </a:tcPr>
+                </a:tc>
+                <a:extLst>
+                  <a:ext uri="{0D108BD9-81ED-4DB2-BD59-A6C34878D82A}">
+                    <a16:rowId xmlns:a16="http://schemas.microsoft.com/office/drawing/2014/main" val="1272730967"/>
+                  </a:ext>
+                </a:extLst>
+              </a:tr>
+              <a:tr h="1024524">
+                <a:tc>
+                  <a:txBody>
+                    <a:bodyPr/>
+                    <a:lstStyle/>
+                    <a:p>
+                      <a:pPr algn="ctr"/>
+                      <a:r>
+                        <a:rPr lang="en-US" sz="2400" b="1" dirty="0">
+                          <a:latin typeface="Agency FB" panose="020B0503020202020204" pitchFamily="34" charset="0"/>
+                        </a:rPr>
+                        <a:t>11 AM PT</a:t>
+                      </a:r>
+                    </a:p>
+                    <a:p>
+                      <a:pPr algn="ctr"/>
+                      <a:r>
+                        <a:rPr lang="en-US" sz="2400" dirty="0">
+                          <a:latin typeface="Agency FB" panose="020B0503020202020204" pitchFamily="34" charset="0"/>
+                        </a:rPr>
+                        <a:t>2 PM ET</a:t>
+                      </a:r>
+                    </a:p>
+                  </a:txBody>
+                  <a:tcPr marL="107715" marR="107715" marT="53858" marB="53858" anchor="ctr">
+                    <a:lnL w="6350" cap="flat" cmpd="sng" algn="ctr">
+                      <a:noFill/>
+                      <a:prstDash val="solid"/>
+                      <a:miter lim="800000"/>
+                    </a:lnL>
+                    <a:lnR>
+                      <a:noFill/>
+                    </a:lnR>
+                    <a:lnT w="6350" cap="flat" cmpd="sng" algn="ctr">
+                      <a:noFill/>
+                      <a:prstDash val="solid"/>
+                      <a:miter lim="800000"/>
+                    </a:lnT>
+                    <a:lnB w="6350" cap="flat" cmpd="sng" algn="ctr">
+                      <a:noFill/>
+                      <a:prstDash val="solid"/>
+                      <a:miter lim="800000"/>
+                    </a:lnB>
+                    <a:lnTlToBr w="12700" cmpd="sng">
+                      <a:noFill/>
+                      <a:prstDash val="solid"/>
+                    </a:lnTlToBr>
+                    <a:lnBlToTr w="12700" cmpd="sng">
+                      <a:noFill/>
+                      <a:prstDash val="solid"/>
+                    </a:lnBlToTr>
+                    <a:solidFill>
+                      <a:schemeClr val="bg1"/>
+                    </a:solidFill>
+                  </a:tcPr>
+                </a:tc>
+                <a:tc>
+                  <a:txBody>
+                    <a:bodyPr/>
+                    <a:lstStyle/>
+                    <a:p>
+                      <a:pPr algn="ctr"/>
+                      <a:r>
+                        <a:rPr lang="en-US" sz="3600" dirty="0">
+                          <a:latin typeface="Agency FB" panose="020B0503020202020204" pitchFamily="34" charset="0"/>
+                        </a:rPr>
+                        <a:t>MakeCode Arcade (Beginner)</a:t>
+                      </a:r>
+                    </a:p>
+                  </a:txBody>
+                  <a:tcPr marL="107715" marR="107715" marT="53858" marB="53858" anchor="ctr">
+                    <a:lnL>
+                      <a:noFill/>
+                    </a:lnL>
+                    <a:lnR w="6350" cap="flat" cmpd="sng" algn="ctr">
+                      <a:noFill/>
+                      <a:prstDash val="solid"/>
+                      <a:miter lim="800000"/>
+                    </a:lnR>
+                    <a:lnT w="6350" cap="flat" cmpd="sng" algn="ctr">
+                      <a:noFill/>
+                      <a:prstDash val="solid"/>
+                      <a:miter lim="800000"/>
+                    </a:lnT>
+                    <a:lnB w="6350" cap="flat" cmpd="sng" algn="ctr">
+                      <a:noFill/>
+                      <a:prstDash val="solid"/>
+                      <a:miter lim="800000"/>
+                    </a:lnB>
+                    <a:lnTlToBr w="12700" cmpd="sng">
+                      <a:noFill/>
+                      <a:prstDash val="solid"/>
+                    </a:lnTlToBr>
+                    <a:lnBlToTr w="12700" cmpd="sng">
+                      <a:noFill/>
+                      <a:prstDash val="solid"/>
+                    </a:lnBlToTr>
+                    <a:solidFill>
+                      <a:schemeClr val="bg1"/>
+                    </a:solidFill>
+                  </a:tcPr>
+                </a:tc>
+                <a:extLst>
+                  <a:ext uri="{0D108BD9-81ED-4DB2-BD59-A6C34878D82A}">
+                    <a16:rowId xmlns:a16="http://schemas.microsoft.com/office/drawing/2014/main" val="2202148809"/>
+                  </a:ext>
+                </a:extLst>
+              </a:tr>
+              <a:tr h="1471037">
+                <a:tc>
+                  <a:txBody>
+                    <a:bodyPr/>
+                    <a:lstStyle/>
+                    <a:p>
+                      <a:pPr algn="ctr"/>
+                      <a:r>
+                        <a:rPr lang="en-US" sz="2400" b="1" dirty="0">
+                          <a:latin typeface="Agency FB" panose="020B0503020202020204" pitchFamily="34" charset="0"/>
+                        </a:rPr>
+                        <a:t>12 PM PT</a:t>
+                      </a:r>
+                    </a:p>
+                    <a:p>
+                      <a:pPr algn="ctr"/>
+                      <a:r>
+                        <a:rPr lang="en-US" sz="2400" b="1" dirty="0">
+                          <a:latin typeface="Agency FB" panose="020B0503020202020204" pitchFamily="34" charset="0"/>
+                        </a:rPr>
+                        <a:t>1 PM MT</a:t>
+                      </a:r>
+                    </a:p>
+                    <a:p>
+                      <a:pPr algn="ctr"/>
+                      <a:r>
+                        <a:rPr lang="en-US" sz="2400" dirty="0">
+                          <a:latin typeface="Agency FB" panose="020B0503020202020204" pitchFamily="34" charset="0"/>
+                        </a:rPr>
+                        <a:t>3 PM ET</a:t>
+                      </a:r>
+                    </a:p>
+                  </a:txBody>
+                  <a:tcPr marL="107715" marR="107715" marT="53858" marB="53858" anchor="ctr">
+                    <a:lnL w="6350" cap="flat" cmpd="sng" algn="ctr">
+                      <a:noFill/>
+                      <a:prstDash val="solid"/>
+                      <a:miter lim="800000"/>
+                    </a:lnL>
+                    <a:lnR>
+                      <a:noFill/>
+                    </a:lnR>
+                    <a:lnT w="6350" cap="flat" cmpd="sng" algn="ctr">
+                      <a:noFill/>
+                      <a:prstDash val="solid"/>
+                      <a:miter lim="800000"/>
+                    </a:lnT>
+                    <a:lnB w="6350" cap="flat" cmpd="sng" algn="ctr">
+                      <a:noFill/>
+                      <a:prstDash val="solid"/>
+                      <a:miter lim="800000"/>
+                    </a:lnB>
+                    <a:lnTlToBr w="12700" cmpd="sng">
+                      <a:noFill/>
+                      <a:prstDash val="solid"/>
+                    </a:lnTlToBr>
+                    <a:lnBlToTr w="12700" cmpd="sng">
+                      <a:noFill/>
+                      <a:prstDash val="solid"/>
+                    </a:lnBlToTr>
+                    <a:solidFill>
+                      <a:srgbClr val="ECE4EB"/>
+                    </a:solidFill>
+                  </a:tcPr>
+                </a:tc>
+                <a:tc>
+                  <a:txBody>
+                    <a:bodyPr/>
+                    <a:lstStyle/>
+                    <a:p>
+                      <a:pPr algn="ctr"/>
+                      <a:r>
+                        <a:rPr lang="en-US" sz="3600" dirty="0">
+                          <a:solidFill>
+                            <a:sysClr val="windowText" lastClr="000000"/>
+                          </a:solidFill>
+                          <a:latin typeface="Agency FB" panose="020B0503020202020204" pitchFamily="34" charset="0"/>
+                        </a:rPr>
+                        <a:t>Digital All-Stars (Thursday only)</a:t>
+                      </a:r>
+                    </a:p>
+                    <a:p>
+                      <a:pPr algn="ctr"/>
+                      <a:r>
+                        <a:rPr lang="en-US" sz="3600" dirty="0">
+                          <a:solidFill>
+                            <a:sysClr val="windowText" lastClr="000000"/>
+                          </a:solidFill>
+                          <a:latin typeface="Agency FB" panose="020B0503020202020204" pitchFamily="34" charset="0"/>
+                        </a:rPr>
+                        <a:t>Brandan Wright, NBA Player</a:t>
+                      </a:r>
+                    </a:p>
+                  </a:txBody>
+                  <a:tcPr marL="107715" marR="107715" marT="53858" marB="53858" anchor="ctr">
+                    <a:lnL>
+                      <a:noFill/>
+                    </a:lnL>
+                    <a:lnR w="6350" cap="flat" cmpd="sng" algn="ctr">
+                      <a:noFill/>
+                      <a:prstDash val="solid"/>
+                      <a:miter lim="800000"/>
+                    </a:lnR>
+                    <a:lnT w="6350" cap="flat" cmpd="sng" algn="ctr">
+                      <a:noFill/>
+                      <a:prstDash val="solid"/>
+                      <a:miter lim="800000"/>
+                    </a:lnT>
+                    <a:lnB w="6350" cap="flat" cmpd="sng" algn="ctr">
+                      <a:noFill/>
+                      <a:prstDash val="solid"/>
+                      <a:miter lim="800000"/>
+                    </a:lnB>
+                    <a:lnTlToBr w="12700" cmpd="sng">
+                      <a:noFill/>
+                      <a:prstDash val="solid"/>
+                    </a:lnTlToBr>
+                    <a:lnBlToTr w="12700" cmpd="sng">
+                      <a:noFill/>
+                      <a:prstDash val="solid"/>
+                    </a:lnBlToTr>
+                    <a:solidFill>
+                      <a:srgbClr val="ECE4EB"/>
+                    </a:solidFill>
+                  </a:tcPr>
+                </a:tc>
+                <a:extLst>
+                  <a:ext uri="{0D108BD9-81ED-4DB2-BD59-A6C34878D82A}">
+                    <a16:rowId xmlns:a16="http://schemas.microsoft.com/office/drawing/2014/main" val="2879450763"/>
+                  </a:ext>
+                </a:extLst>
+              </a:tr>
+              <a:tr h="1024524">
+                <a:tc>
+                  <a:txBody>
+                    <a:bodyPr/>
+                    <a:lstStyle/>
+                    <a:p>
+                      <a:pPr algn="ctr"/>
+                      <a:r>
+                        <a:rPr lang="en-US" sz="2400" b="1" dirty="0">
+                          <a:latin typeface="Agency FB" panose="020B0503020202020204" pitchFamily="34" charset="0"/>
+                        </a:rPr>
+                        <a:t>2 PM PT</a:t>
+                      </a:r>
+                    </a:p>
+                    <a:p>
+                      <a:pPr algn="ctr"/>
+                      <a:r>
+                        <a:rPr lang="en-US" sz="2400" dirty="0">
+                          <a:latin typeface="Agency FB" panose="020B0503020202020204" pitchFamily="34" charset="0"/>
+                        </a:rPr>
+                        <a:t>5PM ET</a:t>
+                      </a:r>
+                    </a:p>
+                  </a:txBody>
+                  <a:tcPr marL="107715" marR="107715" marT="53858" marB="53858" anchor="ctr">
+                    <a:lnL w="6350" cap="flat" cmpd="sng" algn="ctr">
+                      <a:noFill/>
+                      <a:prstDash val="solid"/>
+                      <a:miter lim="800000"/>
+                    </a:lnL>
+                    <a:lnR>
+                      <a:noFill/>
+                    </a:lnR>
+                    <a:lnT w="6350" cap="flat" cmpd="sng" algn="ctr">
+                      <a:noFill/>
+                      <a:prstDash val="solid"/>
+                      <a:miter lim="800000"/>
+                    </a:lnT>
+                    <a:lnB w="6350" cap="flat" cmpd="sng" algn="ctr">
+                      <a:noFill/>
+                      <a:prstDash val="solid"/>
+                      <a:miter lim="800000"/>
+                    </a:lnB>
+                    <a:lnTlToBr w="12700" cmpd="sng">
+                      <a:noFill/>
+                      <a:prstDash val="solid"/>
+                    </a:lnTlToBr>
+                    <a:lnBlToTr w="12700" cmpd="sng">
+                      <a:noFill/>
+                      <a:prstDash val="solid"/>
+                    </a:lnBlToTr>
+                    <a:solidFill>
+                      <a:schemeClr val="bg1"/>
+                    </a:solidFill>
+                  </a:tcPr>
+                </a:tc>
+                <a:tc>
+                  <a:txBody>
+                    <a:bodyPr/>
+                    <a:lstStyle/>
+                    <a:p>
+                      <a:pPr algn="ctr"/>
+                      <a:r>
+                        <a:rPr lang="en-US" sz="3600" dirty="0">
+                          <a:latin typeface="Agency FB" panose="020B0503020202020204" pitchFamily="34" charset="0"/>
+                        </a:rPr>
+                        <a:t>MakeCode in the Kitchen (Friday only)</a:t>
+                      </a:r>
+                    </a:p>
+                  </a:txBody>
+                  <a:tcPr marL="107715" marR="107715" marT="53858" marB="53858" anchor="ctr">
+                    <a:lnL>
+                      <a:noFill/>
+                    </a:lnL>
+                    <a:lnR w="6350" cap="flat" cmpd="sng" algn="ctr">
+                      <a:noFill/>
+                      <a:prstDash val="solid"/>
+                      <a:miter lim="800000"/>
+                    </a:lnR>
+                    <a:lnT w="6350" cap="flat" cmpd="sng" algn="ctr">
+                      <a:noFill/>
+                      <a:prstDash val="solid"/>
+                      <a:miter lim="800000"/>
+                    </a:lnT>
+                    <a:lnB w="6350" cap="flat" cmpd="sng" algn="ctr">
+                      <a:noFill/>
+                      <a:prstDash val="solid"/>
+                      <a:miter lim="800000"/>
+                    </a:lnB>
+                    <a:lnTlToBr w="12700" cmpd="sng">
+                      <a:noFill/>
+                      <a:prstDash val="solid"/>
+                    </a:lnTlToBr>
+                    <a:lnBlToTr w="12700" cmpd="sng">
+                      <a:noFill/>
+                      <a:prstDash val="solid"/>
+                    </a:lnBlToTr>
+                    <a:solidFill>
+                      <a:schemeClr val="bg1"/>
+                    </a:solidFill>
+                  </a:tcPr>
+                </a:tc>
+                <a:extLst>
+                  <a:ext uri="{0D108BD9-81ED-4DB2-BD59-A6C34878D82A}">
+                    <a16:rowId xmlns:a16="http://schemas.microsoft.com/office/drawing/2014/main" val="2354609438"/>
+                  </a:ext>
+                </a:extLst>
+              </a:tr>
+            </a:tbl>
+          </a:graphicData>
+        </a:graphic>
+      </p:graphicFrame>
+      <p:pic>
+        <p:nvPicPr>
+          <p:cNvPr id="6" name="Picture 5">
+            <a:extLst>
+              <a:ext uri="{FF2B5EF4-FFF2-40B4-BE49-F238E27FC236}">
+                <a16:creationId xmlns:a16="http://schemas.microsoft.com/office/drawing/2014/main" id="{DFA03610-80FC-4DFE-A985-E935A407F2D5}"/>
+              </a:ext>
+            </a:extLst>
+          </p:cNvPr>
+          <p:cNvPicPr>
+            <a:picLocks noChangeAspect="1"/>
+          </p:cNvPicPr>
+          <p:nvPr/>
+        </p:nvPicPr>
+        <p:blipFill>
+          <a:blip r:embed="rId3">
+            <a:clrChange>
+              <a:clrFrom>
+                <a:srgbClr val="FFFFFF"/>
+              </a:clrFrom>
+              <a:clrTo>
+                <a:srgbClr val="FFFFFF">
+                  <a:alpha val="0"/>
+                </a:srgbClr>
+              </a:clrTo>
+            </a:clrChange>
+          </a:blip>
+          <a:stretch>
+            <a:fillRect/>
+          </a:stretch>
+        </p:blipFill>
+        <p:spPr>
+          <a:xfrm rot="20891684">
+            <a:off x="9661190" y="7499776"/>
+            <a:ext cx="1585991" cy="1288260"/>
+          </a:xfrm>
+          <a:prstGeom prst="rect">
+            <a:avLst/>
+          </a:prstGeom>
+        </p:spPr>
+      </p:pic>
+      <p:pic>
+        <p:nvPicPr>
+          <p:cNvPr id="1026" name="Picture 2" descr="Image result for minecraft agent">
+            <a:extLst>
+              <a:ext uri="{FF2B5EF4-FFF2-40B4-BE49-F238E27FC236}">
+                <a16:creationId xmlns:a16="http://schemas.microsoft.com/office/drawing/2014/main" id="{88852689-71CA-442A-A4C5-81C1A8DFB04A}"/>
+              </a:ext>
+            </a:extLst>
+          </p:cNvPr>
+          <p:cNvPicPr>
+            <a:picLocks noChangeAspect="1" noChangeArrowheads="1"/>
+          </p:cNvPicPr>
+          <p:nvPr/>
+        </p:nvPicPr>
+        <p:blipFill>
+          <a:blip r:embed="rId4">
+            <a:extLst>
+              <a:ext uri="{28A0092B-C50C-407E-A947-70E740481C1C}">
+                <a14:useLocalDpi xmlns:a14="http://schemas.microsoft.com/office/drawing/2010/main" val="0"/>
+              </a:ext>
+            </a:extLst>
+          </a:blip>
+          <a:srcRect/>
+          <a:stretch>
+            <a:fillRect/>
+          </a:stretch>
+        </p:blipFill>
+        <p:spPr bwMode="auto">
+          <a:xfrm>
+            <a:off x="7180351" y="7026356"/>
+            <a:ext cx="1485444" cy="1909856"/>
+          </a:xfrm>
+          <a:prstGeom prst="rect">
+            <a:avLst/>
+          </a:prstGeom>
+          <a:noFill/>
+          <a:extLst>
+            <a:ext uri="{909E8E84-426E-40DD-AFC4-6F175D3DCCD1}">
+              <a14:hiddenFill xmlns:a14="http://schemas.microsoft.com/office/drawing/2010/main">
+                <a:solidFill>
+                  <a:srgbClr val="FFFFFF"/>
+                </a:solidFill>
+              </a14:hiddenFill>
+            </a:ext>
+          </a:extLst>
+        </p:spPr>
+      </p:pic>
+      <p:pic>
+        <p:nvPicPr>
+          <p:cNvPr id="20" name="Picture 19">
+            <a:extLst>
+              <a:ext uri="{FF2B5EF4-FFF2-40B4-BE49-F238E27FC236}">
+                <a16:creationId xmlns:a16="http://schemas.microsoft.com/office/drawing/2014/main" id="{48293F08-CD3E-4C65-96CD-5DF121F46256}"/>
+              </a:ext>
+            </a:extLst>
+          </p:cNvPr>
+          <p:cNvPicPr>
+            <a:picLocks noChangeAspect="1"/>
+          </p:cNvPicPr>
+          <p:nvPr/>
+        </p:nvPicPr>
+        <p:blipFill>
+          <a:blip r:embed="rId5">
+            <a:clrChange>
+              <a:clrFrom>
+                <a:srgbClr val="FFFFFF"/>
+              </a:clrFrom>
+              <a:clrTo>
+                <a:srgbClr val="FFFFFF">
+                  <a:alpha val="0"/>
+                </a:srgbClr>
+              </a:clrTo>
+            </a:clrChange>
+          </a:blip>
+          <a:stretch>
+            <a:fillRect/>
+          </a:stretch>
+        </p:blipFill>
+        <p:spPr>
+          <a:xfrm>
+            <a:off x="4909602" y="7150779"/>
+            <a:ext cx="1579177" cy="1986253"/>
+          </a:xfrm>
+          <a:prstGeom prst="rect">
+            <a:avLst/>
+          </a:prstGeom>
+        </p:spPr>
+      </p:pic>
+      <p:pic>
+        <p:nvPicPr>
+          <p:cNvPr id="21" name="Picture 20">
+            <a:extLst>
+              <a:ext uri="{FF2B5EF4-FFF2-40B4-BE49-F238E27FC236}">
+                <a16:creationId xmlns:a16="http://schemas.microsoft.com/office/drawing/2014/main" id="{7B9D8333-3412-4B90-9070-714BFAC66DE1}"/>
+              </a:ext>
+            </a:extLst>
+          </p:cNvPr>
+          <p:cNvPicPr>
+            <a:picLocks noChangeAspect="1"/>
+          </p:cNvPicPr>
+          <p:nvPr/>
+        </p:nvPicPr>
+        <p:blipFill>
+          <a:blip r:embed="rId6">
+            <a:clrChange>
+              <a:clrFrom>
+                <a:srgbClr val="FAFAFA"/>
+              </a:clrFrom>
+              <a:clrTo>
+                <a:srgbClr val="FAFAFA">
+                  <a:alpha val="0"/>
+                </a:srgbClr>
+              </a:clrTo>
+            </a:clrChange>
+          </a:blip>
+          <a:stretch>
+            <a:fillRect/>
+          </a:stretch>
+        </p:blipFill>
+        <p:spPr>
+          <a:xfrm>
+            <a:off x="7881105" y="2680146"/>
+            <a:ext cx="4225143" cy="4188402"/>
+          </a:xfrm>
+          <a:prstGeom prst="rect">
+            <a:avLst/>
+          </a:prstGeom>
+        </p:spPr>
+      </p:pic>
+      <p:pic>
+        <p:nvPicPr>
+          <p:cNvPr id="22" name="Picture 21">
+            <a:extLst>
+              <a:ext uri="{FF2B5EF4-FFF2-40B4-BE49-F238E27FC236}">
+                <a16:creationId xmlns:a16="http://schemas.microsoft.com/office/drawing/2014/main" id="{A98EC812-E79E-4C80-A59D-65E79E1E6801}"/>
+              </a:ext>
+            </a:extLst>
+          </p:cNvPr>
+          <p:cNvPicPr>
+            <a:picLocks noChangeAspect="1"/>
+          </p:cNvPicPr>
+          <p:nvPr/>
+        </p:nvPicPr>
+        <p:blipFill>
+          <a:blip r:embed="rId7">
+            <a:clrChange>
+              <a:clrFrom>
+                <a:srgbClr val="FFFFFF"/>
+              </a:clrFrom>
+              <a:clrTo>
+                <a:srgbClr val="FFFFFF">
+                  <a:alpha val="0"/>
+                </a:srgbClr>
+              </a:clrTo>
+            </a:clrChange>
+          </a:blip>
+          <a:stretch>
+            <a:fillRect/>
+          </a:stretch>
+        </p:blipFill>
+        <p:spPr>
+          <a:xfrm rot="21244650">
+            <a:off x="2288230" y="7073140"/>
+            <a:ext cx="1441710" cy="1454888"/>
+          </a:xfrm>
+          <a:prstGeom prst="rect">
+            <a:avLst/>
+          </a:prstGeom>
+        </p:spPr>
+      </p:pic>
+      <p:pic>
+        <p:nvPicPr>
+          <p:cNvPr id="3" name="Picture 2" descr="A picture containing shirt&#10;&#10;Description automatically generated">
+            <a:extLst>
+              <a:ext uri="{FF2B5EF4-FFF2-40B4-BE49-F238E27FC236}">
+                <a16:creationId xmlns:a16="http://schemas.microsoft.com/office/drawing/2014/main" id="{F0DCA003-393A-41D2-8AE3-C0653694807A}"/>
+              </a:ext>
+            </a:extLst>
+          </p:cNvPr>
+          <p:cNvPicPr>
+            <a:picLocks noChangeAspect="1"/>
+          </p:cNvPicPr>
+          <p:nvPr/>
+        </p:nvPicPr>
+        <p:blipFill rotWithShape="1">
+          <a:blip r:embed="rId8">
+            <a:extLst>
+              <a:ext uri="{28A0092B-C50C-407E-A947-70E740481C1C}">
+                <a14:useLocalDpi xmlns:a14="http://schemas.microsoft.com/office/drawing/2010/main" val="0"/>
+              </a:ext>
+            </a:extLst>
+          </a:blip>
+          <a:srcRect l="33838" t="34344" r="34847" b="18249"/>
+          <a:stretch/>
+        </p:blipFill>
+        <p:spPr>
+          <a:xfrm>
+            <a:off x="2118957" y="3952274"/>
+            <a:ext cx="919944" cy="1740970"/>
+          </a:xfrm>
+          <a:prstGeom prst="rect">
+            <a:avLst/>
+          </a:prstGeom>
+        </p:spPr>
+      </p:pic>
+    </p:spTree>
+    <p:extLst>
+      <p:ext uri="{BB962C8B-B14F-4D97-AF65-F5344CB8AC3E}">
+        <p14:creationId xmlns:p14="http://schemas.microsoft.com/office/powerpoint/2010/main" val="2873932509"/>
       </p:ext>
     </p:extLst>
   </p:cSld>

</xml_diff>

<commit_message>
Added John Park's show
</commit_message>
<xml_diff>
--- a/docs/static/online-learning/Mixer Stream Schedule.pptx
+++ b/docs/static/online-learning/Mixer Stream Schedule.pptx
@@ -7168,14 +7168,14 @@
           <p:nvPr>
             <p:extLst>
               <p:ext uri="{D42A27DB-BD31-4B8C-83A1-F6EECF244321}">
-                <p14:modId xmlns:p14="http://schemas.microsoft.com/office/powerpoint/2010/main" val="1526443243"/>
+                <p14:modId xmlns:p14="http://schemas.microsoft.com/office/powerpoint/2010/main" val="3086054319"/>
               </p:ext>
             </p:extLst>
           </p:nvPr>
         </p:nvGraphicFramePr>
         <p:xfrm>
-          <a:off x="272956" y="194173"/>
-          <a:ext cx="8705582" cy="6057532"/>
+          <a:off x="272955" y="353199"/>
+          <a:ext cx="8900861" cy="6312158"/>
         </p:xfrm>
         <a:graphic>
           <a:graphicData uri="http://schemas.openxmlformats.org/drawingml/2006/table">
@@ -7184,14 +7184,14 @@
                 <a:tableStyleId>{69012ECD-51FC-41F1-AA8D-1B2483CD663E}</a:tableStyleId>
               </a:tblPr>
               <a:tblGrid>
-                <a:gridCol w="1991273">
+                <a:gridCol w="2035940">
                   <a:extLst>
                     <a:ext uri="{9D8B030D-6E8A-4147-A177-3AD203B41FA5}">
                       <a16:colId xmlns:a16="http://schemas.microsoft.com/office/drawing/2014/main" val="1510224491"/>
                     </a:ext>
                   </a:extLst>
                 </a:gridCol>
-                <a:gridCol w="6714309">
+                <a:gridCol w="6864921">
                   <a:extLst>
                     <a:ext uri="{9D8B030D-6E8A-4147-A177-3AD203B41FA5}">
                       <a16:colId xmlns:a16="http://schemas.microsoft.com/office/drawing/2014/main" val="21893690"/>
@@ -7199,7 +7199,7 @@
                   </a:extLst>
                 </a:gridCol>
               </a:tblGrid>
-              <a:tr h="551657">
+              <a:tr h="628066">
                 <a:tc>
                   <a:txBody>
                     <a:bodyPr/>
@@ -7207,7 +7207,7 @@
                     <a:p>
                       <a:pPr algn="ctr"/>
                       <a:r>
-                        <a:rPr lang="en-US" sz="3600" dirty="0">
+                        <a:rPr lang="en-US" sz="3200" dirty="0">
                           <a:latin typeface="Agency FB" panose="020B0503020202020204" pitchFamily="34" charset="0"/>
                         </a:rPr>
                         <a:t>TIME</a:t>
@@ -7253,7 +7253,7 @@
                     <a:p>
                       <a:pPr algn="ctr"/>
                       <a:r>
-                        <a:rPr lang="en-US" sz="3600" dirty="0">
+                        <a:rPr lang="en-US" sz="3200" dirty="0">
                           <a:latin typeface="Agency FB" panose="020B0503020202020204" pitchFamily="34" charset="0"/>
                         </a:rPr>
                         <a:t>STREAM</a:t>
@@ -7298,7 +7298,7 @@
                   </a:ext>
                 </a:extLst>
               </a:tr>
-              <a:tr h="0">
+              <a:tr h="756676">
                 <a:tc>
                   <a:txBody>
                     <a:bodyPr/>
@@ -7306,7 +7306,7 @@
                     <a:p>
                       <a:pPr algn="ctr"/>
                       <a:r>
-                        <a:rPr lang="en-US" sz="2400" b="1" dirty="0">
+                        <a:rPr lang="en-US" sz="2000" b="1" dirty="0">
                           <a:latin typeface="Agency FB" panose="020B0503020202020204" pitchFamily="34" charset="0"/>
                         </a:rPr>
                         <a:t>9 AM PT</a:t>
@@ -7315,7 +7315,7 @@
                     <a:p>
                       <a:pPr algn="ctr"/>
                       <a:r>
-                        <a:rPr lang="en-US" sz="2400" dirty="0">
+                        <a:rPr lang="en-US" sz="2000" dirty="0">
                           <a:latin typeface="Agency FB" panose="020B0503020202020204" pitchFamily="34" charset="0"/>
                         </a:rPr>
                         <a:t>12 PM ET</a:t>
@@ -7361,7 +7361,7 @@
                     <a:p>
                       <a:pPr algn="ctr"/>
                       <a:r>
-                        <a:rPr lang="en-US" sz="3600" dirty="0">
+                        <a:rPr lang="en-US" sz="3400" dirty="0">
                           <a:latin typeface="Agency FB" panose="020B0503020202020204" pitchFamily="34" charset="0"/>
                         </a:rPr>
                         <a:t>MakeCode for the micro:bit</a:t>
@@ -7406,7 +7406,7 @@
                   </a:ext>
                 </a:extLst>
               </a:tr>
-              <a:tr h="0">
+              <a:tr h="756676">
                 <a:tc>
                   <a:txBody>
                     <a:bodyPr/>
@@ -7414,7 +7414,7 @@
                     <a:p>
                       <a:pPr algn="ctr"/>
                       <a:r>
-                        <a:rPr lang="en-US" sz="2400" b="1" dirty="0">
+                        <a:rPr lang="en-US" sz="2000" b="1" dirty="0">
                           <a:latin typeface="Agency FB" panose="020B0503020202020204" pitchFamily="34" charset="0"/>
                         </a:rPr>
                         <a:t>10 AM PT</a:t>
@@ -7423,7 +7423,7 @@
                     <a:p>
                       <a:pPr algn="ctr"/>
                       <a:r>
-                        <a:rPr lang="en-US" sz="2400" dirty="0">
+                        <a:rPr lang="en-US" sz="2000" dirty="0">
                           <a:latin typeface="Agency FB" panose="020B0503020202020204" pitchFamily="34" charset="0"/>
                         </a:rPr>
                         <a:t>1 PM ET</a:t>
@@ -7469,7 +7469,7 @@
                     <a:p>
                       <a:pPr algn="ctr"/>
                       <a:r>
-                        <a:rPr lang="en-US" sz="3600" dirty="0">
+                        <a:rPr lang="en-US" sz="3400" dirty="0">
                           <a:latin typeface="Agency FB" panose="020B0503020202020204" pitchFamily="34" charset="0"/>
                         </a:rPr>
                         <a:t>MakeCode with Minecraft: Education Edition</a:t>
@@ -7514,7 +7514,7 @@
                   </a:ext>
                 </a:extLst>
               </a:tr>
-              <a:tr h="0">
+              <a:tr h="756676">
                 <a:tc>
                   <a:txBody>
                     <a:bodyPr/>
@@ -7522,7 +7522,7 @@
                     <a:p>
                       <a:pPr algn="ctr"/>
                       <a:r>
-                        <a:rPr lang="en-US" sz="2400" b="1" dirty="0">
+                        <a:rPr lang="en-US" sz="2000" b="1" dirty="0">
                           <a:latin typeface="Agency FB" panose="020B0503020202020204" pitchFamily="34" charset="0"/>
                         </a:rPr>
                         <a:t>11 AM PT</a:t>
@@ -7531,7 +7531,7 @@
                     <a:p>
                       <a:pPr algn="ctr"/>
                       <a:r>
-                        <a:rPr lang="en-US" sz="2400" dirty="0">
+                        <a:rPr lang="en-US" sz="2000" dirty="0">
                           <a:latin typeface="Agency FB" panose="020B0503020202020204" pitchFamily="34" charset="0"/>
                         </a:rPr>
                         <a:t>2 PM ET</a:t>
@@ -7577,7 +7577,7 @@
                     <a:p>
                       <a:pPr algn="ctr"/>
                       <a:r>
-                        <a:rPr lang="en-US" sz="3600" dirty="0">
+                        <a:rPr lang="en-US" sz="3400" dirty="0">
                           <a:latin typeface="Agency FB" panose="020B0503020202020204" pitchFamily="34" charset="0"/>
                         </a:rPr>
                         <a:t>MakeCode Arcade (Beginner)</a:t>
@@ -7622,7 +7622,7 @@
                   </a:ext>
                 </a:extLst>
               </a:tr>
-              <a:tr h="0">
+              <a:tr h="756676">
                 <a:tc>
                   <a:txBody>
                     <a:bodyPr/>
@@ -7630,7 +7630,7 @@
                     <a:p>
                       <a:pPr algn="ctr"/>
                       <a:r>
-                        <a:rPr lang="en-US" sz="2400" b="1" dirty="0">
+                        <a:rPr lang="en-US" sz="2000" b="1" dirty="0">
                           <a:latin typeface="Agency FB" panose="020B0503020202020204" pitchFamily="34" charset="0"/>
                         </a:rPr>
                         <a:t>12 PM PT</a:t>
@@ -7639,16 +7639,7 @@
                     <a:p>
                       <a:pPr algn="ctr"/>
                       <a:r>
-                        <a:rPr lang="en-US" sz="2400" b="1" dirty="0">
-                          <a:latin typeface="Agency FB" panose="020B0503020202020204" pitchFamily="34" charset="0"/>
-                        </a:rPr>
-                        <a:t>1 PM MT</a:t>
-                      </a:r>
-                    </a:p>
-                    <a:p>
-                      <a:pPr algn="ctr"/>
-                      <a:r>
-                        <a:rPr lang="en-US" sz="2400" dirty="0">
+                        <a:rPr lang="en-US" sz="2000" dirty="0">
                           <a:latin typeface="Agency FB" panose="020B0503020202020204" pitchFamily="34" charset="0"/>
                         </a:rPr>
                         <a:t>3 PM ET</a:t>
@@ -7694,25 +7685,13 @@
                     <a:p>
                       <a:pPr algn="ctr"/>
                       <a:r>
-                        <a:rPr lang="en-US" sz="3600" dirty="0">
+                        <a:rPr lang="en-US" sz="3400" dirty="0">
                           <a:solidFill>
                             <a:sysClr val="windowText" lastClr="000000"/>
                           </a:solidFill>
                           <a:latin typeface="Agency FB" panose="020B0503020202020204" pitchFamily="34" charset="0"/>
                         </a:rPr>
-                        <a:t>Digital All-Stars (Thursday only)</a:t>
-                      </a:r>
-                    </a:p>
-                    <a:p>
-                      <a:pPr algn="ctr"/>
-                      <a:r>
-                        <a:rPr lang="en-US" sz="3600" dirty="0">
-                          <a:solidFill>
-                            <a:sysClr val="windowText" lastClr="000000"/>
-                          </a:solidFill>
-                          <a:latin typeface="Agency FB" panose="020B0503020202020204" pitchFamily="34" charset="0"/>
-                        </a:rPr>
-                        <a:t>Brandan Wright, NBA Player</a:t>
+                        <a:t>MakeCode Live with John Park (Tuesday only)</a:t>
                       </a:r>
                     </a:p>
                   </a:txBody>
@@ -7750,11 +7729,11 @@
                 </a:tc>
                 <a:extLst>
                   <a:ext uri="{0D108BD9-81ED-4DB2-BD59-A6C34878D82A}">
-                    <a16:rowId xmlns:a16="http://schemas.microsoft.com/office/drawing/2014/main" val="2879450763"/>
+                    <a16:rowId xmlns:a16="http://schemas.microsoft.com/office/drawing/2014/main" val="3369474026"/>
                   </a:ext>
                 </a:extLst>
               </a:tr>
-              <a:tr h="0">
+              <a:tr h="1142506">
                 <a:tc>
                   <a:txBody>
                     <a:bodyPr/>
@@ -7762,25 +7741,28 @@
                     <a:p>
                       <a:pPr algn="ctr"/>
                       <a:r>
-                        <a:rPr lang="en-US" sz="2400" b="1" dirty="0">
-                          <a:solidFill>
-                            <a:sysClr val="windowText" lastClr="000000"/>
-                          </a:solidFill>
-                          <a:latin typeface="Agency FB" panose="020B0503020202020204" pitchFamily="34" charset="0"/>
-                        </a:rPr>
-                        <a:t>1 PM PT</a:t>
-                      </a:r>
-                    </a:p>
-                    <a:p>
-                      <a:pPr algn="ctr"/>
-                      <a:r>
-                        <a:rPr lang="en-US" sz="2400" dirty="0">
-                          <a:solidFill>
-                            <a:sysClr val="windowText" lastClr="000000"/>
-                          </a:solidFill>
-                          <a:latin typeface="Agency FB" panose="020B0503020202020204" pitchFamily="34" charset="0"/>
-                        </a:rPr>
-                        <a:t>4 PM ET</a:t>
+                        <a:rPr lang="en-US" sz="2000" b="1" dirty="0">
+                          <a:latin typeface="Agency FB" panose="020B0503020202020204" pitchFamily="34" charset="0"/>
+                        </a:rPr>
+                        <a:t>12 PM PT</a:t>
+                      </a:r>
+                    </a:p>
+                    <a:p>
+                      <a:pPr algn="ctr"/>
+                      <a:r>
+                        <a:rPr lang="en-US" sz="2000" b="1" dirty="0">
+                          <a:latin typeface="Agency FB" panose="020B0503020202020204" pitchFamily="34" charset="0"/>
+                        </a:rPr>
+                        <a:t>1 PM MT</a:t>
+                      </a:r>
+                    </a:p>
+                    <a:p>
+                      <a:pPr algn="ctr"/>
+                      <a:r>
+                        <a:rPr lang="en-US" sz="2000" dirty="0">
+                          <a:latin typeface="Agency FB" panose="020B0503020202020204" pitchFamily="34" charset="0"/>
+                        </a:rPr>
+                        <a:t>3 PM ET</a:t>
                       </a:r>
                     </a:p>
                   </a:txBody>
@@ -7823,13 +7805,25 @@
                     <a:p>
                       <a:pPr algn="ctr"/>
                       <a:r>
-                        <a:rPr lang="en-US" sz="3600" dirty="0">
+                        <a:rPr lang="en-US" sz="3400" dirty="0">
                           <a:solidFill>
                             <a:sysClr val="windowText" lastClr="000000"/>
                           </a:solidFill>
                           <a:latin typeface="Agency FB" panose="020B0503020202020204" pitchFamily="34" charset="0"/>
                         </a:rPr>
-                        <a:t>MakeCode Arcade (Advanced)</a:t>
+                        <a:t>Digital All-Stars (Thursday only)</a:t>
+                      </a:r>
+                    </a:p>
+                    <a:p>
+                      <a:pPr algn="ctr"/>
+                      <a:r>
+                        <a:rPr lang="en-US" sz="3400" dirty="0">
+                          <a:solidFill>
+                            <a:sysClr val="windowText" lastClr="000000"/>
+                          </a:solidFill>
+                          <a:latin typeface="Agency FB" panose="020B0503020202020204" pitchFamily="34" charset="0"/>
+                        </a:rPr>
+                        <a:t>Brandan Wright, NBA Player</a:t>
                       </a:r>
                     </a:p>
                   </a:txBody>
@@ -7867,11 +7861,11 @@
                 </a:tc>
                 <a:extLst>
                   <a:ext uri="{0D108BD9-81ED-4DB2-BD59-A6C34878D82A}">
-                    <a16:rowId xmlns:a16="http://schemas.microsoft.com/office/drawing/2014/main" val="2354609438"/>
+                    <a16:rowId xmlns:a16="http://schemas.microsoft.com/office/drawing/2014/main" val="2879450763"/>
                   </a:ext>
                 </a:extLst>
               </a:tr>
-              <a:tr h="0">
+              <a:tr h="756676">
                 <a:tc>
                   <a:txBody>
                     <a:bodyPr/>
@@ -7879,19 +7873,25 @@
                     <a:p>
                       <a:pPr algn="ctr"/>
                       <a:r>
-                        <a:rPr lang="en-US" sz="2400" b="1" dirty="0">
-                          <a:latin typeface="Agency FB" panose="020B0503020202020204" pitchFamily="34" charset="0"/>
-                        </a:rPr>
-                        <a:t>2 PM PT</a:t>
-                      </a:r>
-                    </a:p>
-                    <a:p>
-                      <a:pPr algn="ctr"/>
-                      <a:r>
-                        <a:rPr lang="en-US" sz="2400" dirty="0">
-                          <a:latin typeface="Agency FB" panose="020B0503020202020204" pitchFamily="34" charset="0"/>
-                        </a:rPr>
-                        <a:t>5PM ET</a:t>
+                        <a:rPr lang="en-US" sz="2000" b="1" dirty="0">
+                          <a:solidFill>
+                            <a:sysClr val="windowText" lastClr="000000"/>
+                          </a:solidFill>
+                          <a:latin typeface="Agency FB" panose="020B0503020202020204" pitchFamily="34" charset="0"/>
+                        </a:rPr>
+                        <a:t>1 PM PT</a:t>
+                      </a:r>
+                    </a:p>
+                    <a:p>
+                      <a:pPr algn="ctr"/>
+                      <a:r>
+                        <a:rPr lang="en-US" sz="2000" dirty="0">
+                          <a:solidFill>
+                            <a:sysClr val="windowText" lastClr="000000"/>
+                          </a:solidFill>
+                          <a:latin typeface="Agency FB" panose="020B0503020202020204" pitchFamily="34" charset="0"/>
+                        </a:rPr>
+                        <a:t>4 PM ET</a:t>
                       </a:r>
                     </a:p>
                   </a:txBody>
@@ -7934,10 +7934,13 @@
                     <a:p>
                       <a:pPr algn="ctr"/>
                       <a:r>
-                        <a:rPr lang="en-US" sz="3600" dirty="0">
-                          <a:latin typeface="Agency FB" panose="020B0503020202020204" pitchFamily="34" charset="0"/>
-                        </a:rPr>
-                        <a:t>MakeCode in the Kitchen (Friday only)</a:t>
+                        <a:rPr lang="en-US" sz="3400" dirty="0">
+                          <a:solidFill>
+                            <a:sysClr val="windowText" lastClr="000000"/>
+                          </a:solidFill>
+                          <a:latin typeface="Agency FB" panose="020B0503020202020204" pitchFamily="34" charset="0"/>
+                        </a:rPr>
+                        <a:t>MakeCode Arcade (Advanced)</a:t>
                       </a:r>
                     </a:p>
                   </a:txBody>
@@ -7970,6 +7973,114 @@
                     </a:lnBlToTr>
                     <a:solidFill>
                       <a:srgbClr val="ECE4EB"/>
+                    </a:solidFill>
+                  </a:tcPr>
+                </a:tc>
+                <a:extLst>
+                  <a:ext uri="{0D108BD9-81ED-4DB2-BD59-A6C34878D82A}">
+                    <a16:rowId xmlns:a16="http://schemas.microsoft.com/office/drawing/2014/main" val="2354609438"/>
+                  </a:ext>
+                </a:extLst>
+              </a:tr>
+              <a:tr h="756676">
+                <a:tc>
+                  <a:txBody>
+                    <a:bodyPr/>
+                    <a:lstStyle/>
+                    <a:p>
+                      <a:pPr algn="ctr"/>
+                      <a:r>
+                        <a:rPr lang="en-US" sz="2000" b="1" dirty="0">
+                          <a:latin typeface="Agency FB" panose="020B0503020202020204" pitchFamily="34" charset="0"/>
+                        </a:rPr>
+                        <a:t>2 PM PT</a:t>
+                      </a:r>
+                    </a:p>
+                    <a:p>
+                      <a:pPr algn="ctr"/>
+                      <a:r>
+                        <a:rPr lang="en-US" sz="2000" dirty="0">
+                          <a:latin typeface="Agency FB" panose="020B0503020202020204" pitchFamily="34" charset="0"/>
+                        </a:rPr>
+                        <a:t>5PM ET</a:t>
+                      </a:r>
+                    </a:p>
+                  </a:txBody>
+                  <a:tcPr marL="107715" marR="107715" marT="53858" marB="53858" anchor="ctr">
+                    <a:lnL w="6350" cap="flat" cmpd="sng" algn="ctr">
+                      <a:noFill/>
+                      <a:prstDash val="solid"/>
+                      <a:miter lim="800000"/>
+                    </a:lnL>
+                    <a:lnR>
+                      <a:noFill/>
+                    </a:lnR>
+                    <a:lnT w="6350" cap="flat" cmpd="sng" algn="ctr">
+                      <a:noFill/>
+                      <a:prstDash val="solid"/>
+                      <a:miter lim="800000"/>
+                    </a:lnT>
+                    <a:lnB w="6350" cap="flat" cmpd="sng" algn="ctr">
+                      <a:noFill/>
+                      <a:prstDash val="solid"/>
+                      <a:miter lim="800000"/>
+                    </a:lnB>
+                    <a:lnTlToBr w="12700" cmpd="sng">
+                      <a:noFill/>
+                      <a:prstDash val="solid"/>
+                    </a:lnTlToBr>
+                    <a:lnBlToTr w="12700" cmpd="sng">
+                      <a:noFill/>
+                      <a:prstDash val="solid"/>
+                    </a:lnBlToTr>
+                    <a:solidFill>
+                      <a:schemeClr val="bg1"/>
+                    </a:solidFill>
+                  </a:tcPr>
+                </a:tc>
+                <a:tc>
+                  <a:txBody>
+                    <a:bodyPr/>
+                    <a:lstStyle/>
+                    <a:p>
+                      <a:pPr algn="ctr"/>
+                      <a:r>
+                        <a:rPr lang="en-US" sz="3400" dirty="0">
+                          <a:latin typeface="Agency FB" panose="020B0503020202020204" pitchFamily="34" charset="0"/>
+                        </a:rPr>
+                        <a:t>MakeCode in the Kitchen (Friday only)</a:t>
+                      </a:r>
+                    </a:p>
+                  </a:txBody>
+                  <a:tcPr marL="107715" marR="107715" marT="53858" marB="53858" anchor="ctr">
+                    <a:lnL>
+                      <a:noFill/>
+                    </a:lnL>
+                    <a:lnR w="6350" cap="flat" cmpd="sng" algn="ctr">
+                      <a:noFill/>
+                      <a:prstDash val="solid"/>
+                      <a:miter lim="800000"/>
+                    </a:lnR>
+                    <a:lnT w="6350" cap="flat" cmpd="sng" algn="ctr">
+                      <a:noFill/>
+                      <a:prstDash val="solid"/>
+                      <a:miter lim="800000"/>
+                    </a:lnT>
+                    <a:lnB w="6350" cap="flat" cmpd="sng" algn="ctr">
+                      <a:noFill/>
+                      <a:prstDash val="solid"/>
+                      <a:miter lim="800000"/>
+                    </a:lnB>
+                    <a:lnTlToBr w="12700" cmpd="sng">
+                      <a:noFill/>
+                      <a:prstDash val="solid"/>
+                    </a:lnTlToBr>
+                    <a:lnBlToTr w="12700" cmpd="sng">
+                      <a:noFill/>
+                      <a:prstDash val="solid"/>
+                    </a:lnBlToTr>
+                    <a:solidFill>
+                      <a:schemeClr val="bg1"/>
                     </a:solidFill>
                   </a:tcPr>
                 </a:tc>
@@ -8221,7 +8332,7 @@
         </p:blipFill>
         <p:spPr>
           <a:xfrm>
-            <a:off x="2198323" y="3210745"/>
+            <a:off x="2603704" y="3906484"/>
             <a:ext cx="810762" cy="1534346"/>
           </a:xfrm>
           <a:prstGeom prst="rect">
@@ -8287,14 +8398,14 @@
           <p:nvPr>
             <p:extLst>
               <p:ext uri="{D42A27DB-BD31-4B8C-83A1-F6EECF244321}">
-                <p14:modId xmlns:p14="http://schemas.microsoft.com/office/powerpoint/2010/main" val="1499617002"/>
+                <p14:modId xmlns:p14="http://schemas.microsoft.com/office/powerpoint/2010/main" val="1052194106"/>
               </p:ext>
             </p:extLst>
           </p:nvPr>
         </p:nvGraphicFramePr>
         <p:xfrm>
           <a:off x="272956" y="194173"/>
-          <a:ext cx="8989325" cy="6370400"/>
+          <a:ext cx="8989325" cy="6599956"/>
         </p:xfrm>
         <a:graphic>
           <a:graphicData uri="http://schemas.openxmlformats.org/drawingml/2006/table">
@@ -8318,7 +8429,7 @@
                   </a:extLst>
                 </a:gridCol>
               </a:tblGrid>
-              <a:tr h="801267">
+              <a:tr h="548640">
                 <a:tc>
                   <a:txBody>
                     <a:bodyPr/>
@@ -8417,7 +8528,7 @@
                   </a:ext>
                 </a:extLst>
               </a:tr>
-              <a:tr h="1024524">
+              <a:tr h="914400">
                 <a:tc>
                   <a:txBody>
                     <a:bodyPr/>
@@ -8525,7 +8636,7 @@
                   </a:ext>
                 </a:extLst>
               </a:tr>
-              <a:tr h="1024524">
+              <a:tr h="914400">
                 <a:tc>
                   <a:txBody>
                     <a:bodyPr/>
@@ -8633,7 +8744,7 @@
                   </a:ext>
                 </a:extLst>
               </a:tr>
-              <a:tr h="1024524">
+              <a:tr h="914400">
                 <a:tc>
                   <a:txBody>
                     <a:bodyPr/>
@@ -8741,7 +8852,7 @@
                   </a:ext>
                 </a:extLst>
               </a:tr>
-              <a:tr h="1471037">
+              <a:tr h="914400">
                 <a:tc>
                   <a:txBody>
                     <a:bodyPr/>
@@ -8753,15 +8864,6 @@
                           <a:latin typeface="Agency FB" panose="020B0503020202020204" pitchFamily="34" charset="0"/>
                         </a:rPr>
                         <a:t>12 PM PT</a:t>
-                      </a:r>
-                    </a:p>
-                    <a:p>
-                      <a:pPr algn="ctr"/>
-                      <a:r>
-                        <a:rPr lang="en-US" sz="2400" b="1" dirty="0">
-                          <a:latin typeface="Agency FB" panose="020B0503020202020204" pitchFamily="34" charset="0"/>
-                        </a:rPr>
-                        <a:t>1 PM MT</a:t>
                       </a:r>
                     </a:p>
                     <a:p>
@@ -8819,19 +8921,7 @@
                           </a:solidFill>
                           <a:latin typeface="Agency FB" panose="020B0503020202020204" pitchFamily="34" charset="0"/>
                         </a:rPr>
-                        <a:t>Digital All-Stars (Thursday only)</a:t>
-                      </a:r>
-                    </a:p>
-                    <a:p>
-                      <a:pPr algn="ctr"/>
-                      <a:r>
-                        <a:rPr lang="en-US" sz="3600" dirty="0">
-                          <a:solidFill>
-                            <a:sysClr val="windowText" lastClr="000000"/>
-                          </a:solidFill>
-                          <a:latin typeface="Agency FB" panose="020B0503020202020204" pitchFamily="34" charset="0"/>
-                        </a:rPr>
-                        <a:t>Brandan Wright, NBA Player</a:t>
+                        <a:t>MakeCode Live with John Park (Tuesday only)</a:t>
                       </a:r>
                     </a:p>
                   </a:txBody>
@@ -8869,11 +8959,11 @@
                 </a:tc>
                 <a:extLst>
                   <a:ext uri="{0D108BD9-81ED-4DB2-BD59-A6C34878D82A}">
-                    <a16:rowId xmlns:a16="http://schemas.microsoft.com/office/drawing/2014/main" val="2879450763"/>
+                    <a16:rowId xmlns:a16="http://schemas.microsoft.com/office/drawing/2014/main" val="1897825816"/>
                   </a:ext>
                 </a:extLst>
               </a:tr>
-              <a:tr h="1024524">
+              <a:tr h="1371600">
                 <a:tc>
                   <a:txBody>
                     <a:bodyPr/>
@@ -8884,7 +8974,16 @@
                         <a:rPr lang="en-US" sz="2400" b="1" dirty="0">
                           <a:latin typeface="Agency FB" panose="020B0503020202020204" pitchFamily="34" charset="0"/>
                         </a:rPr>
-                        <a:t>2 PM PT</a:t>
+                        <a:t>12 PM PT</a:t>
+                      </a:r>
+                    </a:p>
+                    <a:p>
+                      <a:pPr algn="ctr"/>
+                      <a:r>
+                        <a:rPr lang="en-US" sz="2400" b="1" dirty="0">
+                          <a:latin typeface="Agency FB" panose="020B0503020202020204" pitchFamily="34" charset="0"/>
+                        </a:rPr>
+                        <a:t>1 PM MT</a:t>
                       </a:r>
                     </a:p>
                     <a:p>
@@ -8893,7 +8992,7 @@
                         <a:rPr lang="en-US" sz="2400" dirty="0">
                           <a:latin typeface="Agency FB" panose="020B0503020202020204" pitchFamily="34" charset="0"/>
                         </a:rPr>
-                        <a:t>5PM ET</a:t>
+                        <a:t>3 PM ET</a:t>
                       </a:r>
                     </a:p>
                   </a:txBody>
@@ -8937,9 +9036,24 @@
                       <a:pPr algn="ctr"/>
                       <a:r>
                         <a:rPr lang="en-US" sz="3600" dirty="0">
-                          <a:latin typeface="Agency FB" panose="020B0503020202020204" pitchFamily="34" charset="0"/>
-                        </a:rPr>
-                        <a:t>MakeCode in the Kitchen (Friday only)</a:t>
+                          <a:solidFill>
+                            <a:sysClr val="windowText" lastClr="000000"/>
+                          </a:solidFill>
+                          <a:latin typeface="Agency FB" panose="020B0503020202020204" pitchFamily="34" charset="0"/>
+                        </a:rPr>
+                        <a:t>Digital All-Stars (Thursday only)</a:t>
+                      </a:r>
+                    </a:p>
+                    <a:p>
+                      <a:pPr algn="ctr"/>
+                      <a:r>
+                        <a:rPr lang="en-US" sz="3600" dirty="0">
+                          <a:solidFill>
+                            <a:sysClr val="windowText" lastClr="000000"/>
+                          </a:solidFill>
+                          <a:latin typeface="Agency FB" panose="020B0503020202020204" pitchFamily="34" charset="0"/>
+                        </a:rPr>
+                        <a:t>Brandan Wright, NBA Player</a:t>
                       </a:r>
                     </a:p>
                   </a:txBody>
@@ -8972,6 +9086,114 @@
                     </a:lnBlToTr>
                     <a:solidFill>
                       <a:schemeClr val="bg1"/>
+                    </a:solidFill>
+                  </a:tcPr>
+                </a:tc>
+                <a:extLst>
+                  <a:ext uri="{0D108BD9-81ED-4DB2-BD59-A6C34878D82A}">
+                    <a16:rowId xmlns:a16="http://schemas.microsoft.com/office/drawing/2014/main" val="2879450763"/>
+                  </a:ext>
+                </a:extLst>
+              </a:tr>
+              <a:tr h="914400">
+                <a:tc>
+                  <a:txBody>
+                    <a:bodyPr/>
+                    <a:lstStyle/>
+                    <a:p>
+                      <a:pPr algn="ctr"/>
+                      <a:r>
+                        <a:rPr lang="en-US" sz="2400" b="1" dirty="0">
+                          <a:latin typeface="Agency FB" panose="020B0503020202020204" pitchFamily="34" charset="0"/>
+                        </a:rPr>
+                        <a:t>2 PM PT</a:t>
+                      </a:r>
+                    </a:p>
+                    <a:p>
+                      <a:pPr algn="ctr"/>
+                      <a:r>
+                        <a:rPr lang="en-US" sz="2400" dirty="0">
+                          <a:latin typeface="Agency FB" panose="020B0503020202020204" pitchFamily="34" charset="0"/>
+                        </a:rPr>
+                        <a:t>5PM ET</a:t>
+                      </a:r>
+                    </a:p>
+                  </a:txBody>
+                  <a:tcPr marL="107715" marR="107715" marT="53858" marB="53858" anchor="ctr">
+                    <a:lnL w="6350" cap="flat" cmpd="sng" algn="ctr">
+                      <a:noFill/>
+                      <a:prstDash val="solid"/>
+                      <a:miter lim="800000"/>
+                    </a:lnL>
+                    <a:lnR>
+                      <a:noFill/>
+                    </a:lnR>
+                    <a:lnT w="6350" cap="flat" cmpd="sng" algn="ctr">
+                      <a:noFill/>
+                      <a:prstDash val="solid"/>
+                      <a:miter lim="800000"/>
+                    </a:lnT>
+                    <a:lnB w="6350" cap="flat" cmpd="sng" algn="ctr">
+                      <a:noFill/>
+                      <a:prstDash val="solid"/>
+                      <a:miter lim="800000"/>
+                    </a:lnB>
+                    <a:lnTlToBr w="12700" cmpd="sng">
+                      <a:noFill/>
+                      <a:prstDash val="solid"/>
+                    </a:lnTlToBr>
+                    <a:lnBlToTr w="12700" cmpd="sng">
+                      <a:noFill/>
+                      <a:prstDash val="solid"/>
+                    </a:lnBlToTr>
+                    <a:solidFill>
+                      <a:srgbClr val="ECE4EB"/>
+                    </a:solidFill>
+                  </a:tcPr>
+                </a:tc>
+                <a:tc>
+                  <a:txBody>
+                    <a:bodyPr/>
+                    <a:lstStyle/>
+                    <a:p>
+                      <a:pPr algn="ctr"/>
+                      <a:r>
+                        <a:rPr lang="en-US" sz="3600" dirty="0">
+                          <a:latin typeface="Agency FB" panose="020B0503020202020204" pitchFamily="34" charset="0"/>
+                        </a:rPr>
+                        <a:t>MakeCode in the Kitchen (Friday only)</a:t>
+                      </a:r>
+                    </a:p>
+                  </a:txBody>
+                  <a:tcPr marL="107715" marR="107715" marT="53858" marB="53858" anchor="ctr">
+                    <a:lnL>
+                      <a:noFill/>
+                    </a:lnL>
+                    <a:lnR w="6350" cap="flat" cmpd="sng" algn="ctr">
+                      <a:noFill/>
+                      <a:prstDash val="solid"/>
+                      <a:miter lim="800000"/>
+                    </a:lnR>
+                    <a:lnT w="6350" cap="flat" cmpd="sng" algn="ctr">
+                      <a:noFill/>
+                      <a:prstDash val="solid"/>
+                      <a:miter lim="800000"/>
+                    </a:lnT>
+                    <a:lnB w="6350" cap="flat" cmpd="sng" algn="ctr">
+                      <a:noFill/>
+                      <a:prstDash val="solid"/>
+                      <a:miter lim="800000"/>
+                    </a:lnB>
+                    <a:lnTlToBr w="12700" cmpd="sng">
+                      <a:noFill/>
+                      <a:prstDash val="solid"/>
+                    </a:lnTlToBr>
+                    <a:lnBlToTr w="12700" cmpd="sng">
+                      <a:noFill/>
+                      <a:prstDash val="solid"/>
+                    </a:lnBlToTr>
+                    <a:solidFill>
+                      <a:srgbClr val="ECE4EB"/>
                     </a:solidFill>
                   </a:tcPr>
                 </a:tc>
@@ -9223,7 +9445,7 @@
         </p:blipFill>
         <p:spPr>
           <a:xfrm>
-            <a:off x="2118957" y="3952274"/>
+            <a:off x="2297862" y="4360999"/>
             <a:ext cx="919944" cy="1740970"/>
           </a:xfrm>
           <a:prstGeom prst="rect">
@@ -9289,14 +9511,14 @@
           <p:nvPr>
             <p:extLst>
               <p:ext uri="{D42A27DB-BD31-4B8C-83A1-F6EECF244321}">
-                <p14:modId xmlns:p14="http://schemas.microsoft.com/office/powerpoint/2010/main" val="3320362362"/>
+                <p14:modId xmlns:p14="http://schemas.microsoft.com/office/powerpoint/2010/main" val="3892148161"/>
               </p:ext>
             </p:extLst>
           </p:nvPr>
         </p:nvGraphicFramePr>
         <p:xfrm>
           <a:off x="272956" y="194173"/>
-          <a:ext cx="8705582" cy="6057532"/>
+          <a:ext cx="8543053" cy="6469654"/>
         </p:xfrm>
         <a:graphic>
           <a:graphicData uri="http://schemas.openxmlformats.org/drawingml/2006/table">
@@ -9305,14 +9527,14 @@
                 <a:tableStyleId>{69012ECD-51FC-41F1-AA8D-1B2483CD663E}</a:tableStyleId>
               </a:tblPr>
               <a:tblGrid>
-                <a:gridCol w="1991273">
+                <a:gridCol w="1954097">
                   <a:extLst>
                     <a:ext uri="{9D8B030D-6E8A-4147-A177-3AD203B41FA5}">
                       <a16:colId xmlns:a16="http://schemas.microsoft.com/office/drawing/2014/main" val="1510224491"/>
                     </a:ext>
                   </a:extLst>
                 </a:gridCol>
-                <a:gridCol w="6714309">
+                <a:gridCol w="6588956">
                   <a:extLst>
                     <a:ext uri="{9D8B030D-6E8A-4147-A177-3AD203B41FA5}">
                       <a16:colId xmlns:a16="http://schemas.microsoft.com/office/drawing/2014/main" val="21893690"/>
@@ -9320,7 +9542,7 @@
                   </a:extLst>
                 </a:gridCol>
               </a:tblGrid>
-              <a:tr h="551657">
+              <a:tr h="637398">
                 <a:tc>
                   <a:txBody>
                     <a:bodyPr/>
@@ -9328,7 +9550,7 @@
                     <a:p>
                       <a:pPr algn="ctr"/>
                       <a:r>
-                        <a:rPr lang="en-US" sz="3600" dirty="0">
+                        <a:rPr lang="en-US" sz="3200" dirty="0">
                           <a:latin typeface="Agency FB" panose="020B0503020202020204" pitchFamily="34" charset="0"/>
                         </a:rPr>
                         <a:t>TIME</a:t>
@@ -9374,7 +9596,7 @@
                     <a:p>
                       <a:pPr algn="ctr"/>
                       <a:r>
-                        <a:rPr lang="en-US" sz="3600" dirty="0">
+                        <a:rPr lang="en-US" sz="3200" dirty="0">
                           <a:latin typeface="Agency FB" panose="020B0503020202020204" pitchFamily="34" charset="0"/>
                         </a:rPr>
                         <a:t>STREAM</a:t>
@@ -9419,7 +9641,7 @@
                   </a:ext>
                 </a:extLst>
               </a:tr>
-              <a:tr h="0">
+              <a:tr h="767919">
                 <a:tc>
                   <a:txBody>
                     <a:bodyPr/>
@@ -9427,7 +9649,7 @@
                     <a:p>
                       <a:pPr algn="ctr"/>
                       <a:r>
-                        <a:rPr lang="en-US" sz="2400" b="1" dirty="0">
+                        <a:rPr lang="en-US" sz="2000" b="1" dirty="0">
                           <a:latin typeface="Agency FB" panose="020B0503020202020204" pitchFamily="34" charset="0"/>
                         </a:rPr>
                         <a:t>9 AM PT</a:t>
@@ -9436,7 +9658,7 @@
                     <a:p>
                       <a:pPr algn="ctr"/>
                       <a:r>
-                        <a:rPr lang="en-US" sz="2400" dirty="0">
+                        <a:rPr lang="en-US" sz="2000" dirty="0">
                           <a:latin typeface="Agency FB" panose="020B0503020202020204" pitchFamily="34" charset="0"/>
                         </a:rPr>
                         <a:t>12 PM ET</a:t>
@@ -9482,7 +9704,7 @@
                     <a:p>
                       <a:pPr algn="ctr"/>
                       <a:r>
-                        <a:rPr lang="en-US" sz="3600" dirty="0">
+                        <a:rPr lang="en-US" sz="3400" dirty="0">
                           <a:latin typeface="Agency FB" panose="020B0503020202020204" pitchFamily="34" charset="0"/>
                         </a:rPr>
                         <a:t>MakeCode for the micro:bit</a:t>
@@ -9527,7 +9749,7 @@
                   </a:ext>
                 </a:extLst>
               </a:tr>
-              <a:tr h="0">
+              <a:tr h="767919">
                 <a:tc>
                   <a:txBody>
                     <a:bodyPr/>
@@ -9535,7 +9757,7 @@
                     <a:p>
                       <a:pPr algn="ctr"/>
                       <a:r>
-                        <a:rPr lang="en-US" sz="2400" b="1" dirty="0">
+                        <a:rPr lang="en-US" sz="2000" b="1" dirty="0">
                           <a:latin typeface="Agency FB" panose="020B0503020202020204" pitchFamily="34" charset="0"/>
                         </a:rPr>
                         <a:t>10 AM PT</a:t>
@@ -9544,7 +9766,7 @@
                     <a:p>
                       <a:pPr algn="ctr"/>
                       <a:r>
-                        <a:rPr lang="en-US" sz="2400" dirty="0">
+                        <a:rPr lang="en-US" sz="2000" dirty="0">
                           <a:latin typeface="Agency FB" panose="020B0503020202020204" pitchFamily="34" charset="0"/>
                         </a:rPr>
                         <a:t>1 PM ET</a:t>
@@ -9590,7 +9812,7 @@
                     <a:p>
                       <a:pPr algn="ctr"/>
                       <a:r>
-                        <a:rPr lang="en-US" sz="3600" dirty="0">
+                        <a:rPr lang="en-US" sz="3400" dirty="0">
                           <a:latin typeface="Agency FB" panose="020B0503020202020204" pitchFamily="34" charset="0"/>
                         </a:rPr>
                         <a:t>MakeCode with Minecraft: Education Edition</a:t>
@@ -9635,7 +9857,7 @@
                   </a:ext>
                 </a:extLst>
               </a:tr>
-              <a:tr h="0">
+              <a:tr h="767919">
                 <a:tc>
                   <a:txBody>
                     <a:bodyPr/>
@@ -9643,7 +9865,7 @@
                     <a:p>
                       <a:pPr algn="ctr"/>
                       <a:r>
-                        <a:rPr lang="en-US" sz="2400" b="1" dirty="0">
+                        <a:rPr lang="en-US" sz="2000" b="1" dirty="0">
                           <a:latin typeface="Agency FB" panose="020B0503020202020204" pitchFamily="34" charset="0"/>
                         </a:rPr>
                         <a:t>11 AM PT</a:t>
@@ -9652,7 +9874,7 @@
                     <a:p>
                       <a:pPr algn="ctr"/>
                       <a:r>
-                        <a:rPr lang="en-US" sz="2400" dirty="0">
+                        <a:rPr lang="en-US" sz="2000" dirty="0">
                           <a:latin typeface="Agency FB" panose="020B0503020202020204" pitchFamily="34" charset="0"/>
                         </a:rPr>
                         <a:t>2 PM ET</a:t>
@@ -9698,7 +9920,7 @@
                     <a:p>
                       <a:pPr algn="ctr"/>
                       <a:r>
-                        <a:rPr lang="en-US" sz="3600" dirty="0">
+                        <a:rPr lang="en-US" sz="3400" dirty="0">
                           <a:latin typeface="Agency FB" panose="020B0503020202020204" pitchFamily="34" charset="0"/>
                         </a:rPr>
                         <a:t>MakeCode Arcade (Beginner)</a:t>
@@ -9743,7 +9965,7 @@
                   </a:ext>
                 </a:extLst>
               </a:tr>
-              <a:tr h="0">
+              <a:tr h="1224742">
                 <a:tc>
                   <a:txBody>
                     <a:bodyPr/>
@@ -9751,7 +9973,7 @@
                     <a:p>
                       <a:pPr algn="ctr"/>
                       <a:r>
-                        <a:rPr lang="en-US" sz="2400" b="1" dirty="0">
+                        <a:rPr lang="en-US" sz="2000" b="1" dirty="0">
                           <a:latin typeface="Agency FB" panose="020B0503020202020204" pitchFamily="34" charset="0"/>
                         </a:rPr>
                         <a:t>12 PM PT</a:t>
@@ -9760,7 +9982,7 @@
                     <a:p>
                       <a:pPr algn="ctr"/>
                       <a:r>
-                        <a:rPr lang="en-US" sz="2400" b="1" dirty="0">
+                        <a:rPr lang="en-US" sz="2000" b="1" dirty="0">
                           <a:latin typeface="Agency FB" panose="020B0503020202020204" pitchFamily="34" charset="0"/>
                         </a:rPr>
                         <a:t>1 PM MT</a:t>
@@ -9769,7 +9991,7 @@
                     <a:p>
                       <a:pPr algn="ctr"/>
                       <a:r>
-                        <a:rPr lang="en-US" sz="2400" dirty="0">
+                        <a:rPr lang="en-US" sz="2000" dirty="0">
                           <a:latin typeface="Agency FB" panose="020B0503020202020204" pitchFamily="34" charset="0"/>
                         </a:rPr>
                         <a:t>3 PM ET</a:t>
@@ -9815,7 +10037,7 @@
                     <a:p>
                       <a:pPr algn="ctr"/>
                       <a:r>
-                        <a:rPr lang="en-US" sz="3600" dirty="0">
+                        <a:rPr lang="en-US" sz="3400" dirty="0">
                           <a:solidFill>
                             <a:sysClr val="windowText" lastClr="000000"/>
                           </a:solidFill>
@@ -9827,7 +10049,7 @@
                     <a:p>
                       <a:pPr algn="ctr"/>
                       <a:r>
-                        <a:rPr lang="en-US" sz="3600" dirty="0">
+                        <a:rPr lang="en-US" sz="3400" dirty="0">
                           <a:solidFill>
                             <a:sysClr val="windowText" lastClr="000000"/>
                           </a:solidFill>
@@ -9875,7 +10097,7 @@
                   </a:ext>
                 </a:extLst>
               </a:tr>
-              <a:tr h="0">
+              <a:tr h="767919">
                 <a:tc>
                   <a:txBody>
                     <a:bodyPr/>
@@ -9883,25 +10105,19 @@
                     <a:p>
                       <a:pPr algn="ctr"/>
                       <a:r>
-                        <a:rPr lang="en-US" sz="2400" b="1" dirty="0">
-                          <a:solidFill>
-                            <a:sysClr val="windowText" lastClr="000000"/>
-                          </a:solidFill>
-                          <a:latin typeface="Agency FB" panose="020B0503020202020204" pitchFamily="34" charset="0"/>
-                        </a:rPr>
-                        <a:t>1 PM PT</a:t>
-                      </a:r>
-                    </a:p>
-                    <a:p>
-                      <a:pPr algn="ctr"/>
-                      <a:r>
-                        <a:rPr lang="en-US" sz="2400" dirty="0">
-                          <a:solidFill>
-                            <a:sysClr val="windowText" lastClr="000000"/>
-                          </a:solidFill>
-                          <a:latin typeface="Agency FB" panose="020B0503020202020204" pitchFamily="34" charset="0"/>
-                        </a:rPr>
-                        <a:t>4 PM ET</a:t>
+                        <a:rPr lang="en-US" sz="2000" b="1" dirty="0">
+                          <a:latin typeface="Agency FB" panose="020B0503020202020204" pitchFamily="34" charset="0"/>
+                        </a:rPr>
+                        <a:t>12 PM PT</a:t>
+                      </a:r>
+                    </a:p>
+                    <a:p>
+                      <a:pPr algn="ctr"/>
+                      <a:r>
+                        <a:rPr lang="en-US" sz="2000" dirty="0">
+                          <a:latin typeface="Agency FB" panose="020B0503020202020204" pitchFamily="34" charset="0"/>
+                        </a:rPr>
+                        <a:t>3 PM ET</a:t>
                       </a:r>
                     </a:p>
                   </a:txBody>
@@ -9944,13 +10160,13 @@
                     <a:p>
                       <a:pPr algn="ctr"/>
                       <a:r>
-                        <a:rPr lang="en-US" sz="3600" dirty="0">
+                        <a:rPr lang="en-US" sz="3400" dirty="0">
                           <a:solidFill>
                             <a:sysClr val="windowText" lastClr="000000"/>
                           </a:solidFill>
                           <a:latin typeface="Agency FB" panose="020B0503020202020204" pitchFamily="34" charset="0"/>
                         </a:rPr>
-                        <a:t>MakeCode Arcade (Advanced)</a:t>
+                        <a:t>MakeCode Live with John Park (Tuesday only)</a:t>
                       </a:r>
                     </a:p>
                   </a:txBody>
@@ -9988,11 +10204,11 @@
                 </a:tc>
                 <a:extLst>
                   <a:ext uri="{0D108BD9-81ED-4DB2-BD59-A6C34878D82A}">
-                    <a16:rowId xmlns:a16="http://schemas.microsoft.com/office/drawing/2014/main" val="2354609438"/>
+                    <a16:rowId xmlns:a16="http://schemas.microsoft.com/office/drawing/2014/main" val="2667423859"/>
                   </a:ext>
                 </a:extLst>
               </a:tr>
-              <a:tr h="0">
+              <a:tr h="767919">
                 <a:tc>
                   <a:txBody>
                     <a:bodyPr/>
@@ -10000,19 +10216,25 @@
                     <a:p>
                       <a:pPr algn="ctr"/>
                       <a:r>
-                        <a:rPr lang="en-US" sz="2400" b="1" dirty="0">
-                          <a:latin typeface="Agency FB" panose="020B0503020202020204" pitchFamily="34" charset="0"/>
-                        </a:rPr>
-                        <a:t>2 PM PT</a:t>
-                      </a:r>
-                    </a:p>
-                    <a:p>
-                      <a:pPr algn="ctr"/>
-                      <a:r>
-                        <a:rPr lang="en-US" sz="2400" dirty="0">
-                          <a:latin typeface="Agency FB" panose="020B0503020202020204" pitchFamily="34" charset="0"/>
-                        </a:rPr>
-                        <a:t>5PM ET</a:t>
+                        <a:rPr lang="en-US" sz="2000" b="1" dirty="0">
+                          <a:solidFill>
+                            <a:sysClr val="windowText" lastClr="000000"/>
+                          </a:solidFill>
+                          <a:latin typeface="Agency FB" panose="020B0503020202020204" pitchFamily="34" charset="0"/>
+                        </a:rPr>
+                        <a:t>1 PM PT</a:t>
+                      </a:r>
+                    </a:p>
+                    <a:p>
+                      <a:pPr algn="ctr"/>
+                      <a:r>
+                        <a:rPr lang="en-US" sz="2000" dirty="0">
+                          <a:solidFill>
+                            <a:sysClr val="windowText" lastClr="000000"/>
+                          </a:solidFill>
+                          <a:latin typeface="Agency FB" panose="020B0503020202020204" pitchFamily="34" charset="0"/>
+                        </a:rPr>
+                        <a:t>4 PM ET</a:t>
                       </a:r>
                     </a:p>
                   </a:txBody>
@@ -10055,10 +10277,13 @@
                     <a:p>
                       <a:pPr algn="ctr"/>
                       <a:r>
-                        <a:rPr lang="en-US" sz="3600" dirty="0">
-                          <a:latin typeface="Agency FB" panose="020B0503020202020204" pitchFamily="34" charset="0"/>
-                        </a:rPr>
-                        <a:t>MakeCode in the Kitchen (Friday only)</a:t>
+                        <a:rPr lang="en-US" sz="3400" dirty="0">
+                          <a:solidFill>
+                            <a:sysClr val="windowText" lastClr="000000"/>
+                          </a:solidFill>
+                          <a:latin typeface="Agency FB" panose="020B0503020202020204" pitchFamily="34" charset="0"/>
+                        </a:rPr>
+                        <a:t>MakeCode Arcade (Advanced)</a:t>
                       </a:r>
                     </a:p>
                   </a:txBody>
@@ -10091,6 +10316,114 @@
                     </a:lnBlToTr>
                     <a:solidFill>
                       <a:srgbClr val="ECE4EB"/>
+                    </a:solidFill>
+                  </a:tcPr>
+                </a:tc>
+                <a:extLst>
+                  <a:ext uri="{0D108BD9-81ED-4DB2-BD59-A6C34878D82A}">
+                    <a16:rowId xmlns:a16="http://schemas.microsoft.com/office/drawing/2014/main" val="2354609438"/>
+                  </a:ext>
+                </a:extLst>
+              </a:tr>
+              <a:tr h="767919">
+                <a:tc>
+                  <a:txBody>
+                    <a:bodyPr/>
+                    <a:lstStyle/>
+                    <a:p>
+                      <a:pPr algn="ctr"/>
+                      <a:r>
+                        <a:rPr lang="en-US" sz="2000" b="1" dirty="0">
+                          <a:latin typeface="Agency FB" panose="020B0503020202020204" pitchFamily="34" charset="0"/>
+                        </a:rPr>
+                        <a:t>2 PM PT</a:t>
+                      </a:r>
+                    </a:p>
+                    <a:p>
+                      <a:pPr algn="ctr"/>
+                      <a:r>
+                        <a:rPr lang="en-US" sz="2000" dirty="0">
+                          <a:latin typeface="Agency FB" panose="020B0503020202020204" pitchFamily="34" charset="0"/>
+                        </a:rPr>
+                        <a:t>5PM ET</a:t>
+                      </a:r>
+                    </a:p>
+                  </a:txBody>
+                  <a:tcPr marL="107715" marR="107715" marT="53858" marB="53858" anchor="ctr">
+                    <a:lnL w="6350" cap="flat" cmpd="sng" algn="ctr">
+                      <a:noFill/>
+                      <a:prstDash val="solid"/>
+                      <a:miter lim="800000"/>
+                    </a:lnL>
+                    <a:lnR>
+                      <a:noFill/>
+                    </a:lnR>
+                    <a:lnT w="6350" cap="flat" cmpd="sng" algn="ctr">
+                      <a:noFill/>
+                      <a:prstDash val="solid"/>
+                      <a:miter lim="800000"/>
+                    </a:lnT>
+                    <a:lnB w="6350" cap="flat" cmpd="sng" algn="ctr">
+                      <a:noFill/>
+                      <a:prstDash val="solid"/>
+                      <a:miter lim="800000"/>
+                    </a:lnB>
+                    <a:lnTlToBr w="12700" cmpd="sng">
+                      <a:noFill/>
+                      <a:prstDash val="solid"/>
+                    </a:lnTlToBr>
+                    <a:lnBlToTr w="12700" cmpd="sng">
+                      <a:noFill/>
+                      <a:prstDash val="solid"/>
+                    </a:lnBlToTr>
+                    <a:solidFill>
+                      <a:schemeClr val="bg1"/>
+                    </a:solidFill>
+                  </a:tcPr>
+                </a:tc>
+                <a:tc>
+                  <a:txBody>
+                    <a:bodyPr/>
+                    <a:lstStyle/>
+                    <a:p>
+                      <a:pPr algn="ctr"/>
+                      <a:r>
+                        <a:rPr lang="en-US" sz="3400" dirty="0">
+                          <a:latin typeface="Agency FB" panose="020B0503020202020204" pitchFamily="34" charset="0"/>
+                        </a:rPr>
+                        <a:t>MakeCode in the Kitchen (Friday only)</a:t>
+                      </a:r>
+                    </a:p>
+                  </a:txBody>
+                  <a:tcPr marL="107715" marR="107715" marT="53858" marB="53858" anchor="ctr">
+                    <a:lnL>
+                      <a:noFill/>
+                    </a:lnL>
+                    <a:lnR w="6350" cap="flat" cmpd="sng" algn="ctr">
+                      <a:noFill/>
+                      <a:prstDash val="solid"/>
+                      <a:miter lim="800000"/>
+                    </a:lnR>
+                    <a:lnT w="6350" cap="flat" cmpd="sng" algn="ctr">
+                      <a:noFill/>
+                      <a:prstDash val="solid"/>
+                      <a:miter lim="800000"/>
+                    </a:lnT>
+                    <a:lnB w="6350" cap="flat" cmpd="sng" algn="ctr">
+                      <a:noFill/>
+                      <a:prstDash val="solid"/>
+                      <a:miter lim="800000"/>
+                    </a:lnB>
+                    <a:lnTlToBr w="12700" cmpd="sng">
+                      <a:noFill/>
+                      <a:prstDash val="solid"/>
+                    </a:lnTlToBr>
+                    <a:lnBlToTr w="12700" cmpd="sng">
+                      <a:noFill/>
+                      <a:prstDash val="solid"/>
+                    </a:lnBlToTr>
+                    <a:solidFill>
+                      <a:schemeClr val="bg1"/>
                     </a:solidFill>
                   </a:tcPr>
                 </a:tc>
@@ -10266,7 +10599,7 @@
         </p:blipFill>
         <p:spPr>
           <a:xfrm>
-            <a:off x="7881105" y="2475425"/>
+            <a:off x="7966857" y="2475425"/>
             <a:ext cx="4225143" cy="4188402"/>
           </a:xfrm>
           <a:prstGeom prst="rect">
@@ -10342,7 +10675,7 @@
         </p:blipFill>
         <p:spPr>
           <a:xfrm>
-            <a:off x="2198323" y="3210745"/>
+            <a:off x="2217017" y="2952327"/>
             <a:ext cx="810762" cy="1534346"/>
           </a:xfrm>
           <a:prstGeom prst="rect">
@@ -10408,14 +10741,14 @@
           <p:nvPr>
             <p:extLst>
               <p:ext uri="{D42A27DB-BD31-4B8C-83A1-F6EECF244321}">
-                <p14:modId xmlns:p14="http://schemas.microsoft.com/office/powerpoint/2010/main" val="1167007614"/>
+                <p14:modId xmlns:p14="http://schemas.microsoft.com/office/powerpoint/2010/main" val="1147017696"/>
               </p:ext>
             </p:extLst>
           </p:nvPr>
         </p:nvGraphicFramePr>
         <p:xfrm>
           <a:off x="272955" y="194173"/>
-          <a:ext cx="8914587" cy="6057532"/>
+          <a:ext cx="9273227" cy="6469654"/>
         </p:xfrm>
         <a:graphic>
           <a:graphicData uri="http://schemas.openxmlformats.org/drawingml/2006/table">
@@ -10424,14 +10757,14 @@
                 <a:tableStyleId>{69012ECD-51FC-41F1-AA8D-1B2483CD663E}</a:tableStyleId>
               </a:tblPr>
               <a:tblGrid>
-                <a:gridCol w="2039080">
+                <a:gridCol w="2121114">
                   <a:extLst>
                     <a:ext uri="{9D8B030D-6E8A-4147-A177-3AD203B41FA5}">
                       <a16:colId xmlns:a16="http://schemas.microsoft.com/office/drawing/2014/main" val="1510224491"/>
                     </a:ext>
                   </a:extLst>
                 </a:gridCol>
-                <a:gridCol w="6875507">
+                <a:gridCol w="7152113">
                   <a:extLst>
                     <a:ext uri="{9D8B030D-6E8A-4147-A177-3AD203B41FA5}">
                       <a16:colId xmlns:a16="http://schemas.microsoft.com/office/drawing/2014/main" val="21893690"/>
@@ -10439,7 +10772,7 @@
                   </a:extLst>
                 </a:gridCol>
               </a:tblGrid>
-              <a:tr h="551657">
+              <a:tr h="637398">
                 <a:tc>
                   <a:txBody>
                     <a:bodyPr/>
@@ -10447,7 +10780,7 @@
                     <a:p>
                       <a:pPr algn="ctr"/>
                       <a:r>
-                        <a:rPr lang="en-US" sz="3600" dirty="0">
+                        <a:rPr lang="en-US" sz="3200" dirty="0">
                           <a:latin typeface="Agency FB" panose="020B0503020202020204" pitchFamily="34" charset="0"/>
                         </a:rPr>
                         <a:t>TIME</a:t>
@@ -10493,7 +10826,7 @@
                     <a:p>
                       <a:pPr algn="ctr"/>
                       <a:r>
-                        <a:rPr lang="en-US" sz="3600" dirty="0">
+                        <a:rPr lang="en-US" sz="3200" dirty="0">
                           <a:latin typeface="Agency FB" panose="020B0503020202020204" pitchFamily="34" charset="0"/>
                         </a:rPr>
                         <a:t>STREAM</a:t>
@@ -10538,7 +10871,7 @@
                   </a:ext>
                 </a:extLst>
               </a:tr>
-              <a:tr h="0">
+              <a:tr h="767919">
                 <a:tc>
                   <a:txBody>
                     <a:bodyPr/>
@@ -10546,7 +10879,7 @@
                     <a:p>
                       <a:pPr algn="ctr"/>
                       <a:r>
-                        <a:rPr lang="en-US" sz="2400" b="1" dirty="0">
+                        <a:rPr lang="en-US" sz="2000" b="1" dirty="0">
                           <a:latin typeface="Agency FB" panose="020B0503020202020204" pitchFamily="34" charset="0"/>
                         </a:rPr>
                         <a:t>9 AM PT</a:t>
@@ -10555,7 +10888,7 @@
                     <a:p>
                       <a:pPr algn="ctr"/>
                       <a:r>
-                        <a:rPr lang="en-US" sz="2400" dirty="0">
+                        <a:rPr lang="en-US" sz="2000" dirty="0">
                           <a:latin typeface="Agency FB" panose="020B0503020202020204" pitchFamily="34" charset="0"/>
                         </a:rPr>
                         <a:t>12 PM ET</a:t>
@@ -10601,7 +10934,7 @@
                     <a:p>
                       <a:pPr algn="ctr"/>
                       <a:r>
-                        <a:rPr lang="en-US" sz="3600" dirty="0">
+                        <a:rPr lang="en-US" sz="3400" dirty="0">
                           <a:latin typeface="Agency FB" panose="020B0503020202020204" pitchFamily="34" charset="0"/>
                         </a:rPr>
                         <a:t>MakeCode for the micro:bit</a:t>
@@ -10646,7 +10979,7 @@
                   </a:ext>
                 </a:extLst>
               </a:tr>
-              <a:tr h="0">
+              <a:tr h="767919">
                 <a:tc>
                   <a:txBody>
                     <a:bodyPr/>
@@ -10654,7 +10987,7 @@
                     <a:p>
                       <a:pPr algn="ctr"/>
                       <a:r>
-                        <a:rPr lang="en-US" sz="2400" b="1" dirty="0">
+                        <a:rPr lang="en-US" sz="2000" b="1" dirty="0">
                           <a:latin typeface="Agency FB" panose="020B0503020202020204" pitchFamily="34" charset="0"/>
                         </a:rPr>
                         <a:t>10 AM PT</a:t>
@@ -10663,7 +10996,7 @@
                     <a:p>
                       <a:pPr algn="ctr"/>
                       <a:r>
-                        <a:rPr lang="en-US" sz="2400" dirty="0">
+                        <a:rPr lang="en-US" sz="2000" dirty="0">
                           <a:latin typeface="Agency FB" panose="020B0503020202020204" pitchFamily="34" charset="0"/>
                         </a:rPr>
                         <a:t>1 PM ET</a:t>
@@ -10709,7 +11042,7 @@
                     <a:p>
                       <a:pPr algn="ctr"/>
                       <a:r>
-                        <a:rPr lang="en-US" sz="3600" dirty="0">
+                        <a:rPr lang="en-US" sz="3400" dirty="0">
                           <a:latin typeface="Agency FB" panose="020B0503020202020204" pitchFamily="34" charset="0"/>
                         </a:rPr>
                         <a:t>MakeCode with Minecraft: Education Edition</a:t>
@@ -10754,7 +11087,7 @@
                   </a:ext>
                 </a:extLst>
               </a:tr>
-              <a:tr h="0">
+              <a:tr h="767919">
                 <a:tc>
                   <a:txBody>
                     <a:bodyPr/>
@@ -10762,7 +11095,7 @@
                     <a:p>
                       <a:pPr algn="ctr"/>
                       <a:r>
-                        <a:rPr lang="en-US" sz="2400" b="1" dirty="0">
+                        <a:rPr lang="en-US" sz="2000" b="1" dirty="0">
                           <a:latin typeface="Agency FB" panose="020B0503020202020204" pitchFamily="34" charset="0"/>
                         </a:rPr>
                         <a:t>11 AM PT</a:t>
@@ -10771,7 +11104,7 @@
                     <a:p>
                       <a:pPr algn="ctr"/>
                       <a:r>
-                        <a:rPr lang="en-US" sz="2400" dirty="0">
+                        <a:rPr lang="en-US" sz="2000" dirty="0">
                           <a:latin typeface="Agency FB" panose="020B0503020202020204" pitchFamily="34" charset="0"/>
                         </a:rPr>
                         <a:t>2 PM ET</a:t>
@@ -10817,7 +11150,7 @@
                     <a:p>
                       <a:pPr algn="ctr"/>
                       <a:r>
-                        <a:rPr lang="en-US" sz="3600" dirty="0">
+                        <a:rPr lang="en-US" sz="3400" dirty="0">
                           <a:latin typeface="Agency FB" panose="020B0503020202020204" pitchFamily="34" charset="0"/>
                         </a:rPr>
                         <a:t>MakeCode Arcade (Beginner)</a:t>
@@ -10862,7 +11195,7 @@
                   </a:ext>
                 </a:extLst>
               </a:tr>
-              <a:tr h="0">
+              <a:tr h="1224742">
                 <a:tc>
                   <a:txBody>
                     <a:bodyPr/>
@@ -10870,7 +11203,7 @@
                     <a:p>
                       <a:pPr algn="ctr"/>
                       <a:r>
-                        <a:rPr lang="en-US" sz="2400" b="1" dirty="0">
+                        <a:rPr lang="en-US" sz="2000" b="1" dirty="0">
                           <a:latin typeface="Agency FB" panose="020B0503020202020204" pitchFamily="34" charset="0"/>
                         </a:rPr>
                         <a:t>12 PM PT</a:t>
@@ -10879,7 +11212,7 @@
                     <a:p>
                       <a:pPr algn="ctr"/>
                       <a:r>
-                        <a:rPr lang="en-US" sz="2400" b="1" dirty="0">
+                        <a:rPr lang="en-US" sz="2000" b="1" dirty="0">
                           <a:latin typeface="Agency FB" panose="020B0503020202020204" pitchFamily="34" charset="0"/>
                         </a:rPr>
                         <a:t>1 PM MT</a:t>
@@ -10888,7 +11221,7 @@
                     <a:p>
                       <a:pPr algn="ctr"/>
                       <a:r>
-                        <a:rPr lang="en-US" sz="2400" dirty="0">
+                        <a:rPr lang="en-US" sz="2000" dirty="0">
                           <a:latin typeface="Agency FB" panose="020B0503020202020204" pitchFamily="34" charset="0"/>
                         </a:rPr>
                         <a:t>3 PM ET</a:t>
@@ -10934,7 +11267,7 @@
                     <a:p>
                       <a:pPr algn="ctr"/>
                       <a:r>
-                        <a:rPr lang="en-US" sz="3600" dirty="0">
+                        <a:rPr lang="en-US" sz="3400" dirty="0">
                           <a:solidFill>
                             <a:sysClr val="windowText" lastClr="000000"/>
                           </a:solidFill>
@@ -10946,7 +11279,7 @@
                     <a:p>
                       <a:pPr algn="ctr"/>
                       <a:r>
-                        <a:rPr lang="en-US" sz="3600" dirty="0">
+                        <a:rPr lang="en-US" sz="3400" dirty="0">
                           <a:solidFill>
                             <a:sysClr val="windowText" lastClr="000000"/>
                           </a:solidFill>
@@ -10994,7 +11327,7 @@
                   </a:ext>
                 </a:extLst>
               </a:tr>
-              <a:tr h="0">
+              <a:tr h="767919">
                 <a:tc>
                   <a:txBody>
                     <a:bodyPr/>
@@ -11002,26 +11335,26 @@
                     <a:p>
                       <a:pPr algn="ctr"/>
                       <a:r>
-                        <a:rPr lang="en-US" sz="2400" b="1" dirty="0">
-                          <a:solidFill>
-                            <a:sysClr val="windowText" lastClr="000000"/>
-                          </a:solidFill>
-                          <a:latin typeface="Agency FB" panose="020B0503020202020204" pitchFamily="34" charset="0"/>
-                        </a:rPr>
-                        <a:t>1 PM PT</a:t>
-                      </a:r>
-                    </a:p>
-                    <a:p>
-                      <a:pPr algn="ctr"/>
-                      <a:r>
-                        <a:rPr lang="en-US" sz="2400" dirty="0">
-                          <a:solidFill>
-                            <a:sysClr val="windowText" lastClr="000000"/>
-                          </a:solidFill>
-                          <a:latin typeface="Agency FB" panose="020B0503020202020204" pitchFamily="34" charset="0"/>
-                        </a:rPr>
-                        <a:t>4 PM ET</a:t>
-                      </a:r>
+                        <a:rPr lang="en-US" sz="2000" b="1" dirty="0">
+                          <a:latin typeface="Agency FB" panose="020B0503020202020204" pitchFamily="34" charset="0"/>
+                        </a:rPr>
+                        <a:t>12 PM PT</a:t>
+                      </a:r>
+                    </a:p>
+                    <a:p>
+                      <a:pPr algn="ctr"/>
+                      <a:r>
+                        <a:rPr lang="en-US" sz="2000" dirty="0">
+                          <a:latin typeface="Agency FB" panose="020B0503020202020204" pitchFamily="34" charset="0"/>
+                        </a:rPr>
+                        <a:t>3 PM ET</a:t>
+                      </a:r>
+                      <a:endParaRPr lang="en-US" sz="2000" dirty="0">
+                        <a:solidFill>
+                          <a:sysClr val="windowText" lastClr="000000"/>
+                        </a:solidFill>
+                        <a:latin typeface="Agency FB" panose="020B0503020202020204" pitchFamily="34" charset="0"/>
+                      </a:endParaRPr>
                     </a:p>
                   </a:txBody>
                   <a:tcPr marL="107715" marR="107715" marT="53858" marB="53858" anchor="ctr">
@@ -11061,15 +11394,31 @@
                     <a:bodyPr/>
                     <a:lstStyle/>
                     <a:p>
-                      <a:pPr algn="ctr"/>
-                      <a:r>
-                        <a:rPr lang="en-US" sz="3600" dirty="0">
+                      <a:pPr marL="0" marR="0" lvl="0" indent="0" algn="ctr" defTabSz="914400" rtl="0" eaLnBrk="1" fontAlgn="auto" latinLnBrk="0" hangingPunct="1">
+                        <a:lnSpc>
+                          <a:spcPct val="100000"/>
+                        </a:lnSpc>
+                        <a:spcBef>
+                          <a:spcPts val="0"/>
+                        </a:spcBef>
+                        <a:spcAft>
+                          <a:spcPts val="0"/>
+                        </a:spcAft>
+                        <a:buClrTx/>
+                        <a:buSzTx/>
+                        <a:buFontTx/>
+                        <a:buNone/>
+                        <a:tabLst/>
+                        <a:defRPr/>
+                      </a:pPr>
+                      <a:r>
+                        <a:rPr lang="en-US" sz="3400" dirty="0">
                           <a:solidFill>
                             <a:sysClr val="windowText" lastClr="000000"/>
                           </a:solidFill>
                           <a:latin typeface="Agency FB" panose="020B0503020202020204" pitchFamily="34" charset="0"/>
                         </a:rPr>
-                        <a:t>MakeCode Arcade (Advanced)</a:t>
+                        <a:t>MakeCode Live with John Park</a:t>
                       </a:r>
                     </a:p>
                   </a:txBody>
@@ -11107,11 +11456,11 @@
                 </a:tc>
                 <a:extLst>
                   <a:ext uri="{0D108BD9-81ED-4DB2-BD59-A6C34878D82A}">
-                    <a16:rowId xmlns:a16="http://schemas.microsoft.com/office/drawing/2014/main" val="2354609438"/>
+                    <a16:rowId xmlns:a16="http://schemas.microsoft.com/office/drawing/2014/main" val="1411529291"/>
                   </a:ext>
                 </a:extLst>
               </a:tr>
-              <a:tr h="0">
+              <a:tr h="767919">
                 <a:tc>
                   <a:txBody>
                     <a:bodyPr/>
@@ -11119,19 +11468,25 @@
                     <a:p>
                       <a:pPr algn="ctr"/>
                       <a:r>
-                        <a:rPr lang="en-US" sz="2400" b="1" dirty="0">
-                          <a:latin typeface="Agency FB" panose="020B0503020202020204" pitchFamily="34" charset="0"/>
-                        </a:rPr>
-                        <a:t>2 PM PT</a:t>
-                      </a:r>
-                    </a:p>
-                    <a:p>
-                      <a:pPr algn="ctr"/>
-                      <a:r>
-                        <a:rPr lang="en-US" sz="2400" dirty="0">
-                          <a:latin typeface="Agency FB" panose="020B0503020202020204" pitchFamily="34" charset="0"/>
-                        </a:rPr>
-                        <a:t>5PM ET</a:t>
+                        <a:rPr lang="en-US" sz="2000" b="1" dirty="0">
+                          <a:solidFill>
+                            <a:sysClr val="windowText" lastClr="000000"/>
+                          </a:solidFill>
+                          <a:latin typeface="Agency FB" panose="020B0503020202020204" pitchFamily="34" charset="0"/>
+                        </a:rPr>
+                        <a:t>1 PM PT</a:t>
+                      </a:r>
+                    </a:p>
+                    <a:p>
+                      <a:pPr algn="ctr"/>
+                      <a:r>
+                        <a:rPr lang="en-US" sz="2000" dirty="0">
+                          <a:solidFill>
+                            <a:sysClr val="windowText" lastClr="000000"/>
+                          </a:solidFill>
+                          <a:latin typeface="Agency FB" panose="020B0503020202020204" pitchFamily="34" charset="0"/>
+                        </a:rPr>
+                        <a:t>4 PM ET</a:t>
                       </a:r>
                     </a:p>
                   </a:txBody>
@@ -11174,10 +11529,13 @@
                     <a:p>
                       <a:pPr algn="ctr"/>
                       <a:r>
-                        <a:rPr lang="en-US" sz="3600" dirty="0">
-                          <a:latin typeface="Agency FB" panose="020B0503020202020204" pitchFamily="34" charset="0"/>
-                        </a:rPr>
-                        <a:t>MakeCode in the Kitchen (Friday only)</a:t>
+                        <a:rPr lang="en-US" sz="3400" dirty="0">
+                          <a:solidFill>
+                            <a:sysClr val="windowText" lastClr="000000"/>
+                          </a:solidFill>
+                          <a:latin typeface="Agency FB" panose="020B0503020202020204" pitchFamily="34" charset="0"/>
+                        </a:rPr>
+                        <a:t>MakeCode Arcade (Advanced)</a:t>
                       </a:r>
                     </a:p>
                   </a:txBody>
@@ -11210,6 +11568,114 @@
                     </a:lnBlToTr>
                     <a:solidFill>
                       <a:srgbClr val="ECE4EB"/>
+                    </a:solidFill>
+                  </a:tcPr>
+                </a:tc>
+                <a:extLst>
+                  <a:ext uri="{0D108BD9-81ED-4DB2-BD59-A6C34878D82A}">
+                    <a16:rowId xmlns:a16="http://schemas.microsoft.com/office/drawing/2014/main" val="2354609438"/>
+                  </a:ext>
+                </a:extLst>
+              </a:tr>
+              <a:tr h="767919">
+                <a:tc>
+                  <a:txBody>
+                    <a:bodyPr/>
+                    <a:lstStyle/>
+                    <a:p>
+                      <a:pPr algn="ctr"/>
+                      <a:r>
+                        <a:rPr lang="en-US" sz="2000" b="1" dirty="0">
+                          <a:latin typeface="Agency FB" panose="020B0503020202020204" pitchFamily="34" charset="0"/>
+                        </a:rPr>
+                        <a:t>2 PM PT</a:t>
+                      </a:r>
+                    </a:p>
+                    <a:p>
+                      <a:pPr algn="ctr"/>
+                      <a:r>
+                        <a:rPr lang="en-US" sz="2000" dirty="0">
+                          <a:latin typeface="Agency FB" panose="020B0503020202020204" pitchFamily="34" charset="0"/>
+                        </a:rPr>
+                        <a:t>5PM ET</a:t>
+                      </a:r>
+                    </a:p>
+                  </a:txBody>
+                  <a:tcPr marL="107715" marR="107715" marT="53858" marB="53858" anchor="ctr">
+                    <a:lnL w="6350" cap="flat" cmpd="sng" algn="ctr">
+                      <a:noFill/>
+                      <a:prstDash val="solid"/>
+                      <a:miter lim="800000"/>
+                    </a:lnL>
+                    <a:lnR>
+                      <a:noFill/>
+                    </a:lnR>
+                    <a:lnT w="6350" cap="flat" cmpd="sng" algn="ctr">
+                      <a:noFill/>
+                      <a:prstDash val="solid"/>
+                      <a:miter lim="800000"/>
+                    </a:lnT>
+                    <a:lnB w="6350" cap="flat" cmpd="sng" algn="ctr">
+                      <a:noFill/>
+                      <a:prstDash val="solid"/>
+                      <a:miter lim="800000"/>
+                    </a:lnB>
+                    <a:lnTlToBr w="12700" cmpd="sng">
+                      <a:noFill/>
+                      <a:prstDash val="solid"/>
+                    </a:lnTlToBr>
+                    <a:lnBlToTr w="12700" cmpd="sng">
+                      <a:noFill/>
+                      <a:prstDash val="solid"/>
+                    </a:lnBlToTr>
+                    <a:solidFill>
+                      <a:schemeClr val="bg1"/>
+                    </a:solidFill>
+                  </a:tcPr>
+                </a:tc>
+                <a:tc>
+                  <a:txBody>
+                    <a:bodyPr/>
+                    <a:lstStyle/>
+                    <a:p>
+                      <a:pPr algn="ctr"/>
+                      <a:r>
+                        <a:rPr lang="en-US" sz="3400" dirty="0">
+                          <a:latin typeface="Agency FB" panose="020B0503020202020204" pitchFamily="34" charset="0"/>
+                        </a:rPr>
+                        <a:t>MakeCode in the Kitchen (Friday only)</a:t>
+                      </a:r>
+                    </a:p>
+                  </a:txBody>
+                  <a:tcPr marL="107715" marR="107715" marT="53858" marB="53858" anchor="ctr">
+                    <a:lnL>
+                      <a:noFill/>
+                    </a:lnL>
+                    <a:lnR w="6350" cap="flat" cmpd="sng" algn="ctr">
+                      <a:noFill/>
+                      <a:prstDash val="solid"/>
+                      <a:miter lim="800000"/>
+                    </a:lnR>
+                    <a:lnT w="6350" cap="flat" cmpd="sng" algn="ctr">
+                      <a:noFill/>
+                      <a:prstDash val="solid"/>
+                      <a:miter lim="800000"/>
+                    </a:lnT>
+                    <a:lnB w="6350" cap="flat" cmpd="sng" algn="ctr">
+                      <a:noFill/>
+                      <a:prstDash val="solid"/>
+                      <a:miter lim="800000"/>
+                    </a:lnB>
+                    <a:lnTlToBr w="12700" cmpd="sng">
+                      <a:noFill/>
+                      <a:prstDash val="solid"/>
+                    </a:lnTlToBr>
+                    <a:lnBlToTr w="12700" cmpd="sng">
+                      <a:noFill/>
+                      <a:prstDash val="solid"/>
+                    </a:lnBlToTr>
+                    <a:solidFill>
+                      <a:schemeClr val="bg1"/>
                     </a:solidFill>
                   </a:tcPr>
                 </a:tc>
@@ -12073,21 +12539,6 @@
 </file>
 
 <file path=customXml/item1.xml><?xml version="1.0" encoding="utf-8"?>
-<p:properties xmlns:p="http://schemas.microsoft.com/office/2006/metadata/properties" xmlns:xsi="http://www.w3.org/2001/XMLSchema-instance" xmlns:pc="http://schemas.microsoft.com/office/infopath/2007/PartnerControls">
-  <documentManagement/>
-</p:properties>
-</file>
-
-<file path=customXml/item2.xml><?xml version="1.0" encoding="utf-8"?>
-<?mso-contentType ?>
-<FormTemplates xmlns="http://schemas.microsoft.com/sharepoint/v3/contenttype/forms">
-  <Display>DocumentLibraryForm</Display>
-  <Edit>DocumentLibraryForm</Edit>
-  <New>DocumentLibraryForm</New>
-</FormTemplates>
-</file>
-
-<file path=customXml/item3.xml><?xml version="1.0" encoding="utf-8"?>
 <ct:contentTypeSchema xmlns:ct="http://schemas.microsoft.com/office/2006/metadata/contentType" xmlns:ma="http://schemas.microsoft.com/office/2006/metadata/properties/metaAttributes" ct:_="" ma:_="" ma:contentTypeName="Document" ma:contentTypeID="0x010100860CD5D9B0436D4CAD5600AE7CA2E713" ma:contentTypeVersion="5" ma:contentTypeDescription="Create a new document." ma:contentTypeScope="" ma:versionID="82efc5ef0cc70a930dc0dd44bc7a59e5">
   <xsd:schema xmlns:xsd="http://www.w3.org/2001/XMLSchema" xmlns:xs="http://www.w3.org/2001/XMLSchema" xmlns:p="http://schemas.microsoft.com/office/2006/metadata/properties" xmlns:ns3="88ced256-c029-4233-a058-f3ec71fefdbe" xmlns:ns4="999ce889-1043-45e4-86ca-a56cfe2271af" targetNamespace="http://schemas.microsoft.com/office/2006/metadata/properties" ma:root="true" ma:fieldsID="df5615878e1656ee4e772df057bbfd02" ns3:_="" ns4:_="">
     <xsd:import namespace="88ced256-c029-4233-a058-f3ec71fefdbe"/>
@@ -12258,32 +12709,22 @@
 </ct:contentTypeSchema>
 </file>
 
-<file path=customXml/itemProps1.xml><?xml version="1.0" encoding="utf-8"?>
-<ds:datastoreItem xmlns:ds="http://schemas.openxmlformats.org/officeDocument/2006/customXml" ds:itemID="{60259DF6-DA4D-4E1C-9935-A04345E6A0FE}">
-  <ds:schemaRefs>
-    <ds:schemaRef ds:uri="http://schemas.microsoft.com/office/2006/metadata/properties"/>
-    <ds:schemaRef ds:uri="88ced256-c029-4233-a058-f3ec71fefdbe"/>
-    <ds:schemaRef ds:uri="http://schemas.microsoft.com/office/infopath/2007/PartnerControls"/>
-    <ds:schemaRef ds:uri="999ce889-1043-45e4-86ca-a56cfe2271af"/>
-    <ds:schemaRef ds:uri="http://purl.org/dc/dcmitype/"/>
-    <ds:schemaRef ds:uri="http://purl.org/dc/terms/"/>
-    <ds:schemaRef ds:uri="http://schemas.microsoft.com/office/2006/documentManagement/types"/>
-    <ds:schemaRef ds:uri="http://purl.org/dc/elements/1.1/"/>
-    <ds:schemaRef ds:uri="http://schemas.openxmlformats.org/package/2006/metadata/core-properties"/>
-    <ds:schemaRef ds:uri="http://www.w3.org/XML/1998/namespace"/>
-  </ds:schemaRefs>
-</ds:datastoreItem>
+<file path=customXml/item2.xml><?xml version="1.0" encoding="utf-8"?>
+<?mso-contentType ?>
+<FormTemplates xmlns="http://schemas.microsoft.com/sharepoint/v3/contenttype/forms">
+  <Display>DocumentLibraryForm</Display>
+  <Edit>DocumentLibraryForm</Edit>
+  <New>DocumentLibraryForm</New>
+</FormTemplates>
 </file>
 
-<file path=customXml/itemProps2.xml><?xml version="1.0" encoding="utf-8"?>
-<ds:datastoreItem xmlns:ds="http://schemas.openxmlformats.org/officeDocument/2006/customXml" ds:itemID="{4080D5DD-FD7F-4E53-9DDB-1149624B0AF8}">
-  <ds:schemaRefs>
-    <ds:schemaRef ds:uri="http://schemas.microsoft.com/sharepoint/v3/contenttype/forms"/>
-  </ds:schemaRefs>
-</ds:datastoreItem>
+<file path=customXml/item3.xml><?xml version="1.0" encoding="utf-8"?>
+<p:properties xmlns:p="http://schemas.microsoft.com/office/2006/metadata/properties" xmlns:xsi="http://www.w3.org/2001/XMLSchema-instance" xmlns:pc="http://schemas.microsoft.com/office/infopath/2007/PartnerControls">
+  <documentManagement/>
+</p:properties>
 </file>
 
-<file path=customXml/itemProps3.xml><?xml version="1.0" encoding="utf-8"?>
+<file path=customXml/itemProps1.xml><?xml version="1.0" encoding="utf-8"?>
 <ds:datastoreItem xmlns:ds="http://schemas.openxmlformats.org/officeDocument/2006/customXml" ds:itemID="{48DDB3CD-7A26-4427-A010-5E4AD2CBA3CF}">
   <ds:schemaRefs>
     <ds:schemaRef ds:uri="http://schemas.microsoft.com/office/2006/metadata/contentType"/>
@@ -12300,4 +12741,29 @@
     <ds:schemaRef ds:uri="http://schemas.microsoft.com/internal/obd"/>
   </ds:schemaRefs>
 </ds:datastoreItem>
+</file>
+
+<file path=customXml/itemProps2.xml><?xml version="1.0" encoding="utf-8"?>
+<ds:datastoreItem xmlns:ds="http://schemas.openxmlformats.org/officeDocument/2006/customXml" ds:itemID="{4080D5DD-FD7F-4E53-9DDB-1149624B0AF8}">
+  <ds:schemaRefs>
+    <ds:schemaRef ds:uri="http://schemas.microsoft.com/sharepoint/v3/contenttype/forms"/>
+  </ds:schemaRefs>
+</ds:datastoreItem>
+</file>
+
+<file path=customXml/itemProps3.xml><?xml version="1.0" encoding="utf-8"?>
+<ds:datastoreItem xmlns:ds="http://schemas.openxmlformats.org/officeDocument/2006/customXml" ds:itemID="{60259DF6-DA4D-4E1C-9935-A04345E6A0FE}">
+  <ds:schemaRefs>
+    <ds:schemaRef ds:uri="http://schemas.microsoft.com/office/2006/metadata/properties"/>
+    <ds:schemaRef ds:uri="88ced256-c029-4233-a058-f3ec71fefdbe"/>
+    <ds:schemaRef ds:uri="http://schemas.microsoft.com/office/infopath/2007/PartnerControls"/>
+    <ds:schemaRef ds:uri="999ce889-1043-45e4-86ca-a56cfe2271af"/>
+    <ds:schemaRef ds:uri="http://purl.org/dc/dcmitype/"/>
+    <ds:schemaRef ds:uri="http://purl.org/dc/terms/"/>
+    <ds:schemaRef ds:uri="http://schemas.microsoft.com/office/2006/documentManagement/types"/>
+    <ds:schemaRef ds:uri="http://purl.org/dc/elements/1.1/"/>
+    <ds:schemaRef ds:uri="http://schemas.openxmlformats.org/package/2006/metadata/core-properties"/>
+    <ds:schemaRef ds:uri="http://www.w3.org/XML/1998/namespace"/>
+  </ds:schemaRefs>
+</ds:datastoreItem>
 </file>
</xml_diff>

<commit_message>
Remove Arcade Advanced stream from this week's schedule
</commit_message>
<xml_diff>
--- a/docs/static/online-learning/Mixer Stream Schedule.pptx
+++ b/docs/static/online-learning/Mixer Stream Schedule.pptx
@@ -5,7 +5,7 @@
     <p:sldMasterId id="2147483648" r:id="rId4"/>
   </p:sldMasterIdLst>
   <p:notesMasterIdLst>
-    <p:notesMasterId r:id="rId12"/>
+    <p:notesMasterId r:id="rId13"/>
   </p:notesMasterIdLst>
   <p:sldIdLst>
     <p:sldId id="256" r:id="rId5"/>
@@ -14,7 +14,8 @@
     <p:sldId id="259" r:id="rId8"/>
     <p:sldId id="262" r:id="rId9"/>
     <p:sldId id="260" r:id="rId10"/>
-    <p:sldId id="261" r:id="rId11"/>
+    <p:sldId id="263" r:id="rId11"/>
+    <p:sldId id="261" r:id="rId12"/>
   </p:sldIdLst>
   <p:sldSz cx="12192000" cy="6858000"/>
   <p:notesSz cx="6858000" cy="9144000"/>
@@ -211,7 +212,7 @@
           <a:p>
             <a:fld id="{9820A582-7AE2-4948-B06A-742F9F045A83}" type="datetimeFigureOut">
               <a:rPr lang="en-US" smtClean="0"/>
-              <a:t>4/20/2020</a:t>
+              <a:t>4/27/2020</a:t>
             </a:fld>
             <a:endParaRPr lang="en-US"/>
           </a:p>
@@ -1056,6 +1057,90 @@
     </p:spTree>
     <p:extLst>
       <p:ext uri="{BB962C8B-B14F-4D97-AF65-F5344CB8AC3E}">
+        <p14:creationId xmlns:p14="http://schemas.microsoft.com/office/powerpoint/2010/main" val="3841027729"/>
+      </p:ext>
+    </p:extLst>
+  </p:cSld>
+  <p:clrMapOvr>
+    <a:masterClrMapping/>
+  </p:clrMapOvr>
+</p:notes>
+</file>
+
+<file path=ppt/notesSlides/notesSlide8.xml><?xml version="1.0" encoding="utf-8"?>
+<p:notes xmlns:a="http://schemas.openxmlformats.org/drawingml/2006/main" xmlns:r="http://schemas.openxmlformats.org/officeDocument/2006/relationships" xmlns:p="http://schemas.openxmlformats.org/presentationml/2006/main">
+  <p:cSld>
+    <p:spTree>
+      <p:nvGrpSpPr>
+        <p:cNvPr id="1" name=""/>
+        <p:cNvGrpSpPr/>
+        <p:nvPr/>
+      </p:nvGrpSpPr>
+      <p:grpSpPr>
+        <a:xfrm>
+          <a:off x="0" y="0"/>
+          <a:ext cx="0" cy="0"/>
+          <a:chOff x="0" y="0"/>
+          <a:chExt cx="0" cy="0"/>
+        </a:xfrm>
+      </p:grpSpPr>
+      <p:sp>
+        <p:nvSpPr>
+          <p:cNvPr id="2" name="Slide Image Placeholder 1"/>
+          <p:cNvSpPr>
+            <a:spLocks noGrp="1" noRot="1" noChangeAspect="1"/>
+          </p:cNvSpPr>
+          <p:nvPr>
+            <p:ph type="sldImg"/>
+          </p:nvPr>
+        </p:nvSpPr>
+        <p:spPr/>
+      </p:sp>
+      <p:sp>
+        <p:nvSpPr>
+          <p:cNvPr id="3" name="Notes Placeholder 2"/>
+          <p:cNvSpPr>
+            <a:spLocks noGrp="1"/>
+          </p:cNvSpPr>
+          <p:nvPr>
+            <p:ph type="body" idx="1"/>
+          </p:nvPr>
+        </p:nvSpPr>
+        <p:spPr/>
+        <p:txBody>
+          <a:bodyPr/>
+          <a:lstStyle/>
+          <a:p>
+            <a:endParaRPr lang="en-US" dirty="0"/>
+          </a:p>
+        </p:txBody>
+      </p:sp>
+      <p:sp>
+        <p:nvSpPr>
+          <p:cNvPr id="4" name="Slide Number Placeholder 3"/>
+          <p:cNvSpPr>
+            <a:spLocks noGrp="1"/>
+          </p:cNvSpPr>
+          <p:nvPr>
+            <p:ph type="sldNum" sz="quarter" idx="5"/>
+          </p:nvPr>
+        </p:nvSpPr>
+        <p:spPr/>
+        <p:txBody>
+          <a:bodyPr/>
+          <a:lstStyle/>
+          <a:p>
+            <a:fld id="{187F1E49-A4A6-43FF-827C-952A37F20303}" type="slidenum">
+              <a:rPr lang="en-US" smtClean="0"/>
+              <a:t>8</a:t>
+            </a:fld>
+            <a:endParaRPr lang="en-US"/>
+          </a:p>
+        </p:txBody>
+      </p:sp>
+    </p:spTree>
+    <p:extLst>
+      <p:ext uri="{BB962C8B-B14F-4D97-AF65-F5344CB8AC3E}">
         <p14:creationId xmlns:p14="http://schemas.microsoft.com/office/powerpoint/2010/main" val="1435183535"/>
       </p:ext>
     </p:extLst>
@@ -1213,7 +1298,7 @@
           <a:p>
             <a:fld id="{EE18C4CC-5113-4103-95F7-16AD5B06551D}" type="datetimeFigureOut">
               <a:rPr lang="en-US" smtClean="0"/>
-              <a:t>4/20/2020</a:t>
+              <a:t>4/27/2020</a:t>
             </a:fld>
             <a:endParaRPr lang="en-US"/>
           </a:p>
@@ -1411,7 +1496,7 @@
           <a:p>
             <a:fld id="{EE18C4CC-5113-4103-95F7-16AD5B06551D}" type="datetimeFigureOut">
               <a:rPr lang="en-US" smtClean="0"/>
-              <a:t>4/20/2020</a:t>
+              <a:t>4/27/2020</a:t>
             </a:fld>
             <a:endParaRPr lang="en-US"/>
           </a:p>
@@ -1619,7 +1704,7 @@
           <a:p>
             <a:fld id="{EE18C4CC-5113-4103-95F7-16AD5B06551D}" type="datetimeFigureOut">
               <a:rPr lang="en-US" smtClean="0"/>
-              <a:t>4/20/2020</a:t>
+              <a:t>4/27/2020</a:t>
             </a:fld>
             <a:endParaRPr lang="en-US"/>
           </a:p>
@@ -1817,7 +1902,7 @@
           <a:p>
             <a:fld id="{EE18C4CC-5113-4103-95F7-16AD5B06551D}" type="datetimeFigureOut">
               <a:rPr lang="en-US" smtClean="0"/>
-              <a:t>4/20/2020</a:t>
+              <a:t>4/27/2020</a:t>
             </a:fld>
             <a:endParaRPr lang="en-US"/>
           </a:p>
@@ -2092,7 +2177,7 @@
           <a:p>
             <a:fld id="{EE18C4CC-5113-4103-95F7-16AD5B06551D}" type="datetimeFigureOut">
               <a:rPr lang="en-US" smtClean="0"/>
-              <a:t>4/20/2020</a:t>
+              <a:t>4/27/2020</a:t>
             </a:fld>
             <a:endParaRPr lang="en-US"/>
           </a:p>
@@ -2357,7 +2442,7 @@
           <a:p>
             <a:fld id="{EE18C4CC-5113-4103-95F7-16AD5B06551D}" type="datetimeFigureOut">
               <a:rPr lang="en-US" smtClean="0"/>
-              <a:t>4/20/2020</a:t>
+              <a:t>4/27/2020</a:t>
             </a:fld>
             <a:endParaRPr lang="en-US"/>
           </a:p>
@@ -2769,7 +2854,7 @@
           <a:p>
             <a:fld id="{EE18C4CC-5113-4103-95F7-16AD5B06551D}" type="datetimeFigureOut">
               <a:rPr lang="en-US" smtClean="0"/>
-              <a:t>4/20/2020</a:t>
+              <a:t>4/27/2020</a:t>
             </a:fld>
             <a:endParaRPr lang="en-US"/>
           </a:p>
@@ -2910,7 +2995,7 @@
           <a:p>
             <a:fld id="{EE18C4CC-5113-4103-95F7-16AD5B06551D}" type="datetimeFigureOut">
               <a:rPr lang="en-US" smtClean="0"/>
-              <a:t>4/20/2020</a:t>
+              <a:t>4/27/2020</a:t>
             </a:fld>
             <a:endParaRPr lang="en-US"/>
           </a:p>
@@ -3023,7 +3108,7 @@
           <a:p>
             <a:fld id="{EE18C4CC-5113-4103-95F7-16AD5B06551D}" type="datetimeFigureOut">
               <a:rPr lang="en-US" smtClean="0"/>
-              <a:t>4/20/2020</a:t>
+              <a:t>4/27/2020</a:t>
             </a:fld>
             <a:endParaRPr lang="en-US"/>
           </a:p>
@@ -3334,7 +3419,7 @@
           <a:p>
             <a:fld id="{EE18C4CC-5113-4103-95F7-16AD5B06551D}" type="datetimeFigureOut">
               <a:rPr lang="en-US" smtClean="0"/>
-              <a:t>4/20/2020</a:t>
+              <a:t>4/27/2020</a:t>
             </a:fld>
             <a:endParaRPr lang="en-US"/>
           </a:p>
@@ -3622,7 +3707,7 @@
           <a:p>
             <a:fld id="{EE18C4CC-5113-4103-95F7-16AD5B06551D}" type="datetimeFigureOut">
               <a:rPr lang="en-US" smtClean="0"/>
-              <a:t>4/20/2020</a:t>
+              <a:t>4/27/2020</a:t>
             </a:fld>
             <a:endParaRPr lang="en-US"/>
           </a:p>
@@ -3863,7 +3948,7 @@
           <a:p>
             <a:fld id="{EE18C4CC-5113-4103-95F7-16AD5B06551D}" type="datetimeFigureOut">
               <a:rPr lang="en-US" smtClean="0"/>
-              <a:t>4/20/2020</a:t>
+              <a:t>4/27/2020</a:t>
             </a:fld>
             <a:endParaRPr lang="en-US"/>
           </a:p>
@@ -10697,6 +10782,1119 @@
 </file>
 
 <file path=ppt/slides/slide7.xml><?xml version="1.0" encoding="utf-8"?>
+<p:sld xmlns:a="http://schemas.openxmlformats.org/drawingml/2006/main" xmlns:r="http://schemas.openxmlformats.org/officeDocument/2006/relationships" xmlns:p="http://schemas.openxmlformats.org/presentationml/2006/main">
+  <p:cSld>
+    <p:bg>
+      <p:bgPr>
+        <a:pattFill prst="pct5">
+          <a:fgClr>
+            <a:srgbClr val="5D406C"/>
+          </a:fgClr>
+          <a:bgClr>
+            <a:schemeClr val="bg1"/>
+          </a:bgClr>
+        </a:pattFill>
+        <a:effectLst/>
+      </p:bgPr>
+    </p:bg>
+    <p:spTree>
+      <p:nvGrpSpPr>
+        <p:cNvPr id="1" name=""/>
+        <p:cNvGrpSpPr/>
+        <p:nvPr/>
+      </p:nvGrpSpPr>
+      <p:grpSpPr>
+        <a:xfrm>
+          <a:off x="0" y="0"/>
+          <a:ext cx="0" cy="0"/>
+          <a:chOff x="0" y="0"/>
+          <a:chExt cx="0" cy="0"/>
+        </a:xfrm>
+      </p:grpSpPr>
+      <p:graphicFrame>
+        <p:nvGraphicFramePr>
+          <p:cNvPr id="4" name="Table 4">
+            <a:extLst>
+              <a:ext uri="{FF2B5EF4-FFF2-40B4-BE49-F238E27FC236}">
+                <a16:creationId xmlns:a16="http://schemas.microsoft.com/office/drawing/2014/main" id="{1E17FCE3-C1AC-415D-AD4D-9D9BBBF374CC}"/>
+              </a:ext>
+            </a:extLst>
+          </p:cNvPr>
+          <p:cNvGraphicFramePr>
+            <a:graphicFrameLocks noGrp="1"/>
+          </p:cNvGraphicFramePr>
+          <p:nvPr>
+            <p:extLst>
+              <p:ext uri="{D42A27DB-BD31-4B8C-83A1-F6EECF244321}">
+                <p14:modId xmlns:p14="http://schemas.microsoft.com/office/powerpoint/2010/main" val="1213512088"/>
+              </p:ext>
+            </p:extLst>
+          </p:nvPr>
+        </p:nvGraphicFramePr>
+        <p:xfrm>
+          <a:off x="304801" y="276061"/>
+          <a:ext cx="8543053" cy="6261218"/>
+        </p:xfrm>
+        <a:graphic>
+          <a:graphicData uri="http://schemas.openxmlformats.org/drawingml/2006/table">
+            <a:tbl>
+              <a:tblPr firstRow="1" bandRow="1">
+                <a:tableStyleId>{69012ECD-51FC-41F1-AA8D-1B2483CD663E}</a:tableStyleId>
+              </a:tblPr>
+              <a:tblGrid>
+                <a:gridCol w="1954097">
+                  <a:extLst>
+                    <a:ext uri="{9D8B030D-6E8A-4147-A177-3AD203B41FA5}">
+                      <a16:colId xmlns:a16="http://schemas.microsoft.com/office/drawing/2014/main" val="1510224491"/>
+                    </a:ext>
+                  </a:extLst>
+                </a:gridCol>
+                <a:gridCol w="6588956">
+                  <a:extLst>
+                    <a:ext uri="{9D8B030D-6E8A-4147-A177-3AD203B41FA5}">
+                      <a16:colId xmlns:a16="http://schemas.microsoft.com/office/drawing/2014/main" val="21893690"/>
+                    </a:ext>
+                  </a:extLst>
+                </a:gridCol>
+              </a:tblGrid>
+              <a:tr h="699943">
+                <a:tc>
+                  <a:txBody>
+                    <a:bodyPr/>
+                    <a:lstStyle/>
+                    <a:p>
+                      <a:pPr algn="ctr"/>
+                      <a:r>
+                        <a:rPr lang="en-US" sz="3200" dirty="0">
+                          <a:latin typeface="Agency FB" panose="020B0503020202020204" pitchFamily="34" charset="0"/>
+                        </a:rPr>
+                        <a:t>TIME</a:t>
+                      </a:r>
+                    </a:p>
+                  </a:txBody>
+                  <a:tcPr marL="107715" marR="107715" marT="53858" marB="53858" anchor="ctr">
+                    <a:lnL w="6350" cap="flat" cmpd="sng" algn="ctr">
+                      <a:noFill/>
+                      <a:prstDash val="solid"/>
+                      <a:miter lim="800000"/>
+                    </a:lnL>
+                    <a:lnR>
+                      <a:noFill/>
+                    </a:lnR>
+                    <a:lnT w="6350" cap="flat" cmpd="sng" algn="ctr">
+                      <a:noFill/>
+                      <a:prstDash val="solid"/>
+                      <a:miter lim="800000"/>
+                    </a:lnT>
+                    <a:lnB w="6350" cap="flat" cmpd="sng" algn="ctr">
+                      <a:noFill/>
+                      <a:prstDash val="solid"/>
+                      <a:miter lim="800000"/>
+                    </a:lnB>
+                    <a:lnTlToBr w="12700" cmpd="sng">
+                      <a:noFill/>
+                      <a:prstDash val="solid"/>
+                    </a:lnTlToBr>
+                    <a:lnBlToTr w="12700" cmpd="sng">
+                      <a:noFill/>
+                      <a:prstDash val="solid"/>
+                    </a:lnBlToTr>
+                    <a:solidFill>
+                      <a:srgbClr val="5D406C"/>
+                    </a:solidFill>
+                  </a:tcPr>
+                </a:tc>
+                <a:tc>
+                  <a:txBody>
+                    <a:bodyPr/>
+                    <a:lstStyle/>
+                    <a:p>
+                      <a:pPr algn="ctr"/>
+                      <a:r>
+                        <a:rPr lang="en-US" sz="3200" dirty="0">
+                          <a:latin typeface="Agency FB" panose="020B0503020202020204" pitchFamily="34" charset="0"/>
+                        </a:rPr>
+                        <a:t>STREAM</a:t>
+                      </a:r>
+                    </a:p>
+                  </a:txBody>
+                  <a:tcPr marL="107715" marR="107715" marT="53858" marB="53858" anchor="ctr">
+                    <a:lnL>
+                      <a:noFill/>
+                    </a:lnL>
+                    <a:lnR w="6350" cap="flat" cmpd="sng" algn="ctr">
+                      <a:noFill/>
+                      <a:prstDash val="solid"/>
+                      <a:miter lim="800000"/>
+                    </a:lnR>
+                    <a:lnT w="6350" cap="flat" cmpd="sng" algn="ctr">
+                      <a:noFill/>
+                      <a:prstDash val="solid"/>
+                      <a:miter lim="800000"/>
+                    </a:lnT>
+                    <a:lnB w="6350" cap="flat" cmpd="sng" algn="ctr">
+                      <a:noFill/>
+                      <a:prstDash val="solid"/>
+                      <a:miter lim="800000"/>
+                    </a:lnB>
+                    <a:lnTlToBr w="12700" cmpd="sng">
+                      <a:noFill/>
+                      <a:prstDash val="solid"/>
+                    </a:lnTlToBr>
+                    <a:lnBlToTr w="12700" cmpd="sng">
+                      <a:noFill/>
+                      <a:prstDash val="solid"/>
+                    </a:lnBlToTr>
+                    <a:solidFill>
+                      <a:srgbClr val="5D406C"/>
+                    </a:solidFill>
+                  </a:tcPr>
+                </a:tc>
+                <a:extLst>
+                  <a:ext uri="{0D108BD9-81ED-4DB2-BD59-A6C34878D82A}">
+                    <a16:rowId xmlns:a16="http://schemas.microsoft.com/office/drawing/2014/main" val="888274358"/>
+                  </a:ext>
+                </a:extLst>
+              </a:tr>
+              <a:tr h="843271">
+                <a:tc>
+                  <a:txBody>
+                    <a:bodyPr/>
+                    <a:lstStyle/>
+                    <a:p>
+                      <a:pPr algn="ctr"/>
+                      <a:r>
+                        <a:rPr lang="en-US" sz="2000" b="1" dirty="0">
+                          <a:latin typeface="Agency FB" panose="020B0503020202020204" pitchFamily="34" charset="0"/>
+                        </a:rPr>
+                        <a:t>9 AM PT</a:t>
+                      </a:r>
+                    </a:p>
+                    <a:p>
+                      <a:pPr algn="ctr"/>
+                      <a:r>
+                        <a:rPr lang="en-US" sz="2000" dirty="0">
+                          <a:latin typeface="Agency FB" panose="020B0503020202020204" pitchFamily="34" charset="0"/>
+                        </a:rPr>
+                        <a:t>12 PM ET</a:t>
+                      </a:r>
+                    </a:p>
+                  </a:txBody>
+                  <a:tcPr marL="107715" marR="107715" marT="53858" marB="53858" anchor="ctr">
+                    <a:lnL w="6350" cap="flat" cmpd="sng" algn="ctr">
+                      <a:noFill/>
+                      <a:prstDash val="solid"/>
+                      <a:miter lim="800000"/>
+                    </a:lnL>
+                    <a:lnR>
+                      <a:noFill/>
+                    </a:lnR>
+                    <a:lnT w="6350" cap="flat" cmpd="sng" algn="ctr">
+                      <a:noFill/>
+                      <a:prstDash val="solid"/>
+                      <a:miter lim="800000"/>
+                    </a:lnT>
+                    <a:lnB w="6350" cap="flat" cmpd="sng" algn="ctr">
+                      <a:noFill/>
+                      <a:prstDash val="solid"/>
+                      <a:miter lim="800000"/>
+                    </a:lnB>
+                    <a:lnTlToBr w="12700" cmpd="sng">
+                      <a:noFill/>
+                      <a:prstDash val="solid"/>
+                    </a:lnTlToBr>
+                    <a:lnBlToTr w="12700" cmpd="sng">
+                      <a:noFill/>
+                      <a:prstDash val="solid"/>
+                    </a:lnBlToTr>
+                    <a:solidFill>
+                      <a:schemeClr val="bg1"/>
+                    </a:solidFill>
+                  </a:tcPr>
+                </a:tc>
+                <a:tc>
+                  <a:txBody>
+                    <a:bodyPr/>
+                    <a:lstStyle/>
+                    <a:p>
+                      <a:pPr algn="ctr"/>
+                      <a:r>
+                        <a:rPr lang="en-US" sz="3400" dirty="0">
+                          <a:latin typeface="Agency FB" panose="020B0503020202020204" pitchFamily="34" charset="0"/>
+                        </a:rPr>
+                        <a:t>MakeCode for the micro:bit</a:t>
+                      </a:r>
+                    </a:p>
+                  </a:txBody>
+                  <a:tcPr marL="107715" marR="107715" marT="53858" marB="53858" anchor="ctr">
+                    <a:lnL>
+                      <a:noFill/>
+                    </a:lnL>
+                    <a:lnR w="6350" cap="flat" cmpd="sng" algn="ctr">
+                      <a:noFill/>
+                      <a:prstDash val="solid"/>
+                      <a:miter lim="800000"/>
+                    </a:lnR>
+                    <a:lnT w="6350" cap="flat" cmpd="sng" algn="ctr">
+                      <a:noFill/>
+                      <a:prstDash val="solid"/>
+                      <a:miter lim="800000"/>
+                    </a:lnT>
+                    <a:lnB w="6350" cap="flat" cmpd="sng" algn="ctr">
+                      <a:noFill/>
+                      <a:prstDash val="solid"/>
+                      <a:miter lim="800000"/>
+                    </a:lnB>
+                    <a:lnTlToBr w="12700" cmpd="sng">
+                      <a:noFill/>
+                      <a:prstDash val="solid"/>
+                    </a:lnTlToBr>
+                    <a:lnBlToTr w="12700" cmpd="sng">
+                      <a:noFill/>
+                      <a:prstDash val="solid"/>
+                    </a:lnBlToTr>
+                    <a:solidFill>
+                      <a:schemeClr val="bg1"/>
+                    </a:solidFill>
+                  </a:tcPr>
+                </a:tc>
+                <a:extLst>
+                  <a:ext uri="{0D108BD9-81ED-4DB2-BD59-A6C34878D82A}">
+                    <a16:rowId xmlns:a16="http://schemas.microsoft.com/office/drawing/2014/main" val="55475757"/>
+                  </a:ext>
+                </a:extLst>
+              </a:tr>
+              <a:tr h="843271">
+                <a:tc>
+                  <a:txBody>
+                    <a:bodyPr/>
+                    <a:lstStyle/>
+                    <a:p>
+                      <a:pPr algn="ctr"/>
+                      <a:r>
+                        <a:rPr lang="en-US" sz="2000" b="1" dirty="0">
+                          <a:latin typeface="Agency FB" panose="020B0503020202020204" pitchFamily="34" charset="0"/>
+                        </a:rPr>
+                        <a:t>10 AM PT</a:t>
+                      </a:r>
+                    </a:p>
+                    <a:p>
+                      <a:pPr algn="ctr"/>
+                      <a:r>
+                        <a:rPr lang="en-US" sz="2000" dirty="0">
+                          <a:latin typeface="Agency FB" panose="020B0503020202020204" pitchFamily="34" charset="0"/>
+                        </a:rPr>
+                        <a:t>1 PM ET</a:t>
+                      </a:r>
+                    </a:p>
+                  </a:txBody>
+                  <a:tcPr marL="107715" marR="107715" marT="53858" marB="53858" anchor="ctr">
+                    <a:lnL w="6350" cap="flat" cmpd="sng" algn="ctr">
+                      <a:noFill/>
+                      <a:prstDash val="solid"/>
+                      <a:miter lim="800000"/>
+                    </a:lnL>
+                    <a:lnR>
+                      <a:noFill/>
+                    </a:lnR>
+                    <a:lnT w="6350" cap="flat" cmpd="sng" algn="ctr">
+                      <a:noFill/>
+                      <a:prstDash val="solid"/>
+                      <a:miter lim="800000"/>
+                    </a:lnT>
+                    <a:lnB w="6350" cap="flat" cmpd="sng" algn="ctr">
+                      <a:noFill/>
+                      <a:prstDash val="solid"/>
+                      <a:miter lim="800000"/>
+                    </a:lnB>
+                    <a:lnTlToBr w="12700" cmpd="sng">
+                      <a:noFill/>
+                      <a:prstDash val="solid"/>
+                    </a:lnTlToBr>
+                    <a:lnBlToTr w="12700" cmpd="sng">
+                      <a:noFill/>
+                      <a:prstDash val="solid"/>
+                    </a:lnBlToTr>
+                    <a:solidFill>
+                      <a:srgbClr val="ECE4EB"/>
+                    </a:solidFill>
+                  </a:tcPr>
+                </a:tc>
+                <a:tc>
+                  <a:txBody>
+                    <a:bodyPr/>
+                    <a:lstStyle/>
+                    <a:p>
+                      <a:pPr algn="ctr"/>
+                      <a:r>
+                        <a:rPr lang="en-US" sz="3400" dirty="0">
+                          <a:latin typeface="Agency FB" panose="020B0503020202020204" pitchFamily="34" charset="0"/>
+                        </a:rPr>
+                        <a:t>MakeCode with Minecraft: Education Edition</a:t>
+                      </a:r>
+                    </a:p>
+                  </a:txBody>
+                  <a:tcPr marL="107715" marR="107715" marT="53858" marB="53858" anchor="ctr">
+                    <a:lnL>
+                      <a:noFill/>
+                    </a:lnL>
+                    <a:lnR w="6350" cap="flat" cmpd="sng" algn="ctr">
+                      <a:noFill/>
+                      <a:prstDash val="solid"/>
+                      <a:miter lim="800000"/>
+                    </a:lnR>
+                    <a:lnT w="6350" cap="flat" cmpd="sng" algn="ctr">
+                      <a:noFill/>
+                      <a:prstDash val="solid"/>
+                      <a:miter lim="800000"/>
+                    </a:lnT>
+                    <a:lnB w="6350" cap="flat" cmpd="sng" algn="ctr">
+                      <a:noFill/>
+                      <a:prstDash val="solid"/>
+                      <a:miter lim="800000"/>
+                    </a:lnB>
+                    <a:lnTlToBr w="12700" cmpd="sng">
+                      <a:noFill/>
+                      <a:prstDash val="solid"/>
+                    </a:lnTlToBr>
+                    <a:lnBlToTr w="12700" cmpd="sng">
+                      <a:noFill/>
+                      <a:prstDash val="solid"/>
+                    </a:lnBlToTr>
+                    <a:solidFill>
+                      <a:srgbClr val="ECE4EB"/>
+                    </a:solidFill>
+                  </a:tcPr>
+                </a:tc>
+                <a:extLst>
+                  <a:ext uri="{0D108BD9-81ED-4DB2-BD59-A6C34878D82A}">
+                    <a16:rowId xmlns:a16="http://schemas.microsoft.com/office/drawing/2014/main" val="1272730967"/>
+                  </a:ext>
+                </a:extLst>
+              </a:tr>
+              <a:tr h="843271">
+                <a:tc>
+                  <a:txBody>
+                    <a:bodyPr/>
+                    <a:lstStyle/>
+                    <a:p>
+                      <a:pPr algn="ctr"/>
+                      <a:r>
+                        <a:rPr lang="en-US" sz="2000" b="1" dirty="0">
+                          <a:latin typeface="Agency FB" panose="020B0503020202020204" pitchFamily="34" charset="0"/>
+                        </a:rPr>
+                        <a:t>11 AM PT</a:t>
+                      </a:r>
+                    </a:p>
+                    <a:p>
+                      <a:pPr algn="ctr"/>
+                      <a:r>
+                        <a:rPr lang="en-US" sz="2000" dirty="0">
+                          <a:latin typeface="Agency FB" panose="020B0503020202020204" pitchFamily="34" charset="0"/>
+                        </a:rPr>
+                        <a:t>2 PM ET</a:t>
+                      </a:r>
+                    </a:p>
+                  </a:txBody>
+                  <a:tcPr marL="107715" marR="107715" marT="53858" marB="53858" anchor="ctr">
+                    <a:lnL w="6350" cap="flat" cmpd="sng" algn="ctr">
+                      <a:noFill/>
+                      <a:prstDash val="solid"/>
+                      <a:miter lim="800000"/>
+                    </a:lnL>
+                    <a:lnR>
+                      <a:noFill/>
+                    </a:lnR>
+                    <a:lnT w="6350" cap="flat" cmpd="sng" algn="ctr">
+                      <a:noFill/>
+                      <a:prstDash val="solid"/>
+                      <a:miter lim="800000"/>
+                    </a:lnT>
+                    <a:lnB w="6350" cap="flat" cmpd="sng" algn="ctr">
+                      <a:noFill/>
+                      <a:prstDash val="solid"/>
+                      <a:miter lim="800000"/>
+                    </a:lnB>
+                    <a:lnTlToBr w="12700" cmpd="sng">
+                      <a:noFill/>
+                      <a:prstDash val="solid"/>
+                    </a:lnTlToBr>
+                    <a:lnBlToTr w="12700" cmpd="sng">
+                      <a:noFill/>
+                      <a:prstDash val="solid"/>
+                    </a:lnBlToTr>
+                    <a:solidFill>
+                      <a:schemeClr val="bg1"/>
+                    </a:solidFill>
+                  </a:tcPr>
+                </a:tc>
+                <a:tc>
+                  <a:txBody>
+                    <a:bodyPr/>
+                    <a:lstStyle/>
+                    <a:p>
+                      <a:pPr algn="ctr"/>
+                      <a:r>
+                        <a:rPr lang="en-US" sz="3400" dirty="0">
+                          <a:latin typeface="Agency FB" panose="020B0503020202020204" pitchFamily="34" charset="0"/>
+                        </a:rPr>
+                        <a:t>MakeCode Arcade (Beginner)</a:t>
+                      </a:r>
+                    </a:p>
+                  </a:txBody>
+                  <a:tcPr marL="107715" marR="107715" marT="53858" marB="53858" anchor="ctr">
+                    <a:lnL>
+                      <a:noFill/>
+                    </a:lnL>
+                    <a:lnR w="6350" cap="flat" cmpd="sng" algn="ctr">
+                      <a:noFill/>
+                      <a:prstDash val="solid"/>
+                      <a:miter lim="800000"/>
+                    </a:lnR>
+                    <a:lnT w="6350" cap="flat" cmpd="sng" algn="ctr">
+                      <a:noFill/>
+                      <a:prstDash val="solid"/>
+                      <a:miter lim="800000"/>
+                    </a:lnT>
+                    <a:lnB w="6350" cap="flat" cmpd="sng" algn="ctr">
+                      <a:noFill/>
+                      <a:prstDash val="solid"/>
+                      <a:miter lim="800000"/>
+                    </a:lnB>
+                    <a:lnTlToBr w="12700" cmpd="sng">
+                      <a:noFill/>
+                      <a:prstDash val="solid"/>
+                    </a:lnTlToBr>
+                    <a:lnBlToTr w="12700" cmpd="sng">
+                      <a:noFill/>
+                      <a:prstDash val="solid"/>
+                    </a:lnBlToTr>
+                    <a:solidFill>
+                      <a:schemeClr val="bg1"/>
+                    </a:solidFill>
+                  </a:tcPr>
+                </a:tc>
+                <a:extLst>
+                  <a:ext uri="{0D108BD9-81ED-4DB2-BD59-A6C34878D82A}">
+                    <a16:rowId xmlns:a16="http://schemas.microsoft.com/office/drawing/2014/main" val="2202148809"/>
+                  </a:ext>
+                </a:extLst>
+              </a:tr>
+              <a:tr h="1344920">
+                <a:tc>
+                  <a:txBody>
+                    <a:bodyPr/>
+                    <a:lstStyle/>
+                    <a:p>
+                      <a:pPr algn="ctr"/>
+                      <a:r>
+                        <a:rPr lang="en-US" sz="2000" b="1" dirty="0">
+                          <a:latin typeface="Agency FB" panose="020B0503020202020204" pitchFamily="34" charset="0"/>
+                        </a:rPr>
+                        <a:t>12 PM PT</a:t>
+                      </a:r>
+                    </a:p>
+                    <a:p>
+                      <a:pPr algn="ctr"/>
+                      <a:r>
+                        <a:rPr lang="en-US" sz="2000" b="1" dirty="0">
+                          <a:latin typeface="Agency FB" panose="020B0503020202020204" pitchFamily="34" charset="0"/>
+                        </a:rPr>
+                        <a:t>1 PM MT</a:t>
+                      </a:r>
+                    </a:p>
+                    <a:p>
+                      <a:pPr algn="ctr"/>
+                      <a:r>
+                        <a:rPr lang="en-US" sz="2000" dirty="0">
+                          <a:latin typeface="Agency FB" panose="020B0503020202020204" pitchFamily="34" charset="0"/>
+                        </a:rPr>
+                        <a:t>3 PM ET</a:t>
+                      </a:r>
+                    </a:p>
+                  </a:txBody>
+                  <a:tcPr marL="107715" marR="107715" marT="53858" marB="53858" anchor="ctr">
+                    <a:lnL w="6350" cap="flat" cmpd="sng" algn="ctr">
+                      <a:noFill/>
+                      <a:prstDash val="solid"/>
+                      <a:miter lim="800000"/>
+                    </a:lnL>
+                    <a:lnR>
+                      <a:noFill/>
+                    </a:lnR>
+                    <a:lnT w="6350" cap="flat" cmpd="sng" algn="ctr">
+                      <a:noFill/>
+                      <a:prstDash val="solid"/>
+                      <a:miter lim="800000"/>
+                    </a:lnT>
+                    <a:lnB w="6350" cap="flat" cmpd="sng" algn="ctr">
+                      <a:noFill/>
+                      <a:prstDash val="solid"/>
+                      <a:miter lim="800000"/>
+                    </a:lnB>
+                    <a:lnTlToBr w="12700" cmpd="sng">
+                      <a:noFill/>
+                      <a:prstDash val="solid"/>
+                    </a:lnTlToBr>
+                    <a:lnBlToTr w="12700" cmpd="sng">
+                      <a:noFill/>
+                      <a:prstDash val="solid"/>
+                    </a:lnBlToTr>
+                    <a:solidFill>
+                      <a:srgbClr val="ECE4EB"/>
+                    </a:solidFill>
+                  </a:tcPr>
+                </a:tc>
+                <a:tc>
+                  <a:txBody>
+                    <a:bodyPr/>
+                    <a:lstStyle/>
+                    <a:p>
+                      <a:pPr algn="ctr"/>
+                      <a:r>
+                        <a:rPr lang="en-US" sz="3400" dirty="0">
+                          <a:solidFill>
+                            <a:sysClr val="windowText" lastClr="000000"/>
+                          </a:solidFill>
+                          <a:latin typeface="Agency FB" panose="020B0503020202020204" pitchFamily="34" charset="0"/>
+                        </a:rPr>
+                        <a:t>Digital All-Stars (Monday only)</a:t>
+                      </a:r>
+                    </a:p>
+                    <a:p>
+                      <a:pPr algn="ctr"/>
+                      <a:r>
+                        <a:rPr lang="en-US" sz="3400" dirty="0">
+                          <a:solidFill>
+                            <a:sysClr val="windowText" lastClr="000000"/>
+                          </a:solidFill>
+                          <a:latin typeface="Agency FB" panose="020B0503020202020204" pitchFamily="34" charset="0"/>
+                        </a:rPr>
+                        <a:t>Landon Collins, Washington Redskins</a:t>
+                      </a:r>
+                    </a:p>
+                  </a:txBody>
+                  <a:tcPr marL="107715" marR="107715" marT="53858" marB="53858" anchor="ctr">
+                    <a:lnL>
+                      <a:noFill/>
+                    </a:lnL>
+                    <a:lnR w="6350" cap="flat" cmpd="sng" algn="ctr">
+                      <a:noFill/>
+                      <a:prstDash val="solid"/>
+                      <a:miter lim="800000"/>
+                    </a:lnR>
+                    <a:lnT w="6350" cap="flat" cmpd="sng" algn="ctr">
+                      <a:noFill/>
+                      <a:prstDash val="solid"/>
+                      <a:miter lim="800000"/>
+                    </a:lnT>
+                    <a:lnB w="6350" cap="flat" cmpd="sng" algn="ctr">
+                      <a:noFill/>
+                      <a:prstDash val="solid"/>
+                      <a:miter lim="800000"/>
+                    </a:lnB>
+                    <a:lnTlToBr w="12700" cmpd="sng">
+                      <a:noFill/>
+                      <a:prstDash val="solid"/>
+                    </a:lnTlToBr>
+                    <a:lnBlToTr w="12700" cmpd="sng">
+                      <a:noFill/>
+                      <a:prstDash val="solid"/>
+                    </a:lnBlToTr>
+                    <a:solidFill>
+                      <a:srgbClr val="ECE4EB"/>
+                    </a:solidFill>
+                  </a:tcPr>
+                </a:tc>
+                <a:extLst>
+                  <a:ext uri="{0D108BD9-81ED-4DB2-BD59-A6C34878D82A}">
+                    <a16:rowId xmlns:a16="http://schemas.microsoft.com/office/drawing/2014/main" val="2879450763"/>
+                  </a:ext>
+                </a:extLst>
+              </a:tr>
+              <a:tr h="843271">
+                <a:tc>
+                  <a:txBody>
+                    <a:bodyPr/>
+                    <a:lstStyle/>
+                    <a:p>
+                      <a:pPr algn="ctr"/>
+                      <a:r>
+                        <a:rPr lang="en-US" sz="2000" b="1" dirty="0">
+                          <a:latin typeface="Agency FB" panose="020B0503020202020204" pitchFamily="34" charset="0"/>
+                        </a:rPr>
+                        <a:t>12 PM PT</a:t>
+                      </a:r>
+                    </a:p>
+                    <a:p>
+                      <a:pPr algn="ctr"/>
+                      <a:r>
+                        <a:rPr lang="en-US" sz="2000" dirty="0">
+                          <a:latin typeface="Agency FB" panose="020B0503020202020204" pitchFamily="34" charset="0"/>
+                        </a:rPr>
+                        <a:t>3 PM ET</a:t>
+                      </a:r>
+                    </a:p>
+                  </a:txBody>
+                  <a:tcPr marL="107715" marR="107715" marT="53858" marB="53858" anchor="ctr">
+                    <a:lnL w="6350" cap="flat" cmpd="sng" algn="ctr">
+                      <a:noFill/>
+                      <a:prstDash val="solid"/>
+                      <a:miter lim="800000"/>
+                    </a:lnL>
+                    <a:lnR>
+                      <a:noFill/>
+                    </a:lnR>
+                    <a:lnT w="6350" cap="flat" cmpd="sng" algn="ctr">
+                      <a:noFill/>
+                      <a:prstDash val="solid"/>
+                      <a:miter lim="800000"/>
+                    </a:lnT>
+                    <a:lnB w="6350" cap="flat" cmpd="sng" algn="ctr">
+                      <a:noFill/>
+                      <a:prstDash val="solid"/>
+                      <a:miter lim="800000"/>
+                    </a:lnB>
+                    <a:lnTlToBr w="12700" cmpd="sng">
+                      <a:noFill/>
+                      <a:prstDash val="solid"/>
+                    </a:lnTlToBr>
+                    <a:lnBlToTr w="12700" cmpd="sng">
+                      <a:noFill/>
+                      <a:prstDash val="solid"/>
+                    </a:lnBlToTr>
+                    <a:solidFill>
+                      <a:schemeClr val="bg1"/>
+                    </a:solidFill>
+                  </a:tcPr>
+                </a:tc>
+                <a:tc>
+                  <a:txBody>
+                    <a:bodyPr/>
+                    <a:lstStyle/>
+                    <a:p>
+                      <a:pPr algn="ctr"/>
+                      <a:r>
+                        <a:rPr lang="en-US" sz="3400" dirty="0">
+                          <a:solidFill>
+                            <a:sysClr val="windowText" lastClr="000000"/>
+                          </a:solidFill>
+                          <a:latin typeface="Agency FB" panose="020B0503020202020204" pitchFamily="34" charset="0"/>
+                        </a:rPr>
+                        <a:t>MakeCode Live with John Park (Tuesday only)</a:t>
+                      </a:r>
+                    </a:p>
+                  </a:txBody>
+                  <a:tcPr marL="107715" marR="107715" marT="53858" marB="53858" anchor="ctr">
+                    <a:lnL>
+                      <a:noFill/>
+                    </a:lnL>
+                    <a:lnR w="6350" cap="flat" cmpd="sng" algn="ctr">
+                      <a:noFill/>
+                      <a:prstDash val="solid"/>
+                      <a:miter lim="800000"/>
+                    </a:lnR>
+                    <a:lnT w="6350" cap="flat" cmpd="sng" algn="ctr">
+                      <a:noFill/>
+                      <a:prstDash val="solid"/>
+                      <a:miter lim="800000"/>
+                    </a:lnT>
+                    <a:lnB w="6350" cap="flat" cmpd="sng" algn="ctr">
+                      <a:noFill/>
+                      <a:prstDash val="solid"/>
+                      <a:miter lim="800000"/>
+                    </a:lnB>
+                    <a:lnTlToBr w="12700" cmpd="sng">
+                      <a:noFill/>
+                      <a:prstDash val="solid"/>
+                    </a:lnTlToBr>
+                    <a:lnBlToTr w="12700" cmpd="sng">
+                      <a:noFill/>
+                      <a:prstDash val="solid"/>
+                    </a:lnBlToTr>
+                    <a:solidFill>
+                      <a:schemeClr val="bg1"/>
+                    </a:solidFill>
+                  </a:tcPr>
+                </a:tc>
+                <a:extLst>
+                  <a:ext uri="{0D108BD9-81ED-4DB2-BD59-A6C34878D82A}">
+                    <a16:rowId xmlns:a16="http://schemas.microsoft.com/office/drawing/2014/main" val="2667423859"/>
+                  </a:ext>
+                </a:extLst>
+              </a:tr>
+              <a:tr h="843271">
+                <a:tc>
+                  <a:txBody>
+                    <a:bodyPr/>
+                    <a:lstStyle/>
+                    <a:p>
+                      <a:pPr algn="ctr"/>
+                      <a:r>
+                        <a:rPr lang="en-US" sz="2000" b="1" dirty="0">
+                          <a:latin typeface="Agency FB" panose="020B0503020202020204" pitchFamily="34" charset="0"/>
+                        </a:rPr>
+                        <a:t>2 PM PT</a:t>
+                      </a:r>
+                    </a:p>
+                    <a:p>
+                      <a:pPr algn="ctr"/>
+                      <a:r>
+                        <a:rPr lang="en-US" sz="2000" dirty="0">
+                          <a:latin typeface="Agency FB" panose="020B0503020202020204" pitchFamily="34" charset="0"/>
+                        </a:rPr>
+                        <a:t>5PM ET</a:t>
+                      </a:r>
+                    </a:p>
+                  </a:txBody>
+                  <a:tcPr marL="107715" marR="107715" marT="53858" marB="53858" anchor="ctr">
+                    <a:lnL w="6350" cap="flat" cmpd="sng" algn="ctr">
+                      <a:noFill/>
+                      <a:prstDash val="solid"/>
+                      <a:miter lim="800000"/>
+                    </a:lnL>
+                    <a:lnR>
+                      <a:noFill/>
+                    </a:lnR>
+                    <a:lnT w="6350" cap="flat" cmpd="sng" algn="ctr">
+                      <a:noFill/>
+                      <a:prstDash val="solid"/>
+                      <a:miter lim="800000"/>
+                    </a:lnT>
+                    <a:lnB w="6350" cap="flat" cmpd="sng" algn="ctr">
+                      <a:noFill/>
+                      <a:prstDash val="solid"/>
+                      <a:miter lim="800000"/>
+                    </a:lnB>
+                    <a:lnTlToBr w="12700" cmpd="sng">
+                      <a:noFill/>
+                      <a:prstDash val="solid"/>
+                    </a:lnTlToBr>
+                    <a:lnBlToTr w="12700" cmpd="sng">
+                      <a:noFill/>
+                      <a:prstDash val="solid"/>
+                    </a:lnBlToTr>
+                    <a:solidFill>
+                      <a:srgbClr val="ECE4EB"/>
+                    </a:solidFill>
+                  </a:tcPr>
+                </a:tc>
+                <a:tc>
+                  <a:txBody>
+                    <a:bodyPr/>
+                    <a:lstStyle/>
+                    <a:p>
+                      <a:pPr algn="ctr"/>
+                      <a:r>
+                        <a:rPr lang="en-US" sz="3400" dirty="0">
+                          <a:latin typeface="Agency FB" panose="020B0503020202020204" pitchFamily="34" charset="0"/>
+                        </a:rPr>
+                        <a:t>MakeCode in the Kitchen (Friday only)</a:t>
+                      </a:r>
+                    </a:p>
+                  </a:txBody>
+                  <a:tcPr marL="107715" marR="107715" marT="53858" marB="53858" anchor="ctr">
+                    <a:lnL>
+                      <a:noFill/>
+                    </a:lnL>
+                    <a:lnR w="6350" cap="flat" cmpd="sng" algn="ctr">
+                      <a:noFill/>
+                      <a:prstDash val="solid"/>
+                      <a:miter lim="800000"/>
+                    </a:lnR>
+                    <a:lnT w="6350" cap="flat" cmpd="sng" algn="ctr">
+                      <a:noFill/>
+                      <a:prstDash val="solid"/>
+                      <a:miter lim="800000"/>
+                    </a:lnT>
+                    <a:lnB w="6350" cap="flat" cmpd="sng" algn="ctr">
+                      <a:noFill/>
+                      <a:prstDash val="solid"/>
+                      <a:miter lim="800000"/>
+                    </a:lnB>
+                    <a:lnTlToBr w="12700" cmpd="sng">
+                      <a:noFill/>
+                      <a:prstDash val="solid"/>
+                    </a:lnTlToBr>
+                    <a:lnBlToTr w="12700" cmpd="sng">
+                      <a:noFill/>
+                      <a:prstDash val="solid"/>
+                    </a:lnBlToTr>
+                    <a:solidFill>
+                      <a:srgbClr val="ECE4EB"/>
+                    </a:solidFill>
+                  </a:tcPr>
+                </a:tc>
+                <a:extLst>
+                  <a:ext uri="{0D108BD9-81ED-4DB2-BD59-A6C34878D82A}">
+                    <a16:rowId xmlns:a16="http://schemas.microsoft.com/office/drawing/2014/main" val="2354609438"/>
+                  </a:ext>
+                </a:extLst>
+              </a:tr>
+            </a:tbl>
+          </a:graphicData>
+        </a:graphic>
+      </p:graphicFrame>
+      <p:pic>
+        <p:nvPicPr>
+          <p:cNvPr id="6" name="Picture 5">
+            <a:extLst>
+              <a:ext uri="{FF2B5EF4-FFF2-40B4-BE49-F238E27FC236}">
+                <a16:creationId xmlns:a16="http://schemas.microsoft.com/office/drawing/2014/main" id="{DFA03610-80FC-4DFE-A985-E935A407F2D5}"/>
+              </a:ext>
+            </a:extLst>
+          </p:cNvPr>
+          <p:cNvPicPr>
+            <a:picLocks noChangeAspect="1"/>
+          </p:cNvPicPr>
+          <p:nvPr/>
+        </p:nvPicPr>
+        <p:blipFill>
+          <a:blip r:embed="rId3">
+            <a:clrChange>
+              <a:clrFrom>
+                <a:srgbClr val="FFFFFF"/>
+              </a:clrFrom>
+              <a:clrTo>
+                <a:srgbClr val="FFFFFF">
+                  <a:alpha val="0"/>
+                </a:srgbClr>
+              </a:clrTo>
+            </a:clrChange>
+          </a:blip>
+          <a:stretch>
+            <a:fillRect/>
+          </a:stretch>
+        </p:blipFill>
+        <p:spPr>
+          <a:xfrm rot="20891684">
+            <a:off x="9661190" y="7499776"/>
+            <a:ext cx="1585991" cy="1288260"/>
+          </a:xfrm>
+          <a:prstGeom prst="rect">
+            <a:avLst/>
+          </a:prstGeom>
+        </p:spPr>
+      </p:pic>
+      <p:pic>
+        <p:nvPicPr>
+          <p:cNvPr id="1026" name="Picture 2" descr="Image result for minecraft agent">
+            <a:extLst>
+              <a:ext uri="{FF2B5EF4-FFF2-40B4-BE49-F238E27FC236}">
+                <a16:creationId xmlns:a16="http://schemas.microsoft.com/office/drawing/2014/main" id="{88852689-71CA-442A-A4C5-81C1A8DFB04A}"/>
+              </a:ext>
+            </a:extLst>
+          </p:cNvPr>
+          <p:cNvPicPr>
+            <a:picLocks noChangeAspect="1" noChangeArrowheads="1"/>
+          </p:cNvPicPr>
+          <p:nvPr/>
+        </p:nvPicPr>
+        <p:blipFill>
+          <a:blip r:embed="rId4">
+            <a:extLst>
+              <a:ext uri="{28A0092B-C50C-407E-A947-70E740481C1C}">
+                <a14:useLocalDpi xmlns:a14="http://schemas.microsoft.com/office/drawing/2010/main" val="0"/>
+              </a:ext>
+            </a:extLst>
+          </a:blip>
+          <a:srcRect/>
+          <a:stretch>
+            <a:fillRect/>
+          </a:stretch>
+        </p:blipFill>
+        <p:spPr bwMode="auto">
+          <a:xfrm>
+            <a:off x="7180351" y="7026356"/>
+            <a:ext cx="1485444" cy="1909856"/>
+          </a:xfrm>
+          <a:prstGeom prst="rect">
+            <a:avLst/>
+          </a:prstGeom>
+          <a:noFill/>
+          <a:extLst>
+            <a:ext uri="{909E8E84-426E-40DD-AFC4-6F175D3DCCD1}">
+              <a14:hiddenFill xmlns:a14="http://schemas.microsoft.com/office/drawing/2010/main">
+                <a:solidFill>
+                  <a:srgbClr val="FFFFFF"/>
+                </a:solidFill>
+              </a14:hiddenFill>
+            </a:ext>
+          </a:extLst>
+        </p:spPr>
+      </p:pic>
+      <p:pic>
+        <p:nvPicPr>
+          <p:cNvPr id="20" name="Picture 19">
+            <a:extLst>
+              <a:ext uri="{FF2B5EF4-FFF2-40B4-BE49-F238E27FC236}">
+                <a16:creationId xmlns:a16="http://schemas.microsoft.com/office/drawing/2014/main" id="{48293F08-CD3E-4C65-96CD-5DF121F46256}"/>
+              </a:ext>
+            </a:extLst>
+          </p:cNvPr>
+          <p:cNvPicPr>
+            <a:picLocks noChangeAspect="1"/>
+          </p:cNvPicPr>
+          <p:nvPr/>
+        </p:nvPicPr>
+        <p:blipFill>
+          <a:blip r:embed="rId5">
+            <a:clrChange>
+              <a:clrFrom>
+                <a:srgbClr val="FFFFFF"/>
+              </a:clrFrom>
+              <a:clrTo>
+                <a:srgbClr val="FFFFFF">
+                  <a:alpha val="0"/>
+                </a:srgbClr>
+              </a:clrTo>
+            </a:clrChange>
+          </a:blip>
+          <a:stretch>
+            <a:fillRect/>
+          </a:stretch>
+        </p:blipFill>
+        <p:spPr>
+          <a:xfrm>
+            <a:off x="4909602" y="7150779"/>
+            <a:ext cx="1579177" cy="1986253"/>
+          </a:xfrm>
+          <a:prstGeom prst="rect">
+            <a:avLst/>
+          </a:prstGeom>
+        </p:spPr>
+      </p:pic>
+      <p:pic>
+        <p:nvPicPr>
+          <p:cNvPr id="21" name="Picture 20">
+            <a:extLst>
+              <a:ext uri="{FF2B5EF4-FFF2-40B4-BE49-F238E27FC236}">
+                <a16:creationId xmlns:a16="http://schemas.microsoft.com/office/drawing/2014/main" id="{7B9D8333-3412-4B90-9070-714BFAC66DE1}"/>
+              </a:ext>
+            </a:extLst>
+          </p:cNvPr>
+          <p:cNvPicPr>
+            <a:picLocks noChangeAspect="1"/>
+          </p:cNvPicPr>
+          <p:nvPr/>
+        </p:nvPicPr>
+        <p:blipFill>
+          <a:blip r:embed="rId6">
+            <a:clrChange>
+              <a:clrFrom>
+                <a:srgbClr val="FAFAFA"/>
+              </a:clrFrom>
+              <a:clrTo>
+                <a:srgbClr val="FAFAFA">
+                  <a:alpha val="0"/>
+                </a:srgbClr>
+              </a:clrTo>
+            </a:clrChange>
+          </a:blip>
+          <a:stretch>
+            <a:fillRect/>
+          </a:stretch>
+        </p:blipFill>
+        <p:spPr>
+          <a:xfrm>
+            <a:off x="8039644" y="2684693"/>
+            <a:ext cx="4225143" cy="4188402"/>
+          </a:xfrm>
+          <a:prstGeom prst="rect">
+            <a:avLst/>
+          </a:prstGeom>
+        </p:spPr>
+      </p:pic>
+      <p:pic>
+        <p:nvPicPr>
+          <p:cNvPr id="22" name="Picture 21">
+            <a:extLst>
+              <a:ext uri="{FF2B5EF4-FFF2-40B4-BE49-F238E27FC236}">
+                <a16:creationId xmlns:a16="http://schemas.microsoft.com/office/drawing/2014/main" id="{A98EC812-E79E-4C80-A59D-65E79E1E6801}"/>
+              </a:ext>
+            </a:extLst>
+          </p:cNvPr>
+          <p:cNvPicPr>
+            <a:picLocks noChangeAspect="1"/>
+          </p:cNvPicPr>
+          <p:nvPr/>
+        </p:nvPicPr>
+        <p:blipFill>
+          <a:blip r:embed="rId7">
+            <a:clrChange>
+              <a:clrFrom>
+                <a:srgbClr val="FFFFFF"/>
+              </a:clrFrom>
+              <a:clrTo>
+                <a:srgbClr val="FFFFFF">
+                  <a:alpha val="0"/>
+                </a:srgbClr>
+              </a:clrTo>
+            </a:clrChange>
+          </a:blip>
+          <a:stretch>
+            <a:fillRect/>
+          </a:stretch>
+        </p:blipFill>
+        <p:spPr>
+          <a:xfrm rot="21244650">
+            <a:off x="2288230" y="7073140"/>
+            <a:ext cx="1441710" cy="1454888"/>
+          </a:xfrm>
+          <a:prstGeom prst="rect">
+            <a:avLst/>
+          </a:prstGeom>
+        </p:spPr>
+      </p:pic>
+      <p:pic>
+        <p:nvPicPr>
+          <p:cNvPr id="3" name="Picture 2" descr="A picture containing shirt&#10;&#10;Description automatically generated">
+            <a:extLst>
+              <a:ext uri="{FF2B5EF4-FFF2-40B4-BE49-F238E27FC236}">
+                <a16:creationId xmlns:a16="http://schemas.microsoft.com/office/drawing/2014/main" id="{F0DCA003-393A-41D2-8AE3-C0653694807A}"/>
+              </a:ext>
+            </a:extLst>
+          </p:cNvPr>
+          <p:cNvPicPr>
+            <a:picLocks noChangeAspect="1"/>
+          </p:cNvPicPr>
+          <p:nvPr/>
+        </p:nvPicPr>
+        <p:blipFill rotWithShape="1">
+          <a:blip r:embed="rId8">
+            <a:extLst>
+              <a:ext uri="{28A0092B-C50C-407E-A947-70E740481C1C}">
+                <a14:useLocalDpi xmlns:a14="http://schemas.microsoft.com/office/drawing/2010/main" val="0"/>
+              </a:ext>
+            </a:extLst>
+          </a:blip>
+          <a:srcRect l="33838" t="34344" r="34847" b="18249"/>
+          <a:stretch/>
+        </p:blipFill>
+        <p:spPr>
+          <a:xfrm>
+            <a:off x="2100059" y="3406670"/>
+            <a:ext cx="810762" cy="1534346"/>
+          </a:xfrm>
+          <a:prstGeom prst="rect">
+            <a:avLst/>
+          </a:prstGeom>
+        </p:spPr>
+      </p:pic>
+    </p:spTree>
+    <p:extLst>
+      <p:ext uri="{BB962C8B-B14F-4D97-AF65-F5344CB8AC3E}">
+        <p14:creationId xmlns:p14="http://schemas.microsoft.com/office/powerpoint/2010/main" val="3791738392"/>
+      </p:ext>
+    </p:extLst>
+  </p:cSld>
+  <p:clrMapOvr>
+    <a:masterClrMapping/>
+  </p:clrMapOvr>
+</p:sld>
+</file>
+
+<file path=ppt/slides/slide8.xml><?xml version="1.0" encoding="utf-8"?>
 <p:sld xmlns:a="http://schemas.openxmlformats.org/drawingml/2006/main" xmlns:r="http://schemas.openxmlformats.org/officeDocument/2006/relationships" xmlns:p="http://schemas.openxmlformats.org/presentationml/2006/main">
   <p:cSld>
     <p:bg>
@@ -12539,6 +13737,21 @@
 </file>
 
 <file path=customXml/item1.xml><?xml version="1.0" encoding="utf-8"?>
+<p:properties xmlns:p="http://schemas.microsoft.com/office/2006/metadata/properties" xmlns:xsi="http://www.w3.org/2001/XMLSchema-instance" xmlns:pc="http://schemas.microsoft.com/office/infopath/2007/PartnerControls">
+  <documentManagement/>
+</p:properties>
+</file>
+
+<file path=customXml/item2.xml><?xml version="1.0" encoding="utf-8"?>
+<?mso-contentType ?>
+<FormTemplates xmlns="http://schemas.microsoft.com/sharepoint/v3/contenttype/forms">
+  <Display>DocumentLibraryForm</Display>
+  <Edit>DocumentLibraryForm</Edit>
+  <New>DocumentLibraryForm</New>
+</FormTemplates>
+</file>
+
+<file path=customXml/item3.xml><?xml version="1.0" encoding="utf-8"?>
 <ct:contentTypeSchema xmlns:ct="http://schemas.microsoft.com/office/2006/metadata/contentType" xmlns:ma="http://schemas.microsoft.com/office/2006/metadata/properties/metaAttributes" ct:_="" ma:_="" ma:contentTypeName="Document" ma:contentTypeID="0x010100860CD5D9B0436D4CAD5600AE7CA2E713" ma:contentTypeVersion="5" ma:contentTypeDescription="Create a new document." ma:contentTypeScope="" ma:versionID="82efc5ef0cc70a930dc0dd44bc7a59e5">
   <xsd:schema xmlns:xsd="http://www.w3.org/2001/XMLSchema" xmlns:xs="http://www.w3.org/2001/XMLSchema" xmlns:p="http://schemas.microsoft.com/office/2006/metadata/properties" xmlns:ns3="88ced256-c029-4233-a058-f3ec71fefdbe" xmlns:ns4="999ce889-1043-45e4-86ca-a56cfe2271af" targetNamespace="http://schemas.microsoft.com/office/2006/metadata/properties" ma:root="true" ma:fieldsID="df5615878e1656ee4e772df057bbfd02" ns3:_="" ns4:_="">
     <xsd:import namespace="88ced256-c029-4233-a058-f3ec71fefdbe"/>
@@ -12709,22 +13922,32 @@
 </ct:contentTypeSchema>
 </file>
 
-<file path=customXml/item2.xml><?xml version="1.0" encoding="utf-8"?>
-<?mso-contentType ?>
-<FormTemplates xmlns="http://schemas.microsoft.com/sharepoint/v3/contenttype/forms">
-  <Display>DocumentLibraryForm</Display>
-  <Edit>DocumentLibraryForm</Edit>
-  <New>DocumentLibraryForm</New>
-</FormTemplates>
+<file path=customXml/itemProps1.xml><?xml version="1.0" encoding="utf-8"?>
+<ds:datastoreItem xmlns:ds="http://schemas.openxmlformats.org/officeDocument/2006/customXml" ds:itemID="{60259DF6-DA4D-4E1C-9935-A04345E6A0FE}">
+  <ds:schemaRefs>
+    <ds:schemaRef ds:uri="http://schemas.microsoft.com/office/2006/metadata/properties"/>
+    <ds:schemaRef ds:uri="88ced256-c029-4233-a058-f3ec71fefdbe"/>
+    <ds:schemaRef ds:uri="http://schemas.microsoft.com/office/infopath/2007/PartnerControls"/>
+    <ds:schemaRef ds:uri="999ce889-1043-45e4-86ca-a56cfe2271af"/>
+    <ds:schemaRef ds:uri="http://purl.org/dc/dcmitype/"/>
+    <ds:schemaRef ds:uri="http://purl.org/dc/terms/"/>
+    <ds:schemaRef ds:uri="http://schemas.microsoft.com/office/2006/documentManagement/types"/>
+    <ds:schemaRef ds:uri="http://purl.org/dc/elements/1.1/"/>
+    <ds:schemaRef ds:uri="http://schemas.openxmlformats.org/package/2006/metadata/core-properties"/>
+    <ds:schemaRef ds:uri="http://www.w3.org/XML/1998/namespace"/>
+  </ds:schemaRefs>
+</ds:datastoreItem>
 </file>
 
-<file path=customXml/item3.xml><?xml version="1.0" encoding="utf-8"?>
-<p:properties xmlns:p="http://schemas.microsoft.com/office/2006/metadata/properties" xmlns:xsi="http://www.w3.org/2001/XMLSchema-instance" xmlns:pc="http://schemas.microsoft.com/office/infopath/2007/PartnerControls">
-  <documentManagement/>
-</p:properties>
+<file path=customXml/itemProps2.xml><?xml version="1.0" encoding="utf-8"?>
+<ds:datastoreItem xmlns:ds="http://schemas.openxmlformats.org/officeDocument/2006/customXml" ds:itemID="{4080D5DD-FD7F-4E53-9DDB-1149624B0AF8}">
+  <ds:schemaRefs>
+    <ds:schemaRef ds:uri="http://schemas.microsoft.com/sharepoint/v3/contenttype/forms"/>
+  </ds:schemaRefs>
+</ds:datastoreItem>
 </file>
 
-<file path=customXml/itemProps1.xml><?xml version="1.0" encoding="utf-8"?>
+<file path=customXml/itemProps3.xml><?xml version="1.0" encoding="utf-8"?>
 <ds:datastoreItem xmlns:ds="http://schemas.openxmlformats.org/officeDocument/2006/customXml" ds:itemID="{48DDB3CD-7A26-4427-A010-5E4AD2CBA3CF}">
   <ds:schemaRefs>
     <ds:schemaRef ds:uri="http://schemas.microsoft.com/office/2006/metadata/contentType"/>
@@ -12741,29 +13964,4 @@
     <ds:schemaRef ds:uri="http://schemas.microsoft.com/internal/obd"/>
   </ds:schemaRefs>
 </ds:datastoreItem>
-</file>
-
-<file path=customXml/itemProps2.xml><?xml version="1.0" encoding="utf-8"?>
-<ds:datastoreItem xmlns:ds="http://schemas.openxmlformats.org/officeDocument/2006/customXml" ds:itemID="{4080D5DD-FD7F-4E53-9DDB-1149624B0AF8}">
-  <ds:schemaRefs>
-    <ds:schemaRef ds:uri="http://schemas.microsoft.com/sharepoint/v3/contenttype/forms"/>
-  </ds:schemaRefs>
-</ds:datastoreItem>
-</file>
-
-<file path=customXml/itemProps3.xml><?xml version="1.0" encoding="utf-8"?>
-<ds:datastoreItem xmlns:ds="http://schemas.openxmlformats.org/officeDocument/2006/customXml" ds:itemID="{60259DF6-DA4D-4E1C-9935-A04345E6A0FE}">
-  <ds:schemaRefs>
-    <ds:schemaRef ds:uri="http://schemas.microsoft.com/office/2006/metadata/properties"/>
-    <ds:schemaRef ds:uri="88ced256-c029-4233-a058-f3ec71fefdbe"/>
-    <ds:schemaRef ds:uri="http://schemas.microsoft.com/office/infopath/2007/PartnerControls"/>
-    <ds:schemaRef ds:uri="999ce889-1043-45e4-86ca-a56cfe2271af"/>
-    <ds:schemaRef ds:uri="http://purl.org/dc/dcmitype/"/>
-    <ds:schemaRef ds:uri="http://purl.org/dc/terms/"/>
-    <ds:schemaRef ds:uri="http://schemas.microsoft.com/office/2006/documentManagement/types"/>
-    <ds:schemaRef ds:uri="http://purl.org/dc/elements/1.1/"/>
-    <ds:schemaRef ds:uri="http://schemas.openxmlformats.org/package/2006/metadata/core-properties"/>
-    <ds:schemaRef ds:uri="http://www.w3.org/XML/1998/namespace"/>
-  </ds:schemaRefs>
-</ds:datastoreItem>
 </file>
</xml_diff>

<commit_message>
Remove Arcade Advanced stream from this week's schedule (#6917)
</commit_message>
<xml_diff>
--- a/docs/static/online-learning/Mixer Stream Schedule.pptx
+++ b/docs/static/online-learning/Mixer Stream Schedule.pptx
@@ -5,7 +5,7 @@
     <p:sldMasterId id="2147483648" r:id="rId4"/>
   </p:sldMasterIdLst>
   <p:notesMasterIdLst>
-    <p:notesMasterId r:id="rId12"/>
+    <p:notesMasterId r:id="rId13"/>
   </p:notesMasterIdLst>
   <p:sldIdLst>
     <p:sldId id="256" r:id="rId5"/>
@@ -14,7 +14,8 @@
     <p:sldId id="259" r:id="rId8"/>
     <p:sldId id="262" r:id="rId9"/>
     <p:sldId id="260" r:id="rId10"/>
-    <p:sldId id="261" r:id="rId11"/>
+    <p:sldId id="263" r:id="rId11"/>
+    <p:sldId id="261" r:id="rId12"/>
   </p:sldIdLst>
   <p:sldSz cx="12192000" cy="6858000"/>
   <p:notesSz cx="6858000" cy="9144000"/>
@@ -211,7 +212,7 @@
           <a:p>
             <a:fld id="{9820A582-7AE2-4948-B06A-742F9F045A83}" type="datetimeFigureOut">
               <a:rPr lang="en-US" smtClean="0"/>
-              <a:t>4/20/2020</a:t>
+              <a:t>4/27/2020</a:t>
             </a:fld>
             <a:endParaRPr lang="en-US"/>
           </a:p>
@@ -1056,6 +1057,90 @@
     </p:spTree>
     <p:extLst>
       <p:ext uri="{BB962C8B-B14F-4D97-AF65-F5344CB8AC3E}">
+        <p14:creationId xmlns:p14="http://schemas.microsoft.com/office/powerpoint/2010/main" val="3841027729"/>
+      </p:ext>
+    </p:extLst>
+  </p:cSld>
+  <p:clrMapOvr>
+    <a:masterClrMapping/>
+  </p:clrMapOvr>
+</p:notes>
+</file>
+
+<file path=ppt/notesSlides/notesSlide8.xml><?xml version="1.0" encoding="utf-8"?>
+<p:notes xmlns:a="http://schemas.openxmlformats.org/drawingml/2006/main" xmlns:r="http://schemas.openxmlformats.org/officeDocument/2006/relationships" xmlns:p="http://schemas.openxmlformats.org/presentationml/2006/main">
+  <p:cSld>
+    <p:spTree>
+      <p:nvGrpSpPr>
+        <p:cNvPr id="1" name=""/>
+        <p:cNvGrpSpPr/>
+        <p:nvPr/>
+      </p:nvGrpSpPr>
+      <p:grpSpPr>
+        <a:xfrm>
+          <a:off x="0" y="0"/>
+          <a:ext cx="0" cy="0"/>
+          <a:chOff x="0" y="0"/>
+          <a:chExt cx="0" cy="0"/>
+        </a:xfrm>
+      </p:grpSpPr>
+      <p:sp>
+        <p:nvSpPr>
+          <p:cNvPr id="2" name="Slide Image Placeholder 1"/>
+          <p:cNvSpPr>
+            <a:spLocks noGrp="1" noRot="1" noChangeAspect="1"/>
+          </p:cNvSpPr>
+          <p:nvPr>
+            <p:ph type="sldImg"/>
+          </p:nvPr>
+        </p:nvSpPr>
+        <p:spPr/>
+      </p:sp>
+      <p:sp>
+        <p:nvSpPr>
+          <p:cNvPr id="3" name="Notes Placeholder 2"/>
+          <p:cNvSpPr>
+            <a:spLocks noGrp="1"/>
+          </p:cNvSpPr>
+          <p:nvPr>
+            <p:ph type="body" idx="1"/>
+          </p:nvPr>
+        </p:nvSpPr>
+        <p:spPr/>
+        <p:txBody>
+          <a:bodyPr/>
+          <a:lstStyle/>
+          <a:p>
+            <a:endParaRPr lang="en-US" dirty="0"/>
+          </a:p>
+        </p:txBody>
+      </p:sp>
+      <p:sp>
+        <p:nvSpPr>
+          <p:cNvPr id="4" name="Slide Number Placeholder 3"/>
+          <p:cNvSpPr>
+            <a:spLocks noGrp="1"/>
+          </p:cNvSpPr>
+          <p:nvPr>
+            <p:ph type="sldNum" sz="quarter" idx="5"/>
+          </p:nvPr>
+        </p:nvSpPr>
+        <p:spPr/>
+        <p:txBody>
+          <a:bodyPr/>
+          <a:lstStyle/>
+          <a:p>
+            <a:fld id="{187F1E49-A4A6-43FF-827C-952A37F20303}" type="slidenum">
+              <a:rPr lang="en-US" smtClean="0"/>
+              <a:t>8</a:t>
+            </a:fld>
+            <a:endParaRPr lang="en-US"/>
+          </a:p>
+        </p:txBody>
+      </p:sp>
+    </p:spTree>
+    <p:extLst>
+      <p:ext uri="{BB962C8B-B14F-4D97-AF65-F5344CB8AC3E}">
         <p14:creationId xmlns:p14="http://schemas.microsoft.com/office/powerpoint/2010/main" val="1435183535"/>
       </p:ext>
     </p:extLst>
@@ -1213,7 +1298,7 @@
           <a:p>
             <a:fld id="{EE18C4CC-5113-4103-95F7-16AD5B06551D}" type="datetimeFigureOut">
               <a:rPr lang="en-US" smtClean="0"/>
-              <a:t>4/20/2020</a:t>
+              <a:t>4/27/2020</a:t>
             </a:fld>
             <a:endParaRPr lang="en-US"/>
           </a:p>
@@ -1411,7 +1496,7 @@
           <a:p>
             <a:fld id="{EE18C4CC-5113-4103-95F7-16AD5B06551D}" type="datetimeFigureOut">
               <a:rPr lang="en-US" smtClean="0"/>
-              <a:t>4/20/2020</a:t>
+              <a:t>4/27/2020</a:t>
             </a:fld>
             <a:endParaRPr lang="en-US"/>
           </a:p>
@@ -1619,7 +1704,7 @@
           <a:p>
             <a:fld id="{EE18C4CC-5113-4103-95F7-16AD5B06551D}" type="datetimeFigureOut">
               <a:rPr lang="en-US" smtClean="0"/>
-              <a:t>4/20/2020</a:t>
+              <a:t>4/27/2020</a:t>
             </a:fld>
             <a:endParaRPr lang="en-US"/>
           </a:p>
@@ -1817,7 +1902,7 @@
           <a:p>
             <a:fld id="{EE18C4CC-5113-4103-95F7-16AD5B06551D}" type="datetimeFigureOut">
               <a:rPr lang="en-US" smtClean="0"/>
-              <a:t>4/20/2020</a:t>
+              <a:t>4/27/2020</a:t>
             </a:fld>
             <a:endParaRPr lang="en-US"/>
           </a:p>
@@ -2092,7 +2177,7 @@
           <a:p>
             <a:fld id="{EE18C4CC-5113-4103-95F7-16AD5B06551D}" type="datetimeFigureOut">
               <a:rPr lang="en-US" smtClean="0"/>
-              <a:t>4/20/2020</a:t>
+              <a:t>4/27/2020</a:t>
             </a:fld>
             <a:endParaRPr lang="en-US"/>
           </a:p>
@@ -2357,7 +2442,7 @@
           <a:p>
             <a:fld id="{EE18C4CC-5113-4103-95F7-16AD5B06551D}" type="datetimeFigureOut">
               <a:rPr lang="en-US" smtClean="0"/>
-              <a:t>4/20/2020</a:t>
+              <a:t>4/27/2020</a:t>
             </a:fld>
             <a:endParaRPr lang="en-US"/>
           </a:p>
@@ -2769,7 +2854,7 @@
           <a:p>
             <a:fld id="{EE18C4CC-5113-4103-95F7-16AD5B06551D}" type="datetimeFigureOut">
               <a:rPr lang="en-US" smtClean="0"/>
-              <a:t>4/20/2020</a:t>
+              <a:t>4/27/2020</a:t>
             </a:fld>
             <a:endParaRPr lang="en-US"/>
           </a:p>
@@ -2910,7 +2995,7 @@
           <a:p>
             <a:fld id="{EE18C4CC-5113-4103-95F7-16AD5B06551D}" type="datetimeFigureOut">
               <a:rPr lang="en-US" smtClean="0"/>
-              <a:t>4/20/2020</a:t>
+              <a:t>4/27/2020</a:t>
             </a:fld>
             <a:endParaRPr lang="en-US"/>
           </a:p>
@@ -3023,7 +3108,7 @@
           <a:p>
             <a:fld id="{EE18C4CC-5113-4103-95F7-16AD5B06551D}" type="datetimeFigureOut">
               <a:rPr lang="en-US" smtClean="0"/>
-              <a:t>4/20/2020</a:t>
+              <a:t>4/27/2020</a:t>
             </a:fld>
             <a:endParaRPr lang="en-US"/>
           </a:p>
@@ -3334,7 +3419,7 @@
           <a:p>
             <a:fld id="{EE18C4CC-5113-4103-95F7-16AD5B06551D}" type="datetimeFigureOut">
               <a:rPr lang="en-US" smtClean="0"/>
-              <a:t>4/20/2020</a:t>
+              <a:t>4/27/2020</a:t>
             </a:fld>
             <a:endParaRPr lang="en-US"/>
           </a:p>
@@ -3622,7 +3707,7 @@
           <a:p>
             <a:fld id="{EE18C4CC-5113-4103-95F7-16AD5B06551D}" type="datetimeFigureOut">
               <a:rPr lang="en-US" smtClean="0"/>
-              <a:t>4/20/2020</a:t>
+              <a:t>4/27/2020</a:t>
             </a:fld>
             <a:endParaRPr lang="en-US"/>
           </a:p>
@@ -3863,7 +3948,7 @@
           <a:p>
             <a:fld id="{EE18C4CC-5113-4103-95F7-16AD5B06551D}" type="datetimeFigureOut">
               <a:rPr lang="en-US" smtClean="0"/>
-              <a:t>4/20/2020</a:t>
+              <a:t>4/27/2020</a:t>
             </a:fld>
             <a:endParaRPr lang="en-US"/>
           </a:p>
@@ -10697,6 +10782,1119 @@
 </file>
 
 <file path=ppt/slides/slide7.xml><?xml version="1.0" encoding="utf-8"?>
+<p:sld xmlns:a="http://schemas.openxmlformats.org/drawingml/2006/main" xmlns:r="http://schemas.openxmlformats.org/officeDocument/2006/relationships" xmlns:p="http://schemas.openxmlformats.org/presentationml/2006/main">
+  <p:cSld>
+    <p:bg>
+      <p:bgPr>
+        <a:pattFill prst="pct5">
+          <a:fgClr>
+            <a:srgbClr val="5D406C"/>
+          </a:fgClr>
+          <a:bgClr>
+            <a:schemeClr val="bg1"/>
+          </a:bgClr>
+        </a:pattFill>
+        <a:effectLst/>
+      </p:bgPr>
+    </p:bg>
+    <p:spTree>
+      <p:nvGrpSpPr>
+        <p:cNvPr id="1" name=""/>
+        <p:cNvGrpSpPr/>
+        <p:nvPr/>
+      </p:nvGrpSpPr>
+      <p:grpSpPr>
+        <a:xfrm>
+          <a:off x="0" y="0"/>
+          <a:ext cx="0" cy="0"/>
+          <a:chOff x="0" y="0"/>
+          <a:chExt cx="0" cy="0"/>
+        </a:xfrm>
+      </p:grpSpPr>
+      <p:graphicFrame>
+        <p:nvGraphicFramePr>
+          <p:cNvPr id="4" name="Table 4">
+            <a:extLst>
+              <a:ext uri="{FF2B5EF4-FFF2-40B4-BE49-F238E27FC236}">
+                <a16:creationId xmlns:a16="http://schemas.microsoft.com/office/drawing/2014/main" id="{1E17FCE3-C1AC-415D-AD4D-9D9BBBF374CC}"/>
+              </a:ext>
+            </a:extLst>
+          </p:cNvPr>
+          <p:cNvGraphicFramePr>
+            <a:graphicFrameLocks noGrp="1"/>
+          </p:cNvGraphicFramePr>
+          <p:nvPr>
+            <p:extLst>
+              <p:ext uri="{D42A27DB-BD31-4B8C-83A1-F6EECF244321}">
+                <p14:modId xmlns:p14="http://schemas.microsoft.com/office/powerpoint/2010/main" val="1213512088"/>
+              </p:ext>
+            </p:extLst>
+          </p:nvPr>
+        </p:nvGraphicFramePr>
+        <p:xfrm>
+          <a:off x="304801" y="276061"/>
+          <a:ext cx="8543053" cy="6261218"/>
+        </p:xfrm>
+        <a:graphic>
+          <a:graphicData uri="http://schemas.openxmlformats.org/drawingml/2006/table">
+            <a:tbl>
+              <a:tblPr firstRow="1" bandRow="1">
+                <a:tableStyleId>{69012ECD-51FC-41F1-AA8D-1B2483CD663E}</a:tableStyleId>
+              </a:tblPr>
+              <a:tblGrid>
+                <a:gridCol w="1954097">
+                  <a:extLst>
+                    <a:ext uri="{9D8B030D-6E8A-4147-A177-3AD203B41FA5}">
+                      <a16:colId xmlns:a16="http://schemas.microsoft.com/office/drawing/2014/main" val="1510224491"/>
+                    </a:ext>
+                  </a:extLst>
+                </a:gridCol>
+                <a:gridCol w="6588956">
+                  <a:extLst>
+                    <a:ext uri="{9D8B030D-6E8A-4147-A177-3AD203B41FA5}">
+                      <a16:colId xmlns:a16="http://schemas.microsoft.com/office/drawing/2014/main" val="21893690"/>
+                    </a:ext>
+                  </a:extLst>
+                </a:gridCol>
+              </a:tblGrid>
+              <a:tr h="699943">
+                <a:tc>
+                  <a:txBody>
+                    <a:bodyPr/>
+                    <a:lstStyle/>
+                    <a:p>
+                      <a:pPr algn="ctr"/>
+                      <a:r>
+                        <a:rPr lang="en-US" sz="3200" dirty="0">
+                          <a:latin typeface="Agency FB" panose="020B0503020202020204" pitchFamily="34" charset="0"/>
+                        </a:rPr>
+                        <a:t>TIME</a:t>
+                      </a:r>
+                    </a:p>
+                  </a:txBody>
+                  <a:tcPr marL="107715" marR="107715" marT="53858" marB="53858" anchor="ctr">
+                    <a:lnL w="6350" cap="flat" cmpd="sng" algn="ctr">
+                      <a:noFill/>
+                      <a:prstDash val="solid"/>
+                      <a:miter lim="800000"/>
+                    </a:lnL>
+                    <a:lnR>
+                      <a:noFill/>
+                    </a:lnR>
+                    <a:lnT w="6350" cap="flat" cmpd="sng" algn="ctr">
+                      <a:noFill/>
+                      <a:prstDash val="solid"/>
+                      <a:miter lim="800000"/>
+                    </a:lnT>
+                    <a:lnB w="6350" cap="flat" cmpd="sng" algn="ctr">
+                      <a:noFill/>
+                      <a:prstDash val="solid"/>
+                      <a:miter lim="800000"/>
+                    </a:lnB>
+                    <a:lnTlToBr w="12700" cmpd="sng">
+                      <a:noFill/>
+                      <a:prstDash val="solid"/>
+                    </a:lnTlToBr>
+                    <a:lnBlToTr w="12700" cmpd="sng">
+                      <a:noFill/>
+                      <a:prstDash val="solid"/>
+                    </a:lnBlToTr>
+                    <a:solidFill>
+                      <a:srgbClr val="5D406C"/>
+                    </a:solidFill>
+                  </a:tcPr>
+                </a:tc>
+                <a:tc>
+                  <a:txBody>
+                    <a:bodyPr/>
+                    <a:lstStyle/>
+                    <a:p>
+                      <a:pPr algn="ctr"/>
+                      <a:r>
+                        <a:rPr lang="en-US" sz="3200" dirty="0">
+                          <a:latin typeface="Agency FB" panose="020B0503020202020204" pitchFamily="34" charset="0"/>
+                        </a:rPr>
+                        <a:t>STREAM</a:t>
+                      </a:r>
+                    </a:p>
+                  </a:txBody>
+                  <a:tcPr marL="107715" marR="107715" marT="53858" marB="53858" anchor="ctr">
+                    <a:lnL>
+                      <a:noFill/>
+                    </a:lnL>
+                    <a:lnR w="6350" cap="flat" cmpd="sng" algn="ctr">
+                      <a:noFill/>
+                      <a:prstDash val="solid"/>
+                      <a:miter lim="800000"/>
+                    </a:lnR>
+                    <a:lnT w="6350" cap="flat" cmpd="sng" algn="ctr">
+                      <a:noFill/>
+                      <a:prstDash val="solid"/>
+                      <a:miter lim="800000"/>
+                    </a:lnT>
+                    <a:lnB w="6350" cap="flat" cmpd="sng" algn="ctr">
+                      <a:noFill/>
+                      <a:prstDash val="solid"/>
+                      <a:miter lim="800000"/>
+                    </a:lnB>
+                    <a:lnTlToBr w="12700" cmpd="sng">
+                      <a:noFill/>
+                      <a:prstDash val="solid"/>
+                    </a:lnTlToBr>
+                    <a:lnBlToTr w="12700" cmpd="sng">
+                      <a:noFill/>
+                      <a:prstDash val="solid"/>
+                    </a:lnBlToTr>
+                    <a:solidFill>
+                      <a:srgbClr val="5D406C"/>
+                    </a:solidFill>
+                  </a:tcPr>
+                </a:tc>
+                <a:extLst>
+                  <a:ext uri="{0D108BD9-81ED-4DB2-BD59-A6C34878D82A}">
+                    <a16:rowId xmlns:a16="http://schemas.microsoft.com/office/drawing/2014/main" val="888274358"/>
+                  </a:ext>
+                </a:extLst>
+              </a:tr>
+              <a:tr h="843271">
+                <a:tc>
+                  <a:txBody>
+                    <a:bodyPr/>
+                    <a:lstStyle/>
+                    <a:p>
+                      <a:pPr algn="ctr"/>
+                      <a:r>
+                        <a:rPr lang="en-US" sz="2000" b="1" dirty="0">
+                          <a:latin typeface="Agency FB" panose="020B0503020202020204" pitchFamily="34" charset="0"/>
+                        </a:rPr>
+                        <a:t>9 AM PT</a:t>
+                      </a:r>
+                    </a:p>
+                    <a:p>
+                      <a:pPr algn="ctr"/>
+                      <a:r>
+                        <a:rPr lang="en-US" sz="2000" dirty="0">
+                          <a:latin typeface="Agency FB" panose="020B0503020202020204" pitchFamily="34" charset="0"/>
+                        </a:rPr>
+                        <a:t>12 PM ET</a:t>
+                      </a:r>
+                    </a:p>
+                  </a:txBody>
+                  <a:tcPr marL="107715" marR="107715" marT="53858" marB="53858" anchor="ctr">
+                    <a:lnL w="6350" cap="flat" cmpd="sng" algn="ctr">
+                      <a:noFill/>
+                      <a:prstDash val="solid"/>
+                      <a:miter lim="800000"/>
+                    </a:lnL>
+                    <a:lnR>
+                      <a:noFill/>
+                    </a:lnR>
+                    <a:lnT w="6350" cap="flat" cmpd="sng" algn="ctr">
+                      <a:noFill/>
+                      <a:prstDash val="solid"/>
+                      <a:miter lim="800000"/>
+                    </a:lnT>
+                    <a:lnB w="6350" cap="flat" cmpd="sng" algn="ctr">
+                      <a:noFill/>
+                      <a:prstDash val="solid"/>
+                      <a:miter lim="800000"/>
+                    </a:lnB>
+                    <a:lnTlToBr w="12700" cmpd="sng">
+                      <a:noFill/>
+                      <a:prstDash val="solid"/>
+                    </a:lnTlToBr>
+                    <a:lnBlToTr w="12700" cmpd="sng">
+                      <a:noFill/>
+                      <a:prstDash val="solid"/>
+                    </a:lnBlToTr>
+                    <a:solidFill>
+                      <a:schemeClr val="bg1"/>
+                    </a:solidFill>
+                  </a:tcPr>
+                </a:tc>
+                <a:tc>
+                  <a:txBody>
+                    <a:bodyPr/>
+                    <a:lstStyle/>
+                    <a:p>
+                      <a:pPr algn="ctr"/>
+                      <a:r>
+                        <a:rPr lang="en-US" sz="3400" dirty="0">
+                          <a:latin typeface="Agency FB" panose="020B0503020202020204" pitchFamily="34" charset="0"/>
+                        </a:rPr>
+                        <a:t>MakeCode for the micro:bit</a:t>
+                      </a:r>
+                    </a:p>
+                  </a:txBody>
+                  <a:tcPr marL="107715" marR="107715" marT="53858" marB="53858" anchor="ctr">
+                    <a:lnL>
+                      <a:noFill/>
+                    </a:lnL>
+                    <a:lnR w="6350" cap="flat" cmpd="sng" algn="ctr">
+                      <a:noFill/>
+                      <a:prstDash val="solid"/>
+                      <a:miter lim="800000"/>
+                    </a:lnR>
+                    <a:lnT w="6350" cap="flat" cmpd="sng" algn="ctr">
+                      <a:noFill/>
+                      <a:prstDash val="solid"/>
+                      <a:miter lim="800000"/>
+                    </a:lnT>
+                    <a:lnB w="6350" cap="flat" cmpd="sng" algn="ctr">
+                      <a:noFill/>
+                      <a:prstDash val="solid"/>
+                      <a:miter lim="800000"/>
+                    </a:lnB>
+                    <a:lnTlToBr w="12700" cmpd="sng">
+                      <a:noFill/>
+                      <a:prstDash val="solid"/>
+                    </a:lnTlToBr>
+                    <a:lnBlToTr w="12700" cmpd="sng">
+                      <a:noFill/>
+                      <a:prstDash val="solid"/>
+                    </a:lnBlToTr>
+                    <a:solidFill>
+                      <a:schemeClr val="bg1"/>
+                    </a:solidFill>
+                  </a:tcPr>
+                </a:tc>
+                <a:extLst>
+                  <a:ext uri="{0D108BD9-81ED-4DB2-BD59-A6C34878D82A}">
+                    <a16:rowId xmlns:a16="http://schemas.microsoft.com/office/drawing/2014/main" val="55475757"/>
+                  </a:ext>
+                </a:extLst>
+              </a:tr>
+              <a:tr h="843271">
+                <a:tc>
+                  <a:txBody>
+                    <a:bodyPr/>
+                    <a:lstStyle/>
+                    <a:p>
+                      <a:pPr algn="ctr"/>
+                      <a:r>
+                        <a:rPr lang="en-US" sz="2000" b="1" dirty="0">
+                          <a:latin typeface="Agency FB" panose="020B0503020202020204" pitchFamily="34" charset="0"/>
+                        </a:rPr>
+                        <a:t>10 AM PT</a:t>
+                      </a:r>
+                    </a:p>
+                    <a:p>
+                      <a:pPr algn="ctr"/>
+                      <a:r>
+                        <a:rPr lang="en-US" sz="2000" dirty="0">
+                          <a:latin typeface="Agency FB" panose="020B0503020202020204" pitchFamily="34" charset="0"/>
+                        </a:rPr>
+                        <a:t>1 PM ET</a:t>
+                      </a:r>
+                    </a:p>
+                  </a:txBody>
+                  <a:tcPr marL="107715" marR="107715" marT="53858" marB="53858" anchor="ctr">
+                    <a:lnL w="6350" cap="flat" cmpd="sng" algn="ctr">
+                      <a:noFill/>
+                      <a:prstDash val="solid"/>
+                      <a:miter lim="800000"/>
+                    </a:lnL>
+                    <a:lnR>
+                      <a:noFill/>
+                    </a:lnR>
+                    <a:lnT w="6350" cap="flat" cmpd="sng" algn="ctr">
+                      <a:noFill/>
+                      <a:prstDash val="solid"/>
+                      <a:miter lim="800000"/>
+                    </a:lnT>
+                    <a:lnB w="6350" cap="flat" cmpd="sng" algn="ctr">
+                      <a:noFill/>
+                      <a:prstDash val="solid"/>
+                      <a:miter lim="800000"/>
+                    </a:lnB>
+                    <a:lnTlToBr w="12700" cmpd="sng">
+                      <a:noFill/>
+                      <a:prstDash val="solid"/>
+                    </a:lnTlToBr>
+                    <a:lnBlToTr w="12700" cmpd="sng">
+                      <a:noFill/>
+                      <a:prstDash val="solid"/>
+                    </a:lnBlToTr>
+                    <a:solidFill>
+                      <a:srgbClr val="ECE4EB"/>
+                    </a:solidFill>
+                  </a:tcPr>
+                </a:tc>
+                <a:tc>
+                  <a:txBody>
+                    <a:bodyPr/>
+                    <a:lstStyle/>
+                    <a:p>
+                      <a:pPr algn="ctr"/>
+                      <a:r>
+                        <a:rPr lang="en-US" sz="3400" dirty="0">
+                          <a:latin typeface="Agency FB" panose="020B0503020202020204" pitchFamily="34" charset="0"/>
+                        </a:rPr>
+                        <a:t>MakeCode with Minecraft: Education Edition</a:t>
+                      </a:r>
+                    </a:p>
+                  </a:txBody>
+                  <a:tcPr marL="107715" marR="107715" marT="53858" marB="53858" anchor="ctr">
+                    <a:lnL>
+                      <a:noFill/>
+                    </a:lnL>
+                    <a:lnR w="6350" cap="flat" cmpd="sng" algn="ctr">
+                      <a:noFill/>
+                      <a:prstDash val="solid"/>
+                      <a:miter lim="800000"/>
+                    </a:lnR>
+                    <a:lnT w="6350" cap="flat" cmpd="sng" algn="ctr">
+                      <a:noFill/>
+                      <a:prstDash val="solid"/>
+                      <a:miter lim="800000"/>
+                    </a:lnT>
+                    <a:lnB w="6350" cap="flat" cmpd="sng" algn="ctr">
+                      <a:noFill/>
+                      <a:prstDash val="solid"/>
+                      <a:miter lim="800000"/>
+                    </a:lnB>
+                    <a:lnTlToBr w="12700" cmpd="sng">
+                      <a:noFill/>
+                      <a:prstDash val="solid"/>
+                    </a:lnTlToBr>
+                    <a:lnBlToTr w="12700" cmpd="sng">
+                      <a:noFill/>
+                      <a:prstDash val="solid"/>
+                    </a:lnBlToTr>
+                    <a:solidFill>
+                      <a:srgbClr val="ECE4EB"/>
+                    </a:solidFill>
+                  </a:tcPr>
+                </a:tc>
+                <a:extLst>
+                  <a:ext uri="{0D108BD9-81ED-4DB2-BD59-A6C34878D82A}">
+                    <a16:rowId xmlns:a16="http://schemas.microsoft.com/office/drawing/2014/main" val="1272730967"/>
+                  </a:ext>
+                </a:extLst>
+              </a:tr>
+              <a:tr h="843271">
+                <a:tc>
+                  <a:txBody>
+                    <a:bodyPr/>
+                    <a:lstStyle/>
+                    <a:p>
+                      <a:pPr algn="ctr"/>
+                      <a:r>
+                        <a:rPr lang="en-US" sz="2000" b="1" dirty="0">
+                          <a:latin typeface="Agency FB" panose="020B0503020202020204" pitchFamily="34" charset="0"/>
+                        </a:rPr>
+                        <a:t>11 AM PT</a:t>
+                      </a:r>
+                    </a:p>
+                    <a:p>
+                      <a:pPr algn="ctr"/>
+                      <a:r>
+                        <a:rPr lang="en-US" sz="2000" dirty="0">
+                          <a:latin typeface="Agency FB" panose="020B0503020202020204" pitchFamily="34" charset="0"/>
+                        </a:rPr>
+                        <a:t>2 PM ET</a:t>
+                      </a:r>
+                    </a:p>
+                  </a:txBody>
+                  <a:tcPr marL="107715" marR="107715" marT="53858" marB="53858" anchor="ctr">
+                    <a:lnL w="6350" cap="flat" cmpd="sng" algn="ctr">
+                      <a:noFill/>
+                      <a:prstDash val="solid"/>
+                      <a:miter lim="800000"/>
+                    </a:lnL>
+                    <a:lnR>
+                      <a:noFill/>
+                    </a:lnR>
+                    <a:lnT w="6350" cap="flat" cmpd="sng" algn="ctr">
+                      <a:noFill/>
+                      <a:prstDash val="solid"/>
+                      <a:miter lim="800000"/>
+                    </a:lnT>
+                    <a:lnB w="6350" cap="flat" cmpd="sng" algn="ctr">
+                      <a:noFill/>
+                      <a:prstDash val="solid"/>
+                      <a:miter lim="800000"/>
+                    </a:lnB>
+                    <a:lnTlToBr w="12700" cmpd="sng">
+                      <a:noFill/>
+                      <a:prstDash val="solid"/>
+                    </a:lnTlToBr>
+                    <a:lnBlToTr w="12700" cmpd="sng">
+                      <a:noFill/>
+                      <a:prstDash val="solid"/>
+                    </a:lnBlToTr>
+                    <a:solidFill>
+                      <a:schemeClr val="bg1"/>
+                    </a:solidFill>
+                  </a:tcPr>
+                </a:tc>
+                <a:tc>
+                  <a:txBody>
+                    <a:bodyPr/>
+                    <a:lstStyle/>
+                    <a:p>
+                      <a:pPr algn="ctr"/>
+                      <a:r>
+                        <a:rPr lang="en-US" sz="3400" dirty="0">
+                          <a:latin typeface="Agency FB" panose="020B0503020202020204" pitchFamily="34" charset="0"/>
+                        </a:rPr>
+                        <a:t>MakeCode Arcade (Beginner)</a:t>
+                      </a:r>
+                    </a:p>
+                  </a:txBody>
+                  <a:tcPr marL="107715" marR="107715" marT="53858" marB="53858" anchor="ctr">
+                    <a:lnL>
+                      <a:noFill/>
+                    </a:lnL>
+                    <a:lnR w="6350" cap="flat" cmpd="sng" algn="ctr">
+                      <a:noFill/>
+                      <a:prstDash val="solid"/>
+                      <a:miter lim="800000"/>
+                    </a:lnR>
+                    <a:lnT w="6350" cap="flat" cmpd="sng" algn="ctr">
+                      <a:noFill/>
+                      <a:prstDash val="solid"/>
+                      <a:miter lim="800000"/>
+                    </a:lnT>
+                    <a:lnB w="6350" cap="flat" cmpd="sng" algn="ctr">
+                      <a:noFill/>
+                      <a:prstDash val="solid"/>
+                      <a:miter lim="800000"/>
+                    </a:lnB>
+                    <a:lnTlToBr w="12700" cmpd="sng">
+                      <a:noFill/>
+                      <a:prstDash val="solid"/>
+                    </a:lnTlToBr>
+                    <a:lnBlToTr w="12700" cmpd="sng">
+                      <a:noFill/>
+                      <a:prstDash val="solid"/>
+                    </a:lnBlToTr>
+                    <a:solidFill>
+                      <a:schemeClr val="bg1"/>
+                    </a:solidFill>
+                  </a:tcPr>
+                </a:tc>
+                <a:extLst>
+                  <a:ext uri="{0D108BD9-81ED-4DB2-BD59-A6C34878D82A}">
+                    <a16:rowId xmlns:a16="http://schemas.microsoft.com/office/drawing/2014/main" val="2202148809"/>
+                  </a:ext>
+                </a:extLst>
+              </a:tr>
+              <a:tr h="1344920">
+                <a:tc>
+                  <a:txBody>
+                    <a:bodyPr/>
+                    <a:lstStyle/>
+                    <a:p>
+                      <a:pPr algn="ctr"/>
+                      <a:r>
+                        <a:rPr lang="en-US" sz="2000" b="1" dirty="0">
+                          <a:latin typeface="Agency FB" panose="020B0503020202020204" pitchFamily="34" charset="0"/>
+                        </a:rPr>
+                        <a:t>12 PM PT</a:t>
+                      </a:r>
+                    </a:p>
+                    <a:p>
+                      <a:pPr algn="ctr"/>
+                      <a:r>
+                        <a:rPr lang="en-US" sz="2000" b="1" dirty="0">
+                          <a:latin typeface="Agency FB" panose="020B0503020202020204" pitchFamily="34" charset="0"/>
+                        </a:rPr>
+                        <a:t>1 PM MT</a:t>
+                      </a:r>
+                    </a:p>
+                    <a:p>
+                      <a:pPr algn="ctr"/>
+                      <a:r>
+                        <a:rPr lang="en-US" sz="2000" dirty="0">
+                          <a:latin typeface="Agency FB" panose="020B0503020202020204" pitchFamily="34" charset="0"/>
+                        </a:rPr>
+                        <a:t>3 PM ET</a:t>
+                      </a:r>
+                    </a:p>
+                  </a:txBody>
+                  <a:tcPr marL="107715" marR="107715" marT="53858" marB="53858" anchor="ctr">
+                    <a:lnL w="6350" cap="flat" cmpd="sng" algn="ctr">
+                      <a:noFill/>
+                      <a:prstDash val="solid"/>
+                      <a:miter lim="800000"/>
+                    </a:lnL>
+                    <a:lnR>
+                      <a:noFill/>
+                    </a:lnR>
+                    <a:lnT w="6350" cap="flat" cmpd="sng" algn="ctr">
+                      <a:noFill/>
+                      <a:prstDash val="solid"/>
+                      <a:miter lim="800000"/>
+                    </a:lnT>
+                    <a:lnB w="6350" cap="flat" cmpd="sng" algn="ctr">
+                      <a:noFill/>
+                      <a:prstDash val="solid"/>
+                      <a:miter lim="800000"/>
+                    </a:lnB>
+                    <a:lnTlToBr w="12700" cmpd="sng">
+                      <a:noFill/>
+                      <a:prstDash val="solid"/>
+                    </a:lnTlToBr>
+                    <a:lnBlToTr w="12700" cmpd="sng">
+                      <a:noFill/>
+                      <a:prstDash val="solid"/>
+                    </a:lnBlToTr>
+                    <a:solidFill>
+                      <a:srgbClr val="ECE4EB"/>
+                    </a:solidFill>
+                  </a:tcPr>
+                </a:tc>
+                <a:tc>
+                  <a:txBody>
+                    <a:bodyPr/>
+                    <a:lstStyle/>
+                    <a:p>
+                      <a:pPr algn="ctr"/>
+                      <a:r>
+                        <a:rPr lang="en-US" sz="3400" dirty="0">
+                          <a:solidFill>
+                            <a:sysClr val="windowText" lastClr="000000"/>
+                          </a:solidFill>
+                          <a:latin typeface="Agency FB" panose="020B0503020202020204" pitchFamily="34" charset="0"/>
+                        </a:rPr>
+                        <a:t>Digital All-Stars (Monday only)</a:t>
+                      </a:r>
+                    </a:p>
+                    <a:p>
+                      <a:pPr algn="ctr"/>
+                      <a:r>
+                        <a:rPr lang="en-US" sz="3400" dirty="0">
+                          <a:solidFill>
+                            <a:sysClr val="windowText" lastClr="000000"/>
+                          </a:solidFill>
+                          <a:latin typeface="Agency FB" panose="020B0503020202020204" pitchFamily="34" charset="0"/>
+                        </a:rPr>
+                        <a:t>Landon Collins, Washington Redskins</a:t>
+                      </a:r>
+                    </a:p>
+                  </a:txBody>
+                  <a:tcPr marL="107715" marR="107715" marT="53858" marB="53858" anchor="ctr">
+                    <a:lnL>
+                      <a:noFill/>
+                    </a:lnL>
+                    <a:lnR w="6350" cap="flat" cmpd="sng" algn="ctr">
+                      <a:noFill/>
+                      <a:prstDash val="solid"/>
+                      <a:miter lim="800000"/>
+                    </a:lnR>
+                    <a:lnT w="6350" cap="flat" cmpd="sng" algn="ctr">
+                      <a:noFill/>
+                      <a:prstDash val="solid"/>
+                      <a:miter lim="800000"/>
+                    </a:lnT>
+                    <a:lnB w="6350" cap="flat" cmpd="sng" algn="ctr">
+                      <a:noFill/>
+                      <a:prstDash val="solid"/>
+                      <a:miter lim="800000"/>
+                    </a:lnB>
+                    <a:lnTlToBr w="12700" cmpd="sng">
+                      <a:noFill/>
+                      <a:prstDash val="solid"/>
+                    </a:lnTlToBr>
+                    <a:lnBlToTr w="12700" cmpd="sng">
+                      <a:noFill/>
+                      <a:prstDash val="solid"/>
+                    </a:lnBlToTr>
+                    <a:solidFill>
+                      <a:srgbClr val="ECE4EB"/>
+                    </a:solidFill>
+                  </a:tcPr>
+                </a:tc>
+                <a:extLst>
+                  <a:ext uri="{0D108BD9-81ED-4DB2-BD59-A6C34878D82A}">
+                    <a16:rowId xmlns:a16="http://schemas.microsoft.com/office/drawing/2014/main" val="2879450763"/>
+                  </a:ext>
+                </a:extLst>
+              </a:tr>
+              <a:tr h="843271">
+                <a:tc>
+                  <a:txBody>
+                    <a:bodyPr/>
+                    <a:lstStyle/>
+                    <a:p>
+                      <a:pPr algn="ctr"/>
+                      <a:r>
+                        <a:rPr lang="en-US" sz="2000" b="1" dirty="0">
+                          <a:latin typeface="Agency FB" panose="020B0503020202020204" pitchFamily="34" charset="0"/>
+                        </a:rPr>
+                        <a:t>12 PM PT</a:t>
+                      </a:r>
+                    </a:p>
+                    <a:p>
+                      <a:pPr algn="ctr"/>
+                      <a:r>
+                        <a:rPr lang="en-US" sz="2000" dirty="0">
+                          <a:latin typeface="Agency FB" panose="020B0503020202020204" pitchFamily="34" charset="0"/>
+                        </a:rPr>
+                        <a:t>3 PM ET</a:t>
+                      </a:r>
+                    </a:p>
+                  </a:txBody>
+                  <a:tcPr marL="107715" marR="107715" marT="53858" marB="53858" anchor="ctr">
+                    <a:lnL w="6350" cap="flat" cmpd="sng" algn="ctr">
+                      <a:noFill/>
+                      <a:prstDash val="solid"/>
+                      <a:miter lim="800000"/>
+                    </a:lnL>
+                    <a:lnR>
+                      <a:noFill/>
+                    </a:lnR>
+                    <a:lnT w="6350" cap="flat" cmpd="sng" algn="ctr">
+                      <a:noFill/>
+                      <a:prstDash val="solid"/>
+                      <a:miter lim="800000"/>
+                    </a:lnT>
+                    <a:lnB w="6350" cap="flat" cmpd="sng" algn="ctr">
+                      <a:noFill/>
+                      <a:prstDash val="solid"/>
+                      <a:miter lim="800000"/>
+                    </a:lnB>
+                    <a:lnTlToBr w="12700" cmpd="sng">
+                      <a:noFill/>
+                      <a:prstDash val="solid"/>
+                    </a:lnTlToBr>
+                    <a:lnBlToTr w="12700" cmpd="sng">
+                      <a:noFill/>
+                      <a:prstDash val="solid"/>
+                    </a:lnBlToTr>
+                    <a:solidFill>
+                      <a:schemeClr val="bg1"/>
+                    </a:solidFill>
+                  </a:tcPr>
+                </a:tc>
+                <a:tc>
+                  <a:txBody>
+                    <a:bodyPr/>
+                    <a:lstStyle/>
+                    <a:p>
+                      <a:pPr algn="ctr"/>
+                      <a:r>
+                        <a:rPr lang="en-US" sz="3400" dirty="0">
+                          <a:solidFill>
+                            <a:sysClr val="windowText" lastClr="000000"/>
+                          </a:solidFill>
+                          <a:latin typeface="Agency FB" panose="020B0503020202020204" pitchFamily="34" charset="0"/>
+                        </a:rPr>
+                        <a:t>MakeCode Live with John Park (Tuesday only)</a:t>
+                      </a:r>
+                    </a:p>
+                  </a:txBody>
+                  <a:tcPr marL="107715" marR="107715" marT="53858" marB="53858" anchor="ctr">
+                    <a:lnL>
+                      <a:noFill/>
+                    </a:lnL>
+                    <a:lnR w="6350" cap="flat" cmpd="sng" algn="ctr">
+                      <a:noFill/>
+                      <a:prstDash val="solid"/>
+                      <a:miter lim="800000"/>
+                    </a:lnR>
+                    <a:lnT w="6350" cap="flat" cmpd="sng" algn="ctr">
+                      <a:noFill/>
+                      <a:prstDash val="solid"/>
+                      <a:miter lim="800000"/>
+                    </a:lnT>
+                    <a:lnB w="6350" cap="flat" cmpd="sng" algn="ctr">
+                      <a:noFill/>
+                      <a:prstDash val="solid"/>
+                      <a:miter lim="800000"/>
+                    </a:lnB>
+                    <a:lnTlToBr w="12700" cmpd="sng">
+                      <a:noFill/>
+                      <a:prstDash val="solid"/>
+                    </a:lnTlToBr>
+                    <a:lnBlToTr w="12700" cmpd="sng">
+                      <a:noFill/>
+                      <a:prstDash val="solid"/>
+                    </a:lnBlToTr>
+                    <a:solidFill>
+                      <a:schemeClr val="bg1"/>
+                    </a:solidFill>
+                  </a:tcPr>
+                </a:tc>
+                <a:extLst>
+                  <a:ext uri="{0D108BD9-81ED-4DB2-BD59-A6C34878D82A}">
+                    <a16:rowId xmlns:a16="http://schemas.microsoft.com/office/drawing/2014/main" val="2667423859"/>
+                  </a:ext>
+                </a:extLst>
+              </a:tr>
+              <a:tr h="843271">
+                <a:tc>
+                  <a:txBody>
+                    <a:bodyPr/>
+                    <a:lstStyle/>
+                    <a:p>
+                      <a:pPr algn="ctr"/>
+                      <a:r>
+                        <a:rPr lang="en-US" sz="2000" b="1" dirty="0">
+                          <a:latin typeface="Agency FB" panose="020B0503020202020204" pitchFamily="34" charset="0"/>
+                        </a:rPr>
+                        <a:t>2 PM PT</a:t>
+                      </a:r>
+                    </a:p>
+                    <a:p>
+                      <a:pPr algn="ctr"/>
+                      <a:r>
+                        <a:rPr lang="en-US" sz="2000" dirty="0">
+                          <a:latin typeface="Agency FB" panose="020B0503020202020204" pitchFamily="34" charset="0"/>
+                        </a:rPr>
+                        <a:t>5PM ET</a:t>
+                      </a:r>
+                    </a:p>
+                  </a:txBody>
+                  <a:tcPr marL="107715" marR="107715" marT="53858" marB="53858" anchor="ctr">
+                    <a:lnL w="6350" cap="flat" cmpd="sng" algn="ctr">
+                      <a:noFill/>
+                      <a:prstDash val="solid"/>
+                      <a:miter lim="800000"/>
+                    </a:lnL>
+                    <a:lnR>
+                      <a:noFill/>
+                    </a:lnR>
+                    <a:lnT w="6350" cap="flat" cmpd="sng" algn="ctr">
+                      <a:noFill/>
+                      <a:prstDash val="solid"/>
+                      <a:miter lim="800000"/>
+                    </a:lnT>
+                    <a:lnB w="6350" cap="flat" cmpd="sng" algn="ctr">
+                      <a:noFill/>
+                      <a:prstDash val="solid"/>
+                      <a:miter lim="800000"/>
+                    </a:lnB>
+                    <a:lnTlToBr w="12700" cmpd="sng">
+                      <a:noFill/>
+                      <a:prstDash val="solid"/>
+                    </a:lnTlToBr>
+                    <a:lnBlToTr w="12700" cmpd="sng">
+                      <a:noFill/>
+                      <a:prstDash val="solid"/>
+                    </a:lnBlToTr>
+                    <a:solidFill>
+                      <a:srgbClr val="ECE4EB"/>
+                    </a:solidFill>
+                  </a:tcPr>
+                </a:tc>
+                <a:tc>
+                  <a:txBody>
+                    <a:bodyPr/>
+                    <a:lstStyle/>
+                    <a:p>
+                      <a:pPr algn="ctr"/>
+                      <a:r>
+                        <a:rPr lang="en-US" sz="3400" dirty="0">
+                          <a:latin typeface="Agency FB" panose="020B0503020202020204" pitchFamily="34" charset="0"/>
+                        </a:rPr>
+                        <a:t>MakeCode in the Kitchen (Friday only)</a:t>
+                      </a:r>
+                    </a:p>
+                  </a:txBody>
+                  <a:tcPr marL="107715" marR="107715" marT="53858" marB="53858" anchor="ctr">
+                    <a:lnL>
+                      <a:noFill/>
+                    </a:lnL>
+                    <a:lnR w="6350" cap="flat" cmpd="sng" algn="ctr">
+                      <a:noFill/>
+                      <a:prstDash val="solid"/>
+                      <a:miter lim="800000"/>
+                    </a:lnR>
+                    <a:lnT w="6350" cap="flat" cmpd="sng" algn="ctr">
+                      <a:noFill/>
+                      <a:prstDash val="solid"/>
+                      <a:miter lim="800000"/>
+                    </a:lnT>
+                    <a:lnB w="6350" cap="flat" cmpd="sng" algn="ctr">
+                      <a:noFill/>
+                      <a:prstDash val="solid"/>
+                      <a:miter lim="800000"/>
+                    </a:lnB>
+                    <a:lnTlToBr w="12700" cmpd="sng">
+                      <a:noFill/>
+                      <a:prstDash val="solid"/>
+                    </a:lnTlToBr>
+                    <a:lnBlToTr w="12700" cmpd="sng">
+                      <a:noFill/>
+                      <a:prstDash val="solid"/>
+                    </a:lnBlToTr>
+                    <a:solidFill>
+                      <a:srgbClr val="ECE4EB"/>
+                    </a:solidFill>
+                  </a:tcPr>
+                </a:tc>
+                <a:extLst>
+                  <a:ext uri="{0D108BD9-81ED-4DB2-BD59-A6C34878D82A}">
+                    <a16:rowId xmlns:a16="http://schemas.microsoft.com/office/drawing/2014/main" val="2354609438"/>
+                  </a:ext>
+                </a:extLst>
+              </a:tr>
+            </a:tbl>
+          </a:graphicData>
+        </a:graphic>
+      </p:graphicFrame>
+      <p:pic>
+        <p:nvPicPr>
+          <p:cNvPr id="6" name="Picture 5">
+            <a:extLst>
+              <a:ext uri="{FF2B5EF4-FFF2-40B4-BE49-F238E27FC236}">
+                <a16:creationId xmlns:a16="http://schemas.microsoft.com/office/drawing/2014/main" id="{DFA03610-80FC-4DFE-A985-E935A407F2D5}"/>
+              </a:ext>
+            </a:extLst>
+          </p:cNvPr>
+          <p:cNvPicPr>
+            <a:picLocks noChangeAspect="1"/>
+          </p:cNvPicPr>
+          <p:nvPr/>
+        </p:nvPicPr>
+        <p:blipFill>
+          <a:blip r:embed="rId3">
+            <a:clrChange>
+              <a:clrFrom>
+                <a:srgbClr val="FFFFFF"/>
+              </a:clrFrom>
+              <a:clrTo>
+                <a:srgbClr val="FFFFFF">
+                  <a:alpha val="0"/>
+                </a:srgbClr>
+              </a:clrTo>
+            </a:clrChange>
+          </a:blip>
+          <a:stretch>
+            <a:fillRect/>
+          </a:stretch>
+        </p:blipFill>
+        <p:spPr>
+          <a:xfrm rot="20891684">
+            <a:off x="9661190" y="7499776"/>
+            <a:ext cx="1585991" cy="1288260"/>
+          </a:xfrm>
+          <a:prstGeom prst="rect">
+            <a:avLst/>
+          </a:prstGeom>
+        </p:spPr>
+      </p:pic>
+      <p:pic>
+        <p:nvPicPr>
+          <p:cNvPr id="1026" name="Picture 2" descr="Image result for minecraft agent">
+            <a:extLst>
+              <a:ext uri="{FF2B5EF4-FFF2-40B4-BE49-F238E27FC236}">
+                <a16:creationId xmlns:a16="http://schemas.microsoft.com/office/drawing/2014/main" id="{88852689-71CA-442A-A4C5-81C1A8DFB04A}"/>
+              </a:ext>
+            </a:extLst>
+          </p:cNvPr>
+          <p:cNvPicPr>
+            <a:picLocks noChangeAspect="1" noChangeArrowheads="1"/>
+          </p:cNvPicPr>
+          <p:nvPr/>
+        </p:nvPicPr>
+        <p:blipFill>
+          <a:blip r:embed="rId4">
+            <a:extLst>
+              <a:ext uri="{28A0092B-C50C-407E-A947-70E740481C1C}">
+                <a14:useLocalDpi xmlns:a14="http://schemas.microsoft.com/office/drawing/2010/main" val="0"/>
+              </a:ext>
+            </a:extLst>
+          </a:blip>
+          <a:srcRect/>
+          <a:stretch>
+            <a:fillRect/>
+          </a:stretch>
+        </p:blipFill>
+        <p:spPr bwMode="auto">
+          <a:xfrm>
+            <a:off x="7180351" y="7026356"/>
+            <a:ext cx="1485444" cy="1909856"/>
+          </a:xfrm>
+          <a:prstGeom prst="rect">
+            <a:avLst/>
+          </a:prstGeom>
+          <a:noFill/>
+          <a:extLst>
+            <a:ext uri="{909E8E84-426E-40DD-AFC4-6F175D3DCCD1}">
+              <a14:hiddenFill xmlns:a14="http://schemas.microsoft.com/office/drawing/2010/main">
+                <a:solidFill>
+                  <a:srgbClr val="FFFFFF"/>
+                </a:solidFill>
+              </a14:hiddenFill>
+            </a:ext>
+          </a:extLst>
+        </p:spPr>
+      </p:pic>
+      <p:pic>
+        <p:nvPicPr>
+          <p:cNvPr id="20" name="Picture 19">
+            <a:extLst>
+              <a:ext uri="{FF2B5EF4-FFF2-40B4-BE49-F238E27FC236}">
+                <a16:creationId xmlns:a16="http://schemas.microsoft.com/office/drawing/2014/main" id="{48293F08-CD3E-4C65-96CD-5DF121F46256}"/>
+              </a:ext>
+            </a:extLst>
+          </p:cNvPr>
+          <p:cNvPicPr>
+            <a:picLocks noChangeAspect="1"/>
+          </p:cNvPicPr>
+          <p:nvPr/>
+        </p:nvPicPr>
+        <p:blipFill>
+          <a:blip r:embed="rId5">
+            <a:clrChange>
+              <a:clrFrom>
+                <a:srgbClr val="FFFFFF"/>
+              </a:clrFrom>
+              <a:clrTo>
+                <a:srgbClr val="FFFFFF">
+                  <a:alpha val="0"/>
+                </a:srgbClr>
+              </a:clrTo>
+            </a:clrChange>
+          </a:blip>
+          <a:stretch>
+            <a:fillRect/>
+          </a:stretch>
+        </p:blipFill>
+        <p:spPr>
+          <a:xfrm>
+            <a:off x="4909602" y="7150779"/>
+            <a:ext cx="1579177" cy="1986253"/>
+          </a:xfrm>
+          <a:prstGeom prst="rect">
+            <a:avLst/>
+          </a:prstGeom>
+        </p:spPr>
+      </p:pic>
+      <p:pic>
+        <p:nvPicPr>
+          <p:cNvPr id="21" name="Picture 20">
+            <a:extLst>
+              <a:ext uri="{FF2B5EF4-FFF2-40B4-BE49-F238E27FC236}">
+                <a16:creationId xmlns:a16="http://schemas.microsoft.com/office/drawing/2014/main" id="{7B9D8333-3412-4B90-9070-714BFAC66DE1}"/>
+              </a:ext>
+            </a:extLst>
+          </p:cNvPr>
+          <p:cNvPicPr>
+            <a:picLocks noChangeAspect="1"/>
+          </p:cNvPicPr>
+          <p:nvPr/>
+        </p:nvPicPr>
+        <p:blipFill>
+          <a:blip r:embed="rId6">
+            <a:clrChange>
+              <a:clrFrom>
+                <a:srgbClr val="FAFAFA"/>
+              </a:clrFrom>
+              <a:clrTo>
+                <a:srgbClr val="FAFAFA">
+                  <a:alpha val="0"/>
+                </a:srgbClr>
+              </a:clrTo>
+            </a:clrChange>
+          </a:blip>
+          <a:stretch>
+            <a:fillRect/>
+          </a:stretch>
+        </p:blipFill>
+        <p:spPr>
+          <a:xfrm>
+            <a:off x="8039644" y="2684693"/>
+            <a:ext cx="4225143" cy="4188402"/>
+          </a:xfrm>
+          <a:prstGeom prst="rect">
+            <a:avLst/>
+          </a:prstGeom>
+        </p:spPr>
+      </p:pic>
+      <p:pic>
+        <p:nvPicPr>
+          <p:cNvPr id="22" name="Picture 21">
+            <a:extLst>
+              <a:ext uri="{FF2B5EF4-FFF2-40B4-BE49-F238E27FC236}">
+                <a16:creationId xmlns:a16="http://schemas.microsoft.com/office/drawing/2014/main" id="{A98EC812-E79E-4C80-A59D-65E79E1E6801}"/>
+              </a:ext>
+            </a:extLst>
+          </p:cNvPr>
+          <p:cNvPicPr>
+            <a:picLocks noChangeAspect="1"/>
+          </p:cNvPicPr>
+          <p:nvPr/>
+        </p:nvPicPr>
+        <p:blipFill>
+          <a:blip r:embed="rId7">
+            <a:clrChange>
+              <a:clrFrom>
+                <a:srgbClr val="FFFFFF"/>
+              </a:clrFrom>
+              <a:clrTo>
+                <a:srgbClr val="FFFFFF">
+                  <a:alpha val="0"/>
+                </a:srgbClr>
+              </a:clrTo>
+            </a:clrChange>
+          </a:blip>
+          <a:stretch>
+            <a:fillRect/>
+          </a:stretch>
+        </p:blipFill>
+        <p:spPr>
+          <a:xfrm rot="21244650">
+            <a:off x="2288230" y="7073140"/>
+            <a:ext cx="1441710" cy="1454888"/>
+          </a:xfrm>
+          <a:prstGeom prst="rect">
+            <a:avLst/>
+          </a:prstGeom>
+        </p:spPr>
+      </p:pic>
+      <p:pic>
+        <p:nvPicPr>
+          <p:cNvPr id="3" name="Picture 2" descr="A picture containing shirt&#10;&#10;Description automatically generated">
+            <a:extLst>
+              <a:ext uri="{FF2B5EF4-FFF2-40B4-BE49-F238E27FC236}">
+                <a16:creationId xmlns:a16="http://schemas.microsoft.com/office/drawing/2014/main" id="{F0DCA003-393A-41D2-8AE3-C0653694807A}"/>
+              </a:ext>
+            </a:extLst>
+          </p:cNvPr>
+          <p:cNvPicPr>
+            <a:picLocks noChangeAspect="1"/>
+          </p:cNvPicPr>
+          <p:nvPr/>
+        </p:nvPicPr>
+        <p:blipFill rotWithShape="1">
+          <a:blip r:embed="rId8">
+            <a:extLst>
+              <a:ext uri="{28A0092B-C50C-407E-A947-70E740481C1C}">
+                <a14:useLocalDpi xmlns:a14="http://schemas.microsoft.com/office/drawing/2010/main" val="0"/>
+              </a:ext>
+            </a:extLst>
+          </a:blip>
+          <a:srcRect l="33838" t="34344" r="34847" b="18249"/>
+          <a:stretch/>
+        </p:blipFill>
+        <p:spPr>
+          <a:xfrm>
+            <a:off x="2100059" y="3406670"/>
+            <a:ext cx="810762" cy="1534346"/>
+          </a:xfrm>
+          <a:prstGeom prst="rect">
+            <a:avLst/>
+          </a:prstGeom>
+        </p:spPr>
+      </p:pic>
+    </p:spTree>
+    <p:extLst>
+      <p:ext uri="{BB962C8B-B14F-4D97-AF65-F5344CB8AC3E}">
+        <p14:creationId xmlns:p14="http://schemas.microsoft.com/office/powerpoint/2010/main" val="3791738392"/>
+      </p:ext>
+    </p:extLst>
+  </p:cSld>
+  <p:clrMapOvr>
+    <a:masterClrMapping/>
+  </p:clrMapOvr>
+</p:sld>
+</file>
+
+<file path=ppt/slides/slide8.xml><?xml version="1.0" encoding="utf-8"?>
 <p:sld xmlns:a="http://schemas.openxmlformats.org/drawingml/2006/main" xmlns:r="http://schemas.openxmlformats.org/officeDocument/2006/relationships" xmlns:p="http://schemas.openxmlformats.org/presentationml/2006/main">
   <p:cSld>
     <p:bg>
@@ -12539,6 +13737,21 @@
 </file>
 
 <file path=customXml/item1.xml><?xml version="1.0" encoding="utf-8"?>
+<p:properties xmlns:p="http://schemas.microsoft.com/office/2006/metadata/properties" xmlns:xsi="http://www.w3.org/2001/XMLSchema-instance" xmlns:pc="http://schemas.microsoft.com/office/infopath/2007/PartnerControls">
+  <documentManagement/>
+</p:properties>
+</file>
+
+<file path=customXml/item2.xml><?xml version="1.0" encoding="utf-8"?>
+<?mso-contentType ?>
+<FormTemplates xmlns="http://schemas.microsoft.com/sharepoint/v3/contenttype/forms">
+  <Display>DocumentLibraryForm</Display>
+  <Edit>DocumentLibraryForm</Edit>
+  <New>DocumentLibraryForm</New>
+</FormTemplates>
+</file>
+
+<file path=customXml/item3.xml><?xml version="1.0" encoding="utf-8"?>
 <ct:contentTypeSchema xmlns:ct="http://schemas.microsoft.com/office/2006/metadata/contentType" xmlns:ma="http://schemas.microsoft.com/office/2006/metadata/properties/metaAttributes" ct:_="" ma:_="" ma:contentTypeName="Document" ma:contentTypeID="0x010100860CD5D9B0436D4CAD5600AE7CA2E713" ma:contentTypeVersion="5" ma:contentTypeDescription="Create a new document." ma:contentTypeScope="" ma:versionID="82efc5ef0cc70a930dc0dd44bc7a59e5">
   <xsd:schema xmlns:xsd="http://www.w3.org/2001/XMLSchema" xmlns:xs="http://www.w3.org/2001/XMLSchema" xmlns:p="http://schemas.microsoft.com/office/2006/metadata/properties" xmlns:ns3="88ced256-c029-4233-a058-f3ec71fefdbe" xmlns:ns4="999ce889-1043-45e4-86ca-a56cfe2271af" targetNamespace="http://schemas.microsoft.com/office/2006/metadata/properties" ma:root="true" ma:fieldsID="df5615878e1656ee4e772df057bbfd02" ns3:_="" ns4:_="">
     <xsd:import namespace="88ced256-c029-4233-a058-f3ec71fefdbe"/>
@@ -12709,22 +13922,32 @@
 </ct:contentTypeSchema>
 </file>
 
-<file path=customXml/item2.xml><?xml version="1.0" encoding="utf-8"?>
-<?mso-contentType ?>
-<FormTemplates xmlns="http://schemas.microsoft.com/sharepoint/v3/contenttype/forms">
-  <Display>DocumentLibraryForm</Display>
-  <Edit>DocumentLibraryForm</Edit>
-  <New>DocumentLibraryForm</New>
-</FormTemplates>
+<file path=customXml/itemProps1.xml><?xml version="1.0" encoding="utf-8"?>
+<ds:datastoreItem xmlns:ds="http://schemas.openxmlformats.org/officeDocument/2006/customXml" ds:itemID="{60259DF6-DA4D-4E1C-9935-A04345E6A0FE}">
+  <ds:schemaRefs>
+    <ds:schemaRef ds:uri="http://schemas.microsoft.com/office/2006/metadata/properties"/>
+    <ds:schemaRef ds:uri="88ced256-c029-4233-a058-f3ec71fefdbe"/>
+    <ds:schemaRef ds:uri="http://schemas.microsoft.com/office/infopath/2007/PartnerControls"/>
+    <ds:schemaRef ds:uri="999ce889-1043-45e4-86ca-a56cfe2271af"/>
+    <ds:schemaRef ds:uri="http://purl.org/dc/dcmitype/"/>
+    <ds:schemaRef ds:uri="http://purl.org/dc/terms/"/>
+    <ds:schemaRef ds:uri="http://schemas.microsoft.com/office/2006/documentManagement/types"/>
+    <ds:schemaRef ds:uri="http://purl.org/dc/elements/1.1/"/>
+    <ds:schemaRef ds:uri="http://schemas.openxmlformats.org/package/2006/metadata/core-properties"/>
+    <ds:schemaRef ds:uri="http://www.w3.org/XML/1998/namespace"/>
+  </ds:schemaRefs>
+</ds:datastoreItem>
 </file>
 
-<file path=customXml/item3.xml><?xml version="1.0" encoding="utf-8"?>
-<p:properties xmlns:p="http://schemas.microsoft.com/office/2006/metadata/properties" xmlns:xsi="http://www.w3.org/2001/XMLSchema-instance" xmlns:pc="http://schemas.microsoft.com/office/infopath/2007/PartnerControls">
-  <documentManagement/>
-</p:properties>
+<file path=customXml/itemProps2.xml><?xml version="1.0" encoding="utf-8"?>
+<ds:datastoreItem xmlns:ds="http://schemas.openxmlformats.org/officeDocument/2006/customXml" ds:itemID="{4080D5DD-FD7F-4E53-9DDB-1149624B0AF8}">
+  <ds:schemaRefs>
+    <ds:schemaRef ds:uri="http://schemas.microsoft.com/sharepoint/v3/contenttype/forms"/>
+  </ds:schemaRefs>
+</ds:datastoreItem>
 </file>
 
-<file path=customXml/itemProps1.xml><?xml version="1.0" encoding="utf-8"?>
+<file path=customXml/itemProps3.xml><?xml version="1.0" encoding="utf-8"?>
 <ds:datastoreItem xmlns:ds="http://schemas.openxmlformats.org/officeDocument/2006/customXml" ds:itemID="{48DDB3CD-7A26-4427-A010-5E4AD2CBA3CF}">
   <ds:schemaRefs>
     <ds:schemaRef ds:uri="http://schemas.microsoft.com/office/2006/metadata/contentType"/>
@@ -12741,29 +13964,4 @@
     <ds:schemaRef ds:uri="http://schemas.microsoft.com/internal/obd"/>
   </ds:schemaRefs>
 </ds:datastoreItem>
-</file>
-
-<file path=customXml/itemProps2.xml><?xml version="1.0" encoding="utf-8"?>
-<ds:datastoreItem xmlns:ds="http://schemas.openxmlformats.org/officeDocument/2006/customXml" ds:itemID="{4080D5DD-FD7F-4E53-9DDB-1149624B0AF8}">
-  <ds:schemaRefs>
-    <ds:schemaRef ds:uri="http://schemas.microsoft.com/sharepoint/v3/contenttype/forms"/>
-  </ds:schemaRefs>
-</ds:datastoreItem>
-</file>
-
-<file path=customXml/itemProps3.xml><?xml version="1.0" encoding="utf-8"?>
-<ds:datastoreItem xmlns:ds="http://schemas.openxmlformats.org/officeDocument/2006/customXml" ds:itemID="{60259DF6-DA4D-4E1C-9935-A04345E6A0FE}">
-  <ds:schemaRefs>
-    <ds:schemaRef ds:uri="http://schemas.microsoft.com/office/2006/metadata/properties"/>
-    <ds:schemaRef ds:uri="88ced256-c029-4233-a058-f3ec71fefdbe"/>
-    <ds:schemaRef ds:uri="http://schemas.microsoft.com/office/infopath/2007/PartnerControls"/>
-    <ds:schemaRef ds:uri="999ce889-1043-45e4-86ca-a56cfe2271af"/>
-    <ds:schemaRef ds:uri="http://purl.org/dc/dcmitype/"/>
-    <ds:schemaRef ds:uri="http://purl.org/dc/terms/"/>
-    <ds:schemaRef ds:uri="http://schemas.microsoft.com/office/2006/documentManagement/types"/>
-    <ds:schemaRef ds:uri="http://purl.org/dc/elements/1.1/"/>
-    <ds:schemaRef ds:uri="http://schemas.openxmlformats.org/package/2006/metadata/core-properties"/>
-    <ds:schemaRef ds:uri="http://www.w3.org/XML/1998/namespace"/>
-  </ds:schemaRefs>
-</ds:datastoreItem>
 </file>
</xml_diff>

<commit_message>
Added micro:bit 2020 release stream
</commit_message>
<xml_diff>
--- a/docs/static/online-learning/Mixer Stream Schedule.pptx
+++ b/docs/static/online-learning/Mixer Stream Schedule.pptx
@@ -212,7 +212,7 @@
           <a:p>
             <a:fld id="{9820A582-7AE2-4948-B06A-742F9F045A83}" type="datetimeFigureOut">
               <a:rPr lang="en-US" smtClean="0"/>
-              <a:t>4/27/2020</a:t>
+              <a:t>4/28/2020</a:t>
             </a:fld>
             <a:endParaRPr lang="en-US"/>
           </a:p>
@@ -1298,7 +1298,7 @@
           <a:p>
             <a:fld id="{EE18C4CC-5113-4103-95F7-16AD5B06551D}" type="datetimeFigureOut">
               <a:rPr lang="en-US" smtClean="0"/>
-              <a:t>4/27/2020</a:t>
+              <a:t>4/28/2020</a:t>
             </a:fld>
             <a:endParaRPr lang="en-US"/>
           </a:p>
@@ -1496,7 +1496,7 @@
           <a:p>
             <a:fld id="{EE18C4CC-5113-4103-95F7-16AD5B06551D}" type="datetimeFigureOut">
               <a:rPr lang="en-US" smtClean="0"/>
-              <a:t>4/27/2020</a:t>
+              <a:t>4/28/2020</a:t>
             </a:fld>
             <a:endParaRPr lang="en-US"/>
           </a:p>
@@ -1704,7 +1704,7 @@
           <a:p>
             <a:fld id="{EE18C4CC-5113-4103-95F7-16AD5B06551D}" type="datetimeFigureOut">
               <a:rPr lang="en-US" smtClean="0"/>
-              <a:t>4/27/2020</a:t>
+              <a:t>4/28/2020</a:t>
             </a:fld>
             <a:endParaRPr lang="en-US"/>
           </a:p>
@@ -1902,7 +1902,7 @@
           <a:p>
             <a:fld id="{EE18C4CC-5113-4103-95F7-16AD5B06551D}" type="datetimeFigureOut">
               <a:rPr lang="en-US" smtClean="0"/>
-              <a:t>4/27/2020</a:t>
+              <a:t>4/28/2020</a:t>
             </a:fld>
             <a:endParaRPr lang="en-US"/>
           </a:p>
@@ -2177,7 +2177,7 @@
           <a:p>
             <a:fld id="{EE18C4CC-5113-4103-95F7-16AD5B06551D}" type="datetimeFigureOut">
               <a:rPr lang="en-US" smtClean="0"/>
-              <a:t>4/27/2020</a:t>
+              <a:t>4/28/2020</a:t>
             </a:fld>
             <a:endParaRPr lang="en-US"/>
           </a:p>
@@ -2442,7 +2442,7 @@
           <a:p>
             <a:fld id="{EE18C4CC-5113-4103-95F7-16AD5B06551D}" type="datetimeFigureOut">
               <a:rPr lang="en-US" smtClean="0"/>
-              <a:t>4/27/2020</a:t>
+              <a:t>4/28/2020</a:t>
             </a:fld>
             <a:endParaRPr lang="en-US"/>
           </a:p>
@@ -2854,7 +2854,7 @@
           <a:p>
             <a:fld id="{EE18C4CC-5113-4103-95F7-16AD5B06551D}" type="datetimeFigureOut">
               <a:rPr lang="en-US" smtClean="0"/>
-              <a:t>4/27/2020</a:t>
+              <a:t>4/28/2020</a:t>
             </a:fld>
             <a:endParaRPr lang="en-US"/>
           </a:p>
@@ -2995,7 +2995,7 @@
           <a:p>
             <a:fld id="{EE18C4CC-5113-4103-95F7-16AD5B06551D}" type="datetimeFigureOut">
               <a:rPr lang="en-US" smtClean="0"/>
-              <a:t>4/27/2020</a:t>
+              <a:t>4/28/2020</a:t>
             </a:fld>
             <a:endParaRPr lang="en-US"/>
           </a:p>
@@ -3108,7 +3108,7 @@
           <a:p>
             <a:fld id="{EE18C4CC-5113-4103-95F7-16AD5B06551D}" type="datetimeFigureOut">
               <a:rPr lang="en-US" smtClean="0"/>
-              <a:t>4/27/2020</a:t>
+              <a:t>4/28/2020</a:t>
             </a:fld>
             <a:endParaRPr lang="en-US"/>
           </a:p>
@@ -3419,7 +3419,7 @@
           <a:p>
             <a:fld id="{EE18C4CC-5113-4103-95F7-16AD5B06551D}" type="datetimeFigureOut">
               <a:rPr lang="en-US" smtClean="0"/>
-              <a:t>4/27/2020</a:t>
+              <a:t>4/28/2020</a:t>
             </a:fld>
             <a:endParaRPr lang="en-US"/>
           </a:p>
@@ -3707,7 +3707,7 @@
           <a:p>
             <a:fld id="{EE18C4CC-5113-4103-95F7-16AD5B06551D}" type="datetimeFigureOut">
               <a:rPr lang="en-US" smtClean="0"/>
-              <a:t>4/27/2020</a:t>
+              <a:t>4/28/2020</a:t>
             </a:fld>
             <a:endParaRPr lang="en-US"/>
           </a:p>
@@ -3948,7 +3948,7 @@
           <a:p>
             <a:fld id="{EE18C4CC-5113-4103-95F7-16AD5B06551D}" type="datetimeFigureOut">
               <a:rPr lang="en-US" smtClean="0"/>
-              <a:t>4/27/2020</a:t>
+              <a:t>4/28/2020</a:t>
             </a:fld>
             <a:endParaRPr lang="en-US"/>
           </a:p>
@@ -10802,13 +10802,13 @@
           <p:nvPr>
             <p:extLst>
               <p:ext uri="{D42A27DB-BD31-4B8C-83A1-F6EECF244321}">
-                <p14:modId xmlns:p14="http://schemas.microsoft.com/office/powerpoint/2010/main" val="3416560680"/>
+                <p14:modId xmlns:p14="http://schemas.microsoft.com/office/powerpoint/2010/main" val="2316542989"/>
               </p:ext>
             </p:extLst>
           </p:nvPr>
         </p:nvGraphicFramePr>
         <p:xfrm>
-          <a:off x="149392" y="325698"/>
+          <a:off x="149392" y="156658"/>
           <a:ext cx="5456531" cy="4496836"/>
         </p:xfrm>
         <a:graphic>
@@ -11642,14 +11642,14 @@
           <p:nvPr>
             <p:extLst>
               <p:ext uri="{D42A27DB-BD31-4B8C-83A1-F6EECF244321}">
-                <p14:modId xmlns:p14="http://schemas.microsoft.com/office/powerpoint/2010/main" val="4293005076"/>
+                <p14:modId xmlns:p14="http://schemas.microsoft.com/office/powerpoint/2010/main" val="3802617613"/>
               </p:ext>
             </p:extLst>
           </p:nvPr>
         </p:nvGraphicFramePr>
         <p:xfrm>
-          <a:off x="5699190" y="325698"/>
-          <a:ext cx="6219325" cy="5888327"/>
+          <a:off x="5699190" y="156658"/>
+          <a:ext cx="6219325" cy="6544683"/>
         </p:xfrm>
         <a:graphic>
           <a:graphicData uri="http://schemas.openxmlformats.org/drawingml/2006/table">
@@ -11665,14 +11665,14 @@
                     </a:ext>
                   </a:extLst>
                 </a:gridCol>
-                <a:gridCol w="1219200">
+                <a:gridCol w="1150308">
                   <a:extLst>
                     <a:ext uri="{9D8B030D-6E8A-4147-A177-3AD203B41FA5}">
                       <a16:colId xmlns:a16="http://schemas.microsoft.com/office/drawing/2014/main" val="1510224491"/>
                     </a:ext>
                   </a:extLst>
                 </a:gridCol>
-                <a:gridCol w="3427999">
+                <a:gridCol w="3496891">
                   <a:extLst>
                     <a:ext uri="{9D8B030D-6E8A-4147-A177-3AD203B41FA5}">
                       <a16:colId xmlns:a16="http://schemas.microsoft.com/office/drawing/2014/main" val="21893690"/>
@@ -12108,7 +12108,7 @@
                     <a:p>
                       <a:pPr algn="ctr"/>
                       <a:r>
-                        <a:rPr lang="en-US" sz="3600" dirty="0">
+                        <a:rPr lang="en-US" sz="3400" dirty="0">
                           <a:solidFill>
                             <a:sysClr val="windowText" lastClr="000000"/>
                           </a:solidFill>
@@ -12120,7 +12120,7 @@
                     <a:p>
                       <a:pPr algn="ctr"/>
                       <a:r>
-                        <a:rPr lang="en-US" sz="3600" dirty="0">
+                        <a:rPr lang="en-US" sz="3400" dirty="0">
                           <a:solidFill>
                             <a:sysClr val="windowText" lastClr="000000"/>
                           </a:solidFill>
@@ -12285,7 +12285,7 @@
                     <a:p>
                       <a:pPr algn="ctr"/>
                       <a:r>
-                        <a:rPr lang="en-US" sz="3600" dirty="0">
+                        <a:rPr lang="en-US" sz="3400" dirty="0">
                           <a:solidFill>
                             <a:sysClr val="windowText" lastClr="000000"/>
                           </a:solidFill>
@@ -12297,7 +12297,7 @@
                     <a:p>
                       <a:pPr algn="ctr"/>
                       <a:r>
-                        <a:rPr lang="en-US" sz="3600" dirty="0">
+                        <a:rPr lang="en-US" sz="3400" dirty="0">
                           <a:solidFill>
                             <a:sysClr val="windowText" lastClr="000000"/>
                           </a:solidFill>
@@ -12462,7 +12462,7 @@
                     <a:p>
                       <a:pPr algn="ctr"/>
                       <a:r>
-                        <a:rPr lang="en-US" sz="3600" dirty="0">
+                        <a:rPr lang="en-US" sz="3400" dirty="0">
                           <a:latin typeface="Agency FB" panose="020B0503020202020204" pitchFamily="34" charset="0"/>
                         </a:rPr>
                         <a:t>WeCodeMakeCode</a:t>
@@ -12522,7 +12522,7 @@
                         <a:rPr lang="en-US" sz="2800" dirty="0">
                           <a:latin typeface="Agency FB" panose="020B0503020202020204" pitchFamily="34" charset="0"/>
                         </a:rPr>
-                        <a:t>FRIDAY</a:t>
+                        <a:t>THURSDAY</a:t>
                       </a:r>
                     </a:p>
                   </a:txBody>
@@ -12545,9 +12545,7 @@
                       <a:miter lim="800000"/>
                     </a:lnT>
                     <a:lnB w="12700" cap="flat" cmpd="sng" algn="ctr">
-                      <a:solidFill>
-                        <a:srgbClr val="5D406C"/>
-                      </a:solidFill>
+                      <a:noFill/>
                       <a:prstDash val="solid"/>
                       <a:round/>
                       <a:headEnd type="none" w="med" len="med"/>
@@ -12576,7 +12574,7 @@
                         <a:rPr lang="en-US" sz="2200" b="1" dirty="0">
                           <a:latin typeface="Agency FB" panose="020B0503020202020204" pitchFamily="34" charset="0"/>
                         </a:rPr>
-                        <a:t>2 PM PT</a:t>
+                        <a:t>1 PM PT</a:t>
                       </a:r>
                     </a:p>
                     <a:p>
@@ -12585,7 +12583,7 @@
                         <a:rPr lang="en-US" sz="2200" dirty="0">
                           <a:latin typeface="Agency FB" panose="020B0503020202020204" pitchFamily="34" charset="0"/>
                         </a:rPr>
-                        <a:t>5PM ET</a:t>
+                        <a:t>4 PM ET</a:t>
                       </a:r>
                     </a:p>
                   </a:txBody>
@@ -12604,9 +12602,7 @@
                       <a:miter lim="800000"/>
                     </a:lnT>
                     <a:lnB w="12700" cap="flat" cmpd="sng" algn="ctr">
-                      <a:solidFill>
-                        <a:srgbClr val="5D406C"/>
-                      </a:solidFill>
+                      <a:noFill/>
                       <a:prstDash val="solid"/>
                       <a:round/>
                       <a:headEnd type="none" w="med" len="med"/>
@@ -12632,7 +12628,179 @@
                     <a:p>
                       <a:pPr algn="ctr"/>
                       <a:r>
-                        <a:rPr lang="en-US" sz="3600" dirty="0">
+                        <a:rPr lang="en-US" sz="3400" dirty="0">
+                          <a:latin typeface="Agency FB" panose="020B0503020202020204" pitchFamily="34" charset="0"/>
+                        </a:rPr>
+                        <a:t>Micro:bit 2020 Beta Release!</a:t>
+                      </a:r>
+                    </a:p>
+                  </a:txBody>
+                  <a:tcPr marL="107715" marR="107715" marT="53858" marB="53858" anchor="ctr">
+                    <a:lnL>
+                      <a:noFill/>
+                    </a:lnL>
+                    <a:lnR w="12700" cap="flat" cmpd="sng" algn="ctr">
+                      <a:solidFill>
+                        <a:srgbClr val="5D406C"/>
+                      </a:solidFill>
+                      <a:prstDash val="solid"/>
+                      <a:round/>
+                      <a:headEnd type="none" w="med" len="med"/>
+                      <a:tailEnd type="none" w="med" len="med"/>
+                    </a:lnR>
+                    <a:lnT w="6350" cap="flat" cmpd="sng" algn="ctr">
+                      <a:noFill/>
+                      <a:prstDash val="solid"/>
+                      <a:miter lim="800000"/>
+                    </a:lnT>
+                    <a:lnB w="12700" cap="flat" cmpd="sng" algn="ctr">
+                      <a:noFill/>
+                      <a:prstDash val="solid"/>
+                      <a:round/>
+                      <a:headEnd type="none" w="med" len="med"/>
+                      <a:tailEnd type="none" w="med" len="med"/>
+                    </a:lnB>
+                    <a:lnTlToBr w="12700" cmpd="sng">
+                      <a:noFill/>
+                      <a:prstDash val="solid"/>
+                    </a:lnTlToBr>
+                    <a:lnBlToTr w="12700" cmpd="sng">
+                      <a:noFill/>
+                      <a:prstDash val="solid"/>
+                    </a:lnBlToTr>
+                    <a:solidFill>
+                      <a:schemeClr val="bg1"/>
+                    </a:solidFill>
+                  </a:tcPr>
+                </a:tc>
+                <a:extLst>
+                  <a:ext uri="{0D108BD9-81ED-4DB2-BD59-A6C34878D82A}">
+                    <a16:rowId xmlns:a16="http://schemas.microsoft.com/office/drawing/2014/main" val="1154188928"/>
+                  </a:ext>
+                </a:extLst>
+              </a:tr>
+              <a:tr h="775617">
+                <a:tc>
+                  <a:txBody>
+                    <a:bodyPr/>
+                    <a:lstStyle/>
+                    <a:p>
+                      <a:pPr algn="ctr"/>
+                      <a:r>
+                        <a:rPr lang="en-US" sz="2800" dirty="0">
+                          <a:latin typeface="Agency FB" panose="020B0503020202020204" pitchFamily="34" charset="0"/>
+                        </a:rPr>
+                        <a:t>FRIDAY</a:t>
+                      </a:r>
+                    </a:p>
+                  </a:txBody>
+                  <a:tcPr marL="107715" marR="107715" marT="53858" marB="53858" anchor="ctr">
+                    <a:lnL w="12700" cap="flat" cmpd="sng" algn="ctr">
+                      <a:solidFill>
+                        <a:srgbClr val="5D406C"/>
+                      </a:solidFill>
+                      <a:prstDash val="solid"/>
+                      <a:round/>
+                      <a:headEnd type="none" w="med" len="med"/>
+                      <a:tailEnd type="none" w="med" len="med"/>
+                    </a:lnL>
+                    <a:lnR>
+                      <a:noFill/>
+                    </a:lnR>
+                    <a:lnT w="6350" cap="flat" cmpd="sng" algn="ctr">
+                      <a:noFill/>
+                      <a:prstDash val="solid"/>
+                      <a:miter lim="800000"/>
+                    </a:lnT>
+                    <a:lnB w="12700" cap="flat" cmpd="sng" algn="ctr">
+                      <a:solidFill>
+                        <a:srgbClr val="5D406C"/>
+                      </a:solidFill>
+                      <a:prstDash val="solid"/>
+                      <a:round/>
+                      <a:headEnd type="none" w="med" len="med"/>
+                      <a:tailEnd type="none" w="med" len="med"/>
+                    </a:lnB>
+                    <a:lnTlToBr w="12700" cmpd="sng">
+                      <a:noFill/>
+                      <a:prstDash val="solid"/>
+                    </a:lnTlToBr>
+                    <a:lnBlToTr w="12700" cmpd="sng">
+                      <a:noFill/>
+                      <a:prstDash val="solid"/>
+                    </a:lnBlToTr>
+                    <a:solidFill>
+                      <a:schemeClr val="bg1"/>
+                    </a:solidFill>
+                  </a:tcPr>
+                </a:tc>
+                <a:tc>
+                  <a:txBody>
+                    <a:bodyPr/>
+                    <a:lstStyle/>
+                    <a:p>
+                      <a:pPr algn="ctr"/>
+                      <a:r>
+                        <a:rPr lang="en-US" sz="2200" b="1" dirty="0">
+                          <a:latin typeface="Agency FB" panose="020B0503020202020204" pitchFamily="34" charset="0"/>
+                        </a:rPr>
+                        <a:t>2 PM PT</a:t>
+                      </a:r>
+                    </a:p>
+                    <a:p>
+                      <a:pPr algn="ctr"/>
+                      <a:r>
+                        <a:rPr lang="en-US" sz="2200" dirty="0">
+                          <a:latin typeface="Agency FB" panose="020B0503020202020204" pitchFamily="34" charset="0"/>
+                        </a:rPr>
+                        <a:t>5PM ET</a:t>
+                      </a:r>
+                    </a:p>
+                  </a:txBody>
+                  <a:tcPr marL="107715" marR="107715" marT="53858" marB="53858" anchor="ctr">
+                    <a:lnL w="6350" cap="flat" cmpd="sng" algn="ctr">
+                      <a:noFill/>
+                      <a:prstDash val="solid"/>
+                      <a:miter lim="800000"/>
+                    </a:lnL>
+                    <a:lnR>
+                      <a:noFill/>
+                    </a:lnR>
+                    <a:lnT w="6350" cap="flat" cmpd="sng" algn="ctr">
+                      <a:noFill/>
+                      <a:prstDash val="solid"/>
+                      <a:miter lim="800000"/>
+                    </a:lnT>
+                    <a:lnB w="12700" cap="flat" cmpd="sng" algn="ctr">
+                      <a:solidFill>
+                        <a:srgbClr val="5D406C"/>
+                      </a:solidFill>
+                      <a:prstDash val="solid"/>
+                      <a:round/>
+                      <a:headEnd type="none" w="med" len="med"/>
+                      <a:tailEnd type="none" w="med" len="med"/>
+                    </a:lnB>
+                    <a:lnTlToBr w="12700" cmpd="sng">
+                      <a:noFill/>
+                      <a:prstDash val="solid"/>
+                    </a:lnTlToBr>
+                    <a:lnBlToTr w="12700" cmpd="sng">
+                      <a:noFill/>
+                      <a:prstDash val="solid"/>
+                    </a:lnBlToTr>
+                    <a:solidFill>
+                      <a:schemeClr val="bg1"/>
+                    </a:solidFill>
+                  </a:tcPr>
+                </a:tc>
+                <a:tc>
+                  <a:txBody>
+                    <a:bodyPr/>
+                    <a:lstStyle/>
+                    <a:p>
+                      <a:pPr algn="ctr"/>
+                      <a:r>
+                        <a:rPr lang="en-US" sz="3400" dirty="0">
                           <a:latin typeface="Agency FB" panose="020B0503020202020204" pitchFamily="34" charset="0"/>
                         </a:rPr>
                         <a:t>MakeCode in the Kitchen</a:t>
@@ -12716,7 +12884,7 @@
         </p:blipFill>
         <p:spPr>
           <a:xfrm>
-            <a:off x="8354821" y="1840308"/>
+            <a:off x="8407292" y="1694004"/>
             <a:ext cx="621947" cy="1177019"/>
           </a:xfrm>
           <a:prstGeom prst="rect">
@@ -12826,6 +12994,129 @@
           </a:prstGeom>
         </p:spPr>
       </p:pic>
+      <p:sp>
+        <p:nvSpPr>
+          <p:cNvPr id="5" name="Rectangle 4">
+            <a:extLst>
+              <a:ext uri="{FF2B5EF4-FFF2-40B4-BE49-F238E27FC236}">
+                <a16:creationId xmlns:a16="http://schemas.microsoft.com/office/drawing/2014/main" id="{FDDABF07-AE5B-47B9-9E0A-81EF6E025610}"/>
+              </a:ext>
+            </a:extLst>
+          </p:cNvPr>
+          <p:cNvSpPr/>
+          <p:nvPr/>
+        </p:nvSpPr>
+        <p:spPr>
+          <a:xfrm>
+            <a:off x="5806441" y="4965192"/>
+            <a:ext cx="5998464" cy="932688"/>
+          </a:xfrm>
+          <a:custGeom>
+            <a:avLst/>
+            <a:gdLst>
+              <a:gd name="connsiteX0" fmla="*/ 0 w 5998464"/>
+              <a:gd name="connsiteY0" fmla="*/ 0 h 932688"/>
+              <a:gd name="connsiteX1" fmla="*/ 5998464 w 5998464"/>
+              <a:gd name="connsiteY1" fmla="*/ 0 h 932688"/>
+              <a:gd name="connsiteX2" fmla="*/ 5998464 w 5998464"/>
+              <a:gd name="connsiteY2" fmla="*/ 932688 h 932688"/>
+              <a:gd name="connsiteX3" fmla="*/ 0 w 5998464"/>
+              <a:gd name="connsiteY3" fmla="*/ 932688 h 932688"/>
+              <a:gd name="connsiteX4" fmla="*/ 0 w 5998464"/>
+              <a:gd name="connsiteY4" fmla="*/ 0 h 932688"/>
+            </a:gdLst>
+            <a:ahLst/>
+            <a:cxnLst>
+              <a:cxn ang="0">
+                <a:pos x="connsiteX0" y="connsiteY0"/>
+              </a:cxn>
+              <a:cxn ang="0">
+                <a:pos x="connsiteX1" y="connsiteY1"/>
+              </a:cxn>
+              <a:cxn ang="0">
+                <a:pos x="connsiteX2" y="connsiteY2"/>
+              </a:cxn>
+              <a:cxn ang="0">
+                <a:pos x="connsiteX3" y="connsiteY3"/>
+              </a:cxn>
+              <a:cxn ang="0">
+                <a:pos x="connsiteX4" y="connsiteY4"/>
+              </a:cxn>
+            </a:cxnLst>
+            <a:rect l="l" t="t" r="r" b="b"/>
+            <a:pathLst>
+              <a:path w="5998464" h="932688" extrusionOk="0">
+                <a:moveTo>
+                  <a:pt x="0" y="0"/>
+                </a:moveTo>
+                <a:cubicBezTo>
+                  <a:pt x="1007051" y="-101487"/>
+                  <a:pt x="5010356" y="-162162"/>
+                  <a:pt x="5998464" y="0"/>
+                </a:cubicBezTo>
+                <a:cubicBezTo>
+                  <a:pt x="6013136" y="295901"/>
+                  <a:pt x="5993835" y="643218"/>
+                  <a:pt x="5998464" y="932688"/>
+                </a:cubicBezTo>
+                <a:cubicBezTo>
+                  <a:pt x="3011218" y="982753"/>
+                  <a:pt x="2903513" y="774239"/>
+                  <a:pt x="0" y="932688"/>
+                </a:cubicBezTo>
+                <a:cubicBezTo>
+                  <a:pt x="-35998" y="654471"/>
+                  <a:pt x="916" y="331474"/>
+                  <a:pt x="0" y="0"/>
+                </a:cubicBezTo>
+                <a:close/>
+              </a:path>
+            </a:pathLst>
+          </a:custGeom>
+          <a:noFill/>
+          <a:ln w="38100">
+            <a:solidFill>
+              <a:srgbClr val="FFC000"/>
+            </a:solidFill>
+            <a:extLst>
+              <a:ext uri="{C807C97D-BFC1-408E-A445-0C87EB9F89A2}">
+                <ask:lineSketchStyleProps xmlns:ask="http://schemas.microsoft.com/office/drawing/2018/sketchyshapes" sd="981765707">
+                  <a:prstGeom prst="rect">
+                    <a:avLst/>
+                  </a:prstGeom>
+                  <ask:type>
+                    <ask:lineSketchCurved/>
+                  </ask:type>
+                </ask:lineSketchStyleProps>
+              </a:ext>
+            </a:extLst>
+          </a:ln>
+        </p:spPr>
+        <p:style>
+          <a:lnRef idx="2">
+            <a:schemeClr val="accent1">
+              <a:shade val="50000"/>
+            </a:schemeClr>
+          </a:lnRef>
+          <a:fillRef idx="1">
+            <a:schemeClr val="accent1"/>
+          </a:fillRef>
+          <a:effectRef idx="0">
+            <a:schemeClr val="accent1"/>
+          </a:effectRef>
+          <a:fontRef idx="minor">
+            <a:schemeClr val="lt1"/>
+          </a:fontRef>
+        </p:style>
+        <p:txBody>
+          <a:bodyPr rtlCol="0" anchor="ctr"/>
+          <a:lstStyle/>
+          <a:p>
+            <a:pPr algn="ctr"/>
+            <a:endParaRPr lang="en-US"/>
+          </a:p>
+        </p:txBody>
+      </p:sp>
     </p:spTree>
     <p:extLst>
       <p:ext uri="{BB962C8B-B14F-4D97-AF65-F5344CB8AC3E}">
@@ -15549,6 +15840,21 @@
 </file>
 
 <file path=customXml/item1.xml><?xml version="1.0" encoding="utf-8"?>
+<p:properties xmlns:p="http://schemas.microsoft.com/office/2006/metadata/properties" xmlns:xsi="http://www.w3.org/2001/XMLSchema-instance" xmlns:pc="http://schemas.microsoft.com/office/infopath/2007/PartnerControls">
+  <documentManagement/>
+</p:properties>
+</file>
+
+<file path=customXml/item2.xml><?xml version="1.0" encoding="utf-8"?>
+<?mso-contentType ?>
+<FormTemplates xmlns="http://schemas.microsoft.com/sharepoint/v3/contenttype/forms">
+  <Display>DocumentLibraryForm</Display>
+  <Edit>DocumentLibraryForm</Edit>
+  <New>DocumentLibraryForm</New>
+</FormTemplates>
+</file>
+
+<file path=customXml/item3.xml><?xml version="1.0" encoding="utf-8"?>
 <ct:contentTypeSchema xmlns:ct="http://schemas.microsoft.com/office/2006/metadata/contentType" xmlns:ma="http://schemas.microsoft.com/office/2006/metadata/properties/metaAttributes" ct:_="" ma:_="" ma:contentTypeName="Document" ma:contentTypeID="0x010100860CD5D9B0436D4CAD5600AE7CA2E713" ma:contentTypeVersion="5" ma:contentTypeDescription="Create a new document." ma:contentTypeScope="" ma:versionID="82efc5ef0cc70a930dc0dd44bc7a59e5">
   <xsd:schema xmlns:xsd="http://www.w3.org/2001/XMLSchema" xmlns:xs="http://www.w3.org/2001/XMLSchema" xmlns:p="http://schemas.microsoft.com/office/2006/metadata/properties" xmlns:ns3="88ced256-c029-4233-a058-f3ec71fefdbe" xmlns:ns4="999ce889-1043-45e4-86ca-a56cfe2271af" targetNamespace="http://schemas.microsoft.com/office/2006/metadata/properties" ma:root="true" ma:fieldsID="df5615878e1656ee4e772df057bbfd02" ns3:_="" ns4:_="">
     <xsd:import namespace="88ced256-c029-4233-a058-f3ec71fefdbe"/>
@@ -15719,22 +16025,32 @@
 </ct:contentTypeSchema>
 </file>
 
-<file path=customXml/item2.xml><?xml version="1.0" encoding="utf-8"?>
-<?mso-contentType ?>
-<FormTemplates xmlns="http://schemas.microsoft.com/sharepoint/v3/contenttype/forms">
-  <Display>DocumentLibraryForm</Display>
-  <Edit>DocumentLibraryForm</Edit>
-  <New>DocumentLibraryForm</New>
-</FormTemplates>
+<file path=customXml/itemProps1.xml><?xml version="1.0" encoding="utf-8"?>
+<ds:datastoreItem xmlns:ds="http://schemas.openxmlformats.org/officeDocument/2006/customXml" ds:itemID="{60259DF6-DA4D-4E1C-9935-A04345E6A0FE}">
+  <ds:schemaRefs>
+    <ds:schemaRef ds:uri="http://schemas.microsoft.com/office/2006/metadata/properties"/>
+    <ds:schemaRef ds:uri="88ced256-c029-4233-a058-f3ec71fefdbe"/>
+    <ds:schemaRef ds:uri="http://schemas.microsoft.com/office/infopath/2007/PartnerControls"/>
+    <ds:schemaRef ds:uri="999ce889-1043-45e4-86ca-a56cfe2271af"/>
+    <ds:schemaRef ds:uri="http://purl.org/dc/dcmitype/"/>
+    <ds:schemaRef ds:uri="http://purl.org/dc/terms/"/>
+    <ds:schemaRef ds:uri="http://schemas.microsoft.com/office/2006/documentManagement/types"/>
+    <ds:schemaRef ds:uri="http://purl.org/dc/elements/1.1/"/>
+    <ds:schemaRef ds:uri="http://schemas.openxmlformats.org/package/2006/metadata/core-properties"/>
+    <ds:schemaRef ds:uri="http://www.w3.org/XML/1998/namespace"/>
+  </ds:schemaRefs>
+</ds:datastoreItem>
 </file>
 
-<file path=customXml/item3.xml><?xml version="1.0" encoding="utf-8"?>
-<p:properties xmlns:p="http://schemas.microsoft.com/office/2006/metadata/properties" xmlns:xsi="http://www.w3.org/2001/XMLSchema-instance" xmlns:pc="http://schemas.microsoft.com/office/infopath/2007/PartnerControls">
-  <documentManagement/>
-</p:properties>
+<file path=customXml/itemProps2.xml><?xml version="1.0" encoding="utf-8"?>
+<ds:datastoreItem xmlns:ds="http://schemas.openxmlformats.org/officeDocument/2006/customXml" ds:itemID="{4080D5DD-FD7F-4E53-9DDB-1149624B0AF8}">
+  <ds:schemaRefs>
+    <ds:schemaRef ds:uri="http://schemas.microsoft.com/sharepoint/v3/contenttype/forms"/>
+  </ds:schemaRefs>
+</ds:datastoreItem>
 </file>
 
-<file path=customXml/itemProps1.xml><?xml version="1.0" encoding="utf-8"?>
+<file path=customXml/itemProps3.xml><?xml version="1.0" encoding="utf-8"?>
 <ds:datastoreItem xmlns:ds="http://schemas.openxmlformats.org/officeDocument/2006/customXml" ds:itemID="{48DDB3CD-7A26-4427-A010-5E4AD2CBA3CF}">
   <ds:schemaRefs>
     <ds:schemaRef ds:uri="http://schemas.microsoft.com/office/2006/metadata/contentType"/>
@@ -15751,29 +16067,4 @@
     <ds:schemaRef ds:uri="http://schemas.microsoft.com/internal/obd"/>
   </ds:schemaRefs>
 </ds:datastoreItem>
-</file>
-
-<file path=customXml/itemProps2.xml><?xml version="1.0" encoding="utf-8"?>
-<ds:datastoreItem xmlns:ds="http://schemas.openxmlformats.org/officeDocument/2006/customXml" ds:itemID="{4080D5DD-FD7F-4E53-9DDB-1149624B0AF8}">
-  <ds:schemaRefs>
-    <ds:schemaRef ds:uri="http://schemas.microsoft.com/sharepoint/v3/contenttype/forms"/>
-  </ds:schemaRefs>
-</ds:datastoreItem>
-</file>
-
-<file path=customXml/itemProps3.xml><?xml version="1.0" encoding="utf-8"?>
-<ds:datastoreItem xmlns:ds="http://schemas.openxmlformats.org/officeDocument/2006/customXml" ds:itemID="{60259DF6-DA4D-4E1C-9935-A04345E6A0FE}">
-  <ds:schemaRefs>
-    <ds:schemaRef ds:uri="http://schemas.microsoft.com/office/2006/metadata/properties"/>
-    <ds:schemaRef ds:uri="88ced256-c029-4233-a058-f3ec71fefdbe"/>
-    <ds:schemaRef ds:uri="http://schemas.microsoft.com/office/infopath/2007/PartnerControls"/>
-    <ds:schemaRef ds:uri="999ce889-1043-45e4-86ca-a56cfe2271af"/>
-    <ds:schemaRef ds:uri="http://purl.org/dc/dcmitype/"/>
-    <ds:schemaRef ds:uri="http://purl.org/dc/terms/"/>
-    <ds:schemaRef ds:uri="http://schemas.microsoft.com/office/2006/documentManagement/types"/>
-    <ds:schemaRef ds:uri="http://purl.org/dc/elements/1.1/"/>
-    <ds:schemaRef ds:uri="http://schemas.openxmlformats.org/package/2006/metadata/core-properties"/>
-    <ds:schemaRef ds:uri="http://www.w3.org/XML/1998/namespace"/>
-  </ds:schemaRefs>
-</ds:datastoreItem>
 </file>
</xml_diff>

<commit_message>
Removing Friday Arcade Advanced stream from schedule
</commit_message>
<xml_diff>
--- a/docs/static/online-learning/Mixer Stream Schedule.pptx
+++ b/docs/static/online-learning/Mixer Stream Schedule.pptx
@@ -220,7 +220,7 @@
           <a:p>
             <a:fld id="{9820A582-7AE2-4948-B06A-742F9F045A83}" type="datetimeFigureOut">
               <a:rPr lang="en-US" smtClean="0"/>
-              <a:t>6/16/2020</a:t>
+              <a:t>6/17/2020</a:t>
             </a:fld>
             <a:endParaRPr lang="en-US"/>
           </a:p>
@@ -2064,7 +2064,7 @@
           <a:p>
             <a:fld id="{EE18C4CC-5113-4103-95F7-16AD5B06551D}" type="datetimeFigureOut">
               <a:rPr lang="en-US" smtClean="0"/>
-              <a:t>6/16/2020</a:t>
+              <a:t>6/17/2020</a:t>
             </a:fld>
             <a:endParaRPr lang="en-US"/>
           </a:p>
@@ -2262,7 +2262,7 @@
           <a:p>
             <a:fld id="{EE18C4CC-5113-4103-95F7-16AD5B06551D}" type="datetimeFigureOut">
               <a:rPr lang="en-US" smtClean="0"/>
-              <a:t>6/16/2020</a:t>
+              <a:t>6/17/2020</a:t>
             </a:fld>
             <a:endParaRPr lang="en-US"/>
           </a:p>
@@ -2470,7 +2470,7 @@
           <a:p>
             <a:fld id="{EE18C4CC-5113-4103-95F7-16AD5B06551D}" type="datetimeFigureOut">
               <a:rPr lang="en-US" smtClean="0"/>
-              <a:t>6/16/2020</a:t>
+              <a:t>6/17/2020</a:t>
             </a:fld>
             <a:endParaRPr lang="en-US"/>
           </a:p>
@@ -2668,7 +2668,7 @@
           <a:p>
             <a:fld id="{EE18C4CC-5113-4103-95F7-16AD5B06551D}" type="datetimeFigureOut">
               <a:rPr lang="en-US" smtClean="0"/>
-              <a:t>6/16/2020</a:t>
+              <a:t>6/17/2020</a:t>
             </a:fld>
             <a:endParaRPr lang="en-US"/>
           </a:p>
@@ -2943,7 +2943,7 @@
           <a:p>
             <a:fld id="{EE18C4CC-5113-4103-95F7-16AD5B06551D}" type="datetimeFigureOut">
               <a:rPr lang="en-US" smtClean="0"/>
-              <a:t>6/16/2020</a:t>
+              <a:t>6/17/2020</a:t>
             </a:fld>
             <a:endParaRPr lang="en-US"/>
           </a:p>
@@ -3208,7 +3208,7 @@
           <a:p>
             <a:fld id="{EE18C4CC-5113-4103-95F7-16AD5B06551D}" type="datetimeFigureOut">
               <a:rPr lang="en-US" smtClean="0"/>
-              <a:t>6/16/2020</a:t>
+              <a:t>6/17/2020</a:t>
             </a:fld>
             <a:endParaRPr lang="en-US"/>
           </a:p>
@@ -3620,7 +3620,7 @@
           <a:p>
             <a:fld id="{EE18C4CC-5113-4103-95F7-16AD5B06551D}" type="datetimeFigureOut">
               <a:rPr lang="en-US" smtClean="0"/>
-              <a:t>6/16/2020</a:t>
+              <a:t>6/17/2020</a:t>
             </a:fld>
             <a:endParaRPr lang="en-US"/>
           </a:p>
@@ -3761,7 +3761,7 @@
           <a:p>
             <a:fld id="{EE18C4CC-5113-4103-95F7-16AD5B06551D}" type="datetimeFigureOut">
               <a:rPr lang="en-US" smtClean="0"/>
-              <a:t>6/16/2020</a:t>
+              <a:t>6/17/2020</a:t>
             </a:fld>
             <a:endParaRPr lang="en-US"/>
           </a:p>
@@ -3874,7 +3874,7 @@
           <a:p>
             <a:fld id="{EE18C4CC-5113-4103-95F7-16AD5B06551D}" type="datetimeFigureOut">
               <a:rPr lang="en-US" smtClean="0"/>
-              <a:t>6/16/2020</a:t>
+              <a:t>6/17/2020</a:t>
             </a:fld>
             <a:endParaRPr lang="en-US"/>
           </a:p>
@@ -4185,7 +4185,7 @@
           <a:p>
             <a:fld id="{EE18C4CC-5113-4103-95F7-16AD5B06551D}" type="datetimeFigureOut">
               <a:rPr lang="en-US" smtClean="0"/>
-              <a:t>6/16/2020</a:t>
+              <a:t>6/17/2020</a:t>
             </a:fld>
             <a:endParaRPr lang="en-US"/>
           </a:p>
@@ -4473,7 +4473,7 @@
           <a:p>
             <a:fld id="{EE18C4CC-5113-4103-95F7-16AD5B06551D}" type="datetimeFigureOut">
               <a:rPr lang="en-US" smtClean="0"/>
-              <a:t>6/16/2020</a:t>
+              <a:t>6/17/2020</a:t>
             </a:fld>
             <a:endParaRPr lang="en-US"/>
           </a:p>
@@ -4714,7 +4714,7 @@
           <a:p>
             <a:fld id="{EE18C4CC-5113-4103-95F7-16AD5B06551D}" type="datetimeFigureOut">
               <a:rPr lang="en-US" smtClean="0"/>
-              <a:t>6/16/2020</a:t>
+              <a:t>6/17/2020</a:t>
             </a:fld>
             <a:endParaRPr lang="en-US"/>
           </a:p>
@@ -17797,14 +17797,14 @@
           <p:nvPr>
             <p:extLst>
               <p:ext uri="{D42A27DB-BD31-4B8C-83A1-F6EECF244321}">
-                <p14:modId xmlns:p14="http://schemas.microsoft.com/office/powerpoint/2010/main" val="2174433737"/>
+                <p14:modId xmlns:p14="http://schemas.microsoft.com/office/powerpoint/2010/main" val="2304407275"/>
               </p:ext>
             </p:extLst>
           </p:nvPr>
         </p:nvGraphicFramePr>
         <p:xfrm>
           <a:off x="163038" y="69918"/>
-          <a:ext cx="11978640" cy="6207860"/>
+          <a:ext cx="11978640" cy="6100144"/>
         </p:xfrm>
         <a:graphic>
           <a:graphicData uri="http://schemas.openxmlformats.org/drawingml/2006/table">
@@ -18941,7 +18941,7 @@
                         <a:rPr lang="en-US" sz="1600" b="1" dirty="0">
                           <a:latin typeface="Agency FB" panose="020B0503020202020204" pitchFamily="34" charset="0"/>
                         </a:rPr>
-                        <a:t>1 PM PT</a:t>
+                        <a:t>2 PM PT</a:t>
                       </a:r>
                     </a:p>
                     <a:p>
@@ -18950,7 +18950,7 @@
                         <a:rPr lang="en-US" sz="1600" dirty="0">
                           <a:latin typeface="Agency FB" panose="020B0503020202020204" pitchFamily="34" charset="0"/>
                         </a:rPr>
-                        <a:t>4 PM ET</a:t>
+                        <a:t>5 PM ET</a:t>
                       </a:r>
                     </a:p>
                   </a:txBody>
@@ -18976,10 +18976,14 @@
                       <a:prstDash val="solid"/>
                       <a:miter lim="800000"/>
                     </a:lnT>
-                    <a:lnB w="6350" cap="flat" cmpd="sng" algn="ctr">
-                      <a:noFill/>
-                      <a:prstDash val="solid"/>
-                      <a:miter lim="800000"/>
+                    <a:lnB w="12700" cap="flat" cmpd="sng" algn="ctr">
+                      <a:solidFill>
+                        <a:schemeClr val="tx1"/>
+                      </a:solidFill>
+                      <a:prstDash val="solid"/>
+                      <a:round/>
+                      <a:headEnd type="none" w="med" len="med"/>
+                      <a:tailEnd type="none" w="med" len="med"/>
                     </a:lnB>
                     <a:lnTlToBr w="12700" cmpd="sng">
                       <a:noFill/>
@@ -19020,7 +19024,7 @@
                         <a:rPr lang="en-US" sz="2000" dirty="0">
                           <a:latin typeface="Agency FB" panose="020B0503020202020204" pitchFamily="34" charset="0"/>
                         </a:rPr>
-                        <a:t>MakeCode Arcade (Advanced)</a:t>
+                        <a:t>MakeCode in the Kitchen</a:t>
                       </a:r>
                     </a:p>
                   </a:txBody>
@@ -19046,10 +19050,14 @@
                       <a:prstDash val="solid"/>
                       <a:miter lim="800000"/>
                     </a:lnT>
-                    <a:lnB w="6350" cap="flat" cmpd="sng" algn="ctr">
-                      <a:noFill/>
-                      <a:prstDash val="solid"/>
-                      <a:miter lim="800000"/>
+                    <a:lnB w="12700" cap="flat" cmpd="sng" algn="ctr">
+                      <a:solidFill>
+                        <a:schemeClr val="tx1"/>
+                      </a:solidFill>
+                      <a:prstDash val="solid"/>
+                      <a:round/>
+                      <a:headEnd type="none" w="med" len="med"/>
+                      <a:tailEnd type="none" w="med" len="med"/>
                     </a:lnB>
                     <a:lnTlToBr w="12700" cmpd="sng">
                       <a:noFill/>
@@ -19557,7 +19565,7 @@
                     </a:lnL>
                     <a:lnR w="12700" cap="flat" cmpd="sng" algn="ctr">
                       <a:solidFill>
-                        <a:srgbClr val="5D406C"/>
+                        <a:schemeClr val="tx1"/>
                       </a:solidFill>
                       <a:prstDash val="solid"/>
                       <a:round/>
@@ -19584,622 +19592,6 @@
                     </a:lnBlToTr>
                     <a:solidFill>
                       <a:srgbClr val="ECE4EB"/>
-                    </a:solidFill>
-                  </a:tcPr>
-                </a:tc>
-                <a:tc>
-                  <a:txBody>
-                    <a:bodyPr/>
-                    <a:lstStyle/>
-                    <a:p>
-                      <a:pPr algn="ctr"/>
-                      <a:r>
-                        <a:rPr lang="en-US" sz="1600" b="1" dirty="0">
-                          <a:latin typeface="Agency FB" panose="020B0503020202020204" pitchFamily="34" charset="0"/>
-                        </a:rPr>
-                        <a:t>2 PM PT</a:t>
-                      </a:r>
-                    </a:p>
-                    <a:p>
-                      <a:pPr algn="ctr"/>
-                      <a:r>
-                        <a:rPr lang="en-US" sz="1600" dirty="0">
-                          <a:latin typeface="Agency FB" panose="020B0503020202020204" pitchFamily="34" charset="0"/>
-                        </a:rPr>
-                        <a:t>5 PM ET</a:t>
-                      </a:r>
-                    </a:p>
-                  </a:txBody>
-                  <a:tcPr marL="107715" marR="107715" marT="53858" marB="53858" anchor="ctr">
-                    <a:lnL w="12700" cap="flat" cmpd="sng" algn="ctr">
-                      <a:solidFill>
-                        <a:srgbClr val="5D406C"/>
-                      </a:solidFill>
-                      <a:prstDash val="solid"/>
-                      <a:round/>
-                      <a:headEnd type="none" w="med" len="med"/>
-                      <a:tailEnd type="none" w="med" len="med"/>
-                    </a:lnL>
-                    <a:lnR w="12700" cap="flat" cmpd="sng" algn="ctr">
-                      <a:noFill/>
-                      <a:prstDash val="solid"/>
-                      <a:round/>
-                      <a:headEnd type="none" w="med" len="med"/>
-                      <a:tailEnd type="none" w="med" len="med"/>
-                    </a:lnR>
-                    <a:lnT w="6350" cap="flat" cmpd="sng" algn="ctr">
-                      <a:noFill/>
-                      <a:prstDash val="solid"/>
-                      <a:miter lim="800000"/>
-                    </a:lnT>
-                    <a:lnB w="12700" cap="flat" cmpd="sng" algn="ctr">
-                      <a:solidFill>
-                        <a:schemeClr val="tx1"/>
-                      </a:solidFill>
-                      <a:prstDash val="solid"/>
-                      <a:round/>
-                      <a:headEnd type="none" w="med" len="med"/>
-                      <a:tailEnd type="none" w="med" len="med"/>
-                    </a:lnB>
-                    <a:lnTlToBr w="12700" cmpd="sng">
-                      <a:noFill/>
-                      <a:prstDash val="solid"/>
-                    </a:lnTlToBr>
-                    <a:lnBlToTr w="12700" cmpd="sng">
-                      <a:noFill/>
-                      <a:prstDash val="solid"/>
-                    </a:lnBlToTr>
-                    <a:solidFill>
-                      <a:srgbClr val="ECE4EB"/>
-                    </a:solidFill>
-                  </a:tcPr>
-                </a:tc>
-                <a:tc>
-                  <a:txBody>
-                    <a:bodyPr/>
-                    <a:lstStyle/>
-                    <a:p>
-                      <a:pPr marL="0" marR="0" lvl="0" indent="0" algn="ctr" defTabSz="914400" rtl="0" eaLnBrk="1" fontAlgn="auto" latinLnBrk="0" hangingPunct="1">
-                        <a:lnSpc>
-                          <a:spcPct val="100000"/>
-                        </a:lnSpc>
-                        <a:spcBef>
-                          <a:spcPts val="0"/>
-                        </a:spcBef>
-                        <a:spcAft>
-                          <a:spcPts val="0"/>
-                        </a:spcAft>
-                        <a:buClrTx/>
-                        <a:buSzTx/>
-                        <a:buFontTx/>
-                        <a:buNone/>
-                        <a:tabLst/>
-                        <a:defRPr/>
-                      </a:pPr>
-                      <a:r>
-                        <a:rPr lang="en-US" sz="2000" dirty="0">
-                          <a:latin typeface="Agency FB" panose="020B0503020202020204" pitchFamily="34" charset="0"/>
-                        </a:rPr>
-                        <a:t>MakeCode in the Kitchen</a:t>
-                      </a:r>
-                    </a:p>
-                  </a:txBody>
-                  <a:tcPr marL="107715" marR="107715" marT="53858" marB="53858" anchor="ctr">
-                    <a:lnL w="12700" cap="flat" cmpd="sng" algn="ctr">
-                      <a:noFill/>
-                      <a:prstDash val="solid"/>
-                      <a:round/>
-                      <a:headEnd type="none" w="med" len="med"/>
-                      <a:tailEnd type="none" w="med" len="med"/>
-                    </a:lnL>
-                    <a:lnR w="12700" cap="flat" cmpd="sng" algn="ctr">
-                      <a:solidFill>
-                        <a:srgbClr val="5D406C"/>
-                      </a:solidFill>
-                      <a:prstDash val="solid"/>
-                      <a:round/>
-                      <a:headEnd type="none" w="med" len="med"/>
-                      <a:tailEnd type="none" w="med" len="med"/>
-                    </a:lnR>
-                    <a:lnT w="6350" cap="flat" cmpd="sng" algn="ctr">
-                      <a:noFill/>
-                      <a:prstDash val="solid"/>
-                      <a:miter lim="800000"/>
-                    </a:lnT>
-                    <a:lnB w="12700" cap="flat" cmpd="sng" algn="ctr">
-                      <a:solidFill>
-                        <a:schemeClr val="tx1"/>
-                      </a:solidFill>
-                      <a:prstDash val="solid"/>
-                      <a:round/>
-                      <a:headEnd type="none" w="med" len="med"/>
-                      <a:tailEnd type="none" w="med" len="med"/>
-                    </a:lnB>
-                    <a:lnTlToBr w="12700" cmpd="sng">
-                      <a:noFill/>
-                      <a:prstDash val="solid"/>
-                    </a:lnTlToBr>
-                    <a:lnBlToTr w="12700" cmpd="sng">
-                      <a:noFill/>
-                      <a:prstDash val="solid"/>
-                    </a:lnBlToTr>
-                    <a:solidFill>
-                      <a:srgbClr val="ECE4EB"/>
-                    </a:solidFill>
-                  </a:tcPr>
-                </a:tc>
-                <a:extLst>
-                  <a:ext uri="{0D108BD9-81ED-4DB2-BD59-A6C34878D82A}">
-                    <a16:rowId xmlns:a16="http://schemas.microsoft.com/office/drawing/2014/main" val="1272730967"/>
-                  </a:ext>
-                </a:extLst>
-              </a:tr>
-              <a:tr h="914400">
-                <a:tc>
-                  <a:txBody>
-                    <a:bodyPr/>
-                    <a:lstStyle/>
-                    <a:p>
-                      <a:pPr algn="ctr"/>
-                      <a:r>
-                        <a:rPr lang="en-US" sz="1600" b="1" dirty="0">
-                          <a:latin typeface="Agency FB" panose="020B0503020202020204" pitchFamily="34" charset="0"/>
-                        </a:rPr>
-                        <a:t>11 AM PT</a:t>
-                      </a:r>
-                    </a:p>
-                    <a:p>
-                      <a:pPr algn="ctr"/>
-                      <a:r>
-                        <a:rPr lang="en-US" sz="1600" dirty="0">
-                          <a:latin typeface="Agency FB" panose="020B0503020202020204" pitchFamily="34" charset="0"/>
-                        </a:rPr>
-                        <a:t>2 PM ET</a:t>
-                      </a:r>
-                    </a:p>
-                  </a:txBody>
-                  <a:tcPr marL="107715" marR="107715" marT="53858" marB="53858" anchor="ctr">
-                    <a:lnL w="12700" cap="flat" cmpd="sng" algn="ctr">
-                      <a:solidFill>
-                        <a:srgbClr val="5D406C"/>
-                      </a:solidFill>
-                      <a:prstDash val="solid"/>
-                      <a:round/>
-                      <a:headEnd type="none" w="med" len="med"/>
-                      <a:tailEnd type="none" w="med" len="med"/>
-                    </a:lnL>
-                    <a:lnR>
-                      <a:noFill/>
-                    </a:lnR>
-                    <a:lnT w="6350" cap="flat" cmpd="sng" algn="ctr">
-                      <a:noFill/>
-                      <a:prstDash val="solid"/>
-                      <a:miter lim="800000"/>
-                    </a:lnT>
-                    <a:lnB w="12700" cap="flat" cmpd="sng" algn="ctr">
-                      <a:noFill/>
-                      <a:prstDash val="solid"/>
-                      <a:round/>
-                      <a:headEnd type="none" w="med" len="med"/>
-                      <a:tailEnd type="none" w="med" len="med"/>
-                    </a:lnB>
-                    <a:lnTlToBr w="12700" cmpd="sng">
-                      <a:noFill/>
-                      <a:prstDash val="solid"/>
-                    </a:lnTlToBr>
-                    <a:lnBlToTr w="12700" cmpd="sng">
-                      <a:noFill/>
-                      <a:prstDash val="solid"/>
-                    </a:lnBlToTr>
-                    <a:solidFill>
-                      <a:schemeClr val="bg1"/>
-                    </a:solidFill>
-                  </a:tcPr>
-                </a:tc>
-                <a:tc>
-                  <a:txBody>
-                    <a:bodyPr/>
-                    <a:lstStyle/>
-                    <a:p>
-                      <a:pPr algn="ctr"/>
-                      <a:r>
-                        <a:rPr lang="en-US" sz="2000" dirty="0">
-                          <a:latin typeface="Agency FB" panose="020B0503020202020204" pitchFamily="34" charset="0"/>
-                        </a:rPr>
-                        <a:t>MakeCode Arcade (Beginner)</a:t>
-                      </a:r>
-                    </a:p>
-                  </a:txBody>
-                  <a:tcPr marL="107715" marR="107715" marT="53858" marB="53858" anchor="ctr">
-                    <a:lnL w="12700" cap="flat" cmpd="sng" algn="ctr">
-                      <a:noFill/>
-                      <a:prstDash val="solid"/>
-                      <a:round/>
-                      <a:headEnd type="none" w="med" len="med"/>
-                      <a:tailEnd type="none" w="med" len="med"/>
-                    </a:lnL>
-                    <a:lnR w="12700" cap="flat" cmpd="sng" algn="ctr">
-                      <a:solidFill>
-                        <a:srgbClr val="5D406C"/>
-                      </a:solidFill>
-                      <a:prstDash val="solid"/>
-                      <a:round/>
-                      <a:headEnd type="none" w="med" len="med"/>
-                      <a:tailEnd type="none" w="med" len="med"/>
-                    </a:lnR>
-                    <a:lnT w="6350" cap="flat" cmpd="sng" algn="ctr">
-                      <a:noFill/>
-                      <a:prstDash val="solid"/>
-                      <a:miter lim="800000"/>
-                    </a:lnT>
-                    <a:lnB w="12700" cap="flat" cmpd="sng" algn="ctr">
-                      <a:noFill/>
-                      <a:prstDash val="solid"/>
-                      <a:round/>
-                      <a:headEnd type="none" w="med" len="med"/>
-                      <a:tailEnd type="none" w="med" len="med"/>
-                    </a:lnB>
-                    <a:lnTlToBr w="12700" cmpd="sng">
-                      <a:noFill/>
-                      <a:prstDash val="solid"/>
-                    </a:lnTlToBr>
-                    <a:lnBlToTr w="12700" cmpd="sng">
-                      <a:noFill/>
-                      <a:prstDash val="solid"/>
-                    </a:lnBlToTr>
-                    <a:solidFill>
-                      <a:schemeClr val="bg1"/>
-                    </a:solidFill>
-                  </a:tcPr>
-                </a:tc>
-                <a:tc>
-                  <a:txBody>
-                    <a:bodyPr/>
-                    <a:lstStyle/>
-                    <a:p>
-                      <a:pPr algn="ctr"/>
-                      <a:r>
-                        <a:rPr lang="en-US" sz="1600" b="1" dirty="0">
-                          <a:latin typeface="Agency FB" panose="020B0503020202020204" pitchFamily="34" charset="0"/>
-                        </a:rPr>
-                        <a:t>11 AM PT</a:t>
-                      </a:r>
-                    </a:p>
-                    <a:p>
-                      <a:pPr algn="ctr"/>
-                      <a:r>
-                        <a:rPr lang="en-US" sz="1600" dirty="0">
-                          <a:latin typeface="Agency FB" panose="020B0503020202020204" pitchFamily="34" charset="0"/>
-                        </a:rPr>
-                        <a:t>2 PM ET</a:t>
-                      </a:r>
-                    </a:p>
-                  </a:txBody>
-                  <a:tcPr marL="107715" marR="107715" marT="53858" marB="53858" anchor="ctr">
-                    <a:lnL w="12700" cap="flat" cmpd="sng" algn="ctr">
-                      <a:solidFill>
-                        <a:srgbClr val="5D406C"/>
-                      </a:solidFill>
-                      <a:prstDash val="solid"/>
-                      <a:round/>
-                      <a:headEnd type="none" w="med" len="med"/>
-                      <a:tailEnd type="none" w="med" len="med"/>
-                    </a:lnL>
-                    <a:lnR>
-                      <a:noFill/>
-                    </a:lnR>
-                    <a:lnT w="6350" cap="flat" cmpd="sng" algn="ctr">
-                      <a:noFill/>
-                      <a:prstDash val="solid"/>
-                      <a:miter lim="800000"/>
-                    </a:lnT>
-                    <a:lnB w="12700" cap="flat" cmpd="sng" algn="ctr">
-                      <a:noFill/>
-                      <a:prstDash val="solid"/>
-                      <a:round/>
-                      <a:headEnd type="none" w="med" len="med"/>
-                      <a:tailEnd type="none" w="med" len="med"/>
-                    </a:lnB>
-                    <a:lnTlToBr w="12700" cmpd="sng">
-                      <a:noFill/>
-                      <a:prstDash val="solid"/>
-                    </a:lnTlToBr>
-                    <a:lnBlToTr w="12700" cmpd="sng">
-                      <a:noFill/>
-                      <a:prstDash val="solid"/>
-                    </a:lnBlToTr>
-                    <a:solidFill>
-                      <a:schemeClr val="bg1"/>
-                    </a:solidFill>
-                  </a:tcPr>
-                </a:tc>
-                <a:tc>
-                  <a:txBody>
-                    <a:bodyPr/>
-                    <a:lstStyle/>
-                    <a:p>
-                      <a:pPr algn="ctr"/>
-                      <a:r>
-                        <a:rPr lang="en-US" sz="2000" dirty="0">
-                          <a:latin typeface="Agency FB" panose="020B0503020202020204" pitchFamily="34" charset="0"/>
-                        </a:rPr>
-                        <a:t>MakeCode Arcade (Beginner)</a:t>
-                      </a:r>
-                    </a:p>
-                  </a:txBody>
-                  <a:tcPr marL="107715" marR="107715" marT="53858" marB="53858" anchor="ctr">
-                    <a:lnL w="12700" cap="flat" cmpd="sng" algn="ctr">
-                      <a:noFill/>
-                      <a:prstDash val="solid"/>
-                      <a:round/>
-                      <a:headEnd type="none" w="med" len="med"/>
-                      <a:tailEnd type="none" w="med" len="med"/>
-                    </a:lnL>
-                    <a:lnR w="12700" cap="flat" cmpd="sng" algn="ctr">
-                      <a:solidFill>
-                        <a:srgbClr val="5D406C"/>
-                      </a:solidFill>
-                      <a:prstDash val="solid"/>
-                      <a:round/>
-                      <a:headEnd type="none" w="med" len="med"/>
-                      <a:tailEnd type="none" w="med" len="med"/>
-                    </a:lnR>
-                    <a:lnT w="6350" cap="flat" cmpd="sng" algn="ctr">
-                      <a:noFill/>
-                      <a:prstDash val="solid"/>
-                      <a:miter lim="800000"/>
-                    </a:lnT>
-                    <a:lnB w="12700" cap="flat" cmpd="sng" algn="ctr">
-                      <a:noFill/>
-                      <a:prstDash val="solid"/>
-                      <a:round/>
-                      <a:headEnd type="none" w="med" len="med"/>
-                      <a:tailEnd type="none" w="med" len="med"/>
-                    </a:lnB>
-                    <a:lnTlToBr w="12700" cmpd="sng">
-                      <a:noFill/>
-                      <a:prstDash val="solid"/>
-                    </a:lnTlToBr>
-                    <a:lnBlToTr w="12700" cmpd="sng">
-                      <a:noFill/>
-                      <a:prstDash val="solid"/>
-                    </a:lnBlToTr>
-                    <a:solidFill>
-                      <a:schemeClr val="bg1"/>
-                    </a:solidFill>
-                  </a:tcPr>
-                </a:tc>
-                <a:tc>
-                  <a:txBody>
-                    <a:bodyPr/>
-                    <a:lstStyle/>
-                    <a:p>
-                      <a:pPr algn="ctr"/>
-                      <a:r>
-                        <a:rPr lang="en-US" sz="1600" b="1" dirty="0">
-                          <a:latin typeface="Agency FB" panose="020B0503020202020204" pitchFamily="34" charset="0"/>
-                        </a:rPr>
-                        <a:t>11 AM PT</a:t>
-                      </a:r>
-                    </a:p>
-                    <a:p>
-                      <a:pPr algn="ctr"/>
-                      <a:r>
-                        <a:rPr lang="en-US" sz="1600" dirty="0">
-                          <a:latin typeface="Agency FB" panose="020B0503020202020204" pitchFamily="34" charset="0"/>
-                        </a:rPr>
-                        <a:t>2 PM ET</a:t>
-                      </a:r>
-                    </a:p>
-                  </a:txBody>
-                  <a:tcPr marL="107715" marR="107715" marT="53858" marB="53858" anchor="ctr">
-                    <a:lnL w="12700" cap="flat" cmpd="sng" algn="ctr">
-                      <a:solidFill>
-                        <a:srgbClr val="5D406C"/>
-                      </a:solidFill>
-                      <a:prstDash val="solid"/>
-                      <a:round/>
-                      <a:headEnd type="none" w="med" len="med"/>
-                      <a:tailEnd type="none" w="med" len="med"/>
-                    </a:lnL>
-                    <a:lnR>
-                      <a:noFill/>
-                    </a:lnR>
-                    <a:lnT w="6350" cap="flat" cmpd="sng" algn="ctr">
-                      <a:noFill/>
-                      <a:prstDash val="solid"/>
-                      <a:miter lim="800000"/>
-                    </a:lnT>
-                    <a:lnB w="12700" cap="flat" cmpd="sng" algn="ctr">
-                      <a:noFill/>
-                      <a:prstDash val="solid"/>
-                      <a:round/>
-                      <a:headEnd type="none" w="med" len="med"/>
-                      <a:tailEnd type="none" w="med" len="med"/>
-                    </a:lnB>
-                    <a:lnTlToBr w="12700" cmpd="sng">
-                      <a:noFill/>
-                      <a:prstDash val="solid"/>
-                    </a:lnTlToBr>
-                    <a:lnBlToTr w="12700" cmpd="sng">
-                      <a:noFill/>
-                      <a:prstDash val="solid"/>
-                    </a:lnBlToTr>
-                    <a:solidFill>
-                      <a:schemeClr val="bg1"/>
-                    </a:solidFill>
-                  </a:tcPr>
-                </a:tc>
-                <a:tc>
-                  <a:txBody>
-                    <a:bodyPr/>
-                    <a:lstStyle/>
-                    <a:p>
-                      <a:pPr algn="ctr"/>
-                      <a:r>
-                        <a:rPr lang="en-US" sz="2000" dirty="0">
-                          <a:latin typeface="Agency FB" panose="020B0503020202020204" pitchFamily="34" charset="0"/>
-                        </a:rPr>
-                        <a:t>MakeCode Arcade (Beginner)</a:t>
-                      </a:r>
-                    </a:p>
-                  </a:txBody>
-                  <a:tcPr marL="107715" marR="107715" marT="53858" marB="53858" anchor="ctr">
-                    <a:lnL w="12700" cap="flat" cmpd="sng" algn="ctr">
-                      <a:noFill/>
-                      <a:prstDash val="solid"/>
-                      <a:round/>
-                      <a:headEnd type="none" w="med" len="med"/>
-                      <a:tailEnd type="none" w="med" len="med"/>
-                    </a:lnL>
-                    <a:lnR w="12700" cap="flat" cmpd="sng" algn="ctr">
-                      <a:solidFill>
-                        <a:srgbClr val="5D406C"/>
-                      </a:solidFill>
-                      <a:prstDash val="solid"/>
-                      <a:round/>
-                      <a:headEnd type="none" w="med" len="med"/>
-                      <a:tailEnd type="none" w="med" len="med"/>
-                    </a:lnR>
-                    <a:lnT w="6350" cap="flat" cmpd="sng" algn="ctr">
-                      <a:noFill/>
-                      <a:prstDash val="solid"/>
-                      <a:miter lim="800000"/>
-                    </a:lnT>
-                    <a:lnB w="12700" cap="flat" cmpd="sng" algn="ctr">
-                      <a:noFill/>
-                      <a:prstDash val="solid"/>
-                      <a:round/>
-                      <a:headEnd type="none" w="med" len="med"/>
-                      <a:tailEnd type="none" w="med" len="med"/>
-                    </a:lnB>
-                    <a:lnTlToBr w="12700" cmpd="sng">
-                      <a:noFill/>
-                      <a:prstDash val="solid"/>
-                    </a:lnTlToBr>
-                    <a:lnBlToTr w="12700" cmpd="sng">
-                      <a:noFill/>
-                      <a:prstDash val="solid"/>
-                    </a:lnBlToTr>
-                    <a:solidFill>
-                      <a:schemeClr val="bg1"/>
-                    </a:solidFill>
-                  </a:tcPr>
-                </a:tc>
-                <a:tc>
-                  <a:txBody>
-                    <a:bodyPr/>
-                    <a:lstStyle/>
-                    <a:p>
-                      <a:pPr algn="ctr"/>
-                      <a:r>
-                        <a:rPr lang="en-US" sz="1600" b="1" dirty="0">
-                          <a:latin typeface="Agency FB" panose="020B0503020202020204" pitchFamily="34" charset="0"/>
-                        </a:rPr>
-                        <a:t>11 AM PT</a:t>
-                      </a:r>
-                    </a:p>
-                    <a:p>
-                      <a:pPr algn="ctr"/>
-                      <a:r>
-                        <a:rPr lang="en-US" sz="1600" dirty="0">
-                          <a:latin typeface="Agency FB" panose="020B0503020202020204" pitchFamily="34" charset="0"/>
-                        </a:rPr>
-                        <a:t>2 PM ET</a:t>
-                      </a:r>
-                    </a:p>
-                  </a:txBody>
-                  <a:tcPr marL="107715" marR="107715" marT="53858" marB="53858" anchor="ctr">
-                    <a:lnL w="12700" cap="flat" cmpd="sng" algn="ctr">
-                      <a:solidFill>
-                        <a:srgbClr val="5D406C"/>
-                      </a:solidFill>
-                      <a:prstDash val="solid"/>
-                      <a:round/>
-                      <a:headEnd type="none" w="med" len="med"/>
-                      <a:tailEnd type="none" w="med" len="med"/>
-                    </a:lnL>
-                    <a:lnR>
-                      <a:noFill/>
-                    </a:lnR>
-                    <a:lnT w="6350" cap="flat" cmpd="sng" algn="ctr">
-                      <a:noFill/>
-                      <a:prstDash val="solid"/>
-                      <a:miter lim="800000"/>
-                    </a:lnT>
-                    <a:lnB w="12700" cap="flat" cmpd="sng" algn="ctr">
-                      <a:noFill/>
-                      <a:prstDash val="solid"/>
-                      <a:round/>
-                      <a:headEnd type="none" w="med" len="med"/>
-                      <a:tailEnd type="none" w="med" len="med"/>
-                    </a:lnB>
-                    <a:lnTlToBr w="12700" cmpd="sng">
-                      <a:noFill/>
-                      <a:prstDash val="solid"/>
-                    </a:lnTlToBr>
-                    <a:lnBlToTr w="12700" cmpd="sng">
-                      <a:noFill/>
-                      <a:prstDash val="solid"/>
-                    </a:lnBlToTr>
-                    <a:solidFill>
-                      <a:schemeClr val="bg1"/>
-                    </a:solidFill>
-                  </a:tcPr>
-                </a:tc>
-                <a:tc>
-                  <a:txBody>
-                    <a:bodyPr/>
-                    <a:lstStyle/>
-                    <a:p>
-                      <a:pPr algn="ctr"/>
-                      <a:r>
-                        <a:rPr lang="en-US" sz="2000" dirty="0">
-                          <a:latin typeface="Agency FB" panose="020B0503020202020204" pitchFamily="34" charset="0"/>
-                        </a:rPr>
-                        <a:t>MakeCode Arcade (Beginner)</a:t>
-                      </a:r>
-                    </a:p>
-                  </a:txBody>
-                  <a:tcPr marL="107715" marR="107715" marT="53858" marB="53858" anchor="ctr">
-                    <a:lnL w="12700" cap="flat" cmpd="sng" algn="ctr">
-                      <a:noFill/>
-                      <a:prstDash val="solid"/>
-                      <a:round/>
-                      <a:headEnd type="none" w="med" len="med"/>
-                      <a:tailEnd type="none" w="med" len="med"/>
-                    </a:lnL>
-                    <a:lnR w="12700" cap="flat" cmpd="sng" algn="ctr">
-                      <a:solidFill>
-                        <a:srgbClr val="5D406C"/>
-                      </a:solidFill>
-                      <a:prstDash val="solid"/>
-                      <a:round/>
-                      <a:headEnd type="none" w="med" len="med"/>
-                      <a:tailEnd type="none" w="med" len="med"/>
-                    </a:lnR>
-                    <a:lnT w="6350" cap="flat" cmpd="sng" algn="ctr">
-                      <a:noFill/>
-                      <a:prstDash val="solid"/>
-                      <a:miter lim="800000"/>
-                    </a:lnT>
-                    <a:lnB w="12700" cap="flat" cmpd="sng" algn="ctr">
-                      <a:noFill/>
-                      <a:prstDash val="solid"/>
-                      <a:round/>
-                      <a:headEnd type="none" w="med" len="med"/>
-                      <a:tailEnd type="none" w="med" len="med"/>
-                    </a:lnB>
-                    <a:lnTlToBr w="12700" cmpd="sng">
-                      <a:noFill/>
-                      <a:prstDash val="solid"/>
-                    </a:lnTlToBr>
-                    <a:lnBlToTr w="12700" cmpd="sng">
-                      <a:noFill/>
-                      <a:prstDash val="solid"/>
-                    </a:lnBlToTr>
-                    <a:solidFill>
-                      <a:schemeClr val="bg1"/>
                     </a:solidFill>
                   </a:tcPr>
                 </a:tc>
@@ -20217,7 +19609,7 @@
                   <a:tcPr marL="107715" marR="107715" marT="53858" marB="53858" anchor="ctr">
                     <a:lnL w="12700" cap="flat" cmpd="sng" algn="ctr">
                       <a:solidFill>
-                        <a:srgbClr val="5D406C"/>
+                        <a:schemeClr val="tx1"/>
                       </a:solidFill>
                       <a:prstDash val="solid"/>
                       <a:round/>
@@ -20304,6 +19696,601 @@
                       <a:solidFill>
                         <a:schemeClr val="tx1"/>
                       </a:solidFill>
+                      <a:prstDash val="solid"/>
+                      <a:round/>
+                      <a:headEnd type="none" w="med" len="med"/>
+                      <a:tailEnd type="none" w="med" len="med"/>
+                    </a:lnT>
+                    <a:lnB w="12700" cap="flat" cmpd="sng" algn="ctr">
+                      <a:noFill/>
+                      <a:prstDash val="solid"/>
+                      <a:round/>
+                      <a:headEnd type="none" w="med" len="med"/>
+                      <a:tailEnd type="none" w="med" len="med"/>
+                    </a:lnB>
+                    <a:lnTlToBr w="12700" cmpd="sng">
+                      <a:noFill/>
+                      <a:prstDash val="solid"/>
+                    </a:lnTlToBr>
+                    <a:lnBlToTr w="12700" cmpd="sng">
+                      <a:noFill/>
+                      <a:prstDash val="solid"/>
+                    </a:lnBlToTr>
+                    <a:noFill/>
+                  </a:tcPr>
+                </a:tc>
+                <a:extLst>
+                  <a:ext uri="{0D108BD9-81ED-4DB2-BD59-A6C34878D82A}">
+                    <a16:rowId xmlns:a16="http://schemas.microsoft.com/office/drawing/2014/main" val="1272730967"/>
+                  </a:ext>
+                </a:extLst>
+              </a:tr>
+              <a:tr h="914400">
+                <a:tc>
+                  <a:txBody>
+                    <a:bodyPr/>
+                    <a:lstStyle/>
+                    <a:p>
+                      <a:pPr algn="ctr"/>
+                      <a:r>
+                        <a:rPr lang="en-US" sz="1600" b="1" dirty="0">
+                          <a:latin typeface="Agency FB" panose="020B0503020202020204" pitchFamily="34" charset="0"/>
+                        </a:rPr>
+                        <a:t>11 AM PT</a:t>
+                      </a:r>
+                    </a:p>
+                    <a:p>
+                      <a:pPr algn="ctr"/>
+                      <a:r>
+                        <a:rPr lang="en-US" sz="1600" dirty="0">
+                          <a:latin typeface="Agency FB" panose="020B0503020202020204" pitchFamily="34" charset="0"/>
+                        </a:rPr>
+                        <a:t>2 PM ET</a:t>
+                      </a:r>
+                    </a:p>
+                  </a:txBody>
+                  <a:tcPr marL="107715" marR="107715" marT="53858" marB="53858" anchor="ctr">
+                    <a:lnL w="12700" cap="flat" cmpd="sng" algn="ctr">
+                      <a:solidFill>
+                        <a:srgbClr val="5D406C"/>
+                      </a:solidFill>
+                      <a:prstDash val="solid"/>
+                      <a:round/>
+                      <a:headEnd type="none" w="med" len="med"/>
+                      <a:tailEnd type="none" w="med" len="med"/>
+                    </a:lnL>
+                    <a:lnR>
+                      <a:noFill/>
+                    </a:lnR>
+                    <a:lnT w="6350" cap="flat" cmpd="sng" algn="ctr">
+                      <a:noFill/>
+                      <a:prstDash val="solid"/>
+                      <a:miter lim="800000"/>
+                    </a:lnT>
+                    <a:lnB w="12700" cap="flat" cmpd="sng" algn="ctr">
+                      <a:noFill/>
+                      <a:prstDash val="solid"/>
+                      <a:round/>
+                      <a:headEnd type="none" w="med" len="med"/>
+                      <a:tailEnd type="none" w="med" len="med"/>
+                    </a:lnB>
+                    <a:lnTlToBr w="12700" cmpd="sng">
+                      <a:noFill/>
+                      <a:prstDash val="solid"/>
+                    </a:lnTlToBr>
+                    <a:lnBlToTr w="12700" cmpd="sng">
+                      <a:noFill/>
+                      <a:prstDash val="solid"/>
+                    </a:lnBlToTr>
+                    <a:solidFill>
+                      <a:schemeClr val="bg1"/>
+                    </a:solidFill>
+                  </a:tcPr>
+                </a:tc>
+                <a:tc>
+                  <a:txBody>
+                    <a:bodyPr/>
+                    <a:lstStyle/>
+                    <a:p>
+                      <a:pPr algn="ctr"/>
+                      <a:r>
+                        <a:rPr lang="en-US" sz="2000" dirty="0">
+                          <a:latin typeface="Agency FB" panose="020B0503020202020204" pitchFamily="34" charset="0"/>
+                        </a:rPr>
+                        <a:t>MakeCode Arcade (Beginner)</a:t>
+                      </a:r>
+                    </a:p>
+                  </a:txBody>
+                  <a:tcPr marL="107715" marR="107715" marT="53858" marB="53858" anchor="ctr">
+                    <a:lnL w="12700" cap="flat" cmpd="sng" algn="ctr">
+                      <a:noFill/>
+                      <a:prstDash val="solid"/>
+                      <a:round/>
+                      <a:headEnd type="none" w="med" len="med"/>
+                      <a:tailEnd type="none" w="med" len="med"/>
+                    </a:lnL>
+                    <a:lnR w="12700" cap="flat" cmpd="sng" algn="ctr">
+                      <a:solidFill>
+                        <a:srgbClr val="5D406C"/>
+                      </a:solidFill>
+                      <a:prstDash val="solid"/>
+                      <a:round/>
+                      <a:headEnd type="none" w="med" len="med"/>
+                      <a:tailEnd type="none" w="med" len="med"/>
+                    </a:lnR>
+                    <a:lnT w="6350" cap="flat" cmpd="sng" algn="ctr">
+                      <a:noFill/>
+                      <a:prstDash val="solid"/>
+                      <a:miter lim="800000"/>
+                    </a:lnT>
+                    <a:lnB w="12700" cap="flat" cmpd="sng" algn="ctr">
+                      <a:noFill/>
+                      <a:prstDash val="solid"/>
+                      <a:round/>
+                      <a:headEnd type="none" w="med" len="med"/>
+                      <a:tailEnd type="none" w="med" len="med"/>
+                    </a:lnB>
+                    <a:lnTlToBr w="12700" cmpd="sng">
+                      <a:noFill/>
+                      <a:prstDash val="solid"/>
+                    </a:lnTlToBr>
+                    <a:lnBlToTr w="12700" cmpd="sng">
+                      <a:noFill/>
+                      <a:prstDash val="solid"/>
+                    </a:lnBlToTr>
+                    <a:solidFill>
+                      <a:schemeClr val="bg1"/>
+                    </a:solidFill>
+                  </a:tcPr>
+                </a:tc>
+                <a:tc>
+                  <a:txBody>
+                    <a:bodyPr/>
+                    <a:lstStyle/>
+                    <a:p>
+                      <a:pPr algn="ctr"/>
+                      <a:r>
+                        <a:rPr lang="en-US" sz="1600" b="1" dirty="0">
+                          <a:latin typeface="Agency FB" panose="020B0503020202020204" pitchFamily="34" charset="0"/>
+                        </a:rPr>
+                        <a:t>11 AM PT</a:t>
+                      </a:r>
+                    </a:p>
+                    <a:p>
+                      <a:pPr algn="ctr"/>
+                      <a:r>
+                        <a:rPr lang="en-US" sz="1600" dirty="0">
+                          <a:latin typeface="Agency FB" panose="020B0503020202020204" pitchFamily="34" charset="0"/>
+                        </a:rPr>
+                        <a:t>2 PM ET</a:t>
+                      </a:r>
+                    </a:p>
+                  </a:txBody>
+                  <a:tcPr marL="107715" marR="107715" marT="53858" marB="53858" anchor="ctr">
+                    <a:lnL w="12700" cap="flat" cmpd="sng" algn="ctr">
+                      <a:solidFill>
+                        <a:srgbClr val="5D406C"/>
+                      </a:solidFill>
+                      <a:prstDash val="solid"/>
+                      <a:round/>
+                      <a:headEnd type="none" w="med" len="med"/>
+                      <a:tailEnd type="none" w="med" len="med"/>
+                    </a:lnL>
+                    <a:lnR>
+                      <a:noFill/>
+                    </a:lnR>
+                    <a:lnT w="6350" cap="flat" cmpd="sng" algn="ctr">
+                      <a:noFill/>
+                      <a:prstDash val="solid"/>
+                      <a:miter lim="800000"/>
+                    </a:lnT>
+                    <a:lnB w="12700" cap="flat" cmpd="sng" algn="ctr">
+                      <a:noFill/>
+                      <a:prstDash val="solid"/>
+                      <a:round/>
+                      <a:headEnd type="none" w="med" len="med"/>
+                      <a:tailEnd type="none" w="med" len="med"/>
+                    </a:lnB>
+                    <a:lnTlToBr w="12700" cmpd="sng">
+                      <a:noFill/>
+                      <a:prstDash val="solid"/>
+                    </a:lnTlToBr>
+                    <a:lnBlToTr w="12700" cmpd="sng">
+                      <a:noFill/>
+                      <a:prstDash val="solid"/>
+                    </a:lnBlToTr>
+                    <a:solidFill>
+                      <a:schemeClr val="bg1"/>
+                    </a:solidFill>
+                  </a:tcPr>
+                </a:tc>
+                <a:tc>
+                  <a:txBody>
+                    <a:bodyPr/>
+                    <a:lstStyle/>
+                    <a:p>
+                      <a:pPr algn="ctr"/>
+                      <a:r>
+                        <a:rPr lang="en-US" sz="2000" dirty="0">
+                          <a:latin typeface="Agency FB" panose="020B0503020202020204" pitchFamily="34" charset="0"/>
+                        </a:rPr>
+                        <a:t>MakeCode Arcade (Beginner)</a:t>
+                      </a:r>
+                    </a:p>
+                  </a:txBody>
+                  <a:tcPr marL="107715" marR="107715" marT="53858" marB="53858" anchor="ctr">
+                    <a:lnL w="12700" cap="flat" cmpd="sng" algn="ctr">
+                      <a:noFill/>
+                      <a:prstDash val="solid"/>
+                      <a:round/>
+                      <a:headEnd type="none" w="med" len="med"/>
+                      <a:tailEnd type="none" w="med" len="med"/>
+                    </a:lnL>
+                    <a:lnR w="12700" cap="flat" cmpd="sng" algn="ctr">
+                      <a:solidFill>
+                        <a:srgbClr val="5D406C"/>
+                      </a:solidFill>
+                      <a:prstDash val="solid"/>
+                      <a:round/>
+                      <a:headEnd type="none" w="med" len="med"/>
+                      <a:tailEnd type="none" w="med" len="med"/>
+                    </a:lnR>
+                    <a:lnT w="6350" cap="flat" cmpd="sng" algn="ctr">
+                      <a:noFill/>
+                      <a:prstDash val="solid"/>
+                      <a:miter lim="800000"/>
+                    </a:lnT>
+                    <a:lnB w="12700" cap="flat" cmpd="sng" algn="ctr">
+                      <a:noFill/>
+                      <a:prstDash val="solid"/>
+                      <a:round/>
+                      <a:headEnd type="none" w="med" len="med"/>
+                      <a:tailEnd type="none" w="med" len="med"/>
+                    </a:lnB>
+                    <a:lnTlToBr w="12700" cmpd="sng">
+                      <a:noFill/>
+                      <a:prstDash val="solid"/>
+                    </a:lnTlToBr>
+                    <a:lnBlToTr w="12700" cmpd="sng">
+                      <a:noFill/>
+                      <a:prstDash val="solid"/>
+                    </a:lnBlToTr>
+                    <a:solidFill>
+                      <a:schemeClr val="bg1"/>
+                    </a:solidFill>
+                  </a:tcPr>
+                </a:tc>
+                <a:tc>
+                  <a:txBody>
+                    <a:bodyPr/>
+                    <a:lstStyle/>
+                    <a:p>
+                      <a:pPr algn="ctr"/>
+                      <a:r>
+                        <a:rPr lang="en-US" sz="1600" b="1" dirty="0">
+                          <a:latin typeface="Agency FB" panose="020B0503020202020204" pitchFamily="34" charset="0"/>
+                        </a:rPr>
+                        <a:t>11 AM PT</a:t>
+                      </a:r>
+                    </a:p>
+                    <a:p>
+                      <a:pPr algn="ctr"/>
+                      <a:r>
+                        <a:rPr lang="en-US" sz="1600" dirty="0">
+                          <a:latin typeface="Agency FB" panose="020B0503020202020204" pitchFamily="34" charset="0"/>
+                        </a:rPr>
+                        <a:t>2 PM ET</a:t>
+                      </a:r>
+                    </a:p>
+                  </a:txBody>
+                  <a:tcPr marL="107715" marR="107715" marT="53858" marB="53858" anchor="ctr">
+                    <a:lnL w="12700" cap="flat" cmpd="sng" algn="ctr">
+                      <a:solidFill>
+                        <a:srgbClr val="5D406C"/>
+                      </a:solidFill>
+                      <a:prstDash val="solid"/>
+                      <a:round/>
+                      <a:headEnd type="none" w="med" len="med"/>
+                      <a:tailEnd type="none" w="med" len="med"/>
+                    </a:lnL>
+                    <a:lnR>
+                      <a:noFill/>
+                    </a:lnR>
+                    <a:lnT w="6350" cap="flat" cmpd="sng" algn="ctr">
+                      <a:noFill/>
+                      <a:prstDash val="solid"/>
+                      <a:miter lim="800000"/>
+                    </a:lnT>
+                    <a:lnB w="12700" cap="flat" cmpd="sng" algn="ctr">
+                      <a:noFill/>
+                      <a:prstDash val="solid"/>
+                      <a:round/>
+                      <a:headEnd type="none" w="med" len="med"/>
+                      <a:tailEnd type="none" w="med" len="med"/>
+                    </a:lnB>
+                    <a:lnTlToBr w="12700" cmpd="sng">
+                      <a:noFill/>
+                      <a:prstDash val="solid"/>
+                    </a:lnTlToBr>
+                    <a:lnBlToTr w="12700" cmpd="sng">
+                      <a:noFill/>
+                      <a:prstDash val="solid"/>
+                    </a:lnBlToTr>
+                    <a:solidFill>
+                      <a:schemeClr val="bg1"/>
+                    </a:solidFill>
+                  </a:tcPr>
+                </a:tc>
+                <a:tc>
+                  <a:txBody>
+                    <a:bodyPr/>
+                    <a:lstStyle/>
+                    <a:p>
+                      <a:pPr algn="ctr"/>
+                      <a:r>
+                        <a:rPr lang="en-US" sz="2000" dirty="0">
+                          <a:latin typeface="Agency FB" panose="020B0503020202020204" pitchFamily="34" charset="0"/>
+                        </a:rPr>
+                        <a:t>MakeCode Arcade (Beginner)</a:t>
+                      </a:r>
+                    </a:p>
+                  </a:txBody>
+                  <a:tcPr marL="107715" marR="107715" marT="53858" marB="53858" anchor="ctr">
+                    <a:lnL w="12700" cap="flat" cmpd="sng" algn="ctr">
+                      <a:noFill/>
+                      <a:prstDash val="solid"/>
+                      <a:round/>
+                      <a:headEnd type="none" w="med" len="med"/>
+                      <a:tailEnd type="none" w="med" len="med"/>
+                    </a:lnL>
+                    <a:lnR w="12700" cap="flat" cmpd="sng" algn="ctr">
+                      <a:solidFill>
+                        <a:srgbClr val="5D406C"/>
+                      </a:solidFill>
+                      <a:prstDash val="solid"/>
+                      <a:round/>
+                      <a:headEnd type="none" w="med" len="med"/>
+                      <a:tailEnd type="none" w="med" len="med"/>
+                    </a:lnR>
+                    <a:lnT w="6350" cap="flat" cmpd="sng" algn="ctr">
+                      <a:noFill/>
+                      <a:prstDash val="solid"/>
+                      <a:miter lim="800000"/>
+                    </a:lnT>
+                    <a:lnB w="12700" cap="flat" cmpd="sng" algn="ctr">
+                      <a:noFill/>
+                      <a:prstDash val="solid"/>
+                      <a:round/>
+                      <a:headEnd type="none" w="med" len="med"/>
+                      <a:tailEnd type="none" w="med" len="med"/>
+                    </a:lnB>
+                    <a:lnTlToBr w="12700" cmpd="sng">
+                      <a:noFill/>
+                      <a:prstDash val="solid"/>
+                    </a:lnTlToBr>
+                    <a:lnBlToTr w="12700" cmpd="sng">
+                      <a:noFill/>
+                      <a:prstDash val="solid"/>
+                    </a:lnBlToTr>
+                    <a:solidFill>
+                      <a:schemeClr val="bg1"/>
+                    </a:solidFill>
+                  </a:tcPr>
+                </a:tc>
+                <a:tc>
+                  <a:txBody>
+                    <a:bodyPr/>
+                    <a:lstStyle/>
+                    <a:p>
+                      <a:pPr algn="ctr"/>
+                      <a:r>
+                        <a:rPr lang="en-US" sz="1600" b="1" dirty="0">
+                          <a:latin typeface="Agency FB" panose="020B0503020202020204" pitchFamily="34" charset="0"/>
+                        </a:rPr>
+                        <a:t>11 AM PT</a:t>
+                      </a:r>
+                    </a:p>
+                    <a:p>
+                      <a:pPr algn="ctr"/>
+                      <a:r>
+                        <a:rPr lang="en-US" sz="1600" dirty="0">
+                          <a:latin typeface="Agency FB" panose="020B0503020202020204" pitchFamily="34" charset="0"/>
+                        </a:rPr>
+                        <a:t>2 PM ET</a:t>
+                      </a:r>
+                    </a:p>
+                  </a:txBody>
+                  <a:tcPr marL="107715" marR="107715" marT="53858" marB="53858" anchor="ctr">
+                    <a:lnL w="12700" cap="flat" cmpd="sng" algn="ctr">
+                      <a:solidFill>
+                        <a:srgbClr val="5D406C"/>
+                      </a:solidFill>
+                      <a:prstDash val="solid"/>
+                      <a:round/>
+                      <a:headEnd type="none" w="med" len="med"/>
+                      <a:tailEnd type="none" w="med" len="med"/>
+                    </a:lnL>
+                    <a:lnR>
+                      <a:noFill/>
+                    </a:lnR>
+                    <a:lnT w="6350" cap="flat" cmpd="sng" algn="ctr">
+                      <a:noFill/>
+                      <a:prstDash val="solid"/>
+                      <a:miter lim="800000"/>
+                    </a:lnT>
+                    <a:lnB w="12700" cap="flat" cmpd="sng" algn="ctr">
+                      <a:noFill/>
+                      <a:prstDash val="solid"/>
+                      <a:round/>
+                      <a:headEnd type="none" w="med" len="med"/>
+                      <a:tailEnd type="none" w="med" len="med"/>
+                    </a:lnB>
+                    <a:lnTlToBr w="12700" cmpd="sng">
+                      <a:noFill/>
+                      <a:prstDash val="solid"/>
+                    </a:lnTlToBr>
+                    <a:lnBlToTr w="12700" cmpd="sng">
+                      <a:noFill/>
+                      <a:prstDash val="solid"/>
+                    </a:lnBlToTr>
+                    <a:solidFill>
+                      <a:schemeClr val="bg1"/>
+                    </a:solidFill>
+                  </a:tcPr>
+                </a:tc>
+                <a:tc>
+                  <a:txBody>
+                    <a:bodyPr/>
+                    <a:lstStyle/>
+                    <a:p>
+                      <a:pPr algn="ctr"/>
+                      <a:r>
+                        <a:rPr lang="en-US" sz="2000" dirty="0">
+                          <a:latin typeface="Agency FB" panose="020B0503020202020204" pitchFamily="34" charset="0"/>
+                        </a:rPr>
+                        <a:t>MakeCode Arcade (Beginner)</a:t>
+                      </a:r>
+                    </a:p>
+                  </a:txBody>
+                  <a:tcPr marL="107715" marR="107715" marT="53858" marB="53858" anchor="ctr">
+                    <a:lnL w="12700" cap="flat" cmpd="sng" algn="ctr">
+                      <a:noFill/>
+                      <a:prstDash val="solid"/>
+                      <a:round/>
+                      <a:headEnd type="none" w="med" len="med"/>
+                      <a:tailEnd type="none" w="med" len="med"/>
+                    </a:lnL>
+                    <a:lnR w="12700" cap="flat" cmpd="sng" algn="ctr">
+                      <a:solidFill>
+                        <a:srgbClr val="5D406C"/>
+                      </a:solidFill>
+                      <a:prstDash val="solid"/>
+                      <a:round/>
+                      <a:headEnd type="none" w="med" len="med"/>
+                      <a:tailEnd type="none" w="med" len="med"/>
+                    </a:lnR>
+                    <a:lnT w="6350" cap="flat" cmpd="sng" algn="ctr">
+                      <a:noFill/>
+                      <a:prstDash val="solid"/>
+                      <a:miter lim="800000"/>
+                    </a:lnT>
+                    <a:lnB w="12700" cap="flat" cmpd="sng" algn="ctr">
+                      <a:noFill/>
+                      <a:prstDash val="solid"/>
+                      <a:round/>
+                      <a:headEnd type="none" w="med" len="med"/>
+                      <a:tailEnd type="none" w="med" len="med"/>
+                    </a:lnB>
+                    <a:lnTlToBr w="12700" cmpd="sng">
+                      <a:noFill/>
+                      <a:prstDash val="solid"/>
+                    </a:lnTlToBr>
+                    <a:lnBlToTr w="12700" cmpd="sng">
+                      <a:noFill/>
+                      <a:prstDash val="solid"/>
+                    </a:lnBlToTr>
+                    <a:solidFill>
+                      <a:schemeClr val="bg1"/>
+                    </a:solidFill>
+                  </a:tcPr>
+                </a:tc>
+                <a:tc>
+                  <a:txBody>
+                    <a:bodyPr/>
+                    <a:lstStyle/>
+                    <a:p>
+                      <a:pPr algn="ctr"/>
+                      <a:endParaRPr lang="en-US" sz="1600" dirty="0">
+                        <a:latin typeface="Agency FB" panose="020B0503020202020204" pitchFamily="34" charset="0"/>
+                      </a:endParaRPr>
+                    </a:p>
+                  </a:txBody>
+                  <a:tcPr marL="107715" marR="107715" marT="53858" marB="53858" anchor="ctr">
+                    <a:lnL w="12700" cap="flat" cmpd="sng" algn="ctr">
+                      <a:solidFill>
+                        <a:srgbClr val="5D406C"/>
+                      </a:solidFill>
+                      <a:prstDash val="solid"/>
+                      <a:round/>
+                      <a:headEnd type="none" w="med" len="med"/>
+                      <a:tailEnd type="none" w="med" len="med"/>
+                    </a:lnL>
+                    <a:lnR w="12700" cap="flat" cmpd="sng" algn="ctr">
+                      <a:noFill/>
+                      <a:prstDash val="solid"/>
+                      <a:round/>
+                      <a:headEnd type="none" w="med" len="med"/>
+                      <a:tailEnd type="none" w="med" len="med"/>
+                    </a:lnR>
+                    <a:lnT w="12700" cap="flat" cmpd="sng" algn="ctr">
+                      <a:noFill/>
+                      <a:prstDash val="solid"/>
+                      <a:round/>
+                      <a:headEnd type="none" w="med" len="med"/>
+                      <a:tailEnd type="none" w="med" len="med"/>
+                    </a:lnT>
+                    <a:lnB w="12700" cap="flat" cmpd="sng" algn="ctr">
+                      <a:noFill/>
+                      <a:prstDash val="solid"/>
+                      <a:round/>
+                      <a:headEnd type="none" w="med" len="med"/>
+                      <a:tailEnd type="none" w="med" len="med"/>
+                    </a:lnB>
+                    <a:lnTlToBr w="12700" cmpd="sng">
+                      <a:noFill/>
+                      <a:prstDash val="solid"/>
+                    </a:lnTlToBr>
+                    <a:lnBlToTr w="12700" cmpd="sng">
+                      <a:noFill/>
+                      <a:prstDash val="solid"/>
+                    </a:lnBlToTr>
+                    <a:noFill/>
+                  </a:tcPr>
+                </a:tc>
+                <a:tc>
+                  <a:txBody>
+                    <a:bodyPr/>
+                    <a:lstStyle/>
+                    <a:p>
+                      <a:pPr marL="0" marR="0" lvl="0" indent="0" algn="ctr" defTabSz="914400" rtl="0" eaLnBrk="1" fontAlgn="auto" latinLnBrk="0" hangingPunct="1">
+                        <a:lnSpc>
+                          <a:spcPct val="100000"/>
+                        </a:lnSpc>
+                        <a:spcBef>
+                          <a:spcPts val="0"/>
+                        </a:spcBef>
+                        <a:spcAft>
+                          <a:spcPts val="0"/>
+                        </a:spcAft>
+                        <a:buClrTx/>
+                        <a:buSzTx/>
+                        <a:buFontTx/>
+                        <a:buNone/>
+                        <a:tabLst/>
+                        <a:defRPr/>
+                      </a:pPr>
+                      <a:endParaRPr lang="en-US" sz="2000" dirty="0">
+                        <a:latin typeface="Agency FB" panose="020B0503020202020204" pitchFamily="34" charset="0"/>
+                      </a:endParaRPr>
+                    </a:p>
+                  </a:txBody>
+                  <a:tcPr marL="107715" marR="107715" marT="53858" marB="53858" anchor="ctr">
+                    <a:lnL w="12700" cap="flat" cmpd="sng" algn="ctr">
+                      <a:noFill/>
+                      <a:prstDash val="solid"/>
+                      <a:round/>
+                      <a:headEnd type="none" w="med" len="med"/>
+                      <a:tailEnd type="none" w="med" len="med"/>
+                    </a:lnL>
+                    <a:lnR w="12700" cap="flat" cmpd="sng" algn="ctr">
+                      <a:noFill/>
+                      <a:prstDash val="solid"/>
+                      <a:round/>
+                      <a:headEnd type="none" w="med" len="med"/>
+                      <a:tailEnd type="none" w="med" len="med"/>
+                    </a:lnR>
+                    <a:lnT w="12700" cap="flat" cmpd="sng" algn="ctr">
+                      <a:noFill/>
                       <a:prstDash val="solid"/>
                       <a:round/>
                       <a:headEnd type="none" w="med" len="med"/>
@@ -21849,7 +21836,7 @@
           <p:nvPr>
             <p:extLst>
               <p:ext uri="{D42A27DB-BD31-4B8C-83A1-F6EECF244321}">
-                <p14:modId xmlns:p14="http://schemas.microsoft.com/office/powerpoint/2010/main" val="2657240279"/>
+                <p14:modId xmlns:p14="http://schemas.microsoft.com/office/powerpoint/2010/main" val="3846317315"/>
               </p:ext>
             </p:extLst>
           </p:nvPr>
@@ -22142,7 +22129,15 @@
                       <a:endParaRPr lang="en-US"/>
                     </a:p>
                   </a:txBody>
-                  <a:tcPr/>
+                  <a:tcPr>
+                    <a:lnL w="12700" cap="flat" cmpd="sng" algn="ctr">
+                      <a:noFill/>
+                      <a:prstDash val="solid"/>
+                      <a:round/>
+                      <a:headEnd type="none" w="med" len="med"/>
+                      <a:tailEnd type="none" w="med" len="med"/>
+                    </a:lnL>
+                  </a:tcPr>
                 </a:tc>
                 <a:extLst>
                   <a:ext uri="{0D108BD9-81ED-4DB2-BD59-A6C34878D82A}">
@@ -22458,7 +22453,17 @@
                       <a:endParaRPr lang="en-US"/>
                     </a:p>
                   </a:txBody>
-                  <a:tcPr/>
+                  <a:tcPr>
+                    <a:lnL w="12700" cap="flat" cmpd="sng" algn="ctr">
+                      <a:solidFill>
+                        <a:srgbClr val="5D406C"/>
+                      </a:solidFill>
+                      <a:prstDash val="solid"/>
+                      <a:round/>
+                      <a:headEnd type="none" w="med" len="med"/>
+                      <a:tailEnd type="none" w="med" len="med"/>
+                    </a:lnL>
+                  </a:tcPr>
                 </a:tc>
                 <a:extLst>
                   <a:ext uri="{0D108BD9-81ED-4DB2-BD59-A6C34878D82A}">
@@ -23069,10 +23074,16 @@
                         <a:defRPr/>
                       </a:pPr>
                       <a:r>
+                        <a:rPr lang="en-US" sz="2000" dirty="0" err="1">
+                          <a:latin typeface="Agency FB" panose="020B0503020202020204" pitchFamily="34" charset="0"/>
+                        </a:rPr>
+                        <a:t>MakeCode</a:t>
+                      </a:r>
+                      <a:r>
                         <a:rPr lang="en-US" sz="2000" dirty="0">
                           <a:latin typeface="Agency FB" panose="020B0503020202020204" pitchFamily="34" charset="0"/>
                         </a:rPr>
-                        <a:t>MakeCode Arcade (Advanced)</a:t>
+                        <a:t> Arcade (Advanced)</a:t>
                       </a:r>
                     </a:p>
                   </a:txBody>
@@ -23093,11 +23104,6 @@
                       <a:headEnd type="none" w="med" len="med"/>
                       <a:tailEnd type="none" w="med" len="med"/>
                     </a:lnR>
-                    <a:lnT w="6350" cap="flat" cmpd="sng" algn="ctr">
-                      <a:noFill/>
-                      <a:prstDash val="solid"/>
-                      <a:miter lim="800000"/>
-                    </a:lnT>
                     <a:lnB w="6350" cap="flat" cmpd="sng" algn="ctr">
                       <a:noFill/>
                       <a:prstDash val="solid"/>
@@ -23729,10 +23735,16 @@
                         <a:defRPr/>
                       </a:pPr>
                       <a:r>
+                        <a:rPr lang="en-US" sz="2000" dirty="0" err="1">
+                          <a:latin typeface="Agency FB" panose="020B0503020202020204" pitchFamily="34" charset="0"/>
+                        </a:rPr>
+                        <a:t>MakeCode</a:t>
+                      </a:r>
+                      <a:r>
                         <a:rPr lang="en-US" sz="2000" dirty="0">
                           <a:latin typeface="Agency FB" panose="020B0503020202020204" pitchFamily="34" charset="0"/>
                         </a:rPr>
-                        <a:t>MakeCode in the Kitchen</a:t>
+                        <a:t> in the Kitchen</a:t>
                       </a:r>
                     </a:p>
                   </a:txBody>
@@ -38398,9 +38410,12 @@
 </file>
 
 <file path=customXml/item1.xml><?xml version="1.0" encoding="utf-8"?>
-<p:properties xmlns:p="http://schemas.microsoft.com/office/2006/metadata/properties" xmlns:xsi="http://www.w3.org/2001/XMLSchema-instance" xmlns:pc="http://schemas.microsoft.com/office/infopath/2007/PartnerControls">
-  <documentManagement/>
-</p:properties>
+<?mso-contentType ?>
+<FormTemplates xmlns="http://schemas.microsoft.com/sharepoint/v3/contenttype/forms">
+  <Display>DocumentLibraryForm</Display>
+  <Edit>DocumentLibraryForm</Edit>
+  <New>DocumentLibraryForm</New>
+</FormTemplates>
 </file>
 
 <file path=customXml/item2.xml><?xml version="1.0" encoding="utf-8"?>
@@ -38575,27 +38590,15 @@
 </file>
 
 <file path=customXml/item3.xml><?xml version="1.0" encoding="utf-8"?>
-<?mso-contentType ?>
-<FormTemplates xmlns="http://schemas.microsoft.com/sharepoint/v3/contenttype/forms">
-  <Display>DocumentLibraryForm</Display>
-  <Edit>DocumentLibraryForm</Edit>
-  <New>DocumentLibraryForm</New>
-</FormTemplates>
+<p:properties xmlns:p="http://schemas.microsoft.com/office/2006/metadata/properties" xmlns:xsi="http://www.w3.org/2001/XMLSchema-instance" xmlns:pc="http://schemas.microsoft.com/office/infopath/2007/PartnerControls">
+  <documentManagement/>
+</p:properties>
 </file>
 
 <file path=customXml/itemProps1.xml><?xml version="1.0" encoding="utf-8"?>
-<ds:datastoreItem xmlns:ds="http://schemas.openxmlformats.org/officeDocument/2006/customXml" ds:itemID="{60259DF6-DA4D-4E1C-9935-A04345E6A0FE}">
+<ds:datastoreItem xmlns:ds="http://schemas.openxmlformats.org/officeDocument/2006/customXml" ds:itemID="{4080D5DD-FD7F-4E53-9DDB-1149624B0AF8}">
   <ds:schemaRefs>
-    <ds:schemaRef ds:uri="http://schemas.microsoft.com/office/2006/metadata/properties"/>
-    <ds:schemaRef ds:uri="88ced256-c029-4233-a058-f3ec71fefdbe"/>
-    <ds:schemaRef ds:uri="http://schemas.microsoft.com/office/infopath/2007/PartnerControls"/>
-    <ds:schemaRef ds:uri="999ce889-1043-45e4-86ca-a56cfe2271af"/>
-    <ds:schemaRef ds:uri="http://purl.org/dc/dcmitype/"/>
-    <ds:schemaRef ds:uri="http://purl.org/dc/terms/"/>
-    <ds:schemaRef ds:uri="http://schemas.microsoft.com/office/2006/documentManagement/types"/>
-    <ds:schemaRef ds:uri="http://purl.org/dc/elements/1.1/"/>
-    <ds:schemaRef ds:uri="http://schemas.openxmlformats.org/package/2006/metadata/core-properties"/>
-    <ds:schemaRef ds:uri="http://www.w3.org/XML/1998/namespace"/>
+    <ds:schemaRef ds:uri="http://schemas.microsoft.com/sharepoint/v3/contenttype/forms"/>
   </ds:schemaRefs>
 </ds:datastoreItem>
 </file>
@@ -38620,9 +38623,18 @@
 </file>
 
 <file path=customXml/itemProps3.xml><?xml version="1.0" encoding="utf-8"?>
-<ds:datastoreItem xmlns:ds="http://schemas.openxmlformats.org/officeDocument/2006/customXml" ds:itemID="{4080D5DD-FD7F-4E53-9DDB-1149624B0AF8}">
+<ds:datastoreItem xmlns:ds="http://schemas.openxmlformats.org/officeDocument/2006/customXml" ds:itemID="{60259DF6-DA4D-4E1C-9935-A04345E6A0FE}">
   <ds:schemaRefs>
-    <ds:schemaRef ds:uri="http://schemas.microsoft.com/sharepoint/v3/contenttype/forms"/>
+    <ds:schemaRef ds:uri="http://schemas.microsoft.com/office/2006/metadata/properties"/>
+    <ds:schemaRef ds:uri="88ced256-c029-4233-a058-f3ec71fefdbe"/>
+    <ds:schemaRef ds:uri="http://schemas.microsoft.com/office/infopath/2007/PartnerControls"/>
+    <ds:schemaRef ds:uri="999ce889-1043-45e4-86ca-a56cfe2271af"/>
+    <ds:schemaRef ds:uri="http://purl.org/dc/dcmitype/"/>
+    <ds:schemaRef ds:uri="http://purl.org/dc/terms/"/>
+    <ds:schemaRef ds:uri="http://schemas.microsoft.com/office/2006/documentManagement/types"/>
+    <ds:schemaRef ds:uri="http://purl.org/dc/elements/1.1/"/>
+    <ds:schemaRef ds:uri="http://schemas.openxmlformats.org/package/2006/metadata/core-properties"/>
+    <ds:schemaRef ds:uri="http://www.w3.org/XML/1998/namespace"/>
   </ds:schemaRefs>
 </ds:datastoreItem>
 </file>
</xml_diff>

<commit_message>
Removing Friday Arcade Advanced stream from schedule (#7222)
</commit_message>
<xml_diff>
--- a/docs/static/online-learning/Mixer Stream Schedule.pptx
+++ b/docs/static/online-learning/Mixer Stream Schedule.pptx
@@ -220,7 +220,7 @@
           <a:p>
             <a:fld id="{9820A582-7AE2-4948-B06A-742F9F045A83}" type="datetimeFigureOut">
               <a:rPr lang="en-US" smtClean="0"/>
-              <a:t>6/16/2020</a:t>
+              <a:t>6/17/2020</a:t>
             </a:fld>
             <a:endParaRPr lang="en-US"/>
           </a:p>
@@ -2064,7 +2064,7 @@
           <a:p>
             <a:fld id="{EE18C4CC-5113-4103-95F7-16AD5B06551D}" type="datetimeFigureOut">
               <a:rPr lang="en-US" smtClean="0"/>
-              <a:t>6/16/2020</a:t>
+              <a:t>6/17/2020</a:t>
             </a:fld>
             <a:endParaRPr lang="en-US"/>
           </a:p>
@@ -2262,7 +2262,7 @@
           <a:p>
             <a:fld id="{EE18C4CC-5113-4103-95F7-16AD5B06551D}" type="datetimeFigureOut">
               <a:rPr lang="en-US" smtClean="0"/>
-              <a:t>6/16/2020</a:t>
+              <a:t>6/17/2020</a:t>
             </a:fld>
             <a:endParaRPr lang="en-US"/>
           </a:p>
@@ -2470,7 +2470,7 @@
           <a:p>
             <a:fld id="{EE18C4CC-5113-4103-95F7-16AD5B06551D}" type="datetimeFigureOut">
               <a:rPr lang="en-US" smtClean="0"/>
-              <a:t>6/16/2020</a:t>
+              <a:t>6/17/2020</a:t>
             </a:fld>
             <a:endParaRPr lang="en-US"/>
           </a:p>
@@ -2668,7 +2668,7 @@
           <a:p>
             <a:fld id="{EE18C4CC-5113-4103-95F7-16AD5B06551D}" type="datetimeFigureOut">
               <a:rPr lang="en-US" smtClean="0"/>
-              <a:t>6/16/2020</a:t>
+              <a:t>6/17/2020</a:t>
             </a:fld>
             <a:endParaRPr lang="en-US"/>
           </a:p>
@@ -2943,7 +2943,7 @@
           <a:p>
             <a:fld id="{EE18C4CC-5113-4103-95F7-16AD5B06551D}" type="datetimeFigureOut">
               <a:rPr lang="en-US" smtClean="0"/>
-              <a:t>6/16/2020</a:t>
+              <a:t>6/17/2020</a:t>
             </a:fld>
             <a:endParaRPr lang="en-US"/>
           </a:p>
@@ -3208,7 +3208,7 @@
           <a:p>
             <a:fld id="{EE18C4CC-5113-4103-95F7-16AD5B06551D}" type="datetimeFigureOut">
               <a:rPr lang="en-US" smtClean="0"/>
-              <a:t>6/16/2020</a:t>
+              <a:t>6/17/2020</a:t>
             </a:fld>
             <a:endParaRPr lang="en-US"/>
           </a:p>
@@ -3620,7 +3620,7 @@
           <a:p>
             <a:fld id="{EE18C4CC-5113-4103-95F7-16AD5B06551D}" type="datetimeFigureOut">
               <a:rPr lang="en-US" smtClean="0"/>
-              <a:t>6/16/2020</a:t>
+              <a:t>6/17/2020</a:t>
             </a:fld>
             <a:endParaRPr lang="en-US"/>
           </a:p>
@@ -3761,7 +3761,7 @@
           <a:p>
             <a:fld id="{EE18C4CC-5113-4103-95F7-16AD5B06551D}" type="datetimeFigureOut">
               <a:rPr lang="en-US" smtClean="0"/>
-              <a:t>6/16/2020</a:t>
+              <a:t>6/17/2020</a:t>
             </a:fld>
             <a:endParaRPr lang="en-US"/>
           </a:p>
@@ -3874,7 +3874,7 @@
           <a:p>
             <a:fld id="{EE18C4CC-5113-4103-95F7-16AD5B06551D}" type="datetimeFigureOut">
               <a:rPr lang="en-US" smtClean="0"/>
-              <a:t>6/16/2020</a:t>
+              <a:t>6/17/2020</a:t>
             </a:fld>
             <a:endParaRPr lang="en-US"/>
           </a:p>
@@ -4185,7 +4185,7 @@
           <a:p>
             <a:fld id="{EE18C4CC-5113-4103-95F7-16AD5B06551D}" type="datetimeFigureOut">
               <a:rPr lang="en-US" smtClean="0"/>
-              <a:t>6/16/2020</a:t>
+              <a:t>6/17/2020</a:t>
             </a:fld>
             <a:endParaRPr lang="en-US"/>
           </a:p>
@@ -4473,7 +4473,7 @@
           <a:p>
             <a:fld id="{EE18C4CC-5113-4103-95F7-16AD5B06551D}" type="datetimeFigureOut">
               <a:rPr lang="en-US" smtClean="0"/>
-              <a:t>6/16/2020</a:t>
+              <a:t>6/17/2020</a:t>
             </a:fld>
             <a:endParaRPr lang="en-US"/>
           </a:p>
@@ -4714,7 +4714,7 @@
           <a:p>
             <a:fld id="{EE18C4CC-5113-4103-95F7-16AD5B06551D}" type="datetimeFigureOut">
               <a:rPr lang="en-US" smtClean="0"/>
-              <a:t>6/16/2020</a:t>
+              <a:t>6/17/2020</a:t>
             </a:fld>
             <a:endParaRPr lang="en-US"/>
           </a:p>
@@ -17797,14 +17797,14 @@
           <p:nvPr>
             <p:extLst>
               <p:ext uri="{D42A27DB-BD31-4B8C-83A1-F6EECF244321}">
-                <p14:modId xmlns:p14="http://schemas.microsoft.com/office/powerpoint/2010/main" val="2174433737"/>
+                <p14:modId xmlns:p14="http://schemas.microsoft.com/office/powerpoint/2010/main" val="2304407275"/>
               </p:ext>
             </p:extLst>
           </p:nvPr>
         </p:nvGraphicFramePr>
         <p:xfrm>
           <a:off x="163038" y="69918"/>
-          <a:ext cx="11978640" cy="6207860"/>
+          <a:ext cx="11978640" cy="6100144"/>
         </p:xfrm>
         <a:graphic>
           <a:graphicData uri="http://schemas.openxmlformats.org/drawingml/2006/table">
@@ -18941,7 +18941,7 @@
                         <a:rPr lang="en-US" sz="1600" b="1" dirty="0">
                           <a:latin typeface="Agency FB" panose="020B0503020202020204" pitchFamily="34" charset="0"/>
                         </a:rPr>
-                        <a:t>1 PM PT</a:t>
+                        <a:t>2 PM PT</a:t>
                       </a:r>
                     </a:p>
                     <a:p>
@@ -18950,7 +18950,7 @@
                         <a:rPr lang="en-US" sz="1600" dirty="0">
                           <a:latin typeface="Agency FB" panose="020B0503020202020204" pitchFamily="34" charset="0"/>
                         </a:rPr>
-                        <a:t>4 PM ET</a:t>
+                        <a:t>5 PM ET</a:t>
                       </a:r>
                     </a:p>
                   </a:txBody>
@@ -18976,10 +18976,14 @@
                       <a:prstDash val="solid"/>
                       <a:miter lim="800000"/>
                     </a:lnT>
-                    <a:lnB w="6350" cap="flat" cmpd="sng" algn="ctr">
-                      <a:noFill/>
-                      <a:prstDash val="solid"/>
-                      <a:miter lim="800000"/>
+                    <a:lnB w="12700" cap="flat" cmpd="sng" algn="ctr">
+                      <a:solidFill>
+                        <a:schemeClr val="tx1"/>
+                      </a:solidFill>
+                      <a:prstDash val="solid"/>
+                      <a:round/>
+                      <a:headEnd type="none" w="med" len="med"/>
+                      <a:tailEnd type="none" w="med" len="med"/>
                     </a:lnB>
                     <a:lnTlToBr w="12700" cmpd="sng">
                       <a:noFill/>
@@ -19020,7 +19024,7 @@
                         <a:rPr lang="en-US" sz="2000" dirty="0">
                           <a:latin typeface="Agency FB" panose="020B0503020202020204" pitchFamily="34" charset="0"/>
                         </a:rPr>
-                        <a:t>MakeCode Arcade (Advanced)</a:t>
+                        <a:t>MakeCode in the Kitchen</a:t>
                       </a:r>
                     </a:p>
                   </a:txBody>
@@ -19046,10 +19050,14 @@
                       <a:prstDash val="solid"/>
                       <a:miter lim="800000"/>
                     </a:lnT>
-                    <a:lnB w="6350" cap="flat" cmpd="sng" algn="ctr">
-                      <a:noFill/>
-                      <a:prstDash val="solid"/>
-                      <a:miter lim="800000"/>
+                    <a:lnB w="12700" cap="flat" cmpd="sng" algn="ctr">
+                      <a:solidFill>
+                        <a:schemeClr val="tx1"/>
+                      </a:solidFill>
+                      <a:prstDash val="solid"/>
+                      <a:round/>
+                      <a:headEnd type="none" w="med" len="med"/>
+                      <a:tailEnd type="none" w="med" len="med"/>
                     </a:lnB>
                     <a:lnTlToBr w="12700" cmpd="sng">
                       <a:noFill/>
@@ -19557,7 +19565,7 @@
                     </a:lnL>
                     <a:lnR w="12700" cap="flat" cmpd="sng" algn="ctr">
                       <a:solidFill>
-                        <a:srgbClr val="5D406C"/>
+                        <a:schemeClr val="tx1"/>
                       </a:solidFill>
                       <a:prstDash val="solid"/>
                       <a:round/>
@@ -19584,622 +19592,6 @@
                     </a:lnBlToTr>
                     <a:solidFill>
                       <a:srgbClr val="ECE4EB"/>
-                    </a:solidFill>
-                  </a:tcPr>
-                </a:tc>
-                <a:tc>
-                  <a:txBody>
-                    <a:bodyPr/>
-                    <a:lstStyle/>
-                    <a:p>
-                      <a:pPr algn="ctr"/>
-                      <a:r>
-                        <a:rPr lang="en-US" sz="1600" b="1" dirty="0">
-                          <a:latin typeface="Agency FB" panose="020B0503020202020204" pitchFamily="34" charset="0"/>
-                        </a:rPr>
-                        <a:t>2 PM PT</a:t>
-                      </a:r>
-                    </a:p>
-                    <a:p>
-                      <a:pPr algn="ctr"/>
-                      <a:r>
-                        <a:rPr lang="en-US" sz="1600" dirty="0">
-                          <a:latin typeface="Agency FB" panose="020B0503020202020204" pitchFamily="34" charset="0"/>
-                        </a:rPr>
-                        <a:t>5 PM ET</a:t>
-                      </a:r>
-                    </a:p>
-                  </a:txBody>
-                  <a:tcPr marL="107715" marR="107715" marT="53858" marB="53858" anchor="ctr">
-                    <a:lnL w="12700" cap="flat" cmpd="sng" algn="ctr">
-                      <a:solidFill>
-                        <a:srgbClr val="5D406C"/>
-                      </a:solidFill>
-                      <a:prstDash val="solid"/>
-                      <a:round/>
-                      <a:headEnd type="none" w="med" len="med"/>
-                      <a:tailEnd type="none" w="med" len="med"/>
-                    </a:lnL>
-                    <a:lnR w="12700" cap="flat" cmpd="sng" algn="ctr">
-                      <a:noFill/>
-                      <a:prstDash val="solid"/>
-                      <a:round/>
-                      <a:headEnd type="none" w="med" len="med"/>
-                      <a:tailEnd type="none" w="med" len="med"/>
-                    </a:lnR>
-                    <a:lnT w="6350" cap="flat" cmpd="sng" algn="ctr">
-                      <a:noFill/>
-                      <a:prstDash val="solid"/>
-                      <a:miter lim="800000"/>
-                    </a:lnT>
-                    <a:lnB w="12700" cap="flat" cmpd="sng" algn="ctr">
-                      <a:solidFill>
-                        <a:schemeClr val="tx1"/>
-                      </a:solidFill>
-                      <a:prstDash val="solid"/>
-                      <a:round/>
-                      <a:headEnd type="none" w="med" len="med"/>
-                      <a:tailEnd type="none" w="med" len="med"/>
-                    </a:lnB>
-                    <a:lnTlToBr w="12700" cmpd="sng">
-                      <a:noFill/>
-                      <a:prstDash val="solid"/>
-                    </a:lnTlToBr>
-                    <a:lnBlToTr w="12700" cmpd="sng">
-                      <a:noFill/>
-                      <a:prstDash val="solid"/>
-                    </a:lnBlToTr>
-                    <a:solidFill>
-                      <a:srgbClr val="ECE4EB"/>
-                    </a:solidFill>
-                  </a:tcPr>
-                </a:tc>
-                <a:tc>
-                  <a:txBody>
-                    <a:bodyPr/>
-                    <a:lstStyle/>
-                    <a:p>
-                      <a:pPr marL="0" marR="0" lvl="0" indent="0" algn="ctr" defTabSz="914400" rtl="0" eaLnBrk="1" fontAlgn="auto" latinLnBrk="0" hangingPunct="1">
-                        <a:lnSpc>
-                          <a:spcPct val="100000"/>
-                        </a:lnSpc>
-                        <a:spcBef>
-                          <a:spcPts val="0"/>
-                        </a:spcBef>
-                        <a:spcAft>
-                          <a:spcPts val="0"/>
-                        </a:spcAft>
-                        <a:buClrTx/>
-                        <a:buSzTx/>
-                        <a:buFontTx/>
-                        <a:buNone/>
-                        <a:tabLst/>
-                        <a:defRPr/>
-                      </a:pPr>
-                      <a:r>
-                        <a:rPr lang="en-US" sz="2000" dirty="0">
-                          <a:latin typeface="Agency FB" panose="020B0503020202020204" pitchFamily="34" charset="0"/>
-                        </a:rPr>
-                        <a:t>MakeCode in the Kitchen</a:t>
-                      </a:r>
-                    </a:p>
-                  </a:txBody>
-                  <a:tcPr marL="107715" marR="107715" marT="53858" marB="53858" anchor="ctr">
-                    <a:lnL w="12700" cap="flat" cmpd="sng" algn="ctr">
-                      <a:noFill/>
-                      <a:prstDash val="solid"/>
-                      <a:round/>
-                      <a:headEnd type="none" w="med" len="med"/>
-                      <a:tailEnd type="none" w="med" len="med"/>
-                    </a:lnL>
-                    <a:lnR w="12700" cap="flat" cmpd="sng" algn="ctr">
-                      <a:solidFill>
-                        <a:srgbClr val="5D406C"/>
-                      </a:solidFill>
-                      <a:prstDash val="solid"/>
-                      <a:round/>
-                      <a:headEnd type="none" w="med" len="med"/>
-                      <a:tailEnd type="none" w="med" len="med"/>
-                    </a:lnR>
-                    <a:lnT w="6350" cap="flat" cmpd="sng" algn="ctr">
-                      <a:noFill/>
-                      <a:prstDash val="solid"/>
-                      <a:miter lim="800000"/>
-                    </a:lnT>
-                    <a:lnB w="12700" cap="flat" cmpd="sng" algn="ctr">
-                      <a:solidFill>
-                        <a:schemeClr val="tx1"/>
-                      </a:solidFill>
-                      <a:prstDash val="solid"/>
-                      <a:round/>
-                      <a:headEnd type="none" w="med" len="med"/>
-                      <a:tailEnd type="none" w="med" len="med"/>
-                    </a:lnB>
-                    <a:lnTlToBr w="12700" cmpd="sng">
-                      <a:noFill/>
-                      <a:prstDash val="solid"/>
-                    </a:lnTlToBr>
-                    <a:lnBlToTr w="12700" cmpd="sng">
-                      <a:noFill/>
-                      <a:prstDash val="solid"/>
-                    </a:lnBlToTr>
-                    <a:solidFill>
-                      <a:srgbClr val="ECE4EB"/>
-                    </a:solidFill>
-                  </a:tcPr>
-                </a:tc>
-                <a:extLst>
-                  <a:ext uri="{0D108BD9-81ED-4DB2-BD59-A6C34878D82A}">
-                    <a16:rowId xmlns:a16="http://schemas.microsoft.com/office/drawing/2014/main" val="1272730967"/>
-                  </a:ext>
-                </a:extLst>
-              </a:tr>
-              <a:tr h="914400">
-                <a:tc>
-                  <a:txBody>
-                    <a:bodyPr/>
-                    <a:lstStyle/>
-                    <a:p>
-                      <a:pPr algn="ctr"/>
-                      <a:r>
-                        <a:rPr lang="en-US" sz="1600" b="1" dirty="0">
-                          <a:latin typeface="Agency FB" panose="020B0503020202020204" pitchFamily="34" charset="0"/>
-                        </a:rPr>
-                        <a:t>11 AM PT</a:t>
-                      </a:r>
-                    </a:p>
-                    <a:p>
-                      <a:pPr algn="ctr"/>
-                      <a:r>
-                        <a:rPr lang="en-US" sz="1600" dirty="0">
-                          <a:latin typeface="Agency FB" panose="020B0503020202020204" pitchFamily="34" charset="0"/>
-                        </a:rPr>
-                        <a:t>2 PM ET</a:t>
-                      </a:r>
-                    </a:p>
-                  </a:txBody>
-                  <a:tcPr marL="107715" marR="107715" marT="53858" marB="53858" anchor="ctr">
-                    <a:lnL w="12700" cap="flat" cmpd="sng" algn="ctr">
-                      <a:solidFill>
-                        <a:srgbClr val="5D406C"/>
-                      </a:solidFill>
-                      <a:prstDash val="solid"/>
-                      <a:round/>
-                      <a:headEnd type="none" w="med" len="med"/>
-                      <a:tailEnd type="none" w="med" len="med"/>
-                    </a:lnL>
-                    <a:lnR>
-                      <a:noFill/>
-                    </a:lnR>
-                    <a:lnT w="6350" cap="flat" cmpd="sng" algn="ctr">
-                      <a:noFill/>
-                      <a:prstDash val="solid"/>
-                      <a:miter lim="800000"/>
-                    </a:lnT>
-                    <a:lnB w="12700" cap="flat" cmpd="sng" algn="ctr">
-                      <a:noFill/>
-                      <a:prstDash val="solid"/>
-                      <a:round/>
-                      <a:headEnd type="none" w="med" len="med"/>
-                      <a:tailEnd type="none" w="med" len="med"/>
-                    </a:lnB>
-                    <a:lnTlToBr w="12700" cmpd="sng">
-                      <a:noFill/>
-                      <a:prstDash val="solid"/>
-                    </a:lnTlToBr>
-                    <a:lnBlToTr w="12700" cmpd="sng">
-                      <a:noFill/>
-                      <a:prstDash val="solid"/>
-                    </a:lnBlToTr>
-                    <a:solidFill>
-                      <a:schemeClr val="bg1"/>
-                    </a:solidFill>
-                  </a:tcPr>
-                </a:tc>
-                <a:tc>
-                  <a:txBody>
-                    <a:bodyPr/>
-                    <a:lstStyle/>
-                    <a:p>
-                      <a:pPr algn="ctr"/>
-                      <a:r>
-                        <a:rPr lang="en-US" sz="2000" dirty="0">
-                          <a:latin typeface="Agency FB" panose="020B0503020202020204" pitchFamily="34" charset="0"/>
-                        </a:rPr>
-                        <a:t>MakeCode Arcade (Beginner)</a:t>
-                      </a:r>
-                    </a:p>
-                  </a:txBody>
-                  <a:tcPr marL="107715" marR="107715" marT="53858" marB="53858" anchor="ctr">
-                    <a:lnL w="12700" cap="flat" cmpd="sng" algn="ctr">
-                      <a:noFill/>
-                      <a:prstDash val="solid"/>
-                      <a:round/>
-                      <a:headEnd type="none" w="med" len="med"/>
-                      <a:tailEnd type="none" w="med" len="med"/>
-                    </a:lnL>
-                    <a:lnR w="12700" cap="flat" cmpd="sng" algn="ctr">
-                      <a:solidFill>
-                        <a:srgbClr val="5D406C"/>
-                      </a:solidFill>
-                      <a:prstDash val="solid"/>
-                      <a:round/>
-                      <a:headEnd type="none" w="med" len="med"/>
-                      <a:tailEnd type="none" w="med" len="med"/>
-                    </a:lnR>
-                    <a:lnT w="6350" cap="flat" cmpd="sng" algn="ctr">
-                      <a:noFill/>
-                      <a:prstDash val="solid"/>
-                      <a:miter lim="800000"/>
-                    </a:lnT>
-                    <a:lnB w="12700" cap="flat" cmpd="sng" algn="ctr">
-                      <a:noFill/>
-                      <a:prstDash val="solid"/>
-                      <a:round/>
-                      <a:headEnd type="none" w="med" len="med"/>
-                      <a:tailEnd type="none" w="med" len="med"/>
-                    </a:lnB>
-                    <a:lnTlToBr w="12700" cmpd="sng">
-                      <a:noFill/>
-                      <a:prstDash val="solid"/>
-                    </a:lnTlToBr>
-                    <a:lnBlToTr w="12700" cmpd="sng">
-                      <a:noFill/>
-                      <a:prstDash val="solid"/>
-                    </a:lnBlToTr>
-                    <a:solidFill>
-                      <a:schemeClr val="bg1"/>
-                    </a:solidFill>
-                  </a:tcPr>
-                </a:tc>
-                <a:tc>
-                  <a:txBody>
-                    <a:bodyPr/>
-                    <a:lstStyle/>
-                    <a:p>
-                      <a:pPr algn="ctr"/>
-                      <a:r>
-                        <a:rPr lang="en-US" sz="1600" b="1" dirty="0">
-                          <a:latin typeface="Agency FB" panose="020B0503020202020204" pitchFamily="34" charset="0"/>
-                        </a:rPr>
-                        <a:t>11 AM PT</a:t>
-                      </a:r>
-                    </a:p>
-                    <a:p>
-                      <a:pPr algn="ctr"/>
-                      <a:r>
-                        <a:rPr lang="en-US" sz="1600" dirty="0">
-                          <a:latin typeface="Agency FB" panose="020B0503020202020204" pitchFamily="34" charset="0"/>
-                        </a:rPr>
-                        <a:t>2 PM ET</a:t>
-                      </a:r>
-                    </a:p>
-                  </a:txBody>
-                  <a:tcPr marL="107715" marR="107715" marT="53858" marB="53858" anchor="ctr">
-                    <a:lnL w="12700" cap="flat" cmpd="sng" algn="ctr">
-                      <a:solidFill>
-                        <a:srgbClr val="5D406C"/>
-                      </a:solidFill>
-                      <a:prstDash val="solid"/>
-                      <a:round/>
-                      <a:headEnd type="none" w="med" len="med"/>
-                      <a:tailEnd type="none" w="med" len="med"/>
-                    </a:lnL>
-                    <a:lnR>
-                      <a:noFill/>
-                    </a:lnR>
-                    <a:lnT w="6350" cap="flat" cmpd="sng" algn="ctr">
-                      <a:noFill/>
-                      <a:prstDash val="solid"/>
-                      <a:miter lim="800000"/>
-                    </a:lnT>
-                    <a:lnB w="12700" cap="flat" cmpd="sng" algn="ctr">
-                      <a:noFill/>
-                      <a:prstDash val="solid"/>
-                      <a:round/>
-                      <a:headEnd type="none" w="med" len="med"/>
-                      <a:tailEnd type="none" w="med" len="med"/>
-                    </a:lnB>
-                    <a:lnTlToBr w="12700" cmpd="sng">
-                      <a:noFill/>
-                      <a:prstDash val="solid"/>
-                    </a:lnTlToBr>
-                    <a:lnBlToTr w="12700" cmpd="sng">
-                      <a:noFill/>
-                      <a:prstDash val="solid"/>
-                    </a:lnBlToTr>
-                    <a:solidFill>
-                      <a:schemeClr val="bg1"/>
-                    </a:solidFill>
-                  </a:tcPr>
-                </a:tc>
-                <a:tc>
-                  <a:txBody>
-                    <a:bodyPr/>
-                    <a:lstStyle/>
-                    <a:p>
-                      <a:pPr algn="ctr"/>
-                      <a:r>
-                        <a:rPr lang="en-US" sz="2000" dirty="0">
-                          <a:latin typeface="Agency FB" panose="020B0503020202020204" pitchFamily="34" charset="0"/>
-                        </a:rPr>
-                        <a:t>MakeCode Arcade (Beginner)</a:t>
-                      </a:r>
-                    </a:p>
-                  </a:txBody>
-                  <a:tcPr marL="107715" marR="107715" marT="53858" marB="53858" anchor="ctr">
-                    <a:lnL w="12700" cap="flat" cmpd="sng" algn="ctr">
-                      <a:noFill/>
-                      <a:prstDash val="solid"/>
-                      <a:round/>
-                      <a:headEnd type="none" w="med" len="med"/>
-                      <a:tailEnd type="none" w="med" len="med"/>
-                    </a:lnL>
-                    <a:lnR w="12700" cap="flat" cmpd="sng" algn="ctr">
-                      <a:solidFill>
-                        <a:srgbClr val="5D406C"/>
-                      </a:solidFill>
-                      <a:prstDash val="solid"/>
-                      <a:round/>
-                      <a:headEnd type="none" w="med" len="med"/>
-                      <a:tailEnd type="none" w="med" len="med"/>
-                    </a:lnR>
-                    <a:lnT w="6350" cap="flat" cmpd="sng" algn="ctr">
-                      <a:noFill/>
-                      <a:prstDash val="solid"/>
-                      <a:miter lim="800000"/>
-                    </a:lnT>
-                    <a:lnB w="12700" cap="flat" cmpd="sng" algn="ctr">
-                      <a:noFill/>
-                      <a:prstDash val="solid"/>
-                      <a:round/>
-                      <a:headEnd type="none" w="med" len="med"/>
-                      <a:tailEnd type="none" w="med" len="med"/>
-                    </a:lnB>
-                    <a:lnTlToBr w="12700" cmpd="sng">
-                      <a:noFill/>
-                      <a:prstDash val="solid"/>
-                    </a:lnTlToBr>
-                    <a:lnBlToTr w="12700" cmpd="sng">
-                      <a:noFill/>
-                      <a:prstDash val="solid"/>
-                    </a:lnBlToTr>
-                    <a:solidFill>
-                      <a:schemeClr val="bg1"/>
-                    </a:solidFill>
-                  </a:tcPr>
-                </a:tc>
-                <a:tc>
-                  <a:txBody>
-                    <a:bodyPr/>
-                    <a:lstStyle/>
-                    <a:p>
-                      <a:pPr algn="ctr"/>
-                      <a:r>
-                        <a:rPr lang="en-US" sz="1600" b="1" dirty="0">
-                          <a:latin typeface="Agency FB" panose="020B0503020202020204" pitchFamily="34" charset="0"/>
-                        </a:rPr>
-                        <a:t>11 AM PT</a:t>
-                      </a:r>
-                    </a:p>
-                    <a:p>
-                      <a:pPr algn="ctr"/>
-                      <a:r>
-                        <a:rPr lang="en-US" sz="1600" dirty="0">
-                          <a:latin typeface="Agency FB" panose="020B0503020202020204" pitchFamily="34" charset="0"/>
-                        </a:rPr>
-                        <a:t>2 PM ET</a:t>
-                      </a:r>
-                    </a:p>
-                  </a:txBody>
-                  <a:tcPr marL="107715" marR="107715" marT="53858" marB="53858" anchor="ctr">
-                    <a:lnL w="12700" cap="flat" cmpd="sng" algn="ctr">
-                      <a:solidFill>
-                        <a:srgbClr val="5D406C"/>
-                      </a:solidFill>
-                      <a:prstDash val="solid"/>
-                      <a:round/>
-                      <a:headEnd type="none" w="med" len="med"/>
-                      <a:tailEnd type="none" w="med" len="med"/>
-                    </a:lnL>
-                    <a:lnR>
-                      <a:noFill/>
-                    </a:lnR>
-                    <a:lnT w="6350" cap="flat" cmpd="sng" algn="ctr">
-                      <a:noFill/>
-                      <a:prstDash val="solid"/>
-                      <a:miter lim="800000"/>
-                    </a:lnT>
-                    <a:lnB w="12700" cap="flat" cmpd="sng" algn="ctr">
-                      <a:noFill/>
-                      <a:prstDash val="solid"/>
-                      <a:round/>
-                      <a:headEnd type="none" w="med" len="med"/>
-                      <a:tailEnd type="none" w="med" len="med"/>
-                    </a:lnB>
-                    <a:lnTlToBr w="12700" cmpd="sng">
-                      <a:noFill/>
-                      <a:prstDash val="solid"/>
-                    </a:lnTlToBr>
-                    <a:lnBlToTr w="12700" cmpd="sng">
-                      <a:noFill/>
-                      <a:prstDash val="solid"/>
-                    </a:lnBlToTr>
-                    <a:solidFill>
-                      <a:schemeClr val="bg1"/>
-                    </a:solidFill>
-                  </a:tcPr>
-                </a:tc>
-                <a:tc>
-                  <a:txBody>
-                    <a:bodyPr/>
-                    <a:lstStyle/>
-                    <a:p>
-                      <a:pPr algn="ctr"/>
-                      <a:r>
-                        <a:rPr lang="en-US" sz="2000" dirty="0">
-                          <a:latin typeface="Agency FB" panose="020B0503020202020204" pitchFamily="34" charset="0"/>
-                        </a:rPr>
-                        <a:t>MakeCode Arcade (Beginner)</a:t>
-                      </a:r>
-                    </a:p>
-                  </a:txBody>
-                  <a:tcPr marL="107715" marR="107715" marT="53858" marB="53858" anchor="ctr">
-                    <a:lnL w="12700" cap="flat" cmpd="sng" algn="ctr">
-                      <a:noFill/>
-                      <a:prstDash val="solid"/>
-                      <a:round/>
-                      <a:headEnd type="none" w="med" len="med"/>
-                      <a:tailEnd type="none" w="med" len="med"/>
-                    </a:lnL>
-                    <a:lnR w="12700" cap="flat" cmpd="sng" algn="ctr">
-                      <a:solidFill>
-                        <a:srgbClr val="5D406C"/>
-                      </a:solidFill>
-                      <a:prstDash val="solid"/>
-                      <a:round/>
-                      <a:headEnd type="none" w="med" len="med"/>
-                      <a:tailEnd type="none" w="med" len="med"/>
-                    </a:lnR>
-                    <a:lnT w="6350" cap="flat" cmpd="sng" algn="ctr">
-                      <a:noFill/>
-                      <a:prstDash val="solid"/>
-                      <a:miter lim="800000"/>
-                    </a:lnT>
-                    <a:lnB w="12700" cap="flat" cmpd="sng" algn="ctr">
-                      <a:noFill/>
-                      <a:prstDash val="solid"/>
-                      <a:round/>
-                      <a:headEnd type="none" w="med" len="med"/>
-                      <a:tailEnd type="none" w="med" len="med"/>
-                    </a:lnB>
-                    <a:lnTlToBr w="12700" cmpd="sng">
-                      <a:noFill/>
-                      <a:prstDash val="solid"/>
-                    </a:lnTlToBr>
-                    <a:lnBlToTr w="12700" cmpd="sng">
-                      <a:noFill/>
-                      <a:prstDash val="solid"/>
-                    </a:lnBlToTr>
-                    <a:solidFill>
-                      <a:schemeClr val="bg1"/>
-                    </a:solidFill>
-                  </a:tcPr>
-                </a:tc>
-                <a:tc>
-                  <a:txBody>
-                    <a:bodyPr/>
-                    <a:lstStyle/>
-                    <a:p>
-                      <a:pPr algn="ctr"/>
-                      <a:r>
-                        <a:rPr lang="en-US" sz="1600" b="1" dirty="0">
-                          <a:latin typeface="Agency FB" panose="020B0503020202020204" pitchFamily="34" charset="0"/>
-                        </a:rPr>
-                        <a:t>11 AM PT</a:t>
-                      </a:r>
-                    </a:p>
-                    <a:p>
-                      <a:pPr algn="ctr"/>
-                      <a:r>
-                        <a:rPr lang="en-US" sz="1600" dirty="0">
-                          <a:latin typeface="Agency FB" panose="020B0503020202020204" pitchFamily="34" charset="0"/>
-                        </a:rPr>
-                        <a:t>2 PM ET</a:t>
-                      </a:r>
-                    </a:p>
-                  </a:txBody>
-                  <a:tcPr marL="107715" marR="107715" marT="53858" marB="53858" anchor="ctr">
-                    <a:lnL w="12700" cap="flat" cmpd="sng" algn="ctr">
-                      <a:solidFill>
-                        <a:srgbClr val="5D406C"/>
-                      </a:solidFill>
-                      <a:prstDash val="solid"/>
-                      <a:round/>
-                      <a:headEnd type="none" w="med" len="med"/>
-                      <a:tailEnd type="none" w="med" len="med"/>
-                    </a:lnL>
-                    <a:lnR>
-                      <a:noFill/>
-                    </a:lnR>
-                    <a:lnT w="6350" cap="flat" cmpd="sng" algn="ctr">
-                      <a:noFill/>
-                      <a:prstDash val="solid"/>
-                      <a:miter lim="800000"/>
-                    </a:lnT>
-                    <a:lnB w="12700" cap="flat" cmpd="sng" algn="ctr">
-                      <a:noFill/>
-                      <a:prstDash val="solid"/>
-                      <a:round/>
-                      <a:headEnd type="none" w="med" len="med"/>
-                      <a:tailEnd type="none" w="med" len="med"/>
-                    </a:lnB>
-                    <a:lnTlToBr w="12700" cmpd="sng">
-                      <a:noFill/>
-                      <a:prstDash val="solid"/>
-                    </a:lnTlToBr>
-                    <a:lnBlToTr w="12700" cmpd="sng">
-                      <a:noFill/>
-                      <a:prstDash val="solid"/>
-                    </a:lnBlToTr>
-                    <a:solidFill>
-                      <a:schemeClr val="bg1"/>
-                    </a:solidFill>
-                  </a:tcPr>
-                </a:tc>
-                <a:tc>
-                  <a:txBody>
-                    <a:bodyPr/>
-                    <a:lstStyle/>
-                    <a:p>
-                      <a:pPr algn="ctr"/>
-                      <a:r>
-                        <a:rPr lang="en-US" sz="2000" dirty="0">
-                          <a:latin typeface="Agency FB" panose="020B0503020202020204" pitchFamily="34" charset="0"/>
-                        </a:rPr>
-                        <a:t>MakeCode Arcade (Beginner)</a:t>
-                      </a:r>
-                    </a:p>
-                  </a:txBody>
-                  <a:tcPr marL="107715" marR="107715" marT="53858" marB="53858" anchor="ctr">
-                    <a:lnL w="12700" cap="flat" cmpd="sng" algn="ctr">
-                      <a:noFill/>
-                      <a:prstDash val="solid"/>
-                      <a:round/>
-                      <a:headEnd type="none" w="med" len="med"/>
-                      <a:tailEnd type="none" w="med" len="med"/>
-                    </a:lnL>
-                    <a:lnR w="12700" cap="flat" cmpd="sng" algn="ctr">
-                      <a:solidFill>
-                        <a:srgbClr val="5D406C"/>
-                      </a:solidFill>
-                      <a:prstDash val="solid"/>
-                      <a:round/>
-                      <a:headEnd type="none" w="med" len="med"/>
-                      <a:tailEnd type="none" w="med" len="med"/>
-                    </a:lnR>
-                    <a:lnT w="6350" cap="flat" cmpd="sng" algn="ctr">
-                      <a:noFill/>
-                      <a:prstDash val="solid"/>
-                      <a:miter lim="800000"/>
-                    </a:lnT>
-                    <a:lnB w="12700" cap="flat" cmpd="sng" algn="ctr">
-                      <a:noFill/>
-                      <a:prstDash val="solid"/>
-                      <a:round/>
-                      <a:headEnd type="none" w="med" len="med"/>
-                      <a:tailEnd type="none" w="med" len="med"/>
-                    </a:lnB>
-                    <a:lnTlToBr w="12700" cmpd="sng">
-                      <a:noFill/>
-                      <a:prstDash val="solid"/>
-                    </a:lnTlToBr>
-                    <a:lnBlToTr w="12700" cmpd="sng">
-                      <a:noFill/>
-                      <a:prstDash val="solid"/>
-                    </a:lnBlToTr>
-                    <a:solidFill>
-                      <a:schemeClr val="bg1"/>
                     </a:solidFill>
                   </a:tcPr>
                 </a:tc>
@@ -20217,7 +19609,7 @@
                   <a:tcPr marL="107715" marR="107715" marT="53858" marB="53858" anchor="ctr">
                     <a:lnL w="12700" cap="flat" cmpd="sng" algn="ctr">
                       <a:solidFill>
-                        <a:srgbClr val="5D406C"/>
+                        <a:schemeClr val="tx1"/>
                       </a:solidFill>
                       <a:prstDash val="solid"/>
                       <a:round/>
@@ -20304,6 +19696,601 @@
                       <a:solidFill>
                         <a:schemeClr val="tx1"/>
                       </a:solidFill>
+                      <a:prstDash val="solid"/>
+                      <a:round/>
+                      <a:headEnd type="none" w="med" len="med"/>
+                      <a:tailEnd type="none" w="med" len="med"/>
+                    </a:lnT>
+                    <a:lnB w="12700" cap="flat" cmpd="sng" algn="ctr">
+                      <a:noFill/>
+                      <a:prstDash val="solid"/>
+                      <a:round/>
+                      <a:headEnd type="none" w="med" len="med"/>
+                      <a:tailEnd type="none" w="med" len="med"/>
+                    </a:lnB>
+                    <a:lnTlToBr w="12700" cmpd="sng">
+                      <a:noFill/>
+                      <a:prstDash val="solid"/>
+                    </a:lnTlToBr>
+                    <a:lnBlToTr w="12700" cmpd="sng">
+                      <a:noFill/>
+                      <a:prstDash val="solid"/>
+                    </a:lnBlToTr>
+                    <a:noFill/>
+                  </a:tcPr>
+                </a:tc>
+                <a:extLst>
+                  <a:ext uri="{0D108BD9-81ED-4DB2-BD59-A6C34878D82A}">
+                    <a16:rowId xmlns:a16="http://schemas.microsoft.com/office/drawing/2014/main" val="1272730967"/>
+                  </a:ext>
+                </a:extLst>
+              </a:tr>
+              <a:tr h="914400">
+                <a:tc>
+                  <a:txBody>
+                    <a:bodyPr/>
+                    <a:lstStyle/>
+                    <a:p>
+                      <a:pPr algn="ctr"/>
+                      <a:r>
+                        <a:rPr lang="en-US" sz="1600" b="1" dirty="0">
+                          <a:latin typeface="Agency FB" panose="020B0503020202020204" pitchFamily="34" charset="0"/>
+                        </a:rPr>
+                        <a:t>11 AM PT</a:t>
+                      </a:r>
+                    </a:p>
+                    <a:p>
+                      <a:pPr algn="ctr"/>
+                      <a:r>
+                        <a:rPr lang="en-US" sz="1600" dirty="0">
+                          <a:latin typeface="Agency FB" panose="020B0503020202020204" pitchFamily="34" charset="0"/>
+                        </a:rPr>
+                        <a:t>2 PM ET</a:t>
+                      </a:r>
+                    </a:p>
+                  </a:txBody>
+                  <a:tcPr marL="107715" marR="107715" marT="53858" marB="53858" anchor="ctr">
+                    <a:lnL w="12700" cap="flat" cmpd="sng" algn="ctr">
+                      <a:solidFill>
+                        <a:srgbClr val="5D406C"/>
+                      </a:solidFill>
+                      <a:prstDash val="solid"/>
+                      <a:round/>
+                      <a:headEnd type="none" w="med" len="med"/>
+                      <a:tailEnd type="none" w="med" len="med"/>
+                    </a:lnL>
+                    <a:lnR>
+                      <a:noFill/>
+                    </a:lnR>
+                    <a:lnT w="6350" cap="flat" cmpd="sng" algn="ctr">
+                      <a:noFill/>
+                      <a:prstDash val="solid"/>
+                      <a:miter lim="800000"/>
+                    </a:lnT>
+                    <a:lnB w="12700" cap="flat" cmpd="sng" algn="ctr">
+                      <a:noFill/>
+                      <a:prstDash val="solid"/>
+                      <a:round/>
+                      <a:headEnd type="none" w="med" len="med"/>
+                      <a:tailEnd type="none" w="med" len="med"/>
+                    </a:lnB>
+                    <a:lnTlToBr w="12700" cmpd="sng">
+                      <a:noFill/>
+                      <a:prstDash val="solid"/>
+                    </a:lnTlToBr>
+                    <a:lnBlToTr w="12700" cmpd="sng">
+                      <a:noFill/>
+                      <a:prstDash val="solid"/>
+                    </a:lnBlToTr>
+                    <a:solidFill>
+                      <a:schemeClr val="bg1"/>
+                    </a:solidFill>
+                  </a:tcPr>
+                </a:tc>
+                <a:tc>
+                  <a:txBody>
+                    <a:bodyPr/>
+                    <a:lstStyle/>
+                    <a:p>
+                      <a:pPr algn="ctr"/>
+                      <a:r>
+                        <a:rPr lang="en-US" sz="2000" dirty="0">
+                          <a:latin typeface="Agency FB" panose="020B0503020202020204" pitchFamily="34" charset="0"/>
+                        </a:rPr>
+                        <a:t>MakeCode Arcade (Beginner)</a:t>
+                      </a:r>
+                    </a:p>
+                  </a:txBody>
+                  <a:tcPr marL="107715" marR="107715" marT="53858" marB="53858" anchor="ctr">
+                    <a:lnL w="12700" cap="flat" cmpd="sng" algn="ctr">
+                      <a:noFill/>
+                      <a:prstDash val="solid"/>
+                      <a:round/>
+                      <a:headEnd type="none" w="med" len="med"/>
+                      <a:tailEnd type="none" w="med" len="med"/>
+                    </a:lnL>
+                    <a:lnR w="12700" cap="flat" cmpd="sng" algn="ctr">
+                      <a:solidFill>
+                        <a:srgbClr val="5D406C"/>
+                      </a:solidFill>
+                      <a:prstDash val="solid"/>
+                      <a:round/>
+                      <a:headEnd type="none" w="med" len="med"/>
+                      <a:tailEnd type="none" w="med" len="med"/>
+                    </a:lnR>
+                    <a:lnT w="6350" cap="flat" cmpd="sng" algn="ctr">
+                      <a:noFill/>
+                      <a:prstDash val="solid"/>
+                      <a:miter lim="800000"/>
+                    </a:lnT>
+                    <a:lnB w="12700" cap="flat" cmpd="sng" algn="ctr">
+                      <a:noFill/>
+                      <a:prstDash val="solid"/>
+                      <a:round/>
+                      <a:headEnd type="none" w="med" len="med"/>
+                      <a:tailEnd type="none" w="med" len="med"/>
+                    </a:lnB>
+                    <a:lnTlToBr w="12700" cmpd="sng">
+                      <a:noFill/>
+                      <a:prstDash val="solid"/>
+                    </a:lnTlToBr>
+                    <a:lnBlToTr w="12700" cmpd="sng">
+                      <a:noFill/>
+                      <a:prstDash val="solid"/>
+                    </a:lnBlToTr>
+                    <a:solidFill>
+                      <a:schemeClr val="bg1"/>
+                    </a:solidFill>
+                  </a:tcPr>
+                </a:tc>
+                <a:tc>
+                  <a:txBody>
+                    <a:bodyPr/>
+                    <a:lstStyle/>
+                    <a:p>
+                      <a:pPr algn="ctr"/>
+                      <a:r>
+                        <a:rPr lang="en-US" sz="1600" b="1" dirty="0">
+                          <a:latin typeface="Agency FB" panose="020B0503020202020204" pitchFamily="34" charset="0"/>
+                        </a:rPr>
+                        <a:t>11 AM PT</a:t>
+                      </a:r>
+                    </a:p>
+                    <a:p>
+                      <a:pPr algn="ctr"/>
+                      <a:r>
+                        <a:rPr lang="en-US" sz="1600" dirty="0">
+                          <a:latin typeface="Agency FB" panose="020B0503020202020204" pitchFamily="34" charset="0"/>
+                        </a:rPr>
+                        <a:t>2 PM ET</a:t>
+                      </a:r>
+                    </a:p>
+                  </a:txBody>
+                  <a:tcPr marL="107715" marR="107715" marT="53858" marB="53858" anchor="ctr">
+                    <a:lnL w="12700" cap="flat" cmpd="sng" algn="ctr">
+                      <a:solidFill>
+                        <a:srgbClr val="5D406C"/>
+                      </a:solidFill>
+                      <a:prstDash val="solid"/>
+                      <a:round/>
+                      <a:headEnd type="none" w="med" len="med"/>
+                      <a:tailEnd type="none" w="med" len="med"/>
+                    </a:lnL>
+                    <a:lnR>
+                      <a:noFill/>
+                    </a:lnR>
+                    <a:lnT w="6350" cap="flat" cmpd="sng" algn="ctr">
+                      <a:noFill/>
+                      <a:prstDash val="solid"/>
+                      <a:miter lim="800000"/>
+                    </a:lnT>
+                    <a:lnB w="12700" cap="flat" cmpd="sng" algn="ctr">
+                      <a:noFill/>
+                      <a:prstDash val="solid"/>
+                      <a:round/>
+                      <a:headEnd type="none" w="med" len="med"/>
+                      <a:tailEnd type="none" w="med" len="med"/>
+                    </a:lnB>
+                    <a:lnTlToBr w="12700" cmpd="sng">
+                      <a:noFill/>
+                      <a:prstDash val="solid"/>
+                    </a:lnTlToBr>
+                    <a:lnBlToTr w="12700" cmpd="sng">
+                      <a:noFill/>
+                      <a:prstDash val="solid"/>
+                    </a:lnBlToTr>
+                    <a:solidFill>
+                      <a:schemeClr val="bg1"/>
+                    </a:solidFill>
+                  </a:tcPr>
+                </a:tc>
+                <a:tc>
+                  <a:txBody>
+                    <a:bodyPr/>
+                    <a:lstStyle/>
+                    <a:p>
+                      <a:pPr algn="ctr"/>
+                      <a:r>
+                        <a:rPr lang="en-US" sz="2000" dirty="0">
+                          <a:latin typeface="Agency FB" panose="020B0503020202020204" pitchFamily="34" charset="0"/>
+                        </a:rPr>
+                        <a:t>MakeCode Arcade (Beginner)</a:t>
+                      </a:r>
+                    </a:p>
+                  </a:txBody>
+                  <a:tcPr marL="107715" marR="107715" marT="53858" marB="53858" anchor="ctr">
+                    <a:lnL w="12700" cap="flat" cmpd="sng" algn="ctr">
+                      <a:noFill/>
+                      <a:prstDash val="solid"/>
+                      <a:round/>
+                      <a:headEnd type="none" w="med" len="med"/>
+                      <a:tailEnd type="none" w="med" len="med"/>
+                    </a:lnL>
+                    <a:lnR w="12700" cap="flat" cmpd="sng" algn="ctr">
+                      <a:solidFill>
+                        <a:srgbClr val="5D406C"/>
+                      </a:solidFill>
+                      <a:prstDash val="solid"/>
+                      <a:round/>
+                      <a:headEnd type="none" w="med" len="med"/>
+                      <a:tailEnd type="none" w="med" len="med"/>
+                    </a:lnR>
+                    <a:lnT w="6350" cap="flat" cmpd="sng" algn="ctr">
+                      <a:noFill/>
+                      <a:prstDash val="solid"/>
+                      <a:miter lim="800000"/>
+                    </a:lnT>
+                    <a:lnB w="12700" cap="flat" cmpd="sng" algn="ctr">
+                      <a:noFill/>
+                      <a:prstDash val="solid"/>
+                      <a:round/>
+                      <a:headEnd type="none" w="med" len="med"/>
+                      <a:tailEnd type="none" w="med" len="med"/>
+                    </a:lnB>
+                    <a:lnTlToBr w="12700" cmpd="sng">
+                      <a:noFill/>
+                      <a:prstDash val="solid"/>
+                    </a:lnTlToBr>
+                    <a:lnBlToTr w="12700" cmpd="sng">
+                      <a:noFill/>
+                      <a:prstDash val="solid"/>
+                    </a:lnBlToTr>
+                    <a:solidFill>
+                      <a:schemeClr val="bg1"/>
+                    </a:solidFill>
+                  </a:tcPr>
+                </a:tc>
+                <a:tc>
+                  <a:txBody>
+                    <a:bodyPr/>
+                    <a:lstStyle/>
+                    <a:p>
+                      <a:pPr algn="ctr"/>
+                      <a:r>
+                        <a:rPr lang="en-US" sz="1600" b="1" dirty="0">
+                          <a:latin typeface="Agency FB" panose="020B0503020202020204" pitchFamily="34" charset="0"/>
+                        </a:rPr>
+                        <a:t>11 AM PT</a:t>
+                      </a:r>
+                    </a:p>
+                    <a:p>
+                      <a:pPr algn="ctr"/>
+                      <a:r>
+                        <a:rPr lang="en-US" sz="1600" dirty="0">
+                          <a:latin typeface="Agency FB" panose="020B0503020202020204" pitchFamily="34" charset="0"/>
+                        </a:rPr>
+                        <a:t>2 PM ET</a:t>
+                      </a:r>
+                    </a:p>
+                  </a:txBody>
+                  <a:tcPr marL="107715" marR="107715" marT="53858" marB="53858" anchor="ctr">
+                    <a:lnL w="12700" cap="flat" cmpd="sng" algn="ctr">
+                      <a:solidFill>
+                        <a:srgbClr val="5D406C"/>
+                      </a:solidFill>
+                      <a:prstDash val="solid"/>
+                      <a:round/>
+                      <a:headEnd type="none" w="med" len="med"/>
+                      <a:tailEnd type="none" w="med" len="med"/>
+                    </a:lnL>
+                    <a:lnR>
+                      <a:noFill/>
+                    </a:lnR>
+                    <a:lnT w="6350" cap="flat" cmpd="sng" algn="ctr">
+                      <a:noFill/>
+                      <a:prstDash val="solid"/>
+                      <a:miter lim="800000"/>
+                    </a:lnT>
+                    <a:lnB w="12700" cap="flat" cmpd="sng" algn="ctr">
+                      <a:noFill/>
+                      <a:prstDash val="solid"/>
+                      <a:round/>
+                      <a:headEnd type="none" w="med" len="med"/>
+                      <a:tailEnd type="none" w="med" len="med"/>
+                    </a:lnB>
+                    <a:lnTlToBr w="12700" cmpd="sng">
+                      <a:noFill/>
+                      <a:prstDash val="solid"/>
+                    </a:lnTlToBr>
+                    <a:lnBlToTr w="12700" cmpd="sng">
+                      <a:noFill/>
+                      <a:prstDash val="solid"/>
+                    </a:lnBlToTr>
+                    <a:solidFill>
+                      <a:schemeClr val="bg1"/>
+                    </a:solidFill>
+                  </a:tcPr>
+                </a:tc>
+                <a:tc>
+                  <a:txBody>
+                    <a:bodyPr/>
+                    <a:lstStyle/>
+                    <a:p>
+                      <a:pPr algn="ctr"/>
+                      <a:r>
+                        <a:rPr lang="en-US" sz="2000" dirty="0">
+                          <a:latin typeface="Agency FB" panose="020B0503020202020204" pitchFamily="34" charset="0"/>
+                        </a:rPr>
+                        <a:t>MakeCode Arcade (Beginner)</a:t>
+                      </a:r>
+                    </a:p>
+                  </a:txBody>
+                  <a:tcPr marL="107715" marR="107715" marT="53858" marB="53858" anchor="ctr">
+                    <a:lnL w="12700" cap="flat" cmpd="sng" algn="ctr">
+                      <a:noFill/>
+                      <a:prstDash val="solid"/>
+                      <a:round/>
+                      <a:headEnd type="none" w="med" len="med"/>
+                      <a:tailEnd type="none" w="med" len="med"/>
+                    </a:lnL>
+                    <a:lnR w="12700" cap="flat" cmpd="sng" algn="ctr">
+                      <a:solidFill>
+                        <a:srgbClr val="5D406C"/>
+                      </a:solidFill>
+                      <a:prstDash val="solid"/>
+                      <a:round/>
+                      <a:headEnd type="none" w="med" len="med"/>
+                      <a:tailEnd type="none" w="med" len="med"/>
+                    </a:lnR>
+                    <a:lnT w="6350" cap="flat" cmpd="sng" algn="ctr">
+                      <a:noFill/>
+                      <a:prstDash val="solid"/>
+                      <a:miter lim="800000"/>
+                    </a:lnT>
+                    <a:lnB w="12700" cap="flat" cmpd="sng" algn="ctr">
+                      <a:noFill/>
+                      <a:prstDash val="solid"/>
+                      <a:round/>
+                      <a:headEnd type="none" w="med" len="med"/>
+                      <a:tailEnd type="none" w="med" len="med"/>
+                    </a:lnB>
+                    <a:lnTlToBr w="12700" cmpd="sng">
+                      <a:noFill/>
+                      <a:prstDash val="solid"/>
+                    </a:lnTlToBr>
+                    <a:lnBlToTr w="12700" cmpd="sng">
+                      <a:noFill/>
+                      <a:prstDash val="solid"/>
+                    </a:lnBlToTr>
+                    <a:solidFill>
+                      <a:schemeClr val="bg1"/>
+                    </a:solidFill>
+                  </a:tcPr>
+                </a:tc>
+                <a:tc>
+                  <a:txBody>
+                    <a:bodyPr/>
+                    <a:lstStyle/>
+                    <a:p>
+                      <a:pPr algn="ctr"/>
+                      <a:r>
+                        <a:rPr lang="en-US" sz="1600" b="1" dirty="0">
+                          <a:latin typeface="Agency FB" panose="020B0503020202020204" pitchFamily="34" charset="0"/>
+                        </a:rPr>
+                        <a:t>11 AM PT</a:t>
+                      </a:r>
+                    </a:p>
+                    <a:p>
+                      <a:pPr algn="ctr"/>
+                      <a:r>
+                        <a:rPr lang="en-US" sz="1600" dirty="0">
+                          <a:latin typeface="Agency FB" panose="020B0503020202020204" pitchFamily="34" charset="0"/>
+                        </a:rPr>
+                        <a:t>2 PM ET</a:t>
+                      </a:r>
+                    </a:p>
+                  </a:txBody>
+                  <a:tcPr marL="107715" marR="107715" marT="53858" marB="53858" anchor="ctr">
+                    <a:lnL w="12700" cap="flat" cmpd="sng" algn="ctr">
+                      <a:solidFill>
+                        <a:srgbClr val="5D406C"/>
+                      </a:solidFill>
+                      <a:prstDash val="solid"/>
+                      <a:round/>
+                      <a:headEnd type="none" w="med" len="med"/>
+                      <a:tailEnd type="none" w="med" len="med"/>
+                    </a:lnL>
+                    <a:lnR>
+                      <a:noFill/>
+                    </a:lnR>
+                    <a:lnT w="6350" cap="flat" cmpd="sng" algn="ctr">
+                      <a:noFill/>
+                      <a:prstDash val="solid"/>
+                      <a:miter lim="800000"/>
+                    </a:lnT>
+                    <a:lnB w="12700" cap="flat" cmpd="sng" algn="ctr">
+                      <a:noFill/>
+                      <a:prstDash val="solid"/>
+                      <a:round/>
+                      <a:headEnd type="none" w="med" len="med"/>
+                      <a:tailEnd type="none" w="med" len="med"/>
+                    </a:lnB>
+                    <a:lnTlToBr w="12700" cmpd="sng">
+                      <a:noFill/>
+                      <a:prstDash val="solid"/>
+                    </a:lnTlToBr>
+                    <a:lnBlToTr w="12700" cmpd="sng">
+                      <a:noFill/>
+                      <a:prstDash val="solid"/>
+                    </a:lnBlToTr>
+                    <a:solidFill>
+                      <a:schemeClr val="bg1"/>
+                    </a:solidFill>
+                  </a:tcPr>
+                </a:tc>
+                <a:tc>
+                  <a:txBody>
+                    <a:bodyPr/>
+                    <a:lstStyle/>
+                    <a:p>
+                      <a:pPr algn="ctr"/>
+                      <a:r>
+                        <a:rPr lang="en-US" sz="2000" dirty="0">
+                          <a:latin typeface="Agency FB" panose="020B0503020202020204" pitchFamily="34" charset="0"/>
+                        </a:rPr>
+                        <a:t>MakeCode Arcade (Beginner)</a:t>
+                      </a:r>
+                    </a:p>
+                  </a:txBody>
+                  <a:tcPr marL="107715" marR="107715" marT="53858" marB="53858" anchor="ctr">
+                    <a:lnL w="12700" cap="flat" cmpd="sng" algn="ctr">
+                      <a:noFill/>
+                      <a:prstDash val="solid"/>
+                      <a:round/>
+                      <a:headEnd type="none" w="med" len="med"/>
+                      <a:tailEnd type="none" w="med" len="med"/>
+                    </a:lnL>
+                    <a:lnR w="12700" cap="flat" cmpd="sng" algn="ctr">
+                      <a:solidFill>
+                        <a:srgbClr val="5D406C"/>
+                      </a:solidFill>
+                      <a:prstDash val="solid"/>
+                      <a:round/>
+                      <a:headEnd type="none" w="med" len="med"/>
+                      <a:tailEnd type="none" w="med" len="med"/>
+                    </a:lnR>
+                    <a:lnT w="6350" cap="flat" cmpd="sng" algn="ctr">
+                      <a:noFill/>
+                      <a:prstDash val="solid"/>
+                      <a:miter lim="800000"/>
+                    </a:lnT>
+                    <a:lnB w="12700" cap="flat" cmpd="sng" algn="ctr">
+                      <a:noFill/>
+                      <a:prstDash val="solid"/>
+                      <a:round/>
+                      <a:headEnd type="none" w="med" len="med"/>
+                      <a:tailEnd type="none" w="med" len="med"/>
+                    </a:lnB>
+                    <a:lnTlToBr w="12700" cmpd="sng">
+                      <a:noFill/>
+                      <a:prstDash val="solid"/>
+                    </a:lnTlToBr>
+                    <a:lnBlToTr w="12700" cmpd="sng">
+                      <a:noFill/>
+                      <a:prstDash val="solid"/>
+                    </a:lnBlToTr>
+                    <a:solidFill>
+                      <a:schemeClr val="bg1"/>
+                    </a:solidFill>
+                  </a:tcPr>
+                </a:tc>
+                <a:tc>
+                  <a:txBody>
+                    <a:bodyPr/>
+                    <a:lstStyle/>
+                    <a:p>
+                      <a:pPr algn="ctr"/>
+                      <a:endParaRPr lang="en-US" sz="1600" dirty="0">
+                        <a:latin typeface="Agency FB" panose="020B0503020202020204" pitchFamily="34" charset="0"/>
+                      </a:endParaRPr>
+                    </a:p>
+                  </a:txBody>
+                  <a:tcPr marL="107715" marR="107715" marT="53858" marB="53858" anchor="ctr">
+                    <a:lnL w="12700" cap="flat" cmpd="sng" algn="ctr">
+                      <a:solidFill>
+                        <a:srgbClr val="5D406C"/>
+                      </a:solidFill>
+                      <a:prstDash val="solid"/>
+                      <a:round/>
+                      <a:headEnd type="none" w="med" len="med"/>
+                      <a:tailEnd type="none" w="med" len="med"/>
+                    </a:lnL>
+                    <a:lnR w="12700" cap="flat" cmpd="sng" algn="ctr">
+                      <a:noFill/>
+                      <a:prstDash val="solid"/>
+                      <a:round/>
+                      <a:headEnd type="none" w="med" len="med"/>
+                      <a:tailEnd type="none" w="med" len="med"/>
+                    </a:lnR>
+                    <a:lnT w="12700" cap="flat" cmpd="sng" algn="ctr">
+                      <a:noFill/>
+                      <a:prstDash val="solid"/>
+                      <a:round/>
+                      <a:headEnd type="none" w="med" len="med"/>
+                      <a:tailEnd type="none" w="med" len="med"/>
+                    </a:lnT>
+                    <a:lnB w="12700" cap="flat" cmpd="sng" algn="ctr">
+                      <a:noFill/>
+                      <a:prstDash val="solid"/>
+                      <a:round/>
+                      <a:headEnd type="none" w="med" len="med"/>
+                      <a:tailEnd type="none" w="med" len="med"/>
+                    </a:lnB>
+                    <a:lnTlToBr w="12700" cmpd="sng">
+                      <a:noFill/>
+                      <a:prstDash val="solid"/>
+                    </a:lnTlToBr>
+                    <a:lnBlToTr w="12700" cmpd="sng">
+                      <a:noFill/>
+                      <a:prstDash val="solid"/>
+                    </a:lnBlToTr>
+                    <a:noFill/>
+                  </a:tcPr>
+                </a:tc>
+                <a:tc>
+                  <a:txBody>
+                    <a:bodyPr/>
+                    <a:lstStyle/>
+                    <a:p>
+                      <a:pPr marL="0" marR="0" lvl="0" indent="0" algn="ctr" defTabSz="914400" rtl="0" eaLnBrk="1" fontAlgn="auto" latinLnBrk="0" hangingPunct="1">
+                        <a:lnSpc>
+                          <a:spcPct val="100000"/>
+                        </a:lnSpc>
+                        <a:spcBef>
+                          <a:spcPts val="0"/>
+                        </a:spcBef>
+                        <a:spcAft>
+                          <a:spcPts val="0"/>
+                        </a:spcAft>
+                        <a:buClrTx/>
+                        <a:buSzTx/>
+                        <a:buFontTx/>
+                        <a:buNone/>
+                        <a:tabLst/>
+                        <a:defRPr/>
+                      </a:pPr>
+                      <a:endParaRPr lang="en-US" sz="2000" dirty="0">
+                        <a:latin typeface="Agency FB" panose="020B0503020202020204" pitchFamily="34" charset="0"/>
+                      </a:endParaRPr>
+                    </a:p>
+                  </a:txBody>
+                  <a:tcPr marL="107715" marR="107715" marT="53858" marB="53858" anchor="ctr">
+                    <a:lnL w="12700" cap="flat" cmpd="sng" algn="ctr">
+                      <a:noFill/>
+                      <a:prstDash val="solid"/>
+                      <a:round/>
+                      <a:headEnd type="none" w="med" len="med"/>
+                      <a:tailEnd type="none" w="med" len="med"/>
+                    </a:lnL>
+                    <a:lnR w="12700" cap="flat" cmpd="sng" algn="ctr">
+                      <a:noFill/>
+                      <a:prstDash val="solid"/>
+                      <a:round/>
+                      <a:headEnd type="none" w="med" len="med"/>
+                      <a:tailEnd type="none" w="med" len="med"/>
+                    </a:lnR>
+                    <a:lnT w="12700" cap="flat" cmpd="sng" algn="ctr">
+                      <a:noFill/>
                       <a:prstDash val="solid"/>
                       <a:round/>
                       <a:headEnd type="none" w="med" len="med"/>
@@ -21849,7 +21836,7 @@
           <p:nvPr>
             <p:extLst>
               <p:ext uri="{D42A27DB-BD31-4B8C-83A1-F6EECF244321}">
-                <p14:modId xmlns:p14="http://schemas.microsoft.com/office/powerpoint/2010/main" val="2657240279"/>
+                <p14:modId xmlns:p14="http://schemas.microsoft.com/office/powerpoint/2010/main" val="3846317315"/>
               </p:ext>
             </p:extLst>
           </p:nvPr>
@@ -22142,7 +22129,15 @@
                       <a:endParaRPr lang="en-US"/>
                     </a:p>
                   </a:txBody>
-                  <a:tcPr/>
+                  <a:tcPr>
+                    <a:lnL w="12700" cap="flat" cmpd="sng" algn="ctr">
+                      <a:noFill/>
+                      <a:prstDash val="solid"/>
+                      <a:round/>
+                      <a:headEnd type="none" w="med" len="med"/>
+                      <a:tailEnd type="none" w="med" len="med"/>
+                    </a:lnL>
+                  </a:tcPr>
                 </a:tc>
                 <a:extLst>
                   <a:ext uri="{0D108BD9-81ED-4DB2-BD59-A6C34878D82A}">
@@ -22458,7 +22453,17 @@
                       <a:endParaRPr lang="en-US"/>
                     </a:p>
                   </a:txBody>
-                  <a:tcPr/>
+                  <a:tcPr>
+                    <a:lnL w="12700" cap="flat" cmpd="sng" algn="ctr">
+                      <a:solidFill>
+                        <a:srgbClr val="5D406C"/>
+                      </a:solidFill>
+                      <a:prstDash val="solid"/>
+                      <a:round/>
+                      <a:headEnd type="none" w="med" len="med"/>
+                      <a:tailEnd type="none" w="med" len="med"/>
+                    </a:lnL>
+                  </a:tcPr>
                 </a:tc>
                 <a:extLst>
                   <a:ext uri="{0D108BD9-81ED-4DB2-BD59-A6C34878D82A}">
@@ -23069,10 +23074,16 @@
                         <a:defRPr/>
                       </a:pPr>
                       <a:r>
+                        <a:rPr lang="en-US" sz="2000" dirty="0" err="1">
+                          <a:latin typeface="Agency FB" panose="020B0503020202020204" pitchFamily="34" charset="0"/>
+                        </a:rPr>
+                        <a:t>MakeCode</a:t>
+                      </a:r>
+                      <a:r>
                         <a:rPr lang="en-US" sz="2000" dirty="0">
                           <a:latin typeface="Agency FB" panose="020B0503020202020204" pitchFamily="34" charset="0"/>
                         </a:rPr>
-                        <a:t>MakeCode Arcade (Advanced)</a:t>
+                        <a:t> Arcade (Advanced)</a:t>
                       </a:r>
                     </a:p>
                   </a:txBody>
@@ -23093,11 +23104,6 @@
                       <a:headEnd type="none" w="med" len="med"/>
                       <a:tailEnd type="none" w="med" len="med"/>
                     </a:lnR>
-                    <a:lnT w="6350" cap="flat" cmpd="sng" algn="ctr">
-                      <a:noFill/>
-                      <a:prstDash val="solid"/>
-                      <a:miter lim="800000"/>
-                    </a:lnT>
                     <a:lnB w="6350" cap="flat" cmpd="sng" algn="ctr">
                       <a:noFill/>
                       <a:prstDash val="solid"/>
@@ -23729,10 +23735,16 @@
                         <a:defRPr/>
                       </a:pPr>
                       <a:r>
+                        <a:rPr lang="en-US" sz="2000" dirty="0" err="1">
+                          <a:latin typeface="Agency FB" panose="020B0503020202020204" pitchFamily="34" charset="0"/>
+                        </a:rPr>
+                        <a:t>MakeCode</a:t>
+                      </a:r>
+                      <a:r>
                         <a:rPr lang="en-US" sz="2000" dirty="0">
                           <a:latin typeface="Agency FB" panose="020B0503020202020204" pitchFamily="34" charset="0"/>
                         </a:rPr>
-                        <a:t>MakeCode in the Kitchen</a:t>
+                        <a:t> in the Kitchen</a:t>
                       </a:r>
                     </a:p>
                   </a:txBody>
@@ -38398,9 +38410,12 @@
 </file>
 
 <file path=customXml/item1.xml><?xml version="1.0" encoding="utf-8"?>
-<p:properties xmlns:p="http://schemas.microsoft.com/office/2006/metadata/properties" xmlns:xsi="http://www.w3.org/2001/XMLSchema-instance" xmlns:pc="http://schemas.microsoft.com/office/infopath/2007/PartnerControls">
-  <documentManagement/>
-</p:properties>
+<?mso-contentType ?>
+<FormTemplates xmlns="http://schemas.microsoft.com/sharepoint/v3/contenttype/forms">
+  <Display>DocumentLibraryForm</Display>
+  <Edit>DocumentLibraryForm</Edit>
+  <New>DocumentLibraryForm</New>
+</FormTemplates>
 </file>
 
 <file path=customXml/item2.xml><?xml version="1.0" encoding="utf-8"?>
@@ -38575,27 +38590,15 @@
 </file>
 
 <file path=customXml/item3.xml><?xml version="1.0" encoding="utf-8"?>
-<?mso-contentType ?>
-<FormTemplates xmlns="http://schemas.microsoft.com/sharepoint/v3/contenttype/forms">
-  <Display>DocumentLibraryForm</Display>
-  <Edit>DocumentLibraryForm</Edit>
-  <New>DocumentLibraryForm</New>
-</FormTemplates>
+<p:properties xmlns:p="http://schemas.microsoft.com/office/2006/metadata/properties" xmlns:xsi="http://www.w3.org/2001/XMLSchema-instance" xmlns:pc="http://schemas.microsoft.com/office/infopath/2007/PartnerControls">
+  <documentManagement/>
+</p:properties>
 </file>
 
 <file path=customXml/itemProps1.xml><?xml version="1.0" encoding="utf-8"?>
-<ds:datastoreItem xmlns:ds="http://schemas.openxmlformats.org/officeDocument/2006/customXml" ds:itemID="{60259DF6-DA4D-4E1C-9935-A04345E6A0FE}">
+<ds:datastoreItem xmlns:ds="http://schemas.openxmlformats.org/officeDocument/2006/customXml" ds:itemID="{4080D5DD-FD7F-4E53-9DDB-1149624B0AF8}">
   <ds:schemaRefs>
-    <ds:schemaRef ds:uri="http://schemas.microsoft.com/office/2006/metadata/properties"/>
-    <ds:schemaRef ds:uri="88ced256-c029-4233-a058-f3ec71fefdbe"/>
-    <ds:schemaRef ds:uri="http://schemas.microsoft.com/office/infopath/2007/PartnerControls"/>
-    <ds:schemaRef ds:uri="999ce889-1043-45e4-86ca-a56cfe2271af"/>
-    <ds:schemaRef ds:uri="http://purl.org/dc/dcmitype/"/>
-    <ds:schemaRef ds:uri="http://purl.org/dc/terms/"/>
-    <ds:schemaRef ds:uri="http://schemas.microsoft.com/office/2006/documentManagement/types"/>
-    <ds:schemaRef ds:uri="http://purl.org/dc/elements/1.1/"/>
-    <ds:schemaRef ds:uri="http://schemas.openxmlformats.org/package/2006/metadata/core-properties"/>
-    <ds:schemaRef ds:uri="http://www.w3.org/XML/1998/namespace"/>
+    <ds:schemaRef ds:uri="http://schemas.microsoft.com/sharepoint/v3/contenttype/forms"/>
   </ds:schemaRefs>
 </ds:datastoreItem>
 </file>
@@ -38620,9 +38623,18 @@
 </file>
 
 <file path=customXml/itemProps3.xml><?xml version="1.0" encoding="utf-8"?>
-<ds:datastoreItem xmlns:ds="http://schemas.openxmlformats.org/officeDocument/2006/customXml" ds:itemID="{4080D5DD-FD7F-4E53-9DDB-1149624B0AF8}">
+<ds:datastoreItem xmlns:ds="http://schemas.openxmlformats.org/officeDocument/2006/customXml" ds:itemID="{60259DF6-DA4D-4E1C-9935-A04345E6A0FE}">
   <ds:schemaRefs>
-    <ds:schemaRef ds:uri="http://schemas.microsoft.com/sharepoint/v3/contenttype/forms"/>
+    <ds:schemaRef ds:uri="http://schemas.microsoft.com/office/2006/metadata/properties"/>
+    <ds:schemaRef ds:uri="88ced256-c029-4233-a058-f3ec71fefdbe"/>
+    <ds:schemaRef ds:uri="http://schemas.microsoft.com/office/infopath/2007/PartnerControls"/>
+    <ds:schemaRef ds:uri="999ce889-1043-45e4-86ca-a56cfe2271af"/>
+    <ds:schemaRef ds:uri="http://purl.org/dc/dcmitype/"/>
+    <ds:schemaRef ds:uri="http://purl.org/dc/terms/"/>
+    <ds:schemaRef ds:uri="http://schemas.microsoft.com/office/2006/documentManagement/types"/>
+    <ds:schemaRef ds:uri="http://purl.org/dc/elements/1.1/"/>
+    <ds:schemaRef ds:uri="http://schemas.openxmlformats.org/package/2006/metadata/core-properties"/>
+    <ds:schemaRef ds:uri="http://www.w3.org/XML/1998/namespace"/>
   </ds:schemaRefs>
 </ds:datastoreItem>
 </file>
</xml_diff>